<commit_message>
some ideas on attestation
</commit_message>
<xml_diff>
--- a/img/source.pptx
+++ b/img/source.pptx
@@ -9,6 +9,10 @@
     <p:sldId id="270" r:id="rId3"/>
     <p:sldId id="260" r:id="rId4"/>
     <p:sldId id="263" r:id="rId5"/>
+    <p:sldId id="271" r:id="rId6"/>
+    <p:sldId id="272" r:id="rId7"/>
+    <p:sldId id="274" r:id="rId8"/>
+    <p:sldId id="275" r:id="rId9"/>
   </p:sldIdLst>
   <p:sldSz cx="9144000" cy="6858000" type="screen4x3"/>
   <p:notesSz cx="6858000" cy="9144000"/>
@@ -291,7 +295,7 @@
           <a:p>
             <a:fld id="{CC555D53-45D0-4CF5-A018-A4852F53D1B1}" type="datetimeFigureOut">
               <a:rPr lang="de-DE" smtClean="0"/>
-              <a:t>08.11.2018</a:t>
+              <a:t>02.03.2019</a:t>
             </a:fld>
             <a:endParaRPr lang="de-DE"/>
           </a:p>
@@ -461,7 +465,7 @@
           <a:p>
             <a:fld id="{CC555D53-45D0-4CF5-A018-A4852F53D1B1}" type="datetimeFigureOut">
               <a:rPr lang="de-DE" smtClean="0"/>
-              <a:t>08.11.2018</a:t>
+              <a:t>02.03.2019</a:t>
             </a:fld>
             <a:endParaRPr lang="de-DE"/>
           </a:p>
@@ -641,7 +645,7 @@
           <a:p>
             <a:fld id="{CC555D53-45D0-4CF5-A018-A4852F53D1B1}" type="datetimeFigureOut">
               <a:rPr lang="de-DE" smtClean="0"/>
-              <a:t>08.11.2018</a:t>
+              <a:t>02.03.2019</a:t>
             </a:fld>
             <a:endParaRPr lang="de-DE"/>
           </a:p>
@@ -811,7 +815,7 @@
           <a:p>
             <a:fld id="{CC555D53-45D0-4CF5-A018-A4852F53D1B1}" type="datetimeFigureOut">
               <a:rPr lang="de-DE" smtClean="0"/>
-              <a:t>08.11.2018</a:t>
+              <a:t>02.03.2019</a:t>
             </a:fld>
             <a:endParaRPr lang="de-DE"/>
           </a:p>
@@ -1057,7 +1061,7 @@
           <a:p>
             <a:fld id="{CC555D53-45D0-4CF5-A018-A4852F53D1B1}" type="datetimeFigureOut">
               <a:rPr lang="de-DE" smtClean="0"/>
-              <a:t>08.11.2018</a:t>
+              <a:t>02.03.2019</a:t>
             </a:fld>
             <a:endParaRPr lang="de-DE"/>
           </a:p>
@@ -1345,7 +1349,7 @@
           <a:p>
             <a:fld id="{CC555D53-45D0-4CF5-A018-A4852F53D1B1}" type="datetimeFigureOut">
               <a:rPr lang="de-DE" smtClean="0"/>
-              <a:t>08.11.2018</a:t>
+              <a:t>02.03.2019</a:t>
             </a:fld>
             <a:endParaRPr lang="de-DE"/>
           </a:p>
@@ -1767,7 +1771,7 @@
           <a:p>
             <a:fld id="{CC555D53-45D0-4CF5-A018-A4852F53D1B1}" type="datetimeFigureOut">
               <a:rPr lang="de-DE" smtClean="0"/>
-              <a:t>08.11.2018</a:t>
+              <a:t>02.03.2019</a:t>
             </a:fld>
             <a:endParaRPr lang="de-DE"/>
           </a:p>
@@ -1885,7 +1889,7 @@
           <a:p>
             <a:fld id="{CC555D53-45D0-4CF5-A018-A4852F53D1B1}" type="datetimeFigureOut">
               <a:rPr lang="de-DE" smtClean="0"/>
-              <a:t>08.11.2018</a:t>
+              <a:t>02.03.2019</a:t>
             </a:fld>
             <a:endParaRPr lang="de-DE"/>
           </a:p>
@@ -1980,7 +1984,7 @@
           <a:p>
             <a:fld id="{CC555D53-45D0-4CF5-A018-A4852F53D1B1}" type="datetimeFigureOut">
               <a:rPr lang="de-DE" smtClean="0"/>
-              <a:t>08.11.2018</a:t>
+              <a:t>02.03.2019</a:t>
             </a:fld>
             <a:endParaRPr lang="de-DE"/>
           </a:p>
@@ -2257,7 +2261,7 @@
           <a:p>
             <a:fld id="{CC555D53-45D0-4CF5-A018-A4852F53D1B1}" type="datetimeFigureOut">
               <a:rPr lang="de-DE" smtClean="0"/>
-              <a:t>08.11.2018</a:t>
+              <a:t>02.03.2019</a:t>
             </a:fld>
             <a:endParaRPr lang="de-DE"/>
           </a:p>
@@ -2510,7 +2514,7 @@
           <a:p>
             <a:fld id="{CC555D53-45D0-4CF5-A018-A4852F53D1B1}" type="datetimeFigureOut">
               <a:rPr lang="de-DE" smtClean="0"/>
-              <a:t>08.11.2018</a:t>
+              <a:t>02.03.2019</a:t>
             </a:fld>
             <a:endParaRPr lang="de-DE"/>
           </a:p>
@@ -2723,7 +2727,7 @@
           <a:p>
             <a:fld id="{CC555D53-45D0-4CF5-A018-A4852F53D1B1}" type="datetimeFigureOut">
               <a:rPr lang="de-DE" smtClean="0"/>
-              <a:t>08.11.2018</a:t>
+              <a:t>02.03.2019</a:t>
             </a:fld>
             <a:endParaRPr lang="de-DE"/>
           </a:p>
@@ -3598,7 +3602,7 @@
         </p:nvSpPr>
         <p:spPr>
           <a:xfrm>
-            <a:off x="149218" y="4283804"/>
+            <a:off x="149218" y="3899191"/>
             <a:ext cx="1726435" cy="369332"/>
           </a:xfrm>
           <a:prstGeom prst="rect">
@@ -3647,7 +3651,7 @@
         </p:nvSpPr>
         <p:spPr>
           <a:xfrm>
-            <a:off x="1368253" y="5336048"/>
+            <a:off x="1368253" y="5561364"/>
             <a:ext cx="1438471" cy="369332"/>
           </a:xfrm>
           <a:prstGeom prst="rect">
@@ -3691,7 +3695,7 @@
         </p:nvSpPr>
         <p:spPr>
           <a:xfrm>
-            <a:off x="3923928" y="5633372"/>
+            <a:off x="3923928" y="5858688"/>
             <a:ext cx="2119106" cy="369332"/>
           </a:xfrm>
           <a:prstGeom prst="rect">
@@ -3735,7 +3739,7 @@
         </p:nvSpPr>
         <p:spPr>
           <a:xfrm>
-            <a:off x="1331640" y="5930696"/>
+            <a:off x="1331640" y="6156012"/>
             <a:ext cx="2348913" cy="369332"/>
           </a:xfrm>
           <a:prstGeom prst="rect">
@@ -3779,7 +3783,7 @@
         </p:nvSpPr>
         <p:spPr>
           <a:xfrm>
-            <a:off x="3874907" y="6228020"/>
+            <a:off x="3874907" y="6453336"/>
             <a:ext cx="2065245" cy="369332"/>
           </a:xfrm>
           <a:prstGeom prst="rect">
@@ -3823,7 +3827,7 @@
         </p:nvSpPr>
         <p:spPr>
           <a:xfrm>
-            <a:off x="899592" y="4653136"/>
+            <a:off x="899592" y="4293096"/>
             <a:ext cx="216024" cy="216024"/>
           </a:xfrm>
           <a:prstGeom prst="triangle">
@@ -3864,8 +3868,8 @@
         </p:nvCxnSpPr>
         <p:spPr>
           <a:xfrm rot="16200000" flipH="1">
-            <a:off x="862151" y="5014612"/>
-            <a:ext cx="651554" cy="360649"/>
+            <a:off x="569473" y="4947250"/>
+            <a:ext cx="1236910" cy="360649"/>
           </a:xfrm>
           <a:prstGeom prst="bentConnector2">
             <a:avLst/>
@@ -3897,8 +3901,8 @@
         </p:nvCxnSpPr>
         <p:spPr>
           <a:xfrm rot="16200000" flipH="1">
-            <a:off x="1991327" y="3885437"/>
-            <a:ext cx="948878" cy="2916324"/>
+            <a:off x="1698649" y="3818075"/>
+            <a:ext cx="1534234" cy="2916324"/>
           </a:xfrm>
           <a:prstGeom prst="bentConnector2">
             <a:avLst/>
@@ -3930,8 +3934,8 @@
         </p:nvCxnSpPr>
         <p:spPr>
           <a:xfrm rot="16200000" flipH="1">
-            <a:off x="546521" y="5330243"/>
-            <a:ext cx="1246202" cy="324036"/>
+            <a:off x="253843" y="5262881"/>
+            <a:ext cx="1831558" cy="324036"/>
           </a:xfrm>
           <a:prstGeom prst="bentConnector2">
             <a:avLst/>
@@ -3963,8 +3967,8 @@
         </p:nvCxnSpPr>
         <p:spPr>
           <a:xfrm rot="16200000" flipH="1">
-            <a:off x="1669492" y="4207271"/>
-            <a:ext cx="1543526" cy="2867303"/>
+            <a:off x="1376814" y="4139909"/>
+            <a:ext cx="2128882" cy="2867303"/>
           </a:xfrm>
           <a:prstGeom prst="bentConnector2">
             <a:avLst/>
@@ -3993,7 +3997,7 @@
         </p:nvSpPr>
         <p:spPr>
           <a:xfrm>
-            <a:off x="3995936" y="4798893"/>
+            <a:off x="3995936" y="5024209"/>
             <a:ext cx="1786258" cy="646331"/>
           </a:xfrm>
           <a:prstGeom prst="rect">
@@ -4046,7 +4050,7 @@
         </p:nvSpPr>
         <p:spPr>
           <a:xfrm>
-            <a:off x="2937313" y="4717593"/>
+            <a:off x="2937313" y="5363924"/>
             <a:ext cx="1130631" cy="369332"/>
           </a:xfrm>
           <a:prstGeom prst="rect">
@@ -4076,8 +4080,8 @@
         </p:nvSpPr>
         <p:spPr>
           <a:xfrm>
-            <a:off x="6973354" y="4942909"/>
-            <a:ext cx="1199046" cy="369332"/>
+            <a:off x="6973354" y="5168225"/>
+            <a:ext cx="1772921" cy="369332"/>
           </a:xfrm>
           <a:prstGeom prst="rect">
             <a:avLst/>
@@ -4109,11 +4113,7 @@
           <a:p>
             <a:r>
               <a:rPr lang="de-DE" dirty="0" smtClean="0"/>
-              <a:t>corpus</a:t>
-            </a:r>
-            <a:r>
-              <a:rPr lang="de-DE" dirty="0"/>
-              <a:t> </a:t>
+              <a:t>corpus/locus </a:t>
             </a:r>
             <a:r>
               <a:rPr lang="de-DE" dirty="0" smtClean="0"/>
@@ -4134,7 +4134,7 @@
         </p:nvCxnSpPr>
         <p:spPr>
           <a:xfrm>
-            <a:off x="5782194" y="5122059"/>
+            <a:off x="5782194" y="5347375"/>
             <a:ext cx="1191160" cy="5516"/>
           </a:xfrm>
           <a:prstGeom prst="straightConnector1">
@@ -4167,7 +4167,7 @@
         </p:nvSpPr>
         <p:spPr>
           <a:xfrm>
-            <a:off x="5858094" y="4654877"/>
+            <a:off x="5796136" y="5373216"/>
             <a:ext cx="1090170" cy="369332"/>
           </a:xfrm>
           <a:prstGeom prst="rect">
@@ -4200,7 +4200,7 @@
         </p:nvCxnSpPr>
         <p:spPr>
           <a:xfrm>
-            <a:off x="3995936" y="5122059"/>
+            <a:off x="3995936" y="5347375"/>
             <a:ext cx="1786258" cy="0"/>
           </a:xfrm>
           <a:prstGeom prst="line">
@@ -4230,8 +4230,8 @@
         </p:nvSpPr>
         <p:spPr>
           <a:xfrm>
-            <a:off x="2924200" y="4222829"/>
-            <a:ext cx="954236" cy="369332"/>
+            <a:off x="2924200" y="3683167"/>
+            <a:ext cx="1210075" cy="369332"/>
           </a:xfrm>
           <a:prstGeom prst="rect">
             <a:avLst/>
@@ -4246,7 +4246,7 @@
           <a:p>
             <a:r>
               <a:rPr lang="de-DE" i="1" dirty="0" smtClean="0"/>
-              <a:t>attested</a:t>
+              <a:t>attestation</a:t>
             </a:r>
             <a:endParaRPr lang="de-DE" i="1" dirty="0"/>
           </a:p>
@@ -4257,14 +4257,14 @@
           <p:cNvPr id="27" name="Elbow Connector 26"/>
           <p:cNvCxnSpPr>
             <a:stCxn id="4" idx="3"/>
-            <a:endCxn id="30" idx="1"/>
+            <a:endCxn id="79" idx="1"/>
           </p:cNvCxnSpPr>
           <p:nvPr/>
         </p:nvCxnSpPr>
         <p:spPr>
-          <a:xfrm>
-            <a:off x="1875653" y="4468470"/>
-            <a:ext cx="2120283" cy="155049"/>
+          <a:xfrm flipV="1">
+            <a:off x="1875653" y="4080860"/>
+            <a:ext cx="3848475" cy="2997"/>
           </a:xfrm>
           <a:prstGeom prst="bentConnector3">
             <a:avLst/>
@@ -4291,43 +4291,13 @@
       </p:cxnSp>
       <p:sp>
         <p:nvSpPr>
-          <p:cNvPr id="30" name="TextBox 29"/>
-          <p:cNvSpPr txBox="1"/>
-          <p:nvPr/>
-        </p:nvSpPr>
-        <p:spPr>
-          <a:xfrm>
-            <a:off x="3995936" y="4438853"/>
-            <a:ext cx="357790" cy="369332"/>
-          </a:xfrm>
-          <a:prstGeom prst="rect">
-            <a:avLst/>
-          </a:prstGeom>
-          <a:noFill/>
-        </p:spPr>
-        <p:txBody>
-          <a:bodyPr wrap="none" rtlCol="0">
-            <a:spAutoFit/>
-          </a:bodyPr>
-          <a:lstStyle/>
-          <a:p>
-            <a:r>
-              <a:rPr lang="de-DE" dirty="0" smtClean="0"/>
-              <a:t>...</a:t>
-            </a:r>
-            <a:endParaRPr lang="de-DE" dirty="0"/>
-          </a:p>
-        </p:txBody>
-      </p:sp>
-      <p:sp>
-        <p:nvSpPr>
           <p:cNvPr id="32" name="TextBox 31"/>
           <p:cNvSpPr txBox="1"/>
           <p:nvPr/>
         </p:nvSpPr>
         <p:spPr>
           <a:xfrm>
-            <a:off x="3995936" y="3310532"/>
+            <a:off x="3995936" y="2415078"/>
             <a:ext cx="2180982" cy="1200329"/>
           </a:xfrm>
           <a:prstGeom prst="rect">
@@ -4393,7 +4363,7 @@
         </p:nvSpPr>
         <p:spPr>
           <a:xfrm>
-            <a:off x="2833311" y="3502749"/>
+            <a:off x="2833311" y="2607295"/>
             <a:ext cx="1234633" cy="369332"/>
           </a:xfrm>
           <a:prstGeom prst="rect">
@@ -4423,7 +4393,7 @@
         </p:nvCxnSpPr>
         <p:spPr>
           <a:xfrm>
-            <a:off x="3995936" y="3646765"/>
+            <a:off x="3995936" y="2751311"/>
             <a:ext cx="2180982" cy="0"/>
           </a:xfrm>
           <a:prstGeom prst="line">
@@ -4456,8 +4426,8 @@
         </p:nvCxnSpPr>
         <p:spPr>
           <a:xfrm>
-            <a:off x="6176918" y="3910697"/>
-            <a:ext cx="1395959" cy="1032212"/>
+            <a:off x="6176918" y="3015243"/>
+            <a:ext cx="1682897" cy="2152982"/>
           </a:xfrm>
           <a:prstGeom prst="bentConnector2">
             <a:avLst/>
@@ -4493,8 +4463,8 @@
         </p:nvCxnSpPr>
         <p:spPr>
           <a:xfrm flipV="1">
-            <a:off x="1875653" y="3910697"/>
-            <a:ext cx="2120283" cy="557773"/>
+            <a:off x="1875653" y="3015243"/>
+            <a:ext cx="2120283" cy="1068614"/>
           </a:xfrm>
           <a:prstGeom prst="bentConnector3">
             <a:avLst>
@@ -4529,7 +4499,7 @@
         </p:nvSpPr>
         <p:spPr>
           <a:xfrm>
-            <a:off x="6377738" y="4006805"/>
+            <a:off x="6724724" y="2596262"/>
             <a:ext cx="1090170" cy="369332"/>
           </a:xfrm>
           <a:prstGeom prst="rect">
@@ -4562,8 +4532,8 @@
         </p:nvCxnSpPr>
         <p:spPr>
           <a:xfrm>
-            <a:off x="1875653" y="4468470"/>
-            <a:ext cx="2120283" cy="653589"/>
+            <a:off x="1875653" y="4083857"/>
+            <a:ext cx="2120283" cy="1263518"/>
           </a:xfrm>
           <a:prstGeom prst="bentConnector3">
             <a:avLst/>
@@ -4596,7 +4566,7 @@
         </p:nvSpPr>
         <p:spPr>
           <a:xfrm>
-            <a:off x="6329812" y="1792863"/>
+            <a:off x="6712953" y="846693"/>
             <a:ext cx="1090170" cy="369332"/>
           </a:xfrm>
           <a:prstGeom prst="rect">
@@ -4626,7 +4596,7 @@
         </p:nvGrpSpPr>
         <p:grpSpPr>
           <a:xfrm>
-            <a:off x="329393" y="1453414"/>
+            <a:off x="329393" y="557960"/>
             <a:ext cx="1074255" cy="369332"/>
             <a:chOff x="4355976" y="1268760"/>
             <a:chExt cx="1074255" cy="369332"/>
@@ -4726,7 +4696,7 @@
         </p:nvCxnSpPr>
         <p:spPr>
           <a:xfrm flipV="1">
-            <a:off x="1403648" y="1658417"/>
+            <a:off x="1403648" y="762963"/>
             <a:ext cx="648072" cy="955"/>
           </a:xfrm>
           <a:prstGeom prst="bentConnector3">
@@ -4761,8 +4731,8 @@
         </p:nvCxnSpPr>
         <p:spPr>
           <a:xfrm>
-            <a:off x="1009711" y="2934236"/>
-            <a:ext cx="2725" cy="1349568"/>
+            <a:off x="1009711" y="2038782"/>
+            <a:ext cx="2725" cy="1860409"/>
           </a:xfrm>
           <a:prstGeom prst="straightConnector1">
             <a:avLst/>
@@ -4794,7 +4764,7 @@
         </p:nvSpPr>
         <p:spPr>
           <a:xfrm>
-            <a:off x="1319331" y="3000434"/>
+            <a:off x="1319331" y="2104980"/>
             <a:ext cx="1032719" cy="646331"/>
           </a:xfrm>
           <a:prstGeom prst="rect">
@@ -4830,7 +4800,7 @@
         </p:nvGrpSpPr>
         <p:grpSpPr>
           <a:xfrm>
-            <a:off x="2051720" y="1196752"/>
+            <a:off x="2051720" y="301298"/>
             <a:ext cx="2180982" cy="1152128"/>
             <a:chOff x="3779912" y="2420888"/>
             <a:chExt cx="2180982" cy="1152128"/>
@@ -4973,7 +4943,7 @@
         </p:nvSpPr>
         <p:spPr>
           <a:xfrm>
-            <a:off x="395536" y="2564904"/>
+            <a:off x="395536" y="1669450"/>
             <a:ext cx="1228350" cy="369332"/>
           </a:xfrm>
           <a:prstGeom prst="rect">
@@ -5023,7 +4993,7 @@
         </p:nvCxnSpPr>
         <p:spPr>
           <a:xfrm rot="5400000">
-            <a:off x="1980766" y="1377826"/>
+            <a:off x="1980766" y="482372"/>
             <a:ext cx="216024" cy="2158133"/>
           </a:xfrm>
           <a:prstGeom prst="bentConnector3">
@@ -5055,7 +5025,7 @@
         </p:nvSpPr>
         <p:spPr>
           <a:xfrm>
-            <a:off x="4572000" y="2555612"/>
+            <a:off x="4572000" y="1660158"/>
             <a:ext cx="1059906" cy="369332"/>
           </a:xfrm>
           <a:prstGeom prst="rect">
@@ -5105,7 +5075,7 @@
         </p:nvCxnSpPr>
         <p:spPr>
           <a:xfrm rot="16200000" flipH="1">
-            <a:off x="4031532" y="1485191"/>
+            <a:off x="4031532" y="589737"/>
             <a:ext cx="206732" cy="1934109"/>
           </a:xfrm>
           <a:prstGeom prst="bentConnector3">
@@ -5140,7 +5110,7 @@
         </p:nvCxnSpPr>
         <p:spPr>
           <a:xfrm flipH="1">
-            <a:off x="5086427" y="2924944"/>
+            <a:off x="5086427" y="2029490"/>
             <a:ext cx="15526" cy="385588"/>
           </a:xfrm>
           <a:prstGeom prst="straightConnector1">
@@ -5173,7 +5143,7 @@
         </p:nvSpPr>
         <p:spPr>
           <a:xfrm>
-            <a:off x="5207768" y="2915652"/>
+            <a:off x="5207768" y="2020198"/>
             <a:ext cx="2460576" cy="369332"/>
           </a:xfrm>
           <a:prstGeom prst="rect">
@@ -5210,8 +5180,8 @@
         </p:nvCxnSpPr>
         <p:spPr>
           <a:xfrm>
-            <a:off x="4232702" y="1658417"/>
-            <a:ext cx="3340175" cy="3284492"/>
+            <a:off x="4232702" y="762963"/>
+            <a:ext cx="3627113" cy="4405262"/>
           </a:xfrm>
           <a:prstGeom prst="bentConnector2">
             <a:avLst/>
@@ -5247,7 +5217,7 @@
         </p:nvCxnSpPr>
         <p:spPr>
           <a:xfrm rot="16200000" flipH="1" flipV="1">
-            <a:off x="1815317" y="126519"/>
+            <a:off x="1815317" y="-768935"/>
             <a:ext cx="256662" cy="2397127"/>
           </a:xfrm>
           <a:prstGeom prst="bentConnector3">
@@ -5283,7 +5253,7 @@
         </p:nvSpPr>
         <p:spPr>
           <a:xfrm>
-            <a:off x="1475656" y="611396"/>
+            <a:off x="1039030" y="116632"/>
             <a:ext cx="873252" cy="369332"/>
           </a:xfrm>
           <a:prstGeom prst="rect">
@@ -5305,6 +5275,354 @@
           </a:p>
         </p:txBody>
       </p:sp>
+      <p:cxnSp>
+        <p:nvCxnSpPr>
+          <p:cNvPr id="51" name="Elbow Connector 50"/>
+          <p:cNvCxnSpPr>
+            <a:stCxn id="79" idx="3"/>
+            <a:endCxn id="17" idx="0"/>
+          </p:cNvCxnSpPr>
+          <p:nvPr/>
+        </p:nvCxnSpPr>
+        <p:spPr>
+          <a:xfrm>
+            <a:off x="7473838" y="4080860"/>
+            <a:ext cx="385977" cy="1087365"/>
+          </a:xfrm>
+          <a:prstGeom prst="bentConnector2">
+            <a:avLst/>
+          </a:prstGeom>
+          <a:ln>
+            <a:headEnd type="none" w="med" len="med"/>
+            <a:tailEnd type="arrow" w="med" len="med"/>
+          </a:ln>
+        </p:spPr>
+        <p:style>
+          <a:lnRef idx="2">
+            <a:schemeClr val="dk1"/>
+          </a:lnRef>
+          <a:fillRef idx="0">
+            <a:schemeClr val="dk1"/>
+          </a:fillRef>
+          <a:effectRef idx="1">
+            <a:schemeClr val="dk1"/>
+          </a:effectRef>
+          <a:fontRef idx="minor">
+            <a:schemeClr val="tx1"/>
+          </a:fontRef>
+        </p:style>
+      </p:cxnSp>
+      <p:sp>
+        <p:nvSpPr>
+          <p:cNvPr id="52" name="TextBox 51"/>
+          <p:cNvSpPr txBox="1"/>
+          <p:nvPr/>
+        </p:nvSpPr>
+        <p:spPr>
+          <a:xfrm>
+            <a:off x="6735358" y="4648122"/>
+            <a:ext cx="1090170" cy="369332"/>
+          </a:xfrm>
+          <a:prstGeom prst="rect">
+            <a:avLst/>
+          </a:prstGeom>
+          <a:noFill/>
+        </p:spPr>
+        <p:txBody>
+          <a:bodyPr wrap="none" rtlCol="0">
+            <a:spAutoFit/>
+          </a:bodyPr>
+          <a:lstStyle/>
+          <a:p>
+            <a:r>
+              <a:rPr lang="de-DE" dirty="0" smtClean="0"/>
+              <a:t>dc:source</a:t>
+            </a:r>
+            <a:endParaRPr lang="de-DE" dirty="0"/>
+          </a:p>
+        </p:txBody>
+      </p:sp>
+      <p:sp>
+        <p:nvSpPr>
+          <p:cNvPr id="71" name="TextBox 70"/>
+          <p:cNvSpPr txBox="1"/>
+          <p:nvPr/>
+        </p:nvSpPr>
+        <p:spPr>
+          <a:xfrm>
+            <a:off x="3995936" y="4456672"/>
+            <a:ext cx="917302" cy="369332"/>
+          </a:xfrm>
+          <a:prstGeom prst="rect">
+            <a:avLst/>
+          </a:prstGeom>
+          <a:solidFill>
+            <a:schemeClr val="bg2"/>
+          </a:solidFill>
+          <a:ln/>
+        </p:spPr>
+        <p:style>
+          <a:lnRef idx="2">
+            <a:schemeClr val="dk1"/>
+          </a:lnRef>
+          <a:fillRef idx="1">
+            <a:schemeClr val="lt1"/>
+          </a:fillRef>
+          <a:effectRef idx="0">
+            <a:schemeClr val="dk1"/>
+          </a:effectRef>
+          <a:fontRef idx="minor">
+            <a:schemeClr val="dk1"/>
+          </a:fontRef>
+        </p:style>
+        <p:txBody>
+          <a:bodyPr wrap="none" rtlCol="0">
+            <a:spAutoFit/>
+          </a:bodyPr>
+          <a:lstStyle/>
+          <a:p>
+            <a:r>
+              <a:rPr lang="de-DE" i="1" dirty="0" smtClean="0"/>
+              <a:t>Citation</a:t>
+            </a:r>
+          </a:p>
+        </p:txBody>
+      </p:sp>
+      <p:sp>
+        <p:nvSpPr>
+          <p:cNvPr id="73" name="TextBox 72"/>
+          <p:cNvSpPr txBox="1"/>
+          <p:nvPr/>
+        </p:nvSpPr>
+        <p:spPr>
+          <a:xfrm>
+            <a:off x="3004896" y="4681987"/>
+            <a:ext cx="891462" cy="369332"/>
+          </a:xfrm>
+          <a:prstGeom prst="rect">
+            <a:avLst/>
+          </a:prstGeom>
+          <a:noFill/>
+        </p:spPr>
+        <p:txBody>
+          <a:bodyPr wrap="none" rtlCol="0">
+            <a:spAutoFit/>
+          </a:bodyPr>
+          <a:lstStyle/>
+          <a:p>
+            <a:r>
+              <a:rPr lang="de-DE" i="1" dirty="0" smtClean="0"/>
+              <a:t>citation</a:t>
+            </a:r>
+            <a:endParaRPr lang="de-DE" i="1" dirty="0"/>
+          </a:p>
+        </p:txBody>
+      </p:sp>
+      <p:sp>
+        <p:nvSpPr>
+          <p:cNvPr id="75" name="TextBox 74"/>
+          <p:cNvSpPr txBox="1"/>
+          <p:nvPr/>
+        </p:nvSpPr>
+        <p:spPr>
+          <a:xfrm>
+            <a:off x="4932040" y="4663404"/>
+            <a:ext cx="1815625" cy="369332"/>
+          </a:xfrm>
+          <a:prstGeom prst="rect">
+            <a:avLst/>
+          </a:prstGeom>
+          <a:noFill/>
+        </p:spPr>
+        <p:txBody>
+          <a:bodyPr wrap="none" rtlCol="0">
+            <a:spAutoFit/>
+          </a:bodyPr>
+          <a:lstStyle/>
+          <a:p>
+            <a:r>
+              <a:rPr lang="de-DE" i="1" dirty="0" smtClean="0"/>
+              <a:t>makesAttestation</a:t>
+            </a:r>
+          </a:p>
+        </p:txBody>
+      </p:sp>
+      <p:grpSp>
+        <p:nvGrpSpPr>
+          <p:cNvPr id="77" name="Group 76"/>
+          <p:cNvGrpSpPr/>
+          <p:nvPr/>
+        </p:nvGrpSpPr>
+        <p:grpSpPr>
+          <a:xfrm>
+            <a:off x="5724128" y="3757694"/>
+            <a:ext cx="1749710" cy="646331"/>
+            <a:chOff x="8176191" y="6138279"/>
+            <a:chExt cx="1749710" cy="646331"/>
+          </a:xfrm>
+        </p:grpSpPr>
+        <p:sp>
+          <p:nvSpPr>
+            <p:cNvPr id="79" name="TextBox 78"/>
+            <p:cNvSpPr txBox="1"/>
+            <p:nvPr/>
+          </p:nvSpPr>
+          <p:spPr>
+            <a:xfrm>
+              <a:off x="8176191" y="6138279"/>
+              <a:ext cx="1749710" cy="646331"/>
+            </a:xfrm>
+            <a:prstGeom prst="rect">
+              <a:avLst/>
+            </a:prstGeom>
+            <a:solidFill>
+              <a:schemeClr val="bg2"/>
+            </a:solidFill>
+            <a:ln/>
+          </p:spPr>
+          <p:style>
+            <a:lnRef idx="2">
+              <a:schemeClr val="dk1"/>
+            </a:lnRef>
+            <a:fillRef idx="1">
+              <a:schemeClr val="lt1"/>
+            </a:fillRef>
+            <a:effectRef idx="0">
+              <a:schemeClr val="dk1"/>
+            </a:effectRef>
+            <a:fontRef idx="minor">
+              <a:schemeClr val="dk1"/>
+            </a:fontRef>
+          </p:style>
+          <p:txBody>
+            <a:bodyPr wrap="none" rtlCol="0">
+              <a:spAutoFit/>
+            </a:bodyPr>
+            <a:lstStyle/>
+            <a:p>
+              <a:r>
+                <a:rPr lang="de-DE" i="1" dirty="0" smtClean="0"/>
+                <a:t>Attestation</a:t>
+              </a:r>
+            </a:p>
+            <a:p>
+              <a:r>
+                <a:rPr lang="de-DE" dirty="0" smtClean="0"/>
+                <a:t>quotation: string</a:t>
+              </a:r>
+            </a:p>
+          </p:txBody>
+        </p:sp>
+        <p:cxnSp>
+          <p:nvCxnSpPr>
+            <p:cNvPr id="80" name="Straight Connector 79"/>
+            <p:cNvCxnSpPr>
+              <a:stCxn id="79" idx="1"/>
+              <a:endCxn id="79" idx="3"/>
+            </p:cNvCxnSpPr>
+            <p:nvPr/>
+          </p:nvCxnSpPr>
+          <p:spPr>
+            <a:xfrm>
+              <a:off x="8176191" y="6461445"/>
+              <a:ext cx="1749710" cy="0"/>
+            </a:xfrm>
+            <a:prstGeom prst="line">
+              <a:avLst/>
+            </a:prstGeom>
+          </p:spPr>
+          <p:style>
+            <a:lnRef idx="1">
+              <a:schemeClr val="dk1"/>
+            </a:lnRef>
+            <a:fillRef idx="0">
+              <a:schemeClr val="dk1"/>
+            </a:fillRef>
+            <a:effectRef idx="0">
+              <a:schemeClr val="dk1"/>
+            </a:effectRef>
+            <a:fontRef idx="minor">
+              <a:schemeClr val="tx1"/>
+            </a:fontRef>
+          </p:style>
+        </p:cxnSp>
+      </p:grpSp>
+      <p:cxnSp>
+        <p:nvCxnSpPr>
+          <p:cNvPr id="82" name="Elbow Connector 81"/>
+          <p:cNvCxnSpPr>
+            <a:stCxn id="4" idx="3"/>
+            <a:endCxn id="71" idx="1"/>
+          </p:cNvCxnSpPr>
+          <p:nvPr/>
+        </p:nvCxnSpPr>
+        <p:spPr>
+          <a:xfrm>
+            <a:off x="1875653" y="4083857"/>
+            <a:ext cx="2120283" cy="557481"/>
+          </a:xfrm>
+          <a:prstGeom prst="bentConnector3">
+            <a:avLst>
+              <a:gd name="adj1" fmla="val 50000"/>
+            </a:avLst>
+          </a:prstGeom>
+          <a:ln>
+            <a:headEnd type="none" w="med" len="med"/>
+            <a:tailEnd type="arrow" w="med" len="med"/>
+          </a:ln>
+        </p:spPr>
+        <p:style>
+          <a:lnRef idx="2">
+            <a:schemeClr val="dk1"/>
+          </a:lnRef>
+          <a:fillRef idx="0">
+            <a:schemeClr val="dk1"/>
+          </a:fillRef>
+          <a:effectRef idx="1">
+            <a:schemeClr val="dk1"/>
+          </a:effectRef>
+          <a:fontRef idx="minor">
+            <a:schemeClr val="tx1"/>
+          </a:fontRef>
+        </p:style>
+      </p:cxnSp>
+      <p:cxnSp>
+        <p:nvCxnSpPr>
+          <p:cNvPr id="83" name="Elbow Connector 82"/>
+          <p:cNvCxnSpPr>
+            <a:stCxn id="71" idx="3"/>
+            <a:endCxn id="79" idx="2"/>
+          </p:cNvCxnSpPr>
+          <p:nvPr/>
+        </p:nvCxnSpPr>
+        <p:spPr>
+          <a:xfrm flipV="1">
+            <a:off x="4913238" y="4404025"/>
+            <a:ext cx="1685745" cy="237313"/>
+          </a:xfrm>
+          <a:prstGeom prst="bentConnector2">
+            <a:avLst/>
+          </a:prstGeom>
+          <a:ln>
+            <a:headEnd type="none" w="med" len="med"/>
+            <a:tailEnd type="arrow" w="med" len="med"/>
+          </a:ln>
+        </p:spPr>
+        <p:style>
+          <a:lnRef idx="2">
+            <a:schemeClr val="dk1"/>
+          </a:lnRef>
+          <a:fillRef idx="0">
+            <a:schemeClr val="dk1"/>
+          </a:fillRef>
+          <a:effectRef idx="1">
+            <a:schemeClr val="dk1"/>
+          </a:effectRef>
+          <a:fontRef idx="minor">
+            <a:schemeClr val="tx1"/>
+          </a:fontRef>
+        </p:style>
+      </p:cxnSp>
     </p:spTree>
     <p:extLst>
       <p:ext uri="{BB962C8B-B14F-4D97-AF65-F5344CB8AC3E}">
@@ -6549,6 +6867,3218 @@
     <p:extLst>
       <p:ext uri="{BB962C8B-B14F-4D97-AF65-F5344CB8AC3E}">
         <p14:creationId xmlns:p14="http://schemas.microsoft.com/office/powerpoint/2010/main" val="4243423979"/>
+      </p:ext>
+    </p:extLst>
+  </p:cSld>
+  <p:clrMapOvr>
+    <a:masterClrMapping/>
+  </p:clrMapOvr>
+</p:sld>
+</file>
+
+<file path=ppt/slides/slide5.xml><?xml version="1.0" encoding="utf-8"?>
+<p:sld xmlns:a="http://schemas.openxmlformats.org/drawingml/2006/main" xmlns:r="http://schemas.openxmlformats.org/officeDocument/2006/relationships" xmlns:p="http://schemas.openxmlformats.org/presentationml/2006/main">
+  <p:cSld>
+    <p:spTree>
+      <p:nvGrpSpPr>
+        <p:cNvPr id="1" name=""/>
+        <p:cNvGrpSpPr/>
+        <p:nvPr/>
+      </p:nvGrpSpPr>
+      <p:grpSpPr>
+        <a:xfrm>
+          <a:off x="0" y="0"/>
+          <a:ext cx="0" cy="0"/>
+          <a:chOff x="0" y="0"/>
+          <a:chExt cx="0" cy="0"/>
+        </a:xfrm>
+      </p:grpSpPr>
+      <p:pic>
+        <p:nvPicPr>
+          <p:cNvPr id="1026" name="Picture 2" descr="C:\Users\chiarcos\Desktop\corpus\ontolex-frac\trunk\img\attestations-lexcit.png"/>
+          <p:cNvPicPr>
+            <a:picLocks noChangeAspect="1" noChangeArrowheads="1"/>
+          </p:cNvPicPr>
+          <p:nvPr/>
+        </p:nvPicPr>
+        <p:blipFill>
+          <a:blip r:embed="rId2">
+            <a:extLst>
+              <a:ext uri="{28A0092B-C50C-407E-A947-70E740481C1C}">
+                <a14:useLocalDpi xmlns:a14="http://schemas.microsoft.com/office/drawing/2010/main" val="0"/>
+              </a:ext>
+            </a:extLst>
+          </a:blip>
+          <a:srcRect/>
+          <a:stretch>
+            <a:fillRect/>
+          </a:stretch>
+        </p:blipFill>
+        <p:spPr bwMode="auto">
+          <a:xfrm>
+            <a:off x="179512" y="404664"/>
+            <a:ext cx="5033606" cy="2793405"/>
+          </a:xfrm>
+          <a:prstGeom prst="rect">
+            <a:avLst/>
+          </a:prstGeom>
+          <a:noFill/>
+          <a:extLst>
+            <a:ext uri="{909E8E84-426E-40DD-AFC4-6F175D3DCCD1}">
+              <a14:hiddenFill xmlns:a14="http://schemas.microsoft.com/office/drawing/2010/main">
+                <a:solidFill>
+                  <a:srgbClr val="FFFFFF"/>
+                </a:solidFill>
+              </a14:hiddenFill>
+            </a:ext>
+          </a:extLst>
+        </p:spPr>
+      </p:pic>
+      <p:sp>
+        <p:nvSpPr>
+          <p:cNvPr id="2" name="Title 1"/>
+          <p:cNvSpPr>
+            <a:spLocks noGrp="1"/>
+          </p:cNvSpPr>
+          <p:nvPr>
+            <p:ph type="title"/>
+          </p:nvPr>
+        </p:nvSpPr>
+        <p:spPr>
+          <a:xfrm>
+            <a:off x="5364088" y="773832"/>
+            <a:ext cx="3322712" cy="1143000"/>
+          </a:xfrm>
+        </p:spPr>
+        <p:txBody>
+          <a:bodyPr>
+            <a:normAutofit fontScale="90000"/>
+          </a:bodyPr>
+          <a:lstStyle/>
+          <a:p>
+            <a:r>
+              <a:rPr lang="de-DE" dirty="0" smtClean="0"/>
+              <a:t>attestations after Depuydt &amp; de Does 2018</a:t>
+            </a:r>
+            <a:endParaRPr lang="de-DE" dirty="0"/>
+          </a:p>
+        </p:txBody>
+      </p:sp>
+      <p:sp>
+        <p:nvSpPr>
+          <p:cNvPr id="4" name="TextBox 3"/>
+          <p:cNvSpPr txBox="1"/>
+          <p:nvPr/>
+        </p:nvSpPr>
+        <p:spPr>
+          <a:xfrm>
+            <a:off x="251520" y="4558290"/>
+            <a:ext cx="1841851" cy="369332"/>
+          </a:xfrm>
+          <a:prstGeom prst="rect">
+            <a:avLst/>
+          </a:prstGeom>
+          <a:solidFill>
+            <a:schemeClr val="bg2"/>
+          </a:solidFill>
+          <a:ln>
+            <a:prstDash val="sysDash"/>
+          </a:ln>
+        </p:spPr>
+        <p:style>
+          <a:lnRef idx="2">
+            <a:schemeClr val="dk1"/>
+          </a:lnRef>
+          <a:fillRef idx="1">
+            <a:schemeClr val="lt1"/>
+          </a:fillRef>
+          <a:effectRef idx="0">
+            <a:schemeClr val="dk1"/>
+          </a:effectRef>
+          <a:fontRef idx="minor">
+            <a:schemeClr val="dk1"/>
+          </a:fontRef>
+        </p:style>
+        <p:txBody>
+          <a:bodyPr wrap="none" rtlCol="0">
+            <a:spAutoFit/>
+          </a:bodyPr>
+          <a:lstStyle/>
+          <a:p>
+            <a:r>
+              <a:rPr lang="de-DE" dirty="0" smtClean="0"/>
+              <a:t>ontolex:Element*</a:t>
+            </a:r>
+            <a:endParaRPr lang="de-DE" dirty="0"/>
+          </a:p>
+        </p:txBody>
+      </p:sp>
+      <p:cxnSp>
+        <p:nvCxnSpPr>
+          <p:cNvPr id="6" name="Elbow Connector 5"/>
+          <p:cNvCxnSpPr>
+            <a:stCxn id="4" idx="3"/>
+            <a:endCxn id="12" idx="1"/>
+          </p:cNvCxnSpPr>
+          <p:nvPr/>
+        </p:nvCxnSpPr>
+        <p:spPr>
+          <a:xfrm>
+            <a:off x="2093371" y="4742956"/>
+            <a:ext cx="1581837" cy="6289"/>
+          </a:xfrm>
+          <a:prstGeom prst="bentConnector3">
+            <a:avLst/>
+          </a:prstGeom>
+          <a:ln>
+            <a:headEnd type="none" w="med" len="med"/>
+            <a:tailEnd type="arrow" w="med" len="med"/>
+          </a:ln>
+        </p:spPr>
+        <p:style>
+          <a:lnRef idx="2">
+            <a:schemeClr val="dk1"/>
+          </a:lnRef>
+          <a:fillRef idx="0">
+            <a:schemeClr val="dk1"/>
+          </a:fillRef>
+          <a:effectRef idx="1">
+            <a:schemeClr val="dk1"/>
+          </a:effectRef>
+          <a:fontRef idx="minor">
+            <a:schemeClr val="tx1"/>
+          </a:fontRef>
+        </p:style>
+      </p:cxnSp>
+      <p:sp>
+        <p:nvSpPr>
+          <p:cNvPr id="8" name="TextBox 7"/>
+          <p:cNvSpPr txBox="1"/>
+          <p:nvPr/>
+        </p:nvSpPr>
+        <p:spPr>
+          <a:xfrm>
+            <a:off x="2816442" y="4293096"/>
+            <a:ext cx="891462" cy="369332"/>
+          </a:xfrm>
+          <a:prstGeom prst="rect">
+            <a:avLst/>
+          </a:prstGeom>
+          <a:noFill/>
+        </p:spPr>
+        <p:txBody>
+          <a:bodyPr wrap="none" rtlCol="0">
+            <a:spAutoFit/>
+          </a:bodyPr>
+          <a:lstStyle/>
+          <a:p>
+            <a:r>
+              <a:rPr lang="de-DE" dirty="0" smtClean="0"/>
+              <a:t>citation</a:t>
+            </a:r>
+            <a:endParaRPr lang="de-DE" dirty="0"/>
+          </a:p>
+        </p:txBody>
+      </p:sp>
+      <p:sp>
+        <p:nvSpPr>
+          <p:cNvPr id="12" name="TextBox 11"/>
+          <p:cNvSpPr txBox="1"/>
+          <p:nvPr/>
+        </p:nvSpPr>
+        <p:spPr>
+          <a:xfrm>
+            <a:off x="3675208" y="4149080"/>
+            <a:ext cx="3518335" cy="1200329"/>
+          </a:xfrm>
+          <a:prstGeom prst="rect">
+            <a:avLst/>
+          </a:prstGeom>
+          <a:solidFill>
+            <a:schemeClr val="bg2"/>
+          </a:solidFill>
+          <a:ln/>
+        </p:spPr>
+        <p:style>
+          <a:lnRef idx="2">
+            <a:schemeClr val="dk1"/>
+          </a:lnRef>
+          <a:fillRef idx="1">
+            <a:schemeClr val="lt1"/>
+          </a:fillRef>
+          <a:effectRef idx="0">
+            <a:schemeClr val="dk1"/>
+          </a:effectRef>
+          <a:fontRef idx="minor">
+            <a:schemeClr val="dk1"/>
+          </a:fontRef>
+        </p:style>
+        <p:txBody>
+          <a:bodyPr wrap="none" rtlCol="0">
+            <a:spAutoFit/>
+          </a:bodyPr>
+          <a:lstStyle/>
+          <a:p>
+            <a:r>
+              <a:rPr lang="de-DE" i="1" dirty="0" smtClean="0"/>
+              <a:t>Citation</a:t>
+            </a:r>
+          </a:p>
+          <a:p>
+            <a:r>
+              <a:rPr lang="de-DE" dirty="0" smtClean="0"/>
+              <a:t>quotation: string</a:t>
+            </a:r>
+          </a:p>
+          <a:p>
+            <a:r>
+              <a:rPr lang="de-DE" dirty="0" smtClean="0"/>
+              <a:t>readingCertain: boolean****</a:t>
+            </a:r>
+          </a:p>
+          <a:p>
+            <a:r>
+              <a:rPr lang="de-DE" dirty="0" smtClean="0"/>
+              <a:t>interpretationCertain: boolean****</a:t>
+            </a:r>
+            <a:endParaRPr lang="de-DE" dirty="0" smtClean="0"/>
+          </a:p>
+        </p:txBody>
+      </p:sp>
+      <p:sp>
+        <p:nvSpPr>
+          <p:cNvPr id="10" name="TextBox 9"/>
+          <p:cNvSpPr txBox="1"/>
+          <p:nvPr/>
+        </p:nvSpPr>
+        <p:spPr>
+          <a:xfrm>
+            <a:off x="10353" y="5685055"/>
+            <a:ext cx="9133647" cy="1200329"/>
+          </a:xfrm>
+          <a:prstGeom prst="rect">
+            <a:avLst/>
+          </a:prstGeom>
+          <a:noFill/>
+        </p:spPr>
+        <p:txBody>
+          <a:bodyPr wrap="square" rtlCol="0">
+            <a:spAutoFit/>
+          </a:bodyPr>
+          <a:lstStyle/>
+          <a:p>
+            <a:pPr>
+              <a:tabLst>
+                <a:tab pos="180975" algn="l"/>
+              </a:tabLst>
+            </a:pPr>
+            <a:r>
+              <a:rPr lang="de-DE" sz="1200" dirty="0" smtClean="0"/>
+              <a:t>* 	i.e., D&amp;dD: lexcit:LexicalPhenomenon</a:t>
+            </a:r>
+          </a:p>
+          <a:p>
+            <a:pPr>
+              <a:tabLst>
+                <a:tab pos="180975" algn="l"/>
+              </a:tabLst>
+            </a:pPr>
+            <a:r>
+              <a:rPr lang="de-DE" sz="1200" dirty="0" smtClean="0"/>
+              <a:t>** simplified: pointing to an anonymous superclass of </a:t>
+            </a:r>
+          </a:p>
+          <a:p>
+            <a:pPr>
+              <a:tabLst>
+                <a:tab pos="180975" algn="l"/>
+              </a:tabLst>
+            </a:pPr>
+            <a:r>
+              <a:rPr lang="de-DE" sz="1200" dirty="0" smtClean="0"/>
+              <a:t>	something that contains a quotation</a:t>
+            </a:r>
+          </a:p>
+          <a:p>
+            <a:pPr>
+              <a:tabLst>
+                <a:tab pos="180975" algn="l"/>
+              </a:tabLst>
+            </a:pPr>
+            <a:r>
+              <a:rPr lang="de-DE" sz="1200" dirty="0" smtClean="0"/>
+              <a:t>*** I would prefer not to prescribe nif properties in order to permit other means of cross-referencing, e.g., nif URIs, WebAnnotation selectors, etc.</a:t>
+            </a:r>
+          </a:p>
+          <a:p>
+            <a:pPr>
+              <a:tabLst>
+                <a:tab pos="180975" algn="l"/>
+              </a:tabLst>
+            </a:pPr>
+            <a:r>
+              <a:rPr lang="de-DE" sz="1200" dirty="0" smtClean="0"/>
+              <a:t>**** I would prefer to leave certainly etc. to lexinfo</a:t>
+            </a:r>
+            <a:endParaRPr lang="de-DE" sz="1200" dirty="0"/>
+          </a:p>
+        </p:txBody>
+      </p:sp>
+      <p:sp>
+        <p:nvSpPr>
+          <p:cNvPr id="17" name="TextBox 16"/>
+          <p:cNvSpPr txBox="1"/>
+          <p:nvPr/>
+        </p:nvSpPr>
+        <p:spPr>
+          <a:xfrm>
+            <a:off x="1616434" y="5229200"/>
+            <a:ext cx="1200008" cy="369332"/>
+          </a:xfrm>
+          <a:prstGeom prst="rect">
+            <a:avLst/>
+          </a:prstGeom>
+          <a:noFill/>
+        </p:spPr>
+        <p:txBody>
+          <a:bodyPr wrap="none" rtlCol="0">
+            <a:spAutoFit/>
+          </a:bodyPr>
+          <a:lstStyle/>
+          <a:p>
+            <a:r>
+              <a:rPr lang="de-DE" dirty="0" smtClean="0"/>
+              <a:t>attestation</a:t>
+            </a:r>
+            <a:endParaRPr lang="de-DE" dirty="0"/>
+          </a:p>
+        </p:txBody>
+      </p:sp>
+      <p:sp>
+        <p:nvSpPr>
+          <p:cNvPr id="18" name="TextBox 17"/>
+          <p:cNvSpPr txBox="1"/>
+          <p:nvPr/>
+        </p:nvSpPr>
+        <p:spPr>
+          <a:xfrm>
+            <a:off x="3635896" y="5810575"/>
+            <a:ext cx="1218732" cy="369332"/>
+          </a:xfrm>
+          <a:prstGeom prst="rect">
+            <a:avLst/>
+          </a:prstGeom>
+          <a:solidFill>
+            <a:schemeClr val="bg2"/>
+          </a:solidFill>
+          <a:ln/>
+        </p:spPr>
+        <p:style>
+          <a:lnRef idx="2">
+            <a:schemeClr val="dk1"/>
+          </a:lnRef>
+          <a:fillRef idx="1">
+            <a:schemeClr val="lt1"/>
+          </a:fillRef>
+          <a:effectRef idx="0">
+            <a:schemeClr val="dk1"/>
+          </a:effectRef>
+          <a:fontRef idx="minor">
+            <a:schemeClr val="dk1"/>
+          </a:fontRef>
+        </p:style>
+        <p:txBody>
+          <a:bodyPr wrap="none" rtlCol="0">
+            <a:spAutoFit/>
+          </a:bodyPr>
+          <a:lstStyle/>
+          <a:p>
+            <a:r>
+              <a:rPr lang="de-DE" i="1" dirty="0" smtClean="0"/>
+              <a:t>Attestation</a:t>
+            </a:r>
+            <a:endParaRPr lang="de-DE" i="1" dirty="0" smtClean="0"/>
+          </a:p>
+        </p:txBody>
+      </p:sp>
+      <p:cxnSp>
+        <p:nvCxnSpPr>
+          <p:cNvPr id="19" name="Elbow Connector 18"/>
+          <p:cNvCxnSpPr>
+            <a:stCxn id="4" idx="3"/>
+            <a:endCxn id="18" idx="1"/>
+          </p:cNvCxnSpPr>
+          <p:nvPr/>
+        </p:nvCxnSpPr>
+        <p:spPr>
+          <a:xfrm>
+            <a:off x="2093371" y="4742956"/>
+            <a:ext cx="1542525" cy="1252285"/>
+          </a:xfrm>
+          <a:prstGeom prst="bentConnector3">
+            <a:avLst/>
+          </a:prstGeom>
+          <a:ln>
+            <a:headEnd type="none" w="med" len="med"/>
+            <a:tailEnd type="arrow" w="med" len="med"/>
+          </a:ln>
+        </p:spPr>
+        <p:style>
+          <a:lnRef idx="2">
+            <a:schemeClr val="dk1"/>
+          </a:lnRef>
+          <a:fillRef idx="0">
+            <a:schemeClr val="dk1"/>
+          </a:fillRef>
+          <a:effectRef idx="1">
+            <a:schemeClr val="dk1"/>
+          </a:effectRef>
+          <a:fontRef idx="minor">
+            <a:schemeClr val="tx1"/>
+          </a:fontRef>
+        </p:style>
+      </p:cxnSp>
+      <p:sp>
+        <p:nvSpPr>
+          <p:cNvPr id="22" name="Isosceles Triangle 21"/>
+          <p:cNvSpPr/>
+          <p:nvPr/>
+        </p:nvSpPr>
+        <p:spPr>
+          <a:xfrm>
+            <a:off x="3995936" y="5309043"/>
+            <a:ext cx="216024" cy="216024"/>
+          </a:xfrm>
+          <a:prstGeom prst="triangle">
+            <a:avLst/>
+          </a:prstGeom>
+        </p:spPr>
+        <p:style>
+          <a:lnRef idx="2">
+            <a:schemeClr val="dk1"/>
+          </a:lnRef>
+          <a:fillRef idx="1">
+            <a:schemeClr val="lt1"/>
+          </a:fillRef>
+          <a:effectRef idx="0">
+            <a:schemeClr val="dk1"/>
+          </a:effectRef>
+          <a:fontRef idx="minor">
+            <a:schemeClr val="dk1"/>
+          </a:fontRef>
+        </p:style>
+        <p:txBody>
+          <a:bodyPr rtlCol="0" anchor="ctr"/>
+          <a:lstStyle/>
+          <a:p>
+            <a:pPr algn="ctr"/>
+            <a:endParaRPr lang="de-DE"/>
+          </a:p>
+        </p:txBody>
+      </p:sp>
+      <p:cxnSp>
+        <p:nvCxnSpPr>
+          <p:cNvPr id="23" name="Elbow Connector 22"/>
+          <p:cNvCxnSpPr/>
+          <p:nvPr/>
+        </p:nvCxnSpPr>
+        <p:spPr>
+          <a:xfrm rot="5400000">
+            <a:off x="3963884" y="5670221"/>
+            <a:ext cx="280197" cy="2139"/>
+          </a:xfrm>
+          <a:prstGeom prst="bentConnector3">
+            <a:avLst/>
+          </a:prstGeom>
+        </p:spPr>
+        <p:style>
+          <a:lnRef idx="2">
+            <a:schemeClr val="dk1"/>
+          </a:lnRef>
+          <a:fillRef idx="0">
+            <a:schemeClr val="dk1"/>
+          </a:fillRef>
+          <a:effectRef idx="1">
+            <a:schemeClr val="dk1"/>
+          </a:effectRef>
+          <a:fontRef idx="minor">
+            <a:schemeClr val="tx1"/>
+          </a:fontRef>
+        </p:style>
+      </p:cxnSp>
+      <p:cxnSp>
+        <p:nvCxnSpPr>
+          <p:cNvPr id="25" name="Elbow Connector 24"/>
+          <p:cNvCxnSpPr>
+            <a:stCxn id="4" idx="3"/>
+            <a:endCxn id="28" idx="1"/>
+          </p:cNvCxnSpPr>
+          <p:nvPr/>
+        </p:nvCxnSpPr>
+        <p:spPr>
+          <a:xfrm flipV="1">
+            <a:off x="2093371" y="3346390"/>
+            <a:ext cx="1528531" cy="1396566"/>
+          </a:xfrm>
+          <a:prstGeom prst="bentConnector3">
+            <a:avLst/>
+          </a:prstGeom>
+          <a:ln>
+            <a:headEnd type="none" w="med" len="med"/>
+            <a:tailEnd type="arrow" w="med" len="med"/>
+          </a:ln>
+        </p:spPr>
+        <p:style>
+          <a:lnRef idx="2">
+            <a:schemeClr val="dk1"/>
+          </a:lnRef>
+          <a:fillRef idx="0">
+            <a:schemeClr val="dk1"/>
+          </a:fillRef>
+          <a:effectRef idx="1">
+            <a:schemeClr val="dk1"/>
+          </a:effectRef>
+          <a:fontRef idx="minor">
+            <a:schemeClr val="tx1"/>
+          </a:fontRef>
+        </p:style>
+      </p:cxnSp>
+      <p:sp>
+        <p:nvSpPr>
+          <p:cNvPr id="28" name="TextBox 27"/>
+          <p:cNvSpPr txBox="1"/>
+          <p:nvPr/>
+        </p:nvSpPr>
+        <p:spPr>
+          <a:xfrm>
+            <a:off x="3621902" y="2884725"/>
+            <a:ext cx="1872372" cy="923330"/>
+          </a:xfrm>
+          <a:prstGeom prst="rect">
+            <a:avLst/>
+          </a:prstGeom>
+          <a:solidFill>
+            <a:schemeClr val="bg2"/>
+          </a:solidFill>
+          <a:ln/>
+        </p:spPr>
+        <p:style>
+          <a:lnRef idx="2">
+            <a:schemeClr val="dk1"/>
+          </a:lnRef>
+          <a:fillRef idx="1">
+            <a:schemeClr val="lt1"/>
+          </a:fillRef>
+          <a:effectRef idx="0">
+            <a:schemeClr val="dk1"/>
+          </a:effectRef>
+          <a:fontRef idx="minor">
+            <a:schemeClr val="dk1"/>
+          </a:fontRef>
+        </p:style>
+        <p:txBody>
+          <a:bodyPr wrap="none" rtlCol="0">
+            <a:spAutoFit/>
+          </a:bodyPr>
+          <a:lstStyle/>
+          <a:p>
+            <a:r>
+              <a:rPr lang="de-DE" i="1" dirty="0" smtClean="0"/>
+              <a:t>Locus</a:t>
+            </a:r>
+          </a:p>
+          <a:p>
+            <a:r>
+              <a:rPr lang="de-DE" dirty="0" smtClean="0"/>
+              <a:t>nif:beginIndex***</a:t>
+            </a:r>
+          </a:p>
+          <a:p>
+            <a:r>
+              <a:rPr lang="de-DE" dirty="0" smtClean="0"/>
+              <a:t>nif:endIndex***</a:t>
+            </a:r>
+          </a:p>
+        </p:txBody>
+      </p:sp>
+      <p:sp>
+        <p:nvSpPr>
+          <p:cNvPr id="27" name="TextBox 26"/>
+          <p:cNvSpPr txBox="1"/>
+          <p:nvPr/>
+        </p:nvSpPr>
+        <p:spPr>
+          <a:xfrm>
+            <a:off x="2061211" y="3722764"/>
+            <a:ext cx="668773" cy="369332"/>
+          </a:xfrm>
+          <a:prstGeom prst="rect">
+            <a:avLst/>
+          </a:prstGeom>
+          <a:noFill/>
+        </p:spPr>
+        <p:txBody>
+          <a:bodyPr wrap="none" rtlCol="0">
+            <a:spAutoFit/>
+          </a:bodyPr>
+          <a:lstStyle/>
+          <a:p>
+            <a:r>
+              <a:rPr lang="de-DE" dirty="0" smtClean="0"/>
+              <a:t>locus</a:t>
+            </a:r>
+            <a:endParaRPr lang="de-DE" dirty="0"/>
+          </a:p>
+        </p:txBody>
+      </p:sp>
+      <p:cxnSp>
+        <p:nvCxnSpPr>
+          <p:cNvPr id="31" name="Elbow Connector 30"/>
+          <p:cNvCxnSpPr>
+            <a:stCxn id="28" idx="3"/>
+            <a:endCxn id="12" idx="3"/>
+          </p:cNvCxnSpPr>
+          <p:nvPr/>
+        </p:nvCxnSpPr>
+        <p:spPr>
+          <a:xfrm>
+            <a:off x="5494274" y="3346390"/>
+            <a:ext cx="1699269" cy="1402855"/>
+          </a:xfrm>
+          <a:prstGeom prst="bentConnector3">
+            <a:avLst>
+              <a:gd name="adj1" fmla="val 113453"/>
+            </a:avLst>
+          </a:prstGeom>
+          <a:ln>
+            <a:headEnd type="none" w="med" len="med"/>
+            <a:tailEnd type="arrow" w="med" len="med"/>
+          </a:ln>
+        </p:spPr>
+        <p:style>
+          <a:lnRef idx="2">
+            <a:schemeClr val="dk1"/>
+          </a:lnRef>
+          <a:fillRef idx="0">
+            <a:schemeClr val="dk1"/>
+          </a:fillRef>
+          <a:effectRef idx="1">
+            <a:schemeClr val="dk1"/>
+          </a:effectRef>
+          <a:fontRef idx="minor">
+            <a:schemeClr val="tx1"/>
+          </a:fontRef>
+        </p:style>
+      </p:cxnSp>
+      <p:sp>
+        <p:nvSpPr>
+          <p:cNvPr id="34" name="TextBox 33"/>
+          <p:cNvSpPr txBox="1"/>
+          <p:nvPr/>
+        </p:nvSpPr>
+        <p:spPr>
+          <a:xfrm>
+            <a:off x="5796136" y="2884725"/>
+            <a:ext cx="1079142" cy="369332"/>
+          </a:xfrm>
+          <a:prstGeom prst="rect">
+            <a:avLst/>
+          </a:prstGeom>
+          <a:noFill/>
+        </p:spPr>
+        <p:txBody>
+          <a:bodyPr wrap="none" rtlCol="0">
+            <a:spAutoFit/>
+          </a:bodyPr>
+          <a:lstStyle/>
+          <a:p>
+            <a:r>
+              <a:rPr lang="de-DE" dirty="0" smtClean="0"/>
+              <a:t>locusIn**</a:t>
+            </a:r>
+            <a:endParaRPr lang="de-DE" dirty="0"/>
+          </a:p>
+        </p:txBody>
+      </p:sp>
+      <p:cxnSp>
+        <p:nvCxnSpPr>
+          <p:cNvPr id="40" name="Straight Connector 39"/>
+          <p:cNvCxnSpPr/>
+          <p:nvPr/>
+        </p:nvCxnSpPr>
+        <p:spPr>
+          <a:xfrm>
+            <a:off x="3635896" y="3212976"/>
+            <a:ext cx="1858378" cy="0"/>
+          </a:xfrm>
+          <a:prstGeom prst="line">
+            <a:avLst/>
+          </a:prstGeom>
+        </p:spPr>
+        <p:style>
+          <a:lnRef idx="1">
+            <a:schemeClr val="dk1"/>
+          </a:lnRef>
+          <a:fillRef idx="0">
+            <a:schemeClr val="dk1"/>
+          </a:fillRef>
+          <a:effectRef idx="0">
+            <a:schemeClr val="dk1"/>
+          </a:effectRef>
+          <a:fontRef idx="minor">
+            <a:schemeClr val="tx1"/>
+          </a:fontRef>
+        </p:style>
+      </p:cxnSp>
+      <p:cxnSp>
+        <p:nvCxnSpPr>
+          <p:cNvPr id="42" name="Straight Connector 41"/>
+          <p:cNvCxnSpPr/>
+          <p:nvPr/>
+        </p:nvCxnSpPr>
+        <p:spPr>
+          <a:xfrm>
+            <a:off x="3694358" y="4509120"/>
+            <a:ext cx="3499185" cy="0"/>
+          </a:xfrm>
+          <a:prstGeom prst="line">
+            <a:avLst/>
+          </a:prstGeom>
+        </p:spPr>
+        <p:style>
+          <a:lnRef idx="1">
+            <a:schemeClr val="dk1"/>
+          </a:lnRef>
+          <a:fillRef idx="0">
+            <a:schemeClr val="dk1"/>
+          </a:fillRef>
+          <a:effectRef idx="0">
+            <a:schemeClr val="dk1"/>
+          </a:effectRef>
+          <a:fontRef idx="minor">
+            <a:schemeClr val="tx1"/>
+          </a:fontRef>
+        </p:style>
+      </p:cxnSp>
+    </p:spTree>
+    <p:extLst>
+      <p:ext uri="{BB962C8B-B14F-4D97-AF65-F5344CB8AC3E}">
+        <p14:creationId xmlns:p14="http://schemas.microsoft.com/office/powerpoint/2010/main" val="3486052392"/>
+      </p:ext>
+    </p:extLst>
+  </p:cSld>
+  <p:clrMapOvr>
+    <a:masterClrMapping/>
+  </p:clrMapOvr>
+</p:sld>
+</file>
+
+<file path=ppt/slides/slide6.xml><?xml version="1.0" encoding="utf-8"?>
+<p:sld xmlns:a="http://schemas.openxmlformats.org/drawingml/2006/main" xmlns:r="http://schemas.openxmlformats.org/officeDocument/2006/relationships" xmlns:p="http://schemas.openxmlformats.org/presentationml/2006/main">
+  <p:cSld>
+    <p:spTree>
+      <p:nvGrpSpPr>
+        <p:cNvPr id="1" name=""/>
+        <p:cNvGrpSpPr/>
+        <p:nvPr/>
+      </p:nvGrpSpPr>
+      <p:grpSpPr>
+        <a:xfrm>
+          <a:off x="0" y="0"/>
+          <a:ext cx="0" cy="0"/>
+          <a:chOff x="0" y="0"/>
+          <a:chExt cx="0" cy="0"/>
+        </a:xfrm>
+      </p:grpSpPr>
+      <p:pic>
+        <p:nvPicPr>
+          <p:cNvPr id="2050" name="Picture 2" descr="C:\Users\chiarcos\Desktop\corpus\ontolex-frac\trunk\img\attestations-khan-boschetti.PNG"/>
+          <p:cNvPicPr>
+            <a:picLocks noChangeAspect="1" noChangeArrowheads="1"/>
+          </p:cNvPicPr>
+          <p:nvPr/>
+        </p:nvPicPr>
+        <p:blipFill>
+          <a:blip r:embed="rId2">
+            <a:extLst>
+              <a:ext uri="{28A0092B-C50C-407E-A947-70E740481C1C}">
+                <a14:useLocalDpi xmlns:a14="http://schemas.microsoft.com/office/drawing/2010/main" val="0"/>
+              </a:ext>
+            </a:extLst>
+          </a:blip>
+          <a:srcRect/>
+          <a:stretch>
+            <a:fillRect/>
+          </a:stretch>
+        </p:blipFill>
+        <p:spPr bwMode="auto">
+          <a:xfrm>
+            <a:off x="179512" y="116632"/>
+            <a:ext cx="4189092" cy="2690738"/>
+          </a:xfrm>
+          <a:prstGeom prst="rect">
+            <a:avLst/>
+          </a:prstGeom>
+          <a:noFill/>
+          <a:extLst>
+            <a:ext uri="{909E8E84-426E-40DD-AFC4-6F175D3DCCD1}">
+              <a14:hiddenFill xmlns:a14="http://schemas.microsoft.com/office/drawing/2010/main">
+                <a:solidFill>
+                  <a:srgbClr val="FFFFFF"/>
+                </a:solidFill>
+              </a14:hiddenFill>
+            </a:ext>
+          </a:extLst>
+        </p:spPr>
+      </p:pic>
+      <p:sp>
+        <p:nvSpPr>
+          <p:cNvPr id="2" name="Title 1"/>
+          <p:cNvSpPr>
+            <a:spLocks noGrp="1"/>
+          </p:cNvSpPr>
+          <p:nvPr>
+            <p:ph type="title"/>
+          </p:nvPr>
+        </p:nvSpPr>
+        <p:spPr>
+          <a:xfrm>
+            <a:off x="5364088" y="773832"/>
+            <a:ext cx="3322712" cy="1143000"/>
+          </a:xfrm>
+        </p:spPr>
+        <p:txBody>
+          <a:bodyPr>
+            <a:normAutofit fontScale="90000"/>
+          </a:bodyPr>
+          <a:lstStyle/>
+          <a:p>
+            <a:r>
+              <a:rPr lang="de-DE" dirty="0" smtClean="0"/>
+              <a:t>attestations after Khan &amp; Boschetti (2018)</a:t>
+            </a:r>
+            <a:endParaRPr lang="de-DE" dirty="0"/>
+          </a:p>
+        </p:txBody>
+      </p:sp>
+      <p:sp>
+        <p:nvSpPr>
+          <p:cNvPr id="4" name="TextBox 3"/>
+          <p:cNvSpPr txBox="1"/>
+          <p:nvPr/>
+        </p:nvSpPr>
+        <p:spPr>
+          <a:xfrm>
+            <a:off x="251520" y="3624705"/>
+            <a:ext cx="1841851" cy="369332"/>
+          </a:xfrm>
+          <a:prstGeom prst="rect">
+            <a:avLst/>
+          </a:prstGeom>
+          <a:solidFill>
+            <a:schemeClr val="bg2"/>
+          </a:solidFill>
+          <a:ln>
+            <a:prstDash val="sysDash"/>
+          </a:ln>
+        </p:spPr>
+        <p:style>
+          <a:lnRef idx="2">
+            <a:schemeClr val="dk1"/>
+          </a:lnRef>
+          <a:fillRef idx="1">
+            <a:schemeClr val="lt1"/>
+          </a:fillRef>
+          <a:effectRef idx="0">
+            <a:schemeClr val="dk1"/>
+          </a:effectRef>
+          <a:fontRef idx="minor">
+            <a:schemeClr val="dk1"/>
+          </a:fontRef>
+        </p:style>
+        <p:txBody>
+          <a:bodyPr wrap="none" rtlCol="0">
+            <a:spAutoFit/>
+          </a:bodyPr>
+          <a:lstStyle/>
+          <a:p>
+            <a:r>
+              <a:rPr lang="de-DE" dirty="0" smtClean="0"/>
+              <a:t>ontolex:Element*</a:t>
+            </a:r>
+            <a:endParaRPr lang="de-DE" dirty="0"/>
+          </a:p>
+        </p:txBody>
+      </p:sp>
+      <p:cxnSp>
+        <p:nvCxnSpPr>
+          <p:cNvPr id="6" name="Elbow Connector 5"/>
+          <p:cNvCxnSpPr>
+            <a:stCxn id="4" idx="3"/>
+            <a:endCxn id="12" idx="1"/>
+          </p:cNvCxnSpPr>
+          <p:nvPr/>
+        </p:nvCxnSpPr>
+        <p:spPr>
+          <a:xfrm flipV="1">
+            <a:off x="2093371" y="3809365"/>
+            <a:ext cx="1581837" cy="6"/>
+          </a:xfrm>
+          <a:prstGeom prst="bentConnector3">
+            <a:avLst/>
+          </a:prstGeom>
+          <a:ln>
+            <a:headEnd type="none" w="med" len="med"/>
+            <a:tailEnd type="arrow" w="med" len="med"/>
+          </a:ln>
+        </p:spPr>
+        <p:style>
+          <a:lnRef idx="2">
+            <a:schemeClr val="dk1"/>
+          </a:lnRef>
+          <a:fillRef idx="0">
+            <a:schemeClr val="dk1"/>
+          </a:fillRef>
+          <a:effectRef idx="1">
+            <a:schemeClr val="dk1"/>
+          </a:effectRef>
+          <a:fontRef idx="minor">
+            <a:schemeClr val="tx1"/>
+          </a:fontRef>
+        </p:style>
+      </p:cxnSp>
+      <p:sp>
+        <p:nvSpPr>
+          <p:cNvPr id="12" name="TextBox 11"/>
+          <p:cNvSpPr txBox="1"/>
+          <p:nvPr/>
+        </p:nvSpPr>
+        <p:spPr>
+          <a:xfrm>
+            <a:off x="3675208" y="3347700"/>
+            <a:ext cx="2572884" cy="923330"/>
+          </a:xfrm>
+          <a:prstGeom prst="rect">
+            <a:avLst/>
+          </a:prstGeom>
+          <a:solidFill>
+            <a:schemeClr val="bg2"/>
+          </a:solidFill>
+          <a:ln/>
+        </p:spPr>
+        <p:style>
+          <a:lnRef idx="2">
+            <a:schemeClr val="dk1"/>
+          </a:lnRef>
+          <a:fillRef idx="1">
+            <a:schemeClr val="lt1"/>
+          </a:fillRef>
+          <a:effectRef idx="0">
+            <a:schemeClr val="dk1"/>
+          </a:effectRef>
+          <a:fontRef idx="minor">
+            <a:schemeClr val="dk1"/>
+          </a:fontRef>
+        </p:style>
+        <p:txBody>
+          <a:bodyPr wrap="none" rtlCol="0">
+            <a:spAutoFit/>
+          </a:bodyPr>
+          <a:lstStyle/>
+          <a:p>
+            <a:r>
+              <a:rPr lang="de-DE" i="1" dirty="0" smtClean="0"/>
+              <a:t>Attestation***</a:t>
+            </a:r>
+          </a:p>
+          <a:p>
+            <a:r>
+              <a:rPr lang="de-DE" dirty="0" smtClean="0"/>
+              <a:t>hasContext: str(6*)</a:t>
+            </a:r>
+          </a:p>
+          <a:p>
+            <a:r>
+              <a:rPr lang="de-DE" dirty="0" smtClean="0"/>
+              <a:t>conjectural: boolean****</a:t>
+            </a:r>
+          </a:p>
+        </p:txBody>
+      </p:sp>
+      <p:sp>
+        <p:nvSpPr>
+          <p:cNvPr id="10" name="TextBox 9"/>
+          <p:cNvSpPr txBox="1"/>
+          <p:nvPr/>
+        </p:nvSpPr>
+        <p:spPr>
+          <a:xfrm>
+            <a:off x="10353" y="5445224"/>
+            <a:ext cx="3553535" cy="1384995"/>
+          </a:xfrm>
+          <a:prstGeom prst="rect">
+            <a:avLst/>
+          </a:prstGeom>
+          <a:noFill/>
+        </p:spPr>
+        <p:txBody>
+          <a:bodyPr wrap="square" rtlCol="0">
+            <a:spAutoFit/>
+          </a:bodyPr>
+          <a:lstStyle/>
+          <a:p>
+            <a:pPr>
+              <a:tabLst>
+                <a:tab pos="180975" algn="l"/>
+              </a:tabLst>
+            </a:pPr>
+            <a:r>
+              <a:rPr lang="de-DE" sz="1200" dirty="0" smtClean="0"/>
+              <a:t>* 	originally restricted to LexicalSense</a:t>
+            </a:r>
+          </a:p>
+          <a:p>
+            <a:pPr>
+              <a:tabLst>
+                <a:tab pos="180975" algn="l"/>
+              </a:tabLst>
+            </a:pPr>
+            <a:r>
+              <a:rPr lang="de-DE" sz="1200" dirty="0" smtClean="0"/>
+              <a:t>** originally „isAttestedBy“</a:t>
+            </a:r>
+          </a:p>
+          <a:p>
+            <a:pPr>
+              <a:tabLst>
+                <a:tab pos="180975" algn="l"/>
+              </a:tabLst>
+            </a:pPr>
+            <a:r>
+              <a:rPr lang="de-DE" sz="1200" dirty="0" smtClean="0"/>
+              <a:t>*** originally „LexicalAttestation“</a:t>
+            </a:r>
+          </a:p>
+          <a:p>
+            <a:pPr>
+              <a:tabLst>
+                <a:tab pos="180975" algn="l"/>
+              </a:tabLst>
+            </a:pPr>
+            <a:r>
+              <a:rPr lang="de-DE" sz="1200" dirty="0"/>
+              <a:t>**** I would prefer to leave </a:t>
+            </a:r>
+            <a:r>
+              <a:rPr lang="de-DE" sz="1200" dirty="0" smtClean="0"/>
+              <a:t>certainty </a:t>
+            </a:r>
+            <a:r>
+              <a:rPr lang="de-DE" sz="1200" dirty="0"/>
+              <a:t>etc. to </a:t>
+            </a:r>
+            <a:r>
+              <a:rPr lang="de-DE" sz="1200" dirty="0" smtClean="0"/>
+              <a:t>lexinfo</a:t>
+            </a:r>
+          </a:p>
+          <a:p>
+            <a:pPr>
+              <a:tabLst>
+                <a:tab pos="180975" algn="l"/>
+              </a:tabLst>
+            </a:pPr>
+            <a:r>
+              <a:rPr lang="de-DE" sz="1200" dirty="0" smtClean="0"/>
+              <a:t>***** originally „Work“</a:t>
+            </a:r>
+          </a:p>
+          <a:p>
+            <a:pPr>
+              <a:tabLst>
+                <a:tab pos="180975" algn="l"/>
+              </a:tabLst>
+            </a:pPr>
+            <a:r>
+              <a:rPr lang="de-DE" sz="1200" dirty="0" smtClean="0"/>
+              <a:t>(6*) maybe rename such that that also context-free examples fit</a:t>
+            </a:r>
+            <a:endParaRPr lang="de-DE" sz="1200" dirty="0"/>
+          </a:p>
+        </p:txBody>
+      </p:sp>
+      <p:sp>
+        <p:nvSpPr>
+          <p:cNvPr id="17" name="TextBox 16"/>
+          <p:cNvSpPr txBox="1"/>
+          <p:nvPr/>
+        </p:nvSpPr>
+        <p:spPr>
+          <a:xfrm>
+            <a:off x="2204015" y="3419708"/>
+            <a:ext cx="1430841" cy="369332"/>
+          </a:xfrm>
+          <a:prstGeom prst="rect">
+            <a:avLst/>
+          </a:prstGeom>
+          <a:noFill/>
+        </p:spPr>
+        <p:txBody>
+          <a:bodyPr wrap="none" rtlCol="0">
+            <a:spAutoFit/>
+          </a:bodyPr>
+          <a:lstStyle/>
+          <a:p>
+            <a:r>
+              <a:rPr lang="de-DE" dirty="0" smtClean="0"/>
+              <a:t>attestation**</a:t>
+            </a:r>
+            <a:endParaRPr lang="de-DE" dirty="0"/>
+          </a:p>
+        </p:txBody>
+      </p:sp>
+      <p:sp>
+        <p:nvSpPr>
+          <p:cNvPr id="26" name="TextBox 25"/>
+          <p:cNvSpPr txBox="1"/>
+          <p:nvPr/>
+        </p:nvSpPr>
+        <p:spPr>
+          <a:xfrm>
+            <a:off x="4153498" y="4931876"/>
+            <a:ext cx="1614032" cy="369332"/>
+          </a:xfrm>
+          <a:prstGeom prst="rect">
+            <a:avLst/>
+          </a:prstGeom>
+          <a:noFill/>
+          <a:ln>
+            <a:prstDash val="sysDot"/>
+          </a:ln>
+        </p:spPr>
+        <p:style>
+          <a:lnRef idx="2">
+            <a:schemeClr val="dk1"/>
+          </a:lnRef>
+          <a:fillRef idx="1">
+            <a:schemeClr val="lt1"/>
+          </a:fillRef>
+          <a:effectRef idx="0">
+            <a:schemeClr val="dk1"/>
+          </a:effectRef>
+          <a:fontRef idx="minor">
+            <a:schemeClr val="dk1"/>
+          </a:fontRef>
+        </p:style>
+        <p:txBody>
+          <a:bodyPr wrap="none" rtlCol="0">
+            <a:spAutoFit/>
+          </a:bodyPr>
+          <a:lstStyle/>
+          <a:p>
+            <a:r>
+              <a:rPr lang="de-DE" dirty="0" smtClean="0"/>
+              <a:t>work URI</a:t>
+            </a:r>
+            <a:r>
+              <a:rPr lang="de-DE" i="1" dirty="0" smtClean="0"/>
+              <a:t>*****</a:t>
+            </a:r>
+            <a:endParaRPr lang="de-DE" i="1" dirty="0"/>
+          </a:p>
+        </p:txBody>
+      </p:sp>
+      <p:cxnSp>
+        <p:nvCxnSpPr>
+          <p:cNvPr id="30" name="Elbow Connector 29"/>
+          <p:cNvCxnSpPr>
+            <a:stCxn id="12" idx="2"/>
+            <a:endCxn id="26" idx="0"/>
+          </p:cNvCxnSpPr>
+          <p:nvPr/>
+        </p:nvCxnSpPr>
+        <p:spPr>
+          <a:xfrm rot="5400000">
+            <a:off x="4630659" y="4600885"/>
+            <a:ext cx="660846" cy="1136"/>
+          </a:xfrm>
+          <a:prstGeom prst="bentConnector3">
+            <a:avLst/>
+          </a:prstGeom>
+          <a:ln>
+            <a:headEnd type="none" w="med" len="med"/>
+            <a:tailEnd type="arrow" w="med" len="med"/>
+          </a:ln>
+        </p:spPr>
+        <p:style>
+          <a:lnRef idx="2">
+            <a:schemeClr val="dk1"/>
+          </a:lnRef>
+          <a:fillRef idx="0">
+            <a:schemeClr val="dk1"/>
+          </a:fillRef>
+          <a:effectRef idx="1">
+            <a:schemeClr val="dk1"/>
+          </a:effectRef>
+          <a:fontRef idx="minor">
+            <a:schemeClr val="tx1"/>
+          </a:fontRef>
+        </p:style>
+      </p:cxnSp>
+      <p:sp>
+        <p:nvSpPr>
+          <p:cNvPr id="11" name="TextBox 10"/>
+          <p:cNvSpPr txBox="1"/>
+          <p:nvPr/>
+        </p:nvSpPr>
+        <p:spPr>
+          <a:xfrm>
+            <a:off x="5004048" y="4427820"/>
+            <a:ext cx="1290674" cy="369332"/>
+          </a:xfrm>
+          <a:prstGeom prst="rect">
+            <a:avLst/>
+          </a:prstGeom>
+          <a:noFill/>
+        </p:spPr>
+        <p:txBody>
+          <a:bodyPr wrap="none" rtlCol="0">
+            <a:spAutoFit/>
+          </a:bodyPr>
+          <a:lstStyle/>
+          <a:p>
+            <a:r>
+              <a:rPr lang="de-DE" dirty="0" smtClean="0"/>
+              <a:t>foundIn(7*)</a:t>
+            </a:r>
+            <a:endParaRPr lang="de-DE" dirty="0"/>
+          </a:p>
+        </p:txBody>
+      </p:sp>
+      <p:sp>
+        <p:nvSpPr>
+          <p:cNvPr id="33" name="TextBox 32"/>
+          <p:cNvSpPr txBox="1"/>
+          <p:nvPr/>
+        </p:nvSpPr>
+        <p:spPr>
+          <a:xfrm>
+            <a:off x="3322721" y="5445224"/>
+            <a:ext cx="3553535" cy="276999"/>
+          </a:xfrm>
+          <a:prstGeom prst="rect">
+            <a:avLst/>
+          </a:prstGeom>
+          <a:noFill/>
+        </p:spPr>
+        <p:txBody>
+          <a:bodyPr wrap="square" rtlCol="0">
+            <a:spAutoFit/>
+          </a:bodyPr>
+          <a:lstStyle/>
+          <a:p>
+            <a:pPr>
+              <a:tabLst>
+                <a:tab pos="180975" algn="l"/>
+              </a:tabLst>
+            </a:pPr>
+            <a:r>
+              <a:rPr lang="de-DE" sz="1200" dirty="0" smtClean="0"/>
+              <a:t>(7*) I had dc:source at other occasions</a:t>
+            </a:r>
+            <a:endParaRPr lang="de-DE" sz="1200" dirty="0"/>
+          </a:p>
+        </p:txBody>
+      </p:sp>
+      <p:sp>
+        <p:nvSpPr>
+          <p:cNvPr id="35" name="TextBox 34"/>
+          <p:cNvSpPr txBox="1"/>
+          <p:nvPr/>
+        </p:nvSpPr>
+        <p:spPr>
+          <a:xfrm>
+            <a:off x="8100392" y="3622186"/>
+            <a:ext cx="917302" cy="369332"/>
+          </a:xfrm>
+          <a:prstGeom prst="rect">
+            <a:avLst/>
+          </a:prstGeom>
+          <a:solidFill>
+            <a:schemeClr val="bg2"/>
+          </a:solidFill>
+          <a:ln/>
+        </p:spPr>
+        <p:style>
+          <a:lnRef idx="2">
+            <a:schemeClr val="dk1"/>
+          </a:lnRef>
+          <a:fillRef idx="1">
+            <a:schemeClr val="lt1"/>
+          </a:fillRef>
+          <a:effectRef idx="0">
+            <a:schemeClr val="dk1"/>
+          </a:effectRef>
+          <a:fontRef idx="minor">
+            <a:schemeClr val="dk1"/>
+          </a:fontRef>
+        </p:style>
+        <p:txBody>
+          <a:bodyPr wrap="none" rtlCol="0">
+            <a:spAutoFit/>
+          </a:bodyPr>
+          <a:lstStyle/>
+          <a:p>
+            <a:r>
+              <a:rPr lang="de-DE" i="1" dirty="0" smtClean="0"/>
+              <a:t>Citation</a:t>
+            </a:r>
+          </a:p>
+        </p:txBody>
+      </p:sp>
+      <p:cxnSp>
+        <p:nvCxnSpPr>
+          <p:cNvPr id="36" name="Elbow Connector 35"/>
+          <p:cNvCxnSpPr>
+            <a:stCxn id="35" idx="1"/>
+            <a:endCxn id="12" idx="3"/>
+          </p:cNvCxnSpPr>
+          <p:nvPr/>
+        </p:nvCxnSpPr>
+        <p:spPr>
+          <a:xfrm rot="10800000" flipV="1">
+            <a:off x="6248092" y="3806851"/>
+            <a:ext cx="1852300" cy="2513"/>
+          </a:xfrm>
+          <a:prstGeom prst="bentConnector3">
+            <a:avLst/>
+          </a:prstGeom>
+          <a:ln>
+            <a:headEnd type="none" w="med" len="med"/>
+            <a:tailEnd type="arrow" w="med" len="med"/>
+          </a:ln>
+        </p:spPr>
+        <p:style>
+          <a:lnRef idx="2">
+            <a:schemeClr val="dk1"/>
+          </a:lnRef>
+          <a:fillRef idx="0">
+            <a:schemeClr val="dk1"/>
+          </a:fillRef>
+          <a:effectRef idx="1">
+            <a:schemeClr val="dk1"/>
+          </a:effectRef>
+          <a:fontRef idx="minor">
+            <a:schemeClr val="tx1"/>
+          </a:fontRef>
+        </p:style>
+      </p:cxnSp>
+      <p:sp>
+        <p:nvSpPr>
+          <p:cNvPr id="15" name="TextBox 14"/>
+          <p:cNvSpPr txBox="1"/>
+          <p:nvPr/>
+        </p:nvSpPr>
+        <p:spPr>
+          <a:xfrm>
+            <a:off x="6300192" y="3412791"/>
+            <a:ext cx="1815625" cy="369332"/>
+          </a:xfrm>
+          <a:prstGeom prst="rect">
+            <a:avLst/>
+          </a:prstGeom>
+          <a:noFill/>
+        </p:spPr>
+        <p:txBody>
+          <a:bodyPr wrap="none" rtlCol="0">
+            <a:spAutoFit/>
+          </a:bodyPr>
+          <a:lstStyle/>
+          <a:p>
+            <a:r>
+              <a:rPr lang="de-DE" dirty="0" smtClean="0"/>
+              <a:t>makesAttestation</a:t>
+            </a:r>
+            <a:endParaRPr lang="de-DE" dirty="0"/>
+          </a:p>
+        </p:txBody>
+      </p:sp>
+      <p:sp>
+        <p:nvSpPr>
+          <p:cNvPr id="20" name="TextBox 19"/>
+          <p:cNvSpPr txBox="1"/>
+          <p:nvPr/>
+        </p:nvSpPr>
+        <p:spPr>
+          <a:xfrm>
+            <a:off x="3923928" y="5877272"/>
+            <a:ext cx="5041445" cy="646331"/>
+          </a:xfrm>
+          <a:prstGeom prst="rect">
+            <a:avLst/>
+          </a:prstGeom>
+          <a:noFill/>
+        </p:spPr>
+        <p:txBody>
+          <a:bodyPr wrap="none" rtlCol="0">
+            <a:spAutoFit/>
+          </a:bodyPr>
+          <a:lstStyle/>
+          <a:p>
+            <a:r>
+              <a:rPr lang="de-DE" dirty="0" smtClean="0"/>
+              <a:t>as in the other proposal, cito properties and</a:t>
+            </a:r>
+          </a:p>
+          <a:p>
+            <a:r>
+              <a:rPr lang="de-DE" dirty="0" smtClean="0"/>
+              <a:t>concepts are skipped, these are beyond the module</a:t>
+            </a:r>
+            <a:endParaRPr lang="de-DE" dirty="0"/>
+          </a:p>
+        </p:txBody>
+      </p:sp>
+    </p:spTree>
+    <p:extLst>
+      <p:ext uri="{BB962C8B-B14F-4D97-AF65-F5344CB8AC3E}">
+        <p14:creationId xmlns:p14="http://schemas.microsoft.com/office/powerpoint/2010/main" val="3754524829"/>
+      </p:ext>
+    </p:extLst>
+  </p:cSld>
+  <p:clrMapOvr>
+    <a:masterClrMapping/>
+  </p:clrMapOvr>
+</p:sld>
+</file>
+
+<file path=ppt/slides/slide7.xml><?xml version="1.0" encoding="utf-8"?>
+<p:sld xmlns:a="http://schemas.openxmlformats.org/drawingml/2006/main" xmlns:r="http://schemas.openxmlformats.org/officeDocument/2006/relationships" xmlns:p="http://schemas.openxmlformats.org/presentationml/2006/main">
+  <p:cSld>
+    <p:spTree>
+      <p:nvGrpSpPr>
+        <p:cNvPr id="1" name=""/>
+        <p:cNvGrpSpPr/>
+        <p:nvPr/>
+      </p:nvGrpSpPr>
+      <p:grpSpPr>
+        <a:xfrm>
+          <a:off x="0" y="0"/>
+          <a:ext cx="0" cy="0"/>
+          <a:chOff x="0" y="0"/>
+          <a:chExt cx="0" cy="0"/>
+        </a:xfrm>
+      </p:grpSpPr>
+      <p:sp>
+        <p:nvSpPr>
+          <p:cNvPr id="2" name="Title 1"/>
+          <p:cNvSpPr>
+            <a:spLocks noGrp="1"/>
+          </p:cNvSpPr>
+          <p:nvPr>
+            <p:ph type="title"/>
+          </p:nvPr>
+        </p:nvSpPr>
+        <p:spPr/>
+        <p:txBody>
+          <a:bodyPr>
+            <a:normAutofit fontScale="90000"/>
+          </a:bodyPr>
+          <a:lstStyle/>
+          <a:p>
+            <a:r>
+              <a:rPr lang="de-DE" dirty="0"/>
+              <a:t>attestations: proposal for a minimal consensus</a:t>
+            </a:r>
+          </a:p>
+        </p:txBody>
+      </p:sp>
+      <p:sp>
+        <p:nvSpPr>
+          <p:cNvPr id="7" name="Content Placeholder 6"/>
+          <p:cNvSpPr>
+            <a:spLocks noGrp="1"/>
+          </p:cNvSpPr>
+          <p:nvPr>
+            <p:ph idx="1"/>
+          </p:nvPr>
+        </p:nvSpPr>
+        <p:spPr>
+          <a:xfrm>
+            <a:off x="457200" y="1600201"/>
+            <a:ext cx="8229600" cy="1180728"/>
+          </a:xfrm>
+        </p:spPr>
+        <p:txBody>
+          <a:bodyPr>
+            <a:normAutofit fontScale="62500" lnSpcReduction="20000"/>
+          </a:bodyPr>
+          <a:lstStyle/>
+          <a:p>
+            <a:r>
+              <a:rPr lang="de-DE" dirty="0" smtClean="0"/>
+              <a:t>we do not cover: </a:t>
+            </a:r>
+          </a:p>
+          <a:p>
+            <a:pPr lvl="1"/>
+            <a:r>
+              <a:rPr lang="de-DE" dirty="0" smtClean="0"/>
+              <a:t>scientific citations (should refine Citation, using external vocabularies)</a:t>
+            </a:r>
+          </a:p>
+          <a:p>
+            <a:pPr lvl="1"/>
+            <a:r>
+              <a:rPr lang="de-DE" dirty="0" smtClean="0"/>
+              <a:t>corpus pointers (can be NIF objects, NIF URIs, WebAnnotation selectors, CTS URNs, URLs, etc.)</a:t>
+            </a:r>
+            <a:endParaRPr lang="de-DE" dirty="0"/>
+          </a:p>
+        </p:txBody>
+      </p:sp>
+      <p:sp>
+        <p:nvSpPr>
+          <p:cNvPr id="4" name="TextBox 3"/>
+          <p:cNvSpPr txBox="1"/>
+          <p:nvPr/>
+        </p:nvSpPr>
+        <p:spPr>
+          <a:xfrm>
+            <a:off x="444125" y="3760926"/>
+            <a:ext cx="1726435" cy="369332"/>
+          </a:xfrm>
+          <a:prstGeom prst="rect">
+            <a:avLst/>
+          </a:prstGeom>
+          <a:solidFill>
+            <a:schemeClr val="bg2"/>
+          </a:solidFill>
+          <a:ln>
+            <a:prstDash val="sysDash"/>
+          </a:ln>
+        </p:spPr>
+        <p:style>
+          <a:lnRef idx="2">
+            <a:schemeClr val="dk1"/>
+          </a:lnRef>
+          <a:fillRef idx="1">
+            <a:schemeClr val="lt1"/>
+          </a:fillRef>
+          <a:effectRef idx="0">
+            <a:schemeClr val="dk1"/>
+          </a:effectRef>
+          <a:fontRef idx="minor">
+            <a:schemeClr val="dk1"/>
+          </a:fontRef>
+        </p:style>
+        <p:txBody>
+          <a:bodyPr wrap="none" rtlCol="0">
+            <a:spAutoFit/>
+          </a:bodyPr>
+          <a:lstStyle/>
+          <a:p>
+            <a:r>
+              <a:rPr lang="de-DE" dirty="0" smtClean="0"/>
+              <a:t>ontolex:Element</a:t>
+            </a:r>
+            <a:endParaRPr lang="de-DE" dirty="0"/>
+          </a:p>
+        </p:txBody>
+      </p:sp>
+      <p:cxnSp>
+        <p:nvCxnSpPr>
+          <p:cNvPr id="6" name="Elbow Connector 5"/>
+          <p:cNvCxnSpPr>
+            <a:stCxn id="4" idx="3"/>
+            <a:endCxn id="12" idx="1"/>
+          </p:cNvCxnSpPr>
+          <p:nvPr/>
+        </p:nvCxnSpPr>
+        <p:spPr>
+          <a:xfrm flipV="1">
+            <a:off x="2170560" y="3941507"/>
+            <a:ext cx="1697253" cy="4085"/>
+          </a:xfrm>
+          <a:prstGeom prst="bentConnector3">
+            <a:avLst/>
+          </a:prstGeom>
+          <a:ln>
+            <a:headEnd type="none" w="med" len="med"/>
+            <a:tailEnd type="arrow" w="med" len="med"/>
+          </a:ln>
+        </p:spPr>
+        <p:style>
+          <a:lnRef idx="2">
+            <a:schemeClr val="dk1"/>
+          </a:lnRef>
+          <a:fillRef idx="0">
+            <a:schemeClr val="dk1"/>
+          </a:fillRef>
+          <a:effectRef idx="1">
+            <a:schemeClr val="dk1"/>
+          </a:effectRef>
+          <a:fontRef idx="minor">
+            <a:schemeClr val="tx1"/>
+          </a:fontRef>
+        </p:style>
+      </p:cxnSp>
+      <p:sp>
+        <p:nvSpPr>
+          <p:cNvPr id="8" name="TextBox 7"/>
+          <p:cNvSpPr txBox="1"/>
+          <p:nvPr/>
+        </p:nvSpPr>
+        <p:spPr>
+          <a:xfrm>
+            <a:off x="2267744" y="3573016"/>
+            <a:ext cx="1546257" cy="369332"/>
+          </a:xfrm>
+          <a:prstGeom prst="rect">
+            <a:avLst/>
+          </a:prstGeom>
+          <a:noFill/>
+        </p:spPr>
+        <p:txBody>
+          <a:bodyPr wrap="none" rtlCol="0">
+            <a:spAutoFit/>
+          </a:bodyPr>
+          <a:lstStyle/>
+          <a:p>
+            <a:r>
+              <a:rPr lang="de-DE" dirty="0" smtClean="0"/>
+              <a:t>attestation***</a:t>
+            </a:r>
+            <a:endParaRPr lang="de-DE" dirty="0"/>
+          </a:p>
+        </p:txBody>
+      </p:sp>
+      <p:sp>
+        <p:nvSpPr>
+          <p:cNvPr id="12" name="TextBox 11"/>
+          <p:cNvSpPr txBox="1"/>
+          <p:nvPr/>
+        </p:nvSpPr>
+        <p:spPr>
+          <a:xfrm>
+            <a:off x="3867813" y="3618341"/>
+            <a:ext cx="1980542" cy="646331"/>
+          </a:xfrm>
+          <a:prstGeom prst="rect">
+            <a:avLst/>
+          </a:prstGeom>
+          <a:solidFill>
+            <a:schemeClr val="bg2"/>
+          </a:solidFill>
+          <a:ln/>
+        </p:spPr>
+        <p:style>
+          <a:lnRef idx="2">
+            <a:schemeClr val="dk1"/>
+          </a:lnRef>
+          <a:fillRef idx="1">
+            <a:schemeClr val="lt1"/>
+          </a:fillRef>
+          <a:effectRef idx="0">
+            <a:schemeClr val="dk1"/>
+          </a:effectRef>
+          <a:fontRef idx="minor">
+            <a:schemeClr val="dk1"/>
+          </a:fontRef>
+        </p:style>
+        <p:txBody>
+          <a:bodyPr wrap="none" rtlCol="0">
+            <a:spAutoFit/>
+          </a:bodyPr>
+          <a:lstStyle/>
+          <a:p>
+            <a:r>
+              <a:rPr lang="de-DE" i="1" dirty="0" smtClean="0"/>
+              <a:t>Attestation*</a:t>
+            </a:r>
+          </a:p>
+          <a:p>
+            <a:r>
+              <a:rPr lang="de-DE" dirty="0" smtClean="0"/>
+              <a:t>quotation: string**</a:t>
+            </a:r>
+          </a:p>
+        </p:txBody>
+      </p:sp>
+      <p:cxnSp>
+        <p:nvCxnSpPr>
+          <p:cNvPr id="31" name="Elbow Connector 30"/>
+          <p:cNvCxnSpPr>
+            <a:stCxn id="12" idx="3"/>
+            <a:endCxn id="50" idx="1"/>
+          </p:cNvCxnSpPr>
+          <p:nvPr/>
+        </p:nvCxnSpPr>
+        <p:spPr>
+          <a:xfrm flipV="1">
+            <a:off x="5848355" y="3938703"/>
+            <a:ext cx="1428272" cy="2804"/>
+          </a:xfrm>
+          <a:prstGeom prst="bentConnector3">
+            <a:avLst>
+              <a:gd name="adj1" fmla="val 50000"/>
+            </a:avLst>
+          </a:prstGeom>
+          <a:ln>
+            <a:headEnd type="none" w="med" len="med"/>
+            <a:tailEnd type="arrow" w="med" len="med"/>
+          </a:ln>
+        </p:spPr>
+        <p:style>
+          <a:lnRef idx="2">
+            <a:schemeClr val="dk1"/>
+          </a:lnRef>
+          <a:fillRef idx="0">
+            <a:schemeClr val="dk1"/>
+          </a:fillRef>
+          <a:effectRef idx="1">
+            <a:schemeClr val="dk1"/>
+          </a:effectRef>
+          <a:fontRef idx="minor">
+            <a:schemeClr val="tx1"/>
+          </a:fontRef>
+        </p:style>
+      </p:cxnSp>
+      <p:sp>
+        <p:nvSpPr>
+          <p:cNvPr id="34" name="TextBox 33"/>
+          <p:cNvSpPr txBox="1"/>
+          <p:nvPr/>
+        </p:nvSpPr>
+        <p:spPr>
+          <a:xfrm>
+            <a:off x="5940152" y="3429000"/>
+            <a:ext cx="1516569" cy="369332"/>
+          </a:xfrm>
+          <a:prstGeom prst="rect">
+            <a:avLst/>
+          </a:prstGeom>
+          <a:noFill/>
+        </p:spPr>
+        <p:txBody>
+          <a:bodyPr wrap="none" rtlCol="0">
+            <a:spAutoFit/>
+          </a:bodyPr>
+          <a:lstStyle/>
+          <a:p>
+            <a:r>
+              <a:rPr lang="de-DE" dirty="0" smtClean="0"/>
+              <a:t>dc:source (6*)</a:t>
+            </a:r>
+            <a:endParaRPr lang="de-DE" dirty="0"/>
+          </a:p>
+        </p:txBody>
+      </p:sp>
+      <p:cxnSp>
+        <p:nvCxnSpPr>
+          <p:cNvPr id="42" name="Straight Connector 41"/>
+          <p:cNvCxnSpPr>
+            <a:stCxn id="12" idx="1"/>
+            <a:endCxn id="12" idx="3"/>
+          </p:cNvCxnSpPr>
+          <p:nvPr/>
+        </p:nvCxnSpPr>
+        <p:spPr>
+          <a:xfrm>
+            <a:off x="3867813" y="3941507"/>
+            <a:ext cx="1980542" cy="0"/>
+          </a:xfrm>
+          <a:prstGeom prst="line">
+            <a:avLst/>
+          </a:prstGeom>
+        </p:spPr>
+        <p:style>
+          <a:lnRef idx="1">
+            <a:schemeClr val="dk1"/>
+          </a:lnRef>
+          <a:fillRef idx="0">
+            <a:schemeClr val="dk1"/>
+          </a:fillRef>
+          <a:effectRef idx="0">
+            <a:schemeClr val="dk1"/>
+          </a:effectRef>
+          <a:fontRef idx="minor">
+            <a:schemeClr val="tx1"/>
+          </a:fontRef>
+        </p:style>
+      </p:cxnSp>
+      <p:sp>
+        <p:nvSpPr>
+          <p:cNvPr id="11" name="TextBox 10"/>
+          <p:cNvSpPr txBox="1"/>
+          <p:nvPr/>
+        </p:nvSpPr>
+        <p:spPr>
+          <a:xfrm>
+            <a:off x="5724128" y="5253007"/>
+            <a:ext cx="2551339" cy="1200329"/>
+          </a:xfrm>
+          <a:prstGeom prst="rect">
+            <a:avLst/>
+          </a:prstGeom>
+          <a:noFill/>
+        </p:spPr>
+        <p:txBody>
+          <a:bodyPr wrap="none" rtlCol="0">
+            <a:spAutoFit/>
+          </a:bodyPr>
+          <a:lstStyle/>
+          <a:p>
+            <a:r>
+              <a:rPr lang="de-DE" sz="1200" dirty="0" smtClean="0"/>
+              <a:t>* D&amp;dD: Citation</a:t>
+            </a:r>
+          </a:p>
+          <a:p>
+            <a:r>
+              <a:rPr lang="de-DE" sz="1200" dirty="0" smtClean="0"/>
+              <a:t>** K&amp;B: hasContext</a:t>
+            </a:r>
+          </a:p>
+          <a:p>
+            <a:r>
+              <a:rPr lang="de-DE" sz="1200" dirty="0" smtClean="0"/>
+              <a:t>*** D&amp;dD: attestation</a:t>
+            </a:r>
+          </a:p>
+          <a:p>
+            <a:r>
+              <a:rPr lang="de-DE" sz="1200" dirty="0" smtClean="0"/>
+              <a:t>**** K&amp;B: inv of hasCitingEntity</a:t>
+            </a:r>
+          </a:p>
+          <a:p>
+            <a:r>
+              <a:rPr lang="de-DE" sz="1200" dirty="0" smtClean="0"/>
+              <a:t>5* D&amp;dD: implicit</a:t>
+            </a:r>
+          </a:p>
+          <a:p>
+            <a:r>
+              <a:rPr lang="de-DE" sz="1200" dirty="0" smtClean="0"/>
+              <a:t>6* D&amp;dD: inv of locusIn, K&amp;B: foundIn</a:t>
+            </a:r>
+            <a:endParaRPr lang="de-DE" sz="1200" dirty="0"/>
+          </a:p>
+        </p:txBody>
+      </p:sp>
+      <p:sp>
+        <p:nvSpPr>
+          <p:cNvPr id="39" name="TextBox 38"/>
+          <p:cNvSpPr txBox="1"/>
+          <p:nvPr/>
+        </p:nvSpPr>
+        <p:spPr>
+          <a:xfrm>
+            <a:off x="3631279" y="4647860"/>
+            <a:ext cx="917302" cy="369332"/>
+          </a:xfrm>
+          <a:prstGeom prst="rect">
+            <a:avLst/>
+          </a:prstGeom>
+          <a:solidFill>
+            <a:schemeClr val="bg2"/>
+          </a:solidFill>
+          <a:ln/>
+        </p:spPr>
+        <p:style>
+          <a:lnRef idx="2">
+            <a:schemeClr val="dk1"/>
+          </a:lnRef>
+          <a:fillRef idx="1">
+            <a:schemeClr val="lt1"/>
+          </a:fillRef>
+          <a:effectRef idx="0">
+            <a:schemeClr val="dk1"/>
+          </a:effectRef>
+          <a:fontRef idx="minor">
+            <a:schemeClr val="dk1"/>
+          </a:fontRef>
+        </p:style>
+        <p:txBody>
+          <a:bodyPr wrap="none" rtlCol="0">
+            <a:spAutoFit/>
+          </a:bodyPr>
+          <a:lstStyle/>
+          <a:p>
+            <a:r>
+              <a:rPr lang="de-DE" i="1" dirty="0" smtClean="0"/>
+              <a:t>Citation</a:t>
+            </a:r>
+          </a:p>
+        </p:txBody>
+      </p:sp>
+      <p:cxnSp>
+        <p:nvCxnSpPr>
+          <p:cNvPr id="41" name="Elbow Connector 40"/>
+          <p:cNvCxnSpPr>
+            <a:stCxn id="4" idx="3"/>
+            <a:endCxn id="39" idx="1"/>
+          </p:cNvCxnSpPr>
+          <p:nvPr/>
+        </p:nvCxnSpPr>
+        <p:spPr>
+          <a:xfrm>
+            <a:off x="2170560" y="3945592"/>
+            <a:ext cx="1460719" cy="886934"/>
+          </a:xfrm>
+          <a:prstGeom prst="bentConnector3">
+            <a:avLst/>
+          </a:prstGeom>
+          <a:ln>
+            <a:headEnd type="none" w="med" len="med"/>
+            <a:tailEnd type="arrow" w="med" len="med"/>
+          </a:ln>
+        </p:spPr>
+        <p:style>
+          <a:lnRef idx="2">
+            <a:schemeClr val="dk1"/>
+          </a:lnRef>
+          <a:fillRef idx="0">
+            <a:schemeClr val="dk1"/>
+          </a:fillRef>
+          <a:effectRef idx="1">
+            <a:schemeClr val="dk1"/>
+          </a:effectRef>
+          <a:fontRef idx="minor">
+            <a:schemeClr val="tx1"/>
+          </a:fontRef>
+        </p:style>
+      </p:cxnSp>
+      <p:sp>
+        <p:nvSpPr>
+          <p:cNvPr id="43" name="TextBox 42"/>
+          <p:cNvSpPr txBox="1"/>
+          <p:nvPr/>
+        </p:nvSpPr>
+        <p:spPr>
+          <a:xfrm>
+            <a:off x="2244325" y="4926600"/>
+            <a:ext cx="1353127" cy="369332"/>
+          </a:xfrm>
+          <a:prstGeom prst="rect">
+            <a:avLst/>
+          </a:prstGeom>
+          <a:noFill/>
+        </p:spPr>
+        <p:txBody>
+          <a:bodyPr wrap="none" rtlCol="0">
+            <a:spAutoFit/>
+          </a:bodyPr>
+          <a:lstStyle/>
+          <a:p>
+            <a:r>
+              <a:rPr lang="de-DE" dirty="0" smtClean="0"/>
+              <a:t>citation****</a:t>
+            </a:r>
+            <a:endParaRPr lang="de-DE" dirty="0"/>
+          </a:p>
+        </p:txBody>
+      </p:sp>
+      <p:cxnSp>
+        <p:nvCxnSpPr>
+          <p:cNvPr id="44" name="Elbow Connector 43"/>
+          <p:cNvCxnSpPr>
+            <a:stCxn id="39" idx="3"/>
+            <a:endCxn id="12" idx="2"/>
+          </p:cNvCxnSpPr>
+          <p:nvPr/>
+        </p:nvCxnSpPr>
+        <p:spPr>
+          <a:xfrm flipV="1">
+            <a:off x="4548581" y="4264672"/>
+            <a:ext cx="309503" cy="567854"/>
+          </a:xfrm>
+          <a:prstGeom prst="bentConnector2">
+            <a:avLst/>
+          </a:prstGeom>
+          <a:ln>
+            <a:headEnd type="none" w="med" len="med"/>
+            <a:tailEnd type="arrow" w="med" len="med"/>
+          </a:ln>
+        </p:spPr>
+        <p:style>
+          <a:lnRef idx="2">
+            <a:schemeClr val="dk1"/>
+          </a:lnRef>
+          <a:fillRef idx="0">
+            <a:schemeClr val="dk1"/>
+          </a:fillRef>
+          <a:effectRef idx="1">
+            <a:schemeClr val="dk1"/>
+          </a:effectRef>
+          <a:fontRef idx="minor">
+            <a:schemeClr val="tx1"/>
+          </a:fontRef>
+        </p:style>
+      </p:cxnSp>
+      <p:sp>
+        <p:nvSpPr>
+          <p:cNvPr id="45" name="TextBox 44"/>
+          <p:cNvSpPr txBox="1"/>
+          <p:nvPr/>
+        </p:nvSpPr>
+        <p:spPr>
+          <a:xfrm>
+            <a:off x="4914025" y="4361569"/>
+            <a:ext cx="1218732" cy="923330"/>
+          </a:xfrm>
+          <a:prstGeom prst="rect">
+            <a:avLst/>
+          </a:prstGeom>
+          <a:noFill/>
+        </p:spPr>
+        <p:txBody>
+          <a:bodyPr wrap="none" rtlCol="0">
+            <a:spAutoFit/>
+          </a:bodyPr>
+          <a:lstStyle/>
+          <a:p>
+            <a:r>
+              <a:rPr lang="de-DE" dirty="0" smtClean="0"/>
+              <a:t>makes</a:t>
+            </a:r>
+          </a:p>
+          <a:p>
+            <a:r>
+              <a:rPr lang="de-DE" dirty="0" smtClean="0"/>
+              <a:t>Attestation</a:t>
+            </a:r>
+          </a:p>
+          <a:p>
+            <a:r>
+              <a:rPr lang="de-DE" dirty="0" smtClean="0"/>
+              <a:t>(5*)</a:t>
+            </a:r>
+            <a:endParaRPr lang="de-DE" dirty="0"/>
+          </a:p>
+        </p:txBody>
+      </p:sp>
+      <p:sp>
+        <p:nvSpPr>
+          <p:cNvPr id="50" name="TextBox 49"/>
+          <p:cNvSpPr txBox="1"/>
+          <p:nvPr/>
+        </p:nvSpPr>
+        <p:spPr>
+          <a:xfrm>
+            <a:off x="7276627" y="3754037"/>
+            <a:ext cx="1051891" cy="369332"/>
+          </a:xfrm>
+          <a:prstGeom prst="rect">
+            <a:avLst/>
+          </a:prstGeom>
+          <a:noFill/>
+          <a:ln>
+            <a:prstDash val="sysDot"/>
+          </a:ln>
+        </p:spPr>
+        <p:style>
+          <a:lnRef idx="2">
+            <a:schemeClr val="dk1"/>
+          </a:lnRef>
+          <a:fillRef idx="1">
+            <a:schemeClr val="lt1"/>
+          </a:fillRef>
+          <a:effectRef idx="0">
+            <a:schemeClr val="dk1"/>
+          </a:effectRef>
+          <a:fontRef idx="minor">
+            <a:schemeClr val="dk1"/>
+          </a:fontRef>
+        </p:style>
+        <p:txBody>
+          <a:bodyPr wrap="none" rtlCol="0">
+            <a:spAutoFit/>
+          </a:bodyPr>
+          <a:lstStyle/>
+          <a:p>
+            <a:r>
+              <a:rPr lang="de-DE" dirty="0" smtClean="0"/>
+              <a:t>locus URI</a:t>
+            </a:r>
+            <a:endParaRPr lang="de-DE" i="1" dirty="0"/>
+          </a:p>
+        </p:txBody>
+      </p:sp>
+    </p:spTree>
+    <p:extLst>
+      <p:ext uri="{BB962C8B-B14F-4D97-AF65-F5344CB8AC3E}">
+        <p14:creationId xmlns:p14="http://schemas.microsoft.com/office/powerpoint/2010/main" val="2185386373"/>
+      </p:ext>
+    </p:extLst>
+  </p:cSld>
+  <p:clrMapOvr>
+    <a:masterClrMapping/>
+  </p:clrMapOvr>
+</p:sld>
+</file>
+
+<file path=ppt/slides/slide8.xml><?xml version="1.0" encoding="utf-8"?>
+<p:sld xmlns:a="http://schemas.openxmlformats.org/drawingml/2006/main" xmlns:r="http://schemas.openxmlformats.org/officeDocument/2006/relationships" xmlns:p="http://schemas.openxmlformats.org/presentationml/2006/main">
+  <p:cSld>
+    <p:spTree>
+      <p:nvGrpSpPr>
+        <p:cNvPr id="1" name=""/>
+        <p:cNvGrpSpPr/>
+        <p:nvPr/>
+      </p:nvGrpSpPr>
+      <p:grpSpPr>
+        <a:xfrm>
+          <a:off x="0" y="0"/>
+          <a:ext cx="0" cy="0"/>
+          <a:chOff x="0" y="0"/>
+          <a:chExt cx="0" cy="0"/>
+        </a:xfrm>
+      </p:grpSpPr>
+      <p:sp>
+        <p:nvSpPr>
+          <p:cNvPr id="4" name="TextBox 3"/>
+          <p:cNvSpPr txBox="1"/>
+          <p:nvPr/>
+        </p:nvSpPr>
+        <p:spPr>
+          <a:xfrm>
+            <a:off x="347081" y="756500"/>
+            <a:ext cx="1726435" cy="369332"/>
+          </a:xfrm>
+          <a:prstGeom prst="rect">
+            <a:avLst/>
+          </a:prstGeom>
+          <a:solidFill>
+            <a:schemeClr val="bg2"/>
+          </a:solidFill>
+          <a:ln>
+            <a:prstDash val="sysDash"/>
+          </a:ln>
+        </p:spPr>
+        <p:style>
+          <a:lnRef idx="2">
+            <a:schemeClr val="dk1"/>
+          </a:lnRef>
+          <a:fillRef idx="1">
+            <a:schemeClr val="lt1"/>
+          </a:fillRef>
+          <a:effectRef idx="0">
+            <a:schemeClr val="dk1"/>
+          </a:effectRef>
+          <a:fontRef idx="minor">
+            <a:schemeClr val="dk1"/>
+          </a:fontRef>
+        </p:style>
+        <p:txBody>
+          <a:bodyPr wrap="none" rtlCol="0">
+            <a:spAutoFit/>
+          </a:bodyPr>
+          <a:lstStyle/>
+          <a:p>
+            <a:r>
+              <a:rPr lang="de-DE" dirty="0" smtClean="0"/>
+              <a:t>ontolex:Element</a:t>
+            </a:r>
+            <a:endParaRPr lang="de-DE" dirty="0"/>
+          </a:p>
+        </p:txBody>
+      </p:sp>
+      <p:cxnSp>
+        <p:nvCxnSpPr>
+          <p:cNvPr id="6" name="Elbow Connector 5"/>
+          <p:cNvCxnSpPr>
+            <a:stCxn id="4" idx="3"/>
+            <a:endCxn id="12" idx="1"/>
+          </p:cNvCxnSpPr>
+          <p:nvPr/>
+        </p:nvCxnSpPr>
+        <p:spPr>
+          <a:xfrm>
+            <a:off x="2073516" y="941166"/>
+            <a:ext cx="1697253" cy="2688"/>
+          </a:xfrm>
+          <a:prstGeom prst="bentConnector3">
+            <a:avLst/>
+          </a:prstGeom>
+          <a:ln>
+            <a:headEnd type="none" w="med" len="med"/>
+            <a:tailEnd type="arrow" w="med" len="med"/>
+          </a:ln>
+        </p:spPr>
+        <p:style>
+          <a:lnRef idx="2">
+            <a:schemeClr val="dk1"/>
+          </a:lnRef>
+          <a:fillRef idx="0">
+            <a:schemeClr val="dk1"/>
+          </a:fillRef>
+          <a:effectRef idx="1">
+            <a:schemeClr val="dk1"/>
+          </a:effectRef>
+          <a:fontRef idx="minor">
+            <a:schemeClr val="tx1"/>
+          </a:fontRef>
+        </p:style>
+      </p:cxnSp>
+      <p:sp>
+        <p:nvSpPr>
+          <p:cNvPr id="8" name="TextBox 7"/>
+          <p:cNvSpPr txBox="1"/>
+          <p:nvPr/>
+        </p:nvSpPr>
+        <p:spPr>
+          <a:xfrm>
+            <a:off x="2170700" y="575363"/>
+            <a:ext cx="1200008" cy="369332"/>
+          </a:xfrm>
+          <a:prstGeom prst="rect">
+            <a:avLst/>
+          </a:prstGeom>
+          <a:noFill/>
+        </p:spPr>
+        <p:txBody>
+          <a:bodyPr wrap="none" rtlCol="0">
+            <a:spAutoFit/>
+          </a:bodyPr>
+          <a:lstStyle/>
+          <a:p>
+            <a:r>
+              <a:rPr lang="de-DE" dirty="0" smtClean="0"/>
+              <a:t>attestation</a:t>
+            </a:r>
+            <a:endParaRPr lang="de-DE" dirty="0"/>
+          </a:p>
+        </p:txBody>
+      </p:sp>
+      <p:sp>
+        <p:nvSpPr>
+          <p:cNvPr id="12" name="TextBox 11"/>
+          <p:cNvSpPr txBox="1"/>
+          <p:nvPr/>
+        </p:nvSpPr>
+        <p:spPr>
+          <a:xfrm>
+            <a:off x="3770769" y="620688"/>
+            <a:ext cx="1749710" cy="646331"/>
+          </a:xfrm>
+          <a:prstGeom prst="rect">
+            <a:avLst/>
+          </a:prstGeom>
+          <a:solidFill>
+            <a:schemeClr val="bg2"/>
+          </a:solidFill>
+          <a:ln/>
+        </p:spPr>
+        <p:style>
+          <a:lnRef idx="2">
+            <a:schemeClr val="dk1"/>
+          </a:lnRef>
+          <a:fillRef idx="1">
+            <a:schemeClr val="lt1"/>
+          </a:fillRef>
+          <a:effectRef idx="0">
+            <a:schemeClr val="dk1"/>
+          </a:effectRef>
+          <a:fontRef idx="minor">
+            <a:schemeClr val="dk1"/>
+          </a:fontRef>
+        </p:style>
+        <p:txBody>
+          <a:bodyPr wrap="none" rtlCol="0">
+            <a:spAutoFit/>
+          </a:bodyPr>
+          <a:lstStyle/>
+          <a:p>
+            <a:r>
+              <a:rPr lang="de-DE" i="1" dirty="0" smtClean="0"/>
+              <a:t>Attestation</a:t>
+            </a:r>
+          </a:p>
+          <a:p>
+            <a:r>
+              <a:rPr lang="de-DE" dirty="0" smtClean="0"/>
+              <a:t>quotation: string</a:t>
+            </a:r>
+          </a:p>
+        </p:txBody>
+      </p:sp>
+      <p:cxnSp>
+        <p:nvCxnSpPr>
+          <p:cNvPr id="31" name="Elbow Connector 30"/>
+          <p:cNvCxnSpPr>
+            <a:stCxn id="12" idx="3"/>
+            <a:endCxn id="50" idx="1"/>
+          </p:cNvCxnSpPr>
+          <p:nvPr/>
+        </p:nvCxnSpPr>
+        <p:spPr>
+          <a:xfrm flipV="1">
+            <a:off x="5520479" y="941050"/>
+            <a:ext cx="1659104" cy="2804"/>
+          </a:xfrm>
+          <a:prstGeom prst="bentConnector3">
+            <a:avLst>
+              <a:gd name="adj1" fmla="val 50000"/>
+            </a:avLst>
+          </a:prstGeom>
+          <a:ln>
+            <a:headEnd type="none" w="med" len="med"/>
+            <a:tailEnd type="arrow" w="med" len="med"/>
+          </a:ln>
+        </p:spPr>
+        <p:style>
+          <a:lnRef idx="2">
+            <a:schemeClr val="dk1"/>
+          </a:lnRef>
+          <a:fillRef idx="0">
+            <a:schemeClr val="dk1"/>
+          </a:fillRef>
+          <a:effectRef idx="1">
+            <a:schemeClr val="dk1"/>
+          </a:effectRef>
+          <a:fontRef idx="minor">
+            <a:schemeClr val="tx1"/>
+          </a:fontRef>
+        </p:style>
+      </p:cxnSp>
+      <p:sp>
+        <p:nvSpPr>
+          <p:cNvPr id="34" name="TextBox 33"/>
+          <p:cNvSpPr txBox="1"/>
+          <p:nvPr/>
+        </p:nvSpPr>
+        <p:spPr>
+          <a:xfrm>
+            <a:off x="5843108" y="560795"/>
+            <a:ext cx="1090170" cy="369332"/>
+          </a:xfrm>
+          <a:prstGeom prst="rect">
+            <a:avLst/>
+          </a:prstGeom>
+          <a:noFill/>
+        </p:spPr>
+        <p:txBody>
+          <a:bodyPr wrap="none" rtlCol="0">
+            <a:spAutoFit/>
+          </a:bodyPr>
+          <a:lstStyle/>
+          <a:p>
+            <a:r>
+              <a:rPr lang="de-DE" dirty="0" smtClean="0"/>
+              <a:t>dc:source</a:t>
+            </a:r>
+            <a:endParaRPr lang="de-DE" dirty="0"/>
+          </a:p>
+        </p:txBody>
+      </p:sp>
+      <p:cxnSp>
+        <p:nvCxnSpPr>
+          <p:cNvPr id="42" name="Straight Connector 41"/>
+          <p:cNvCxnSpPr>
+            <a:stCxn id="12" idx="1"/>
+            <a:endCxn id="12" idx="3"/>
+          </p:cNvCxnSpPr>
+          <p:nvPr/>
+        </p:nvCxnSpPr>
+        <p:spPr>
+          <a:xfrm>
+            <a:off x="3770769" y="943854"/>
+            <a:ext cx="1749710" cy="0"/>
+          </a:xfrm>
+          <a:prstGeom prst="line">
+            <a:avLst/>
+          </a:prstGeom>
+        </p:spPr>
+        <p:style>
+          <a:lnRef idx="1">
+            <a:schemeClr val="dk1"/>
+          </a:lnRef>
+          <a:fillRef idx="0">
+            <a:schemeClr val="dk1"/>
+          </a:fillRef>
+          <a:effectRef idx="0">
+            <a:schemeClr val="dk1"/>
+          </a:effectRef>
+          <a:fontRef idx="minor">
+            <a:schemeClr val="tx1"/>
+          </a:fontRef>
+        </p:style>
+      </p:cxnSp>
+      <p:sp>
+        <p:nvSpPr>
+          <p:cNvPr id="39" name="TextBox 38"/>
+          <p:cNvSpPr txBox="1"/>
+          <p:nvPr/>
+        </p:nvSpPr>
+        <p:spPr>
+          <a:xfrm>
+            <a:off x="3534235" y="1650207"/>
+            <a:ext cx="917302" cy="369332"/>
+          </a:xfrm>
+          <a:prstGeom prst="rect">
+            <a:avLst/>
+          </a:prstGeom>
+          <a:solidFill>
+            <a:schemeClr val="bg2"/>
+          </a:solidFill>
+          <a:ln/>
+        </p:spPr>
+        <p:style>
+          <a:lnRef idx="2">
+            <a:schemeClr val="dk1"/>
+          </a:lnRef>
+          <a:fillRef idx="1">
+            <a:schemeClr val="lt1"/>
+          </a:fillRef>
+          <a:effectRef idx="0">
+            <a:schemeClr val="dk1"/>
+          </a:effectRef>
+          <a:fontRef idx="minor">
+            <a:schemeClr val="dk1"/>
+          </a:fontRef>
+        </p:style>
+        <p:txBody>
+          <a:bodyPr wrap="none" rtlCol="0">
+            <a:spAutoFit/>
+          </a:bodyPr>
+          <a:lstStyle/>
+          <a:p>
+            <a:r>
+              <a:rPr lang="de-DE" i="1" dirty="0" smtClean="0"/>
+              <a:t>Citation</a:t>
+            </a:r>
+          </a:p>
+        </p:txBody>
+      </p:sp>
+      <p:cxnSp>
+        <p:nvCxnSpPr>
+          <p:cNvPr id="41" name="Elbow Connector 40"/>
+          <p:cNvCxnSpPr>
+            <a:stCxn id="4" idx="3"/>
+            <a:endCxn id="39" idx="1"/>
+          </p:cNvCxnSpPr>
+          <p:nvPr/>
+        </p:nvCxnSpPr>
+        <p:spPr>
+          <a:xfrm>
+            <a:off x="2073516" y="941166"/>
+            <a:ext cx="1460719" cy="893707"/>
+          </a:xfrm>
+          <a:prstGeom prst="bentConnector3">
+            <a:avLst/>
+          </a:prstGeom>
+          <a:ln>
+            <a:headEnd type="none" w="med" len="med"/>
+            <a:tailEnd type="arrow" w="med" len="med"/>
+          </a:ln>
+        </p:spPr>
+        <p:style>
+          <a:lnRef idx="2">
+            <a:schemeClr val="dk1"/>
+          </a:lnRef>
+          <a:fillRef idx="0">
+            <a:schemeClr val="dk1"/>
+          </a:fillRef>
+          <a:effectRef idx="1">
+            <a:schemeClr val="dk1"/>
+          </a:effectRef>
+          <a:fontRef idx="minor">
+            <a:schemeClr val="tx1"/>
+          </a:fontRef>
+        </p:style>
+      </p:cxnSp>
+      <p:sp>
+        <p:nvSpPr>
+          <p:cNvPr id="43" name="TextBox 42"/>
+          <p:cNvSpPr txBox="1"/>
+          <p:nvPr/>
+        </p:nvSpPr>
+        <p:spPr>
+          <a:xfrm>
+            <a:off x="2147281" y="1928947"/>
+            <a:ext cx="891462" cy="369332"/>
+          </a:xfrm>
+          <a:prstGeom prst="rect">
+            <a:avLst/>
+          </a:prstGeom>
+          <a:noFill/>
+        </p:spPr>
+        <p:txBody>
+          <a:bodyPr wrap="none" rtlCol="0">
+            <a:spAutoFit/>
+          </a:bodyPr>
+          <a:lstStyle/>
+          <a:p>
+            <a:r>
+              <a:rPr lang="de-DE" dirty="0" smtClean="0"/>
+              <a:t>citation</a:t>
+            </a:r>
+            <a:endParaRPr lang="de-DE" dirty="0"/>
+          </a:p>
+        </p:txBody>
+      </p:sp>
+      <p:cxnSp>
+        <p:nvCxnSpPr>
+          <p:cNvPr id="44" name="Elbow Connector 43"/>
+          <p:cNvCxnSpPr>
+            <a:stCxn id="39" idx="3"/>
+            <a:endCxn id="12" idx="2"/>
+          </p:cNvCxnSpPr>
+          <p:nvPr/>
+        </p:nvCxnSpPr>
+        <p:spPr>
+          <a:xfrm flipV="1">
+            <a:off x="4451537" y="1267019"/>
+            <a:ext cx="194087" cy="567854"/>
+          </a:xfrm>
+          <a:prstGeom prst="bentConnector2">
+            <a:avLst/>
+          </a:prstGeom>
+          <a:ln>
+            <a:headEnd type="none" w="med" len="med"/>
+            <a:tailEnd type="arrow" w="med" len="med"/>
+          </a:ln>
+        </p:spPr>
+        <p:style>
+          <a:lnRef idx="2">
+            <a:schemeClr val="dk1"/>
+          </a:lnRef>
+          <a:fillRef idx="0">
+            <a:schemeClr val="dk1"/>
+          </a:fillRef>
+          <a:effectRef idx="1">
+            <a:schemeClr val="dk1"/>
+          </a:effectRef>
+          <a:fontRef idx="minor">
+            <a:schemeClr val="tx1"/>
+          </a:fontRef>
+        </p:style>
+      </p:cxnSp>
+      <p:sp>
+        <p:nvSpPr>
+          <p:cNvPr id="45" name="TextBox 44"/>
+          <p:cNvSpPr txBox="1"/>
+          <p:nvPr/>
+        </p:nvSpPr>
+        <p:spPr>
+          <a:xfrm>
+            <a:off x="4816981" y="1363916"/>
+            <a:ext cx="1218732" cy="646331"/>
+          </a:xfrm>
+          <a:prstGeom prst="rect">
+            <a:avLst/>
+          </a:prstGeom>
+          <a:noFill/>
+        </p:spPr>
+        <p:txBody>
+          <a:bodyPr wrap="none" rtlCol="0">
+            <a:spAutoFit/>
+          </a:bodyPr>
+          <a:lstStyle/>
+          <a:p>
+            <a:r>
+              <a:rPr lang="de-DE" dirty="0" smtClean="0"/>
+              <a:t>makes</a:t>
+            </a:r>
+          </a:p>
+          <a:p>
+            <a:r>
+              <a:rPr lang="de-DE" dirty="0" smtClean="0"/>
+              <a:t>Attestation</a:t>
+            </a:r>
+          </a:p>
+        </p:txBody>
+      </p:sp>
+      <p:sp>
+        <p:nvSpPr>
+          <p:cNvPr id="50" name="TextBox 49"/>
+          <p:cNvSpPr txBox="1"/>
+          <p:nvPr/>
+        </p:nvSpPr>
+        <p:spPr>
+          <a:xfrm>
+            <a:off x="7179583" y="756384"/>
+            <a:ext cx="1051891" cy="369332"/>
+          </a:xfrm>
+          <a:prstGeom prst="rect">
+            <a:avLst/>
+          </a:prstGeom>
+          <a:noFill/>
+          <a:ln>
+            <a:prstDash val="sysDot"/>
+          </a:ln>
+        </p:spPr>
+        <p:style>
+          <a:lnRef idx="2">
+            <a:schemeClr val="dk1"/>
+          </a:lnRef>
+          <a:fillRef idx="1">
+            <a:schemeClr val="lt1"/>
+          </a:fillRef>
+          <a:effectRef idx="0">
+            <a:schemeClr val="dk1"/>
+          </a:effectRef>
+          <a:fontRef idx="minor">
+            <a:schemeClr val="dk1"/>
+          </a:fontRef>
+        </p:style>
+        <p:txBody>
+          <a:bodyPr wrap="none" rtlCol="0">
+            <a:spAutoFit/>
+          </a:bodyPr>
+          <a:lstStyle/>
+          <a:p>
+            <a:r>
+              <a:rPr lang="de-DE" dirty="0" smtClean="0"/>
+              <a:t>locus URI</a:t>
+            </a:r>
+            <a:endParaRPr lang="de-DE" i="1" dirty="0"/>
+          </a:p>
+        </p:txBody>
+      </p:sp>
+      <p:graphicFrame>
+        <p:nvGraphicFramePr>
+          <p:cNvPr id="5" name="Table 4"/>
+          <p:cNvGraphicFramePr>
+            <a:graphicFrameLocks noGrp="1"/>
+          </p:cNvGraphicFramePr>
+          <p:nvPr>
+            <p:extLst>
+              <p:ext uri="{D42A27DB-BD31-4B8C-83A1-F6EECF244321}">
+                <p14:modId xmlns:p14="http://schemas.microsoft.com/office/powerpoint/2010/main" val="2607733390"/>
+              </p:ext>
+            </p:extLst>
+          </p:nvPr>
+        </p:nvGraphicFramePr>
+        <p:xfrm>
+          <a:off x="84085" y="3068960"/>
+          <a:ext cx="8928990" cy="2849880"/>
+        </p:xfrm>
+        <a:graphic>
+          <a:graphicData uri="http://schemas.openxmlformats.org/drawingml/2006/table">
+            <a:tbl>
+              <a:tblPr firstRow="1" bandRow="1">
+                <a:tableStyleId>{5C22544A-7EE6-4342-B048-85BDC9FD1C3A}</a:tableStyleId>
+              </a:tblPr>
+              <a:tblGrid>
+                <a:gridCol w="2976330"/>
+                <a:gridCol w="2976330"/>
+                <a:gridCol w="2976330"/>
+              </a:tblGrid>
+              <a:tr h="0">
+                <a:tc>
+                  <a:txBody>
+                    <a:bodyPr/>
+                    <a:lstStyle/>
+                    <a:p>
+                      <a:r>
+                        <a:rPr lang="de-DE" sz="1100" dirty="0" smtClean="0"/>
+                        <a:t>proposed</a:t>
+                      </a:r>
+                      <a:r>
+                        <a:rPr lang="de-DE" sz="1100" baseline="0" dirty="0" smtClean="0"/>
+                        <a:t> minimal consensus</a:t>
+                      </a:r>
+                      <a:endParaRPr lang="de-DE" sz="1100" dirty="0"/>
+                    </a:p>
+                  </a:txBody>
+                  <a:tcPr/>
+                </a:tc>
+                <a:tc>
+                  <a:txBody>
+                    <a:bodyPr/>
+                    <a:lstStyle/>
+                    <a:p>
+                      <a:r>
+                        <a:rPr lang="de-DE" sz="1100" dirty="0" smtClean="0"/>
+                        <a:t>D&amp;dD</a:t>
+                      </a:r>
+                      <a:endParaRPr lang="de-DE" sz="1100" dirty="0"/>
+                    </a:p>
+                  </a:txBody>
+                  <a:tcPr/>
+                </a:tc>
+                <a:tc>
+                  <a:txBody>
+                    <a:bodyPr/>
+                    <a:lstStyle/>
+                    <a:p>
+                      <a:r>
+                        <a:rPr lang="de-DE" sz="1100" dirty="0" smtClean="0"/>
+                        <a:t>K&amp;B</a:t>
+                      </a:r>
+                      <a:endParaRPr lang="de-DE" sz="1100" dirty="0"/>
+                    </a:p>
+                  </a:txBody>
+                  <a:tcPr/>
+                </a:tc>
+              </a:tr>
+              <a:tr h="232026">
+                <a:tc>
+                  <a:txBody>
+                    <a:bodyPr/>
+                    <a:lstStyle/>
+                    <a:p>
+                      <a:r>
+                        <a:rPr lang="de-DE" sz="1100" dirty="0" smtClean="0"/>
+                        <a:t>ontolex:Element</a:t>
+                      </a:r>
+                      <a:endParaRPr lang="de-DE" sz="1100" dirty="0"/>
+                    </a:p>
+                  </a:txBody>
+                  <a:tcPr/>
+                </a:tc>
+                <a:tc>
+                  <a:txBody>
+                    <a:bodyPr/>
+                    <a:lstStyle/>
+                    <a:p>
+                      <a:r>
+                        <a:rPr lang="de-DE" sz="1100" dirty="0" smtClean="0"/>
+                        <a:t>LexicalPhenomenon</a:t>
+                      </a:r>
+                      <a:endParaRPr lang="de-DE" sz="1100" dirty="0"/>
+                    </a:p>
+                  </a:txBody>
+                  <a:tcPr/>
+                </a:tc>
+                <a:tc>
+                  <a:txBody>
+                    <a:bodyPr/>
+                    <a:lstStyle/>
+                    <a:p>
+                      <a:r>
+                        <a:rPr lang="de-DE" sz="1100" dirty="0" smtClean="0"/>
+                        <a:t>(LexicalSense)</a:t>
+                      </a:r>
+                      <a:endParaRPr lang="de-DE" sz="1100" dirty="0"/>
+                    </a:p>
+                  </a:txBody>
+                  <a:tcPr/>
+                </a:tc>
+              </a:tr>
+              <a:tr h="232026">
+                <a:tc>
+                  <a:txBody>
+                    <a:bodyPr/>
+                    <a:lstStyle/>
+                    <a:p>
+                      <a:r>
+                        <a:rPr lang="de-DE" sz="1100" dirty="0" smtClean="0"/>
+                        <a:t>attestation</a:t>
+                      </a:r>
+                      <a:endParaRPr lang="de-DE" sz="1100" dirty="0"/>
+                    </a:p>
+                  </a:txBody>
+                  <a:tcPr/>
+                </a:tc>
+                <a:tc>
+                  <a:txBody>
+                    <a:bodyPr/>
+                    <a:lstStyle/>
+                    <a:p>
+                      <a:r>
+                        <a:rPr lang="de-DE" sz="1100" dirty="0" smtClean="0"/>
+                        <a:t>attestation</a:t>
+                      </a:r>
+                      <a:endParaRPr lang="de-DE" sz="1100" dirty="0"/>
+                    </a:p>
+                  </a:txBody>
+                  <a:tcPr/>
+                </a:tc>
+                <a:tc>
+                  <a:txBody>
+                    <a:bodyPr/>
+                    <a:lstStyle/>
+                    <a:p>
+                      <a:r>
+                        <a:rPr lang="de-DE" sz="1100" dirty="0" smtClean="0"/>
+                        <a:t>isAttestedBy</a:t>
+                      </a:r>
+                      <a:endParaRPr lang="de-DE" sz="1100" dirty="0"/>
+                    </a:p>
+                  </a:txBody>
+                  <a:tcPr/>
+                </a:tc>
+              </a:tr>
+              <a:tr h="232026">
+                <a:tc>
+                  <a:txBody>
+                    <a:bodyPr/>
+                    <a:lstStyle/>
+                    <a:p>
+                      <a:r>
+                        <a:rPr lang="de-DE" sz="1100" dirty="0" smtClean="0"/>
+                        <a:t>Attestation</a:t>
+                      </a:r>
+                      <a:endParaRPr lang="de-DE" sz="1100" dirty="0"/>
+                    </a:p>
+                  </a:txBody>
+                  <a:tcPr/>
+                </a:tc>
+                <a:tc>
+                  <a:txBody>
+                    <a:bodyPr/>
+                    <a:lstStyle/>
+                    <a:p>
+                      <a:r>
+                        <a:rPr lang="de-DE" sz="1100" dirty="0" smtClean="0"/>
+                        <a:t>Attestation</a:t>
+                      </a:r>
+                      <a:endParaRPr lang="de-DE" sz="1100" dirty="0"/>
+                    </a:p>
+                  </a:txBody>
+                  <a:tcPr/>
+                </a:tc>
+                <a:tc>
+                  <a:txBody>
+                    <a:bodyPr/>
+                    <a:lstStyle/>
+                    <a:p>
+                      <a:r>
+                        <a:rPr lang="de-DE" sz="1100" dirty="0" smtClean="0"/>
+                        <a:t>Attestation</a:t>
+                      </a:r>
+                      <a:endParaRPr lang="de-DE" sz="1100" dirty="0"/>
+                    </a:p>
+                  </a:txBody>
+                  <a:tcPr/>
+                </a:tc>
+              </a:tr>
+              <a:tr h="232026">
+                <a:tc>
+                  <a:txBody>
+                    <a:bodyPr/>
+                    <a:lstStyle/>
+                    <a:p>
+                      <a:r>
+                        <a:rPr lang="de-DE" sz="1100" dirty="0" smtClean="0"/>
+                        <a:t>Citation</a:t>
+                      </a:r>
+                      <a:endParaRPr lang="de-DE" sz="1100" dirty="0"/>
+                    </a:p>
+                  </a:txBody>
+                  <a:tcPr/>
+                </a:tc>
+                <a:tc>
+                  <a:txBody>
+                    <a:bodyPr/>
+                    <a:lstStyle/>
+                    <a:p>
+                      <a:r>
+                        <a:rPr lang="de-DE" sz="1100" dirty="0" smtClean="0"/>
+                        <a:t>~ Citation</a:t>
+                      </a:r>
+                      <a:endParaRPr lang="de-DE" sz="1100" dirty="0"/>
+                    </a:p>
+                  </a:txBody>
+                  <a:tcPr/>
+                </a:tc>
+                <a:tc>
+                  <a:txBody>
+                    <a:bodyPr/>
+                    <a:lstStyle/>
+                    <a:p>
+                      <a:r>
+                        <a:rPr lang="de-DE" sz="1100" dirty="0" smtClean="0"/>
+                        <a:t>Citation</a:t>
+                      </a:r>
+                      <a:endParaRPr lang="de-DE" sz="1100" dirty="0"/>
+                    </a:p>
+                  </a:txBody>
+                  <a:tcPr/>
+                </a:tc>
+              </a:tr>
+              <a:tr h="232026">
+                <a:tc>
+                  <a:txBody>
+                    <a:bodyPr/>
+                    <a:lstStyle/>
+                    <a:p>
+                      <a:r>
+                        <a:rPr lang="de-DE" sz="1100" dirty="0" smtClean="0"/>
+                        <a:t>citation</a:t>
+                      </a:r>
+                      <a:endParaRPr lang="de-DE" sz="1100" dirty="0"/>
+                    </a:p>
+                  </a:txBody>
+                  <a:tcPr/>
+                </a:tc>
+                <a:tc>
+                  <a:txBody>
+                    <a:bodyPr/>
+                    <a:lstStyle/>
+                    <a:p>
+                      <a:r>
+                        <a:rPr lang="de-DE" sz="1100" dirty="0" smtClean="0"/>
+                        <a:t>~</a:t>
+                      </a:r>
+                      <a:r>
+                        <a:rPr lang="de-DE" sz="1100" baseline="0" dirty="0" smtClean="0"/>
+                        <a:t> </a:t>
+                      </a:r>
+                      <a:r>
+                        <a:rPr lang="de-DE" sz="1100" dirty="0" smtClean="0"/>
+                        <a:t>citation</a:t>
+                      </a:r>
+                      <a:endParaRPr lang="de-DE" sz="1100" dirty="0"/>
+                    </a:p>
+                  </a:txBody>
+                  <a:tcPr/>
+                </a:tc>
+                <a:tc>
+                  <a:txBody>
+                    <a:bodyPr/>
+                    <a:lstStyle/>
+                    <a:p>
+                      <a:r>
+                        <a:rPr lang="de-DE" sz="1100" dirty="0" smtClean="0"/>
+                        <a:t>(indirectly via makesAttestation)</a:t>
+                      </a:r>
+                      <a:endParaRPr lang="de-DE" sz="1100" dirty="0"/>
+                    </a:p>
+                  </a:txBody>
+                  <a:tcPr/>
+                </a:tc>
+              </a:tr>
+              <a:tr h="232026">
+                <a:tc>
+                  <a:txBody>
+                    <a:bodyPr/>
+                    <a:lstStyle/>
+                    <a:p>
+                      <a:r>
+                        <a:rPr lang="de-DE" sz="1100" dirty="0" smtClean="0"/>
+                        <a:t>makesAttestation</a:t>
+                      </a:r>
+                      <a:endParaRPr lang="de-DE" sz="1100" dirty="0"/>
+                    </a:p>
+                  </a:txBody>
+                  <a:tcPr/>
+                </a:tc>
+                <a:tc>
+                  <a:txBody>
+                    <a:bodyPr/>
+                    <a:lstStyle/>
+                    <a:p>
+                      <a:r>
+                        <a:rPr lang="de-DE" sz="1100" dirty="0" smtClean="0"/>
+                        <a:t>[</a:t>
+                      </a:r>
+                      <a:r>
+                        <a:rPr lang="de-DE" sz="1100" dirty="0" smtClean="0"/>
+                        <a:t>identity/subClassOf]</a:t>
+                      </a:r>
+                      <a:endParaRPr lang="de-DE" sz="1100" dirty="0"/>
+                    </a:p>
+                  </a:txBody>
+                  <a:tcPr/>
+                </a:tc>
+                <a:tc>
+                  <a:txBody>
+                    <a:bodyPr/>
+                    <a:lstStyle/>
+                    <a:p>
+                      <a:r>
+                        <a:rPr lang="de-DE" sz="1100" dirty="0" smtClean="0"/>
+                        <a:t>makesAttestation</a:t>
+                      </a:r>
+                      <a:endParaRPr lang="de-DE" sz="1100" dirty="0"/>
+                    </a:p>
+                  </a:txBody>
+                  <a:tcPr/>
+                </a:tc>
+              </a:tr>
+              <a:tr h="232026">
+                <a:tc>
+                  <a:txBody>
+                    <a:bodyPr/>
+                    <a:lstStyle/>
+                    <a:p>
+                      <a:r>
+                        <a:rPr lang="de-DE" sz="1100" dirty="0" smtClean="0"/>
+                        <a:t>dc:source</a:t>
+                      </a:r>
+                      <a:endParaRPr lang="de-DE" sz="1100" dirty="0"/>
+                    </a:p>
+                  </a:txBody>
+                  <a:tcPr/>
+                </a:tc>
+                <a:tc>
+                  <a:txBody>
+                    <a:bodyPr/>
+                    <a:lstStyle/>
+                    <a:p>
+                      <a:r>
+                        <a:rPr lang="de-DE" sz="1100" dirty="0" smtClean="0"/>
+                        <a:t>^locusIn</a:t>
+                      </a:r>
+                      <a:endParaRPr lang="de-DE" sz="1100" dirty="0"/>
+                    </a:p>
+                  </a:txBody>
+                  <a:tcPr/>
+                </a:tc>
+                <a:tc>
+                  <a:txBody>
+                    <a:bodyPr/>
+                    <a:lstStyle/>
+                    <a:p>
+                      <a:r>
+                        <a:rPr lang="de-DE" sz="1100" dirty="0" smtClean="0"/>
+                        <a:t>foundIn</a:t>
+                      </a:r>
+                      <a:endParaRPr lang="de-DE" sz="1100" dirty="0"/>
+                    </a:p>
+                  </a:txBody>
+                  <a:tcPr/>
+                </a:tc>
+              </a:tr>
+              <a:tr h="232026">
+                <a:tc>
+                  <a:txBody>
+                    <a:bodyPr/>
+                    <a:lstStyle/>
+                    <a:p>
+                      <a:r>
+                        <a:rPr lang="de-DE" sz="1100" dirty="0" smtClean="0"/>
+                        <a:t>quotation</a:t>
+                      </a:r>
+                      <a:endParaRPr lang="de-DE" sz="1100" dirty="0"/>
+                    </a:p>
+                  </a:txBody>
+                  <a:tcPr/>
+                </a:tc>
+                <a:tc>
+                  <a:txBody>
+                    <a:bodyPr/>
+                    <a:lstStyle/>
+                    <a:p>
+                      <a:r>
+                        <a:rPr lang="de-DE" sz="1100" dirty="0" smtClean="0"/>
+                        <a:t>quotation</a:t>
+                      </a:r>
+                      <a:endParaRPr lang="de-DE" sz="1100" dirty="0"/>
+                    </a:p>
+                  </a:txBody>
+                  <a:tcPr/>
+                </a:tc>
+                <a:tc>
+                  <a:txBody>
+                    <a:bodyPr/>
+                    <a:lstStyle/>
+                    <a:p>
+                      <a:r>
+                        <a:rPr lang="de-DE" sz="1100" dirty="0" smtClean="0"/>
+                        <a:t>hasContext</a:t>
+                      </a:r>
+                      <a:endParaRPr lang="de-DE" sz="1100" dirty="0"/>
+                    </a:p>
+                  </a:txBody>
+                  <a:tcPr/>
+                </a:tc>
+              </a:tr>
+              <a:tr h="232026">
+                <a:tc>
+                  <a:txBody>
+                    <a:bodyPr/>
+                    <a:lstStyle/>
+                    <a:p>
+                      <a:r>
+                        <a:rPr lang="de-DE" sz="1100" dirty="0" smtClean="0"/>
+                        <a:t>(locus URI)</a:t>
+                      </a:r>
+                      <a:endParaRPr lang="de-DE" sz="1100" dirty="0"/>
+                    </a:p>
+                  </a:txBody>
+                  <a:tcPr/>
+                </a:tc>
+                <a:tc>
+                  <a:txBody>
+                    <a:bodyPr/>
+                    <a:lstStyle/>
+                    <a:p>
+                      <a:r>
+                        <a:rPr lang="de-DE" sz="1100" dirty="0" smtClean="0"/>
+                        <a:t>Locus</a:t>
+                      </a:r>
+                      <a:endParaRPr lang="de-DE" sz="1100" dirty="0"/>
+                    </a:p>
+                  </a:txBody>
+                  <a:tcPr/>
+                </a:tc>
+                <a:tc>
+                  <a:txBody>
+                    <a:bodyPr/>
+                    <a:lstStyle/>
+                    <a:p>
+                      <a:r>
+                        <a:rPr lang="de-DE" sz="1100" dirty="0" smtClean="0"/>
+                        <a:t>Work</a:t>
+                      </a:r>
+                      <a:endParaRPr lang="de-DE" sz="1100" dirty="0"/>
+                    </a:p>
+                  </a:txBody>
+                  <a:tcPr/>
+                </a:tc>
+              </a:tr>
+              <a:tr h="232026">
+                <a:tc>
+                  <a:txBody>
+                    <a:bodyPr/>
+                    <a:lstStyle/>
+                    <a:p>
+                      <a:r>
+                        <a:rPr lang="de-DE" sz="1100" dirty="0" smtClean="0"/>
+                        <a:t>(indirectly</a:t>
+                      </a:r>
+                      <a:r>
+                        <a:rPr lang="de-DE" sz="1100" baseline="0" dirty="0" smtClean="0"/>
+                        <a:t> via attestations)</a:t>
+                      </a:r>
+                      <a:endParaRPr lang="de-DE" sz="1100" dirty="0"/>
+                    </a:p>
+                  </a:txBody>
+                  <a:tcPr/>
+                </a:tc>
+                <a:tc>
+                  <a:txBody>
+                    <a:bodyPr/>
+                    <a:lstStyle/>
+                    <a:p>
+                      <a:r>
+                        <a:rPr lang="de-DE" sz="1100" dirty="0" smtClean="0"/>
+                        <a:t>locus</a:t>
+                      </a:r>
+                      <a:endParaRPr lang="de-DE" sz="1100" dirty="0"/>
+                    </a:p>
+                  </a:txBody>
+                  <a:tcPr/>
+                </a:tc>
+                <a:tc>
+                  <a:txBody>
+                    <a:bodyPr/>
+                    <a:lstStyle/>
+                    <a:p>
+                      <a:r>
+                        <a:rPr lang="de-DE" sz="1100" dirty="0" smtClean="0"/>
+                        <a:t>(hasCitingEntity/hasCitedEntity)</a:t>
+                      </a:r>
+                      <a:endParaRPr lang="de-DE" sz="1100" dirty="0"/>
+                    </a:p>
+                  </a:txBody>
+                  <a:tcPr/>
+                </a:tc>
+              </a:tr>
+            </a:tbl>
+          </a:graphicData>
+        </a:graphic>
+      </p:graphicFrame>
+    </p:spTree>
+    <p:extLst>
+      <p:ext uri="{BB962C8B-B14F-4D97-AF65-F5344CB8AC3E}">
+        <p14:creationId xmlns:p14="http://schemas.microsoft.com/office/powerpoint/2010/main" val="2306206981"/>
       </p:ext>
     </p:extLst>
   </p:cSld>

</xml_diff>

<commit_message>
added attestationGloss (tbc whether redundant with quotation)
</commit_message>
<xml_diff>
--- a/img/source.pptx
+++ b/img/source.pptx
@@ -9390,7 +9390,7 @@
         </p:nvSpPr>
         <p:spPr>
           <a:xfrm>
-            <a:off x="376253" y="4157606"/>
+            <a:off x="376253" y="3983973"/>
             <a:ext cx="1237198" cy="369332"/>
           </a:xfrm>
           <a:prstGeom prst="rect">
@@ -9616,7 +9616,7 @@
         </p:nvSpPr>
         <p:spPr>
           <a:xfrm>
-            <a:off x="899592" y="4551511"/>
+            <a:off x="899592" y="4377878"/>
             <a:ext cx="216024" cy="216024"/>
           </a:xfrm>
           <a:prstGeom prst="triangle">
@@ -9657,8 +9657,8 @@
         </p:nvCxnSpPr>
         <p:spPr>
           <a:xfrm rot="16200000" flipH="1">
-            <a:off x="699551" y="5075587"/>
-            <a:ext cx="976754" cy="360649"/>
+            <a:off x="612735" y="4988770"/>
+            <a:ext cx="1150387" cy="360649"/>
           </a:xfrm>
           <a:prstGeom prst="bentConnector2">
             <a:avLst/>
@@ -9690,8 +9690,8 @@
         </p:nvCxnSpPr>
         <p:spPr>
           <a:xfrm rot="16200000" flipH="1">
-            <a:off x="1828727" y="3946412"/>
-            <a:ext cx="1274078" cy="2916324"/>
+            <a:off x="1741911" y="3859595"/>
+            <a:ext cx="1447711" cy="2916324"/>
           </a:xfrm>
           <a:prstGeom prst="bentConnector2">
             <a:avLst/>
@@ -9723,8 +9723,8 @@
         </p:nvCxnSpPr>
         <p:spPr>
           <a:xfrm rot="16200000" flipH="1">
-            <a:off x="383921" y="5391218"/>
-            <a:ext cx="1571402" cy="324036"/>
+            <a:off x="297105" y="5304401"/>
+            <a:ext cx="1745035" cy="324036"/>
           </a:xfrm>
           <a:prstGeom prst="bentConnector2">
             <a:avLst/>
@@ -9756,8 +9756,8 @@
         </p:nvCxnSpPr>
         <p:spPr>
           <a:xfrm rot="16200000" flipH="1">
-            <a:off x="1506892" y="4268246"/>
-            <a:ext cx="1868726" cy="2867303"/>
+            <a:off x="1420076" y="4181429"/>
+            <a:ext cx="2042359" cy="2867303"/>
           </a:xfrm>
           <a:prstGeom prst="bentConnector2">
             <a:avLst/>
@@ -9786,7 +9786,7 @@
         </p:nvSpPr>
         <p:spPr>
           <a:xfrm>
-            <a:off x="3995936" y="3779748"/>
+            <a:off x="3995936" y="3646765"/>
             <a:ext cx="1786258" cy="646331"/>
           </a:xfrm>
           <a:prstGeom prst="rect">
@@ -9839,7 +9839,7 @@
         </p:nvSpPr>
         <p:spPr>
           <a:xfrm>
-            <a:off x="2793297" y="3759423"/>
+            <a:off x="2793297" y="3626440"/>
             <a:ext cx="1130631" cy="369332"/>
           </a:xfrm>
           <a:prstGeom prst="rect">
@@ -9872,7 +9872,7 @@
         </p:nvCxnSpPr>
         <p:spPr>
           <a:xfrm flipV="1">
-            <a:off x="5782194" y="4102913"/>
+            <a:off x="5782194" y="3969930"/>
             <a:ext cx="1670126" cy="1"/>
           </a:xfrm>
           <a:prstGeom prst="straightConnector1">
@@ -9905,7 +9905,7 @@
         </p:nvSpPr>
         <p:spPr>
           <a:xfrm>
-            <a:off x="6276351" y="3759423"/>
+            <a:off x="6276351" y="3626440"/>
             <a:ext cx="815929" cy="369332"/>
           </a:xfrm>
           <a:prstGeom prst="rect">
@@ -9938,7 +9938,7 @@
         </p:nvCxnSpPr>
         <p:spPr>
           <a:xfrm>
-            <a:off x="3995936" y="4102914"/>
+            <a:off x="3995936" y="3969931"/>
             <a:ext cx="1786258" cy="0"/>
           </a:xfrm>
           <a:prstGeom prst="line">
@@ -9968,7 +9968,7 @@
         </p:nvSpPr>
         <p:spPr>
           <a:xfrm>
-            <a:off x="2785861" y="4454930"/>
+            <a:off x="2785861" y="4281297"/>
             <a:ext cx="1210075" cy="369332"/>
           </a:xfrm>
           <a:prstGeom prst="rect">
@@ -10001,12 +10001,12 @@
         </p:nvCxnSpPr>
         <p:spPr>
           <a:xfrm>
-            <a:off x="1613451" y="4342272"/>
-            <a:ext cx="3604413" cy="510351"/>
+            <a:off x="1613451" y="4168639"/>
+            <a:ext cx="3404161" cy="670904"/>
           </a:xfrm>
           <a:prstGeom prst="bentConnector3">
             <a:avLst>
-              <a:gd name="adj1" fmla="val 33152"/>
+              <a:gd name="adj1" fmla="val 35014"/>
             </a:avLst>
           </a:prstGeom>
           <a:ln>
@@ -10037,7 +10037,7 @@
         </p:nvSpPr>
         <p:spPr>
           <a:xfrm>
-            <a:off x="3995936" y="2444695"/>
+            <a:off x="3995936" y="2359837"/>
             <a:ext cx="2180982" cy="1200329"/>
           </a:xfrm>
           <a:prstGeom prst="rect">
@@ -10103,7 +10103,7 @@
         </p:nvSpPr>
         <p:spPr>
           <a:xfrm>
-            <a:off x="2699792" y="2636912"/>
+            <a:off x="2699792" y="2552054"/>
             <a:ext cx="1234633" cy="369332"/>
           </a:xfrm>
           <a:prstGeom prst="rect">
@@ -10133,7 +10133,7 @@
         </p:nvCxnSpPr>
         <p:spPr>
           <a:xfrm>
-            <a:off x="3995936" y="2780928"/>
+            <a:off x="3995936" y="2696070"/>
             <a:ext cx="2180982" cy="0"/>
           </a:xfrm>
           <a:prstGeom prst="line">
@@ -10165,9 +10165,9 @@
           <p:nvPr/>
         </p:nvCxnSpPr>
         <p:spPr>
-          <a:xfrm flipV="1">
-            <a:off x="6967574" y="4849069"/>
-            <a:ext cx="1060810" cy="3554"/>
+          <a:xfrm>
+            <a:off x="7308304" y="4839543"/>
+            <a:ext cx="720080" cy="4109"/>
           </a:xfrm>
           <a:prstGeom prst="bentConnector3">
             <a:avLst>
@@ -10198,14 +10198,13 @@
         <p:nvCxnSpPr>
           <p:cNvPr id="42" name="Elbow Connector 41"/>
           <p:cNvCxnSpPr>
-            <a:stCxn id="4" idx="3"/>
             <a:endCxn id="32" idx="1"/>
           </p:cNvCxnSpPr>
           <p:nvPr/>
         </p:nvCxnSpPr>
         <p:spPr>
           <a:xfrm flipV="1">
-            <a:off x="1613451" y="3044860"/>
+            <a:off x="1613451" y="2960002"/>
             <a:ext cx="2382485" cy="1297412"/>
           </a:xfrm>
           <a:prstGeom prst="bentConnector3">
@@ -10237,14 +10236,13 @@
         <p:nvCxnSpPr>
           <p:cNvPr id="47" name="Elbow Connector 46"/>
           <p:cNvCxnSpPr>
-            <a:stCxn id="4" idx="3"/>
             <a:endCxn id="14" idx="1"/>
           </p:cNvCxnSpPr>
           <p:nvPr/>
         </p:nvCxnSpPr>
         <p:spPr>
           <a:xfrm flipV="1">
-            <a:off x="1613451" y="4102914"/>
+            <a:off x="1613451" y="3969931"/>
             <a:ext cx="2382485" cy="239358"/>
           </a:xfrm>
           <a:prstGeom prst="bentConnector3">
@@ -10278,7 +10276,7 @@
         </p:nvGrpSpPr>
         <p:grpSpPr>
           <a:xfrm>
-            <a:off x="329393" y="587577"/>
+            <a:off x="329393" y="502719"/>
             <a:ext cx="1074255" cy="369332"/>
             <a:chOff x="4355976" y="1268760"/>
             <a:chExt cx="1074255" cy="369332"/>
@@ -10378,7 +10376,7 @@
         </p:nvCxnSpPr>
         <p:spPr>
           <a:xfrm flipV="1">
-            <a:off x="1403648" y="792580"/>
+            <a:off x="1403648" y="707722"/>
             <a:ext cx="648072" cy="955"/>
           </a:xfrm>
           <a:prstGeom prst="bentConnector3">
@@ -10407,13 +10405,12 @@
           <p:cNvPr id="58" name="Straight Arrow Connector 57"/>
           <p:cNvCxnSpPr>
             <a:stCxn id="64" idx="2"/>
-            <a:endCxn id="4" idx="0"/>
           </p:cNvCxnSpPr>
           <p:nvPr/>
         </p:nvCxnSpPr>
         <p:spPr>
           <a:xfrm flipH="1">
-            <a:off x="994852" y="2068399"/>
+            <a:off x="994852" y="1983541"/>
             <a:ext cx="14859" cy="2089207"/>
           </a:xfrm>
           <a:prstGeom prst="straightConnector1">
@@ -10446,7 +10443,7 @@
         </p:nvSpPr>
         <p:spPr>
           <a:xfrm>
-            <a:off x="1319331" y="2134597"/>
+            <a:off x="1319331" y="2049739"/>
             <a:ext cx="1032719" cy="646331"/>
           </a:xfrm>
           <a:prstGeom prst="rect">
@@ -10482,7 +10479,7 @@
         </p:nvGrpSpPr>
         <p:grpSpPr>
           <a:xfrm>
-            <a:off x="2051720" y="330915"/>
+            <a:off x="2051720" y="246057"/>
             <a:ext cx="2180982" cy="1152128"/>
             <a:chOff x="3779912" y="2420888"/>
             <a:chExt cx="2180982" cy="1152128"/>
@@ -10625,7 +10622,7 @@
         </p:nvSpPr>
         <p:spPr>
           <a:xfrm>
-            <a:off x="395536" y="1699067"/>
+            <a:off x="395536" y="1614209"/>
             <a:ext cx="1228350" cy="369332"/>
           </a:xfrm>
           <a:prstGeom prst="rect">
@@ -10675,7 +10672,7 @@
         </p:nvCxnSpPr>
         <p:spPr>
           <a:xfrm rot="5400000">
-            <a:off x="1980766" y="511989"/>
+            <a:off x="1980766" y="427131"/>
             <a:ext cx="216024" cy="2158133"/>
           </a:xfrm>
           <a:prstGeom prst="bentConnector3">
@@ -10707,7 +10704,7 @@
         </p:nvSpPr>
         <p:spPr>
           <a:xfrm>
-            <a:off x="4546600" y="1689775"/>
+            <a:off x="4546600" y="1604917"/>
             <a:ext cx="1059906" cy="369332"/>
           </a:xfrm>
           <a:prstGeom prst="rect">
@@ -10757,7 +10754,7 @@
         </p:nvCxnSpPr>
         <p:spPr>
           <a:xfrm rot="16200000" flipH="1">
-            <a:off x="4018832" y="632054"/>
+            <a:off x="4018832" y="547196"/>
             <a:ext cx="206732" cy="1908709"/>
           </a:xfrm>
           <a:prstGeom prst="bentConnector3">
@@ -10792,7 +10789,7 @@
         </p:nvCxnSpPr>
         <p:spPr>
           <a:xfrm>
-            <a:off x="5076553" y="2059107"/>
+            <a:off x="5076553" y="1974249"/>
             <a:ext cx="9874" cy="385588"/>
           </a:xfrm>
           <a:prstGeom prst="straightConnector1">
@@ -10825,7 +10822,7 @@
         </p:nvSpPr>
         <p:spPr>
           <a:xfrm>
-            <a:off x="5207768" y="2049815"/>
+            <a:off x="5207768" y="1964957"/>
             <a:ext cx="2460576" cy="369332"/>
           </a:xfrm>
           <a:prstGeom prst="rect">
@@ -10862,7 +10859,7 @@
         </p:nvCxnSpPr>
         <p:spPr>
           <a:xfrm rot="16200000" flipH="1" flipV="1">
-            <a:off x="1815317" y="-739318"/>
+            <a:off x="1815317" y="-824176"/>
             <a:ext cx="256662" cy="2397127"/>
           </a:xfrm>
           <a:prstGeom prst="bentConnector3">
@@ -10898,7 +10895,7 @@
         </p:nvSpPr>
         <p:spPr>
           <a:xfrm>
-            <a:off x="1039030" y="146249"/>
+            <a:off x="1039030" y="61391"/>
             <a:ext cx="873252" cy="369332"/>
           </a:xfrm>
           <a:prstGeom prst="rect">
@@ -10928,7 +10925,7 @@
         </p:nvSpPr>
         <p:spPr>
           <a:xfrm>
-            <a:off x="3995936" y="5228435"/>
+            <a:off x="3995936" y="5291916"/>
             <a:ext cx="917302" cy="369332"/>
           </a:xfrm>
           <a:prstGeom prst="rect">
@@ -10974,7 +10971,7 @@
         </p:nvSpPr>
         <p:spPr>
           <a:xfrm>
-            <a:off x="2843808" y="5055567"/>
+            <a:off x="2843808" y="5075892"/>
             <a:ext cx="891462" cy="369332"/>
           </a:xfrm>
           <a:prstGeom prst="rect">
@@ -11004,7 +11001,7 @@
         </p:nvSpPr>
         <p:spPr>
           <a:xfrm>
-            <a:off x="4932040" y="5424899"/>
+            <a:off x="6284767" y="5445224"/>
             <a:ext cx="1815625" cy="369332"/>
           </a:xfrm>
           <a:prstGeom prst="rect">
@@ -11033,10 +11030,10 @@
         </p:nvGrpSpPr>
         <p:grpSpPr>
           <a:xfrm>
-            <a:off x="5217864" y="4529457"/>
-            <a:ext cx="1749710" cy="646331"/>
+            <a:off x="5017612" y="4377878"/>
+            <a:ext cx="2290692" cy="923330"/>
             <a:chOff x="8176191" y="6138279"/>
-            <a:chExt cx="1749710" cy="646331"/>
+            <a:chExt cx="2290692" cy="923330"/>
           </a:xfrm>
         </p:grpSpPr>
         <p:sp>
@@ -11048,7 +11045,7 @@
           <p:spPr>
             <a:xfrm>
               <a:off x="8176191" y="6138279"/>
-              <a:ext cx="1749710" cy="646331"/>
+              <a:ext cx="2290692" cy="923330"/>
             </a:xfrm>
             <a:prstGeom prst="rect">
               <a:avLst/>
@@ -11086,24 +11083,32 @@
             <a:p>
               <a:r>
                 <a:rPr lang="de-DE" dirty="0" smtClean="0"/>
-                <a:t>quotation: string</a:t>
+                <a:t>quotation: </a:t>
               </a:r>
+              <a:r>
+                <a:rPr lang="de-DE" dirty="0" smtClean="0"/>
+                <a:t>string</a:t>
+              </a:r>
+            </a:p>
+            <a:p>
+              <a:r>
+                <a:rPr lang="de-DE" dirty="0" smtClean="0"/>
+                <a:t>attestationGloss:string</a:t>
+              </a:r>
+              <a:endParaRPr lang="de-DE" dirty="0" smtClean="0"/>
             </a:p>
           </p:txBody>
         </p:sp>
         <p:cxnSp>
           <p:nvCxnSpPr>
             <p:cNvPr id="80" name="Straight Connector 79"/>
-            <p:cNvCxnSpPr>
-              <a:stCxn id="79" idx="1"/>
-              <a:endCxn id="79" idx="3"/>
-            </p:cNvCxnSpPr>
+            <p:cNvCxnSpPr/>
             <p:nvPr/>
           </p:nvCxnSpPr>
           <p:spPr>
             <a:xfrm>
-              <a:off x="8176191" y="6461445"/>
-              <a:ext cx="1749710" cy="0"/>
+              <a:off x="8176191" y="6477982"/>
+              <a:ext cx="2290692" cy="0"/>
             </a:xfrm>
             <a:prstGeom prst="line">
               <a:avLst/>
@@ -11136,8 +11141,8 @@
         </p:nvCxnSpPr>
         <p:spPr>
           <a:xfrm>
-            <a:off x="1613451" y="4342272"/>
-            <a:ext cx="2382485" cy="1070829"/>
+            <a:off x="1613451" y="4168639"/>
+            <a:ext cx="2382485" cy="1307943"/>
           </a:xfrm>
           <a:prstGeom prst="bentConnector3">
             <a:avLst>
@@ -11175,8 +11180,8 @@
         </p:nvCxnSpPr>
         <p:spPr>
           <a:xfrm flipV="1">
-            <a:off x="4913238" y="5175788"/>
-            <a:ext cx="1179481" cy="237313"/>
+            <a:off x="4913238" y="5301208"/>
+            <a:ext cx="1249720" cy="175374"/>
           </a:xfrm>
           <a:prstGeom prst="bentConnector2">
             <a:avLst/>
@@ -11209,7 +11214,7 @@
         </p:nvSpPr>
         <p:spPr>
           <a:xfrm>
-            <a:off x="8028384" y="4525903"/>
+            <a:off x="8028384" y="4520486"/>
             <a:ext cx="721672" cy="646331"/>
           </a:xfrm>
           <a:prstGeom prst="rect">
@@ -11264,7 +11269,7 @@
         </p:nvSpPr>
         <p:spPr>
           <a:xfrm>
-            <a:off x="7092280" y="4479503"/>
+            <a:off x="7308304" y="4365104"/>
             <a:ext cx="668773" cy="369332"/>
           </a:xfrm>
           <a:prstGeom prst="rect">
@@ -11295,7 +11300,7 @@
         </p:nvSpPr>
         <p:spPr>
           <a:xfrm>
-            <a:off x="7452320" y="3779747"/>
+            <a:off x="7452320" y="3646764"/>
             <a:ext cx="987706" cy="646331"/>
           </a:xfrm>
           <a:prstGeom prst="rect">
@@ -11359,7 +11364,7 @@
         </p:nvCxnSpPr>
         <p:spPr>
           <a:xfrm flipH="1">
-            <a:off x="7452320" y="4102913"/>
+            <a:off x="7452320" y="3969930"/>
             <a:ext cx="987706" cy="0"/>
           </a:xfrm>
           <a:prstGeom prst="line">
@@ -11392,8 +11397,8 @@
         </p:nvCxnSpPr>
         <p:spPr>
           <a:xfrm>
-            <a:off x="6176918" y="3044860"/>
-            <a:ext cx="1769255" cy="734887"/>
+            <a:off x="6176918" y="2960002"/>
+            <a:ext cx="1769255" cy="686762"/>
           </a:xfrm>
           <a:prstGeom prst="bentConnector2">
             <a:avLst/>
@@ -11429,8 +11434,8 @@
         </p:nvCxnSpPr>
         <p:spPr>
           <a:xfrm>
-            <a:off x="4232702" y="792580"/>
-            <a:ext cx="3713471" cy="2987167"/>
+            <a:off x="4232702" y="707722"/>
+            <a:ext cx="3713471" cy="2939042"/>
           </a:xfrm>
           <a:prstGeom prst="bentConnector2">
             <a:avLst/>
@@ -11463,7 +11468,7 @@
         </p:nvSpPr>
         <p:spPr>
           <a:xfrm>
-            <a:off x="6636391" y="2699628"/>
+            <a:off x="6636391" y="2614770"/>
             <a:ext cx="815929" cy="369332"/>
           </a:xfrm>
           <a:prstGeom prst="rect">
@@ -11493,7 +11498,7 @@
         </p:nvSpPr>
         <p:spPr>
           <a:xfrm>
-            <a:off x="7140447" y="827420"/>
+            <a:off x="7140447" y="742562"/>
             <a:ext cx="815929" cy="369332"/>
           </a:xfrm>
           <a:prstGeom prst="rect">
@@ -12083,7 +12088,6 @@
           <p:cNvPr id="32" name="Elbow Connector 31"/>
           <p:cNvCxnSpPr>
             <a:stCxn id="23" idx="3"/>
-            <a:endCxn id="39" idx="1"/>
           </p:cNvCxnSpPr>
           <p:nvPr/>
         </p:nvCxnSpPr>
@@ -12121,14 +12125,13 @@
         <p:nvCxnSpPr>
           <p:cNvPr id="33" name="Elbow Connector 32"/>
           <p:cNvCxnSpPr>
-            <a:stCxn id="39" idx="3"/>
             <a:endCxn id="43" idx="1"/>
           </p:cNvCxnSpPr>
           <p:nvPr/>
         </p:nvCxnSpPr>
         <p:spPr>
           <a:xfrm>
-            <a:off x="5436096" y="3680158"/>
+            <a:off x="6010568" y="3680158"/>
             <a:ext cx="1224136" cy="1741"/>
           </a:xfrm>
           <a:prstGeom prst="bentConnector3">
@@ -12261,30 +12264,223 @@
           </a:p>
         </p:txBody>
       </p:sp>
+      <p:cxnSp>
+        <p:nvCxnSpPr>
+          <p:cNvPr id="40" name="Straight Connector 39"/>
+          <p:cNvCxnSpPr/>
+          <p:nvPr/>
+        </p:nvCxnSpPr>
+        <p:spPr>
+          <a:xfrm>
+            <a:off x="3686386" y="3680158"/>
+            <a:ext cx="1749710" cy="0"/>
+          </a:xfrm>
+          <a:prstGeom prst="line">
+            <a:avLst/>
+          </a:prstGeom>
+        </p:spPr>
+        <p:style>
+          <a:lnRef idx="1">
+            <a:schemeClr val="dk1"/>
+          </a:lnRef>
+          <a:fillRef idx="0">
+            <a:schemeClr val="dk1"/>
+          </a:fillRef>
+          <a:effectRef idx="0">
+            <a:schemeClr val="dk1"/>
+          </a:effectRef>
+          <a:fontRef idx="minor">
+            <a:schemeClr val="tx1"/>
+          </a:fontRef>
+        </p:style>
+      </p:cxnSp>
+      <p:cxnSp>
+        <p:nvCxnSpPr>
+          <p:cNvPr id="41" name="Elbow Connector 40"/>
+          <p:cNvCxnSpPr>
+            <a:stCxn id="23" idx="3"/>
+            <a:endCxn id="35" idx="1"/>
+          </p:cNvCxnSpPr>
+          <p:nvPr/>
+        </p:nvCxnSpPr>
+        <p:spPr>
+          <a:xfrm>
+            <a:off x="1613451" y="4342272"/>
+            <a:ext cx="2488001" cy="630254"/>
+          </a:xfrm>
+          <a:prstGeom prst="bentConnector3">
+            <a:avLst>
+              <a:gd name="adj1" fmla="val 27949"/>
+            </a:avLst>
+          </a:prstGeom>
+          <a:ln>
+            <a:headEnd type="none" w="med" len="med"/>
+            <a:tailEnd type="arrow" w="med" len="med"/>
+          </a:ln>
+        </p:spPr>
+        <p:style>
+          <a:lnRef idx="2">
+            <a:schemeClr val="dk1"/>
+          </a:lnRef>
+          <a:fillRef idx="0">
+            <a:schemeClr val="dk1"/>
+          </a:fillRef>
+          <a:effectRef idx="1">
+            <a:schemeClr val="dk1"/>
+          </a:effectRef>
+          <a:fontRef idx="minor">
+            <a:schemeClr val="tx1"/>
+          </a:fontRef>
+        </p:style>
+      </p:cxnSp>
+      <p:cxnSp>
+        <p:nvCxnSpPr>
+          <p:cNvPr id="42" name="Elbow Connector 41"/>
+          <p:cNvCxnSpPr>
+            <a:stCxn id="35" idx="0"/>
+          </p:cNvCxnSpPr>
+          <p:nvPr/>
+        </p:nvCxnSpPr>
+        <p:spPr>
+          <a:xfrm rot="5400000" flipH="1" flipV="1">
+            <a:off x="4168404" y="4395023"/>
+            <a:ext cx="784537" cy="1138"/>
+          </a:xfrm>
+          <a:prstGeom prst="bentConnector3">
+            <a:avLst>
+              <a:gd name="adj1" fmla="val 50000"/>
+            </a:avLst>
+          </a:prstGeom>
+          <a:ln>
+            <a:headEnd type="none" w="med" len="med"/>
+            <a:tailEnd type="arrow" w="med" len="med"/>
+          </a:ln>
+        </p:spPr>
+        <p:style>
+          <a:lnRef idx="2">
+            <a:schemeClr val="dk1"/>
+          </a:lnRef>
+          <a:fillRef idx="0">
+            <a:schemeClr val="dk1"/>
+          </a:fillRef>
+          <a:effectRef idx="1">
+            <a:schemeClr val="dk1"/>
+          </a:effectRef>
+          <a:fontRef idx="minor">
+            <a:schemeClr val="tx1"/>
+          </a:fontRef>
+        </p:style>
+      </p:cxnSp>
+      <p:sp>
+        <p:nvSpPr>
+          <p:cNvPr id="43" name="TextBox 42"/>
+          <p:cNvSpPr txBox="1"/>
+          <p:nvPr/>
+        </p:nvSpPr>
+        <p:spPr>
+          <a:xfrm>
+            <a:off x="7234704" y="3358733"/>
+            <a:ext cx="721672" cy="646331"/>
+          </a:xfrm>
+          <a:prstGeom prst="rect">
+            <a:avLst/>
+          </a:prstGeom>
+          <a:noFill/>
+          <a:ln>
+            <a:prstDash val="sysDot"/>
+          </a:ln>
+        </p:spPr>
+        <p:style>
+          <a:lnRef idx="2">
+            <a:schemeClr val="dk1"/>
+          </a:lnRef>
+          <a:fillRef idx="1">
+            <a:schemeClr val="lt1"/>
+          </a:fillRef>
+          <a:effectRef idx="0">
+            <a:schemeClr val="dk1"/>
+          </a:effectRef>
+          <a:fontRef idx="minor">
+            <a:schemeClr val="dk1"/>
+          </a:fontRef>
+        </p:style>
+        <p:txBody>
+          <a:bodyPr wrap="none" rtlCol="0">
+            <a:spAutoFit/>
+          </a:bodyPr>
+          <a:lstStyle/>
+          <a:p>
+            <a:pPr algn="ctr"/>
+            <a:r>
+              <a:rPr lang="de-DE" dirty="0" smtClean="0"/>
+              <a:t>locus </a:t>
+            </a:r>
+          </a:p>
+          <a:p>
+            <a:pPr algn="ctr"/>
+            <a:r>
+              <a:rPr lang="de-DE" dirty="0" smtClean="0"/>
+              <a:t>URI</a:t>
+            </a:r>
+            <a:endParaRPr lang="de-DE" dirty="0"/>
+          </a:p>
+        </p:txBody>
+      </p:sp>
+      <p:sp>
+        <p:nvSpPr>
+          <p:cNvPr id="44" name="TextBox 43"/>
+          <p:cNvSpPr txBox="1"/>
+          <p:nvPr/>
+        </p:nvSpPr>
+        <p:spPr>
+          <a:xfrm>
+            <a:off x="6298600" y="3312333"/>
+            <a:ext cx="668773" cy="369332"/>
+          </a:xfrm>
+          <a:prstGeom prst="rect">
+            <a:avLst/>
+          </a:prstGeom>
+          <a:noFill/>
+        </p:spPr>
+        <p:txBody>
+          <a:bodyPr wrap="none" rtlCol="0">
+            <a:spAutoFit/>
+          </a:bodyPr>
+          <a:lstStyle/>
+          <a:p>
+            <a:pPr algn="ctr"/>
+            <a:r>
+              <a:rPr lang="de-DE" i="1" dirty="0" smtClean="0"/>
+              <a:t>locus</a:t>
+            </a:r>
+            <a:endParaRPr lang="de-DE" i="1" dirty="0"/>
+          </a:p>
+        </p:txBody>
+      </p:sp>
       <p:grpSp>
         <p:nvGrpSpPr>
-          <p:cNvPr id="38" name="Group 37"/>
+          <p:cNvPr id="17" name="Group 16"/>
           <p:cNvGrpSpPr/>
           <p:nvPr/>
         </p:nvGrpSpPr>
         <p:grpSpPr>
           <a:xfrm>
-            <a:off x="3686386" y="3356992"/>
-            <a:ext cx="1749710" cy="646331"/>
-            <a:chOff x="8176191" y="6138279"/>
-            <a:chExt cx="1749710" cy="646331"/>
+            <a:off x="3707904" y="3081734"/>
+            <a:ext cx="2290692" cy="923330"/>
+            <a:chOff x="8176191" y="6000546"/>
+            <a:chExt cx="2290692" cy="923330"/>
           </a:xfrm>
         </p:grpSpPr>
         <p:sp>
           <p:nvSpPr>
-            <p:cNvPr id="39" name="TextBox 38"/>
+            <p:cNvPr id="18" name="TextBox 17"/>
             <p:cNvSpPr txBox="1"/>
             <p:nvPr/>
           </p:nvSpPr>
           <p:spPr>
             <a:xfrm>
-              <a:off x="8176191" y="6138279"/>
-              <a:ext cx="1749710" cy="646331"/>
+              <a:off x="8176191" y="6000546"/>
+              <a:ext cx="2290692" cy="923330"/>
             </a:xfrm>
             <a:prstGeom prst="rect">
               <a:avLst/>
@@ -12322,24 +12518,32 @@
             <a:p>
               <a:r>
                 <a:rPr lang="de-DE" dirty="0" smtClean="0"/>
-                <a:t>quotation: string</a:t>
+                <a:t>quotation: </a:t>
               </a:r>
+              <a:r>
+                <a:rPr lang="de-DE" dirty="0" smtClean="0"/>
+                <a:t>string</a:t>
+              </a:r>
+            </a:p>
+            <a:p>
+              <a:r>
+                <a:rPr lang="de-DE" dirty="0" smtClean="0"/>
+                <a:t>attestationGloss:string</a:t>
+              </a:r>
+              <a:endParaRPr lang="de-DE" dirty="0" smtClean="0"/>
             </a:p>
           </p:txBody>
         </p:sp>
         <p:cxnSp>
           <p:nvCxnSpPr>
-            <p:cNvPr id="40" name="Straight Connector 39"/>
-            <p:cNvCxnSpPr>
-              <a:stCxn id="39" idx="1"/>
-              <a:endCxn id="39" idx="3"/>
-            </p:cNvCxnSpPr>
+            <p:cNvPr id="19" name="Straight Connector 18"/>
+            <p:cNvCxnSpPr/>
             <p:nvPr/>
           </p:nvCxnSpPr>
           <p:spPr>
             <a:xfrm>
-              <a:off x="8176191" y="6461445"/>
-              <a:ext cx="1749710" cy="0"/>
+              <a:off x="8176191" y="6347812"/>
+              <a:ext cx="2290692" cy="0"/>
             </a:xfrm>
             <a:prstGeom prst="line">
               <a:avLst/>
@@ -12361,170 +12565,6 @@
           </p:style>
         </p:cxnSp>
       </p:grpSp>
-      <p:cxnSp>
-        <p:nvCxnSpPr>
-          <p:cNvPr id="41" name="Elbow Connector 40"/>
-          <p:cNvCxnSpPr>
-            <a:stCxn id="23" idx="3"/>
-            <a:endCxn id="35" idx="1"/>
-          </p:cNvCxnSpPr>
-          <p:nvPr/>
-        </p:nvCxnSpPr>
-        <p:spPr>
-          <a:xfrm>
-            <a:off x="1613451" y="4342272"/>
-            <a:ext cx="2488001" cy="630254"/>
-          </a:xfrm>
-          <a:prstGeom prst="bentConnector3">
-            <a:avLst>
-              <a:gd name="adj1" fmla="val 27949"/>
-            </a:avLst>
-          </a:prstGeom>
-          <a:ln>
-            <a:headEnd type="none" w="med" len="med"/>
-            <a:tailEnd type="arrow" w="med" len="med"/>
-          </a:ln>
-        </p:spPr>
-        <p:style>
-          <a:lnRef idx="2">
-            <a:schemeClr val="dk1"/>
-          </a:lnRef>
-          <a:fillRef idx="0">
-            <a:schemeClr val="dk1"/>
-          </a:fillRef>
-          <a:effectRef idx="1">
-            <a:schemeClr val="dk1"/>
-          </a:effectRef>
-          <a:fontRef idx="minor">
-            <a:schemeClr val="tx1"/>
-          </a:fontRef>
-        </p:style>
-      </p:cxnSp>
-      <p:cxnSp>
-        <p:nvCxnSpPr>
-          <p:cNvPr id="42" name="Elbow Connector 41"/>
-          <p:cNvCxnSpPr>
-            <a:stCxn id="35" idx="0"/>
-            <a:endCxn id="39" idx="2"/>
-          </p:cNvCxnSpPr>
-          <p:nvPr/>
-        </p:nvCxnSpPr>
-        <p:spPr>
-          <a:xfrm rot="5400000" flipH="1" flipV="1">
-            <a:off x="4168404" y="4395023"/>
-            <a:ext cx="784537" cy="1138"/>
-          </a:xfrm>
-          <a:prstGeom prst="bentConnector3">
-            <a:avLst>
-              <a:gd name="adj1" fmla="val 50000"/>
-            </a:avLst>
-          </a:prstGeom>
-          <a:ln>
-            <a:headEnd type="none" w="med" len="med"/>
-            <a:tailEnd type="arrow" w="med" len="med"/>
-          </a:ln>
-        </p:spPr>
-        <p:style>
-          <a:lnRef idx="2">
-            <a:schemeClr val="dk1"/>
-          </a:lnRef>
-          <a:fillRef idx="0">
-            <a:schemeClr val="dk1"/>
-          </a:fillRef>
-          <a:effectRef idx="1">
-            <a:schemeClr val="dk1"/>
-          </a:effectRef>
-          <a:fontRef idx="minor">
-            <a:schemeClr val="tx1"/>
-          </a:fontRef>
-        </p:style>
-      </p:cxnSp>
-      <p:sp>
-        <p:nvSpPr>
-          <p:cNvPr id="43" name="TextBox 42"/>
-          <p:cNvSpPr txBox="1"/>
-          <p:nvPr/>
-        </p:nvSpPr>
-        <p:spPr>
-          <a:xfrm>
-            <a:off x="6660232" y="3358733"/>
-            <a:ext cx="721672" cy="646331"/>
-          </a:xfrm>
-          <a:prstGeom prst="rect">
-            <a:avLst/>
-          </a:prstGeom>
-          <a:noFill/>
-          <a:ln>
-            <a:prstDash val="sysDot"/>
-          </a:ln>
-        </p:spPr>
-        <p:style>
-          <a:lnRef idx="2">
-            <a:schemeClr val="dk1"/>
-          </a:lnRef>
-          <a:fillRef idx="1">
-            <a:schemeClr val="lt1"/>
-          </a:fillRef>
-          <a:effectRef idx="0">
-            <a:schemeClr val="dk1"/>
-          </a:effectRef>
-          <a:fontRef idx="minor">
-            <a:schemeClr val="dk1"/>
-          </a:fontRef>
-        </p:style>
-        <p:txBody>
-          <a:bodyPr wrap="none" rtlCol="0">
-            <a:spAutoFit/>
-          </a:bodyPr>
-          <a:lstStyle/>
-          <a:p>
-            <a:pPr algn="ctr"/>
-            <a:r>
-              <a:rPr lang="de-DE" dirty="0" smtClean="0"/>
-              <a:t>locus </a:t>
-            </a:r>
-          </a:p>
-          <a:p>
-            <a:pPr algn="ctr"/>
-            <a:r>
-              <a:rPr lang="de-DE" dirty="0" smtClean="0"/>
-              <a:t>URI</a:t>
-            </a:r>
-            <a:endParaRPr lang="de-DE" dirty="0"/>
-          </a:p>
-        </p:txBody>
-      </p:sp>
-      <p:sp>
-        <p:nvSpPr>
-          <p:cNvPr id="44" name="TextBox 43"/>
-          <p:cNvSpPr txBox="1"/>
-          <p:nvPr/>
-        </p:nvSpPr>
-        <p:spPr>
-          <a:xfrm>
-            <a:off x="5724128" y="3312333"/>
-            <a:ext cx="668773" cy="369332"/>
-          </a:xfrm>
-          <a:prstGeom prst="rect">
-            <a:avLst/>
-          </a:prstGeom>
-          <a:noFill/>
-        </p:spPr>
-        <p:txBody>
-          <a:bodyPr wrap="none" rtlCol="0">
-            <a:spAutoFit/>
-          </a:bodyPr>
-          <a:lstStyle/>
-          <a:p>
-            <a:pPr algn="ctr"/>
-            <a:r>
-              <a:rPr lang="de-DE" i="1" dirty="0" smtClean="0"/>
-              <a:t>locus</a:t>
-            </a:r>
-            <a:endParaRPr lang="de-DE" i="1" dirty="0"/>
-          </a:p>
-        </p:txBody>
-      </p:sp>
     </p:spTree>
     <p:extLst>
       <p:ext uri="{BB962C8B-B14F-4D97-AF65-F5344CB8AC3E}">
@@ -14429,7 +14469,7 @@
         <p:spPr>
           <a:xfrm flipV="1">
             <a:off x="5782194" y="2332330"/>
-            <a:ext cx="950046" cy="1"/>
+            <a:ext cx="1402500" cy="1"/>
           </a:xfrm>
           <a:prstGeom prst="straightConnector1">
             <a:avLst/>
@@ -14461,7 +14501,7 @@
         </p:nvSpPr>
         <p:spPr>
           <a:xfrm>
-            <a:off x="5868144" y="1988840"/>
+            <a:off x="6320598" y="1988840"/>
             <a:ext cx="815929" cy="369332"/>
           </a:xfrm>
           <a:prstGeom prst="rect">
@@ -14558,7 +14598,7 @@
         <p:spPr>
           <a:xfrm>
             <a:off x="1613451" y="3326609"/>
-            <a:ext cx="2432975" cy="12700"/>
+            <a:ext cx="2432975" cy="766"/>
           </a:xfrm>
           <a:prstGeom prst="bentConnector3">
             <a:avLst>
@@ -14596,8 +14636,8 @@
         </p:nvCxnSpPr>
         <p:spPr>
           <a:xfrm flipV="1">
-            <a:off x="5796136" y="3323385"/>
-            <a:ext cx="996895" cy="3224"/>
+            <a:off x="6337118" y="3323385"/>
+            <a:ext cx="908367" cy="3990"/>
           </a:xfrm>
           <a:prstGeom prst="bentConnector3">
             <a:avLst>
@@ -14669,7 +14709,7 @@
         </p:nvSpPr>
         <p:spPr>
           <a:xfrm>
-            <a:off x="3995936" y="4202171"/>
+            <a:off x="3995936" y="4283804"/>
             <a:ext cx="917302" cy="369332"/>
           </a:xfrm>
           <a:prstGeom prst="rect">
@@ -14745,7 +14785,7 @@
         </p:nvSpPr>
         <p:spPr>
           <a:xfrm>
-            <a:off x="4572000" y="3738390"/>
+            <a:off x="4499992" y="3851756"/>
             <a:ext cx="1815625" cy="369332"/>
           </a:xfrm>
           <a:prstGeom prst="rect">
@@ -14774,10 +14814,10 @@
         </p:nvGrpSpPr>
         <p:grpSpPr>
           <a:xfrm>
-            <a:off x="4046426" y="3003443"/>
-            <a:ext cx="1749710" cy="646331"/>
-            <a:chOff x="8176191" y="6138279"/>
-            <a:chExt cx="1749710" cy="646331"/>
+            <a:off x="4046426" y="2865710"/>
+            <a:ext cx="2290692" cy="923330"/>
+            <a:chOff x="8176191" y="6000546"/>
+            <a:chExt cx="2290692" cy="923330"/>
           </a:xfrm>
         </p:grpSpPr>
         <p:sp>
@@ -14788,8 +14828,8 @@
           </p:nvSpPr>
           <p:spPr>
             <a:xfrm>
-              <a:off x="8176191" y="6138279"/>
-              <a:ext cx="1749710" cy="646331"/>
+              <a:off x="8176191" y="6000546"/>
+              <a:ext cx="2290692" cy="923330"/>
             </a:xfrm>
             <a:prstGeom prst="rect">
               <a:avLst/>
@@ -14827,24 +14867,32 @@
             <a:p>
               <a:r>
                 <a:rPr lang="de-DE" dirty="0" smtClean="0"/>
-                <a:t>quotation: string</a:t>
+                <a:t>quotation: </a:t>
               </a:r>
+              <a:r>
+                <a:rPr lang="de-DE" dirty="0" smtClean="0"/>
+                <a:t>string</a:t>
+              </a:r>
+            </a:p>
+            <a:p>
+              <a:r>
+                <a:rPr lang="de-DE" dirty="0" smtClean="0"/>
+                <a:t>attestationGloss:string</a:t>
+              </a:r>
+              <a:endParaRPr lang="de-DE" dirty="0" smtClean="0"/>
             </a:p>
           </p:txBody>
         </p:sp>
         <p:cxnSp>
           <p:nvCxnSpPr>
             <p:cNvPr id="80" name="Straight Connector 79"/>
-            <p:cNvCxnSpPr>
-              <a:stCxn id="79" idx="1"/>
-              <a:endCxn id="79" idx="3"/>
-            </p:cNvCxnSpPr>
+            <p:cNvCxnSpPr/>
             <p:nvPr/>
           </p:nvCxnSpPr>
           <p:spPr>
             <a:xfrm>
-              <a:off x="8176191" y="6461445"/>
-              <a:ext cx="1749710" cy="0"/>
+              <a:off x="8176191" y="6347812"/>
+              <a:ext cx="2290692" cy="0"/>
             </a:xfrm>
             <a:prstGeom prst="line">
               <a:avLst/>
@@ -14878,7 +14926,7 @@
         <p:spPr>
           <a:xfrm>
             <a:off x="1613451" y="3326609"/>
-            <a:ext cx="2382485" cy="1060228"/>
+            <a:ext cx="2382485" cy="1141861"/>
           </a:xfrm>
           <a:prstGeom prst="bentConnector3">
             <a:avLst>
@@ -14913,7 +14961,7 @@
         </p:nvSpPr>
         <p:spPr>
           <a:xfrm>
-            <a:off x="6793031" y="3000219"/>
+            <a:off x="7245485" y="3000219"/>
             <a:ext cx="721672" cy="646331"/>
           </a:xfrm>
           <a:prstGeom prst="rect">
@@ -14968,7 +15016,7 @@
         </p:nvSpPr>
         <p:spPr>
           <a:xfrm>
-            <a:off x="5963993" y="2953819"/>
+            <a:off x="6416447" y="2953819"/>
             <a:ext cx="668773" cy="369332"/>
           </a:xfrm>
           <a:prstGeom prst="rect">
@@ -14999,7 +15047,7 @@
         </p:nvSpPr>
         <p:spPr>
           <a:xfrm>
-            <a:off x="6732240" y="2009164"/>
+            <a:off x="7184694" y="2009164"/>
             <a:ext cx="987706" cy="646331"/>
           </a:xfrm>
           <a:prstGeom prst="rect">
@@ -15063,7 +15111,7 @@
         </p:nvCxnSpPr>
         <p:spPr>
           <a:xfrm flipH="1">
-            <a:off x="6732240" y="2332330"/>
+            <a:off x="7184694" y="2332330"/>
             <a:ext cx="987706" cy="0"/>
           </a:xfrm>
           <a:prstGeom prst="line">
@@ -15116,7 +15164,7 @@
         </p:nvCxnSpPr>
         <p:spPr>
           <a:xfrm rot="5400000" flipH="1" flipV="1">
-            <a:off x="4168454" y="3923056"/>
+            <a:off x="4168454" y="4004689"/>
             <a:ext cx="519062" cy="1"/>
           </a:xfrm>
           <a:prstGeom prst="bentConnector3">

</xml_diff>

<commit_message>
suggested subclasses of embedding
</commit_message>
<xml_diff>
--- a/img/source.pptx
+++ b/img/source.pptx
@@ -4,6 +4,9 @@
   <p:sldMasterIdLst>
     <p:sldMasterId id="2147483648" r:id="rId1"/>
   </p:sldMasterIdLst>
+  <p:notesMasterIdLst>
+    <p:notesMasterId r:id="rId20"/>
+  </p:notesMasterIdLst>
   <p:sldIdLst>
     <p:sldId id="257" r:id="rId2"/>
     <p:sldId id="276" r:id="rId3"/>
@@ -11,15 +14,18 @@
     <p:sldId id="277" r:id="rId5"/>
     <p:sldId id="260" r:id="rId6"/>
     <p:sldId id="263" r:id="rId7"/>
-    <p:sldId id="284" r:id="rId8"/>
-    <p:sldId id="279" r:id="rId9"/>
-    <p:sldId id="280" r:id="rId10"/>
-    <p:sldId id="278" r:id="rId11"/>
-    <p:sldId id="281" r:id="rId12"/>
-    <p:sldId id="271" r:id="rId13"/>
-    <p:sldId id="272" r:id="rId14"/>
-    <p:sldId id="274" r:id="rId15"/>
-    <p:sldId id="275" r:id="rId16"/>
+    <p:sldId id="285" r:id="rId8"/>
+    <p:sldId id="288" r:id="rId9"/>
+    <p:sldId id="279" r:id="rId10"/>
+    <p:sldId id="286" r:id="rId11"/>
+    <p:sldId id="284" r:id="rId12"/>
+    <p:sldId id="280" r:id="rId13"/>
+    <p:sldId id="278" r:id="rId14"/>
+    <p:sldId id="281" r:id="rId15"/>
+    <p:sldId id="271" r:id="rId16"/>
+    <p:sldId id="272" r:id="rId17"/>
+    <p:sldId id="274" r:id="rId18"/>
+    <p:sldId id="275" r:id="rId19"/>
   </p:sldIdLst>
   <p:sldSz cx="9144000" cy="6858000" type="screen4x3"/>
   <p:notesSz cx="6858000" cy="9144000"/>
@@ -131,14 +137,17 @@
             <p14:sldId id="263"/>
           </p14:sldIdLst>
         </p14:section>
-        <p14:section name="FrAC paper 2020" id="{270E5053-75A1-4EF5-92C8-81AD04809A9D}">
+        <p14:section name="Modelling area" id="{37157C53-D5E5-45A4-8A4C-1A6316989718}">
           <p14:sldIdLst>
-            <p14:sldId id="284"/>
+            <p14:sldId id="285"/>
+            <p14:sldId id="288"/>
           </p14:sldIdLst>
         </p14:section>
         <p14:section name="relics" id="{913878ED-508D-49E0-B327-18C94CF48E31}">
           <p14:sldIdLst>
             <p14:sldId id="279"/>
+            <p14:sldId id="286"/>
+            <p14:sldId id="284"/>
             <p14:sldId id="280"/>
             <p14:sldId id="278"/>
             <p14:sldId id="281"/>
@@ -152,6 +161,440 @@
     </p:ext>
   </p:extLst>
 </p:presentation>
+</file>
+
+<file path=ppt/notesMasters/notesMaster1.xml><?xml version="1.0" encoding="utf-8"?>
+<p:notesMaster xmlns:a="http://schemas.openxmlformats.org/drawingml/2006/main" xmlns:r="http://schemas.openxmlformats.org/officeDocument/2006/relationships" xmlns:p="http://schemas.openxmlformats.org/presentationml/2006/main">
+  <p:cSld>
+    <p:bg>
+      <p:bgRef idx="1001">
+        <a:schemeClr val="bg1"/>
+      </p:bgRef>
+    </p:bg>
+    <p:spTree>
+      <p:nvGrpSpPr>
+        <p:cNvPr id="1" name=""/>
+        <p:cNvGrpSpPr/>
+        <p:nvPr/>
+      </p:nvGrpSpPr>
+      <p:grpSpPr>
+        <a:xfrm>
+          <a:off x="0" y="0"/>
+          <a:ext cx="0" cy="0"/>
+          <a:chOff x="0" y="0"/>
+          <a:chExt cx="0" cy="0"/>
+        </a:xfrm>
+      </p:grpSpPr>
+      <p:sp>
+        <p:nvSpPr>
+          <p:cNvPr id="2" name="Header Placeholder 1"/>
+          <p:cNvSpPr>
+            <a:spLocks noGrp="1"/>
+          </p:cNvSpPr>
+          <p:nvPr>
+            <p:ph type="hdr" sz="quarter"/>
+          </p:nvPr>
+        </p:nvSpPr>
+        <p:spPr>
+          <a:xfrm>
+            <a:off x="0" y="0"/>
+            <a:ext cx="2971800" cy="457200"/>
+          </a:xfrm>
+          <a:prstGeom prst="rect">
+            <a:avLst/>
+          </a:prstGeom>
+        </p:spPr>
+        <p:txBody>
+          <a:bodyPr vert="horz" lIns="91440" tIns="45720" rIns="91440" bIns="45720" rtlCol="0"/>
+          <a:lstStyle>
+            <a:lvl1pPr algn="l">
+              <a:defRPr sz="1200"/>
+            </a:lvl1pPr>
+          </a:lstStyle>
+          <a:p>
+            <a:endParaRPr lang="de-DE"/>
+          </a:p>
+        </p:txBody>
+      </p:sp>
+      <p:sp>
+        <p:nvSpPr>
+          <p:cNvPr id="3" name="Date Placeholder 2"/>
+          <p:cNvSpPr>
+            <a:spLocks noGrp="1"/>
+          </p:cNvSpPr>
+          <p:nvPr>
+            <p:ph type="dt" idx="1"/>
+          </p:nvPr>
+        </p:nvSpPr>
+        <p:spPr>
+          <a:xfrm>
+            <a:off x="3884613" y="0"/>
+            <a:ext cx="2971800" cy="457200"/>
+          </a:xfrm>
+          <a:prstGeom prst="rect">
+            <a:avLst/>
+          </a:prstGeom>
+        </p:spPr>
+        <p:txBody>
+          <a:bodyPr vert="horz" lIns="91440" tIns="45720" rIns="91440" bIns="45720" rtlCol="0"/>
+          <a:lstStyle>
+            <a:lvl1pPr algn="r">
+              <a:defRPr sz="1200"/>
+            </a:lvl1pPr>
+          </a:lstStyle>
+          <a:p>
+            <a:fld id="{5A09DDC8-5590-434B-9C56-6F0CAB9C410A}" type="datetimeFigureOut">
+              <a:rPr lang="de-DE" smtClean="0"/>
+              <a:t>25.06.2020</a:t>
+            </a:fld>
+            <a:endParaRPr lang="de-DE"/>
+          </a:p>
+        </p:txBody>
+      </p:sp>
+      <p:sp>
+        <p:nvSpPr>
+          <p:cNvPr id="4" name="Slide Image Placeholder 3"/>
+          <p:cNvSpPr>
+            <a:spLocks noGrp="1" noRot="1" noChangeAspect="1"/>
+          </p:cNvSpPr>
+          <p:nvPr>
+            <p:ph type="sldImg" idx="2"/>
+          </p:nvPr>
+        </p:nvSpPr>
+        <p:spPr>
+          <a:xfrm>
+            <a:off x="1143000" y="685800"/>
+            <a:ext cx="4572000" cy="3429000"/>
+          </a:xfrm>
+          <a:prstGeom prst="rect">
+            <a:avLst/>
+          </a:prstGeom>
+          <a:noFill/>
+          <a:ln w="12700">
+            <a:solidFill>
+              <a:prstClr val="black"/>
+            </a:solidFill>
+          </a:ln>
+        </p:spPr>
+        <p:txBody>
+          <a:bodyPr vert="horz" lIns="91440" tIns="45720" rIns="91440" bIns="45720" rtlCol="0" anchor="ctr"/>
+          <a:lstStyle/>
+          <a:p>
+            <a:endParaRPr lang="de-DE"/>
+          </a:p>
+        </p:txBody>
+      </p:sp>
+      <p:sp>
+        <p:nvSpPr>
+          <p:cNvPr id="5" name="Notes Placeholder 4"/>
+          <p:cNvSpPr>
+            <a:spLocks noGrp="1"/>
+          </p:cNvSpPr>
+          <p:nvPr>
+            <p:ph type="body" sz="quarter" idx="3"/>
+          </p:nvPr>
+        </p:nvSpPr>
+        <p:spPr>
+          <a:xfrm>
+            <a:off x="685800" y="4343400"/>
+            <a:ext cx="5486400" cy="4114800"/>
+          </a:xfrm>
+          <a:prstGeom prst="rect">
+            <a:avLst/>
+          </a:prstGeom>
+        </p:spPr>
+        <p:txBody>
+          <a:bodyPr vert="horz" lIns="91440" tIns="45720" rIns="91440" bIns="45720" rtlCol="0"/>
+          <a:lstStyle/>
+          <a:p>
+            <a:pPr lvl="0"/>
+            <a:r>
+              <a:rPr lang="en-US" smtClean="0"/>
+              <a:t>Click to edit Master text styles</a:t>
+            </a:r>
+          </a:p>
+          <a:p>
+            <a:pPr lvl="1"/>
+            <a:r>
+              <a:rPr lang="en-US" smtClean="0"/>
+              <a:t>Second level</a:t>
+            </a:r>
+          </a:p>
+          <a:p>
+            <a:pPr lvl="2"/>
+            <a:r>
+              <a:rPr lang="en-US" smtClean="0"/>
+              <a:t>Third level</a:t>
+            </a:r>
+          </a:p>
+          <a:p>
+            <a:pPr lvl="3"/>
+            <a:r>
+              <a:rPr lang="en-US" smtClean="0"/>
+              <a:t>Fourth level</a:t>
+            </a:r>
+          </a:p>
+          <a:p>
+            <a:pPr lvl="4"/>
+            <a:r>
+              <a:rPr lang="en-US" smtClean="0"/>
+              <a:t>Fifth level</a:t>
+            </a:r>
+            <a:endParaRPr lang="de-DE"/>
+          </a:p>
+        </p:txBody>
+      </p:sp>
+      <p:sp>
+        <p:nvSpPr>
+          <p:cNvPr id="6" name="Footer Placeholder 5"/>
+          <p:cNvSpPr>
+            <a:spLocks noGrp="1"/>
+          </p:cNvSpPr>
+          <p:nvPr>
+            <p:ph type="ftr" sz="quarter" idx="4"/>
+          </p:nvPr>
+        </p:nvSpPr>
+        <p:spPr>
+          <a:xfrm>
+            <a:off x="0" y="8685213"/>
+            <a:ext cx="2971800" cy="457200"/>
+          </a:xfrm>
+          <a:prstGeom prst="rect">
+            <a:avLst/>
+          </a:prstGeom>
+        </p:spPr>
+        <p:txBody>
+          <a:bodyPr vert="horz" lIns="91440" tIns="45720" rIns="91440" bIns="45720" rtlCol="0" anchor="b"/>
+          <a:lstStyle>
+            <a:lvl1pPr algn="l">
+              <a:defRPr sz="1200"/>
+            </a:lvl1pPr>
+          </a:lstStyle>
+          <a:p>
+            <a:endParaRPr lang="de-DE"/>
+          </a:p>
+        </p:txBody>
+      </p:sp>
+      <p:sp>
+        <p:nvSpPr>
+          <p:cNvPr id="7" name="Slide Number Placeholder 6"/>
+          <p:cNvSpPr>
+            <a:spLocks noGrp="1"/>
+          </p:cNvSpPr>
+          <p:nvPr>
+            <p:ph type="sldNum" sz="quarter" idx="5"/>
+          </p:nvPr>
+        </p:nvSpPr>
+        <p:spPr>
+          <a:xfrm>
+            <a:off x="3884613" y="8685213"/>
+            <a:ext cx="2971800" cy="457200"/>
+          </a:xfrm>
+          <a:prstGeom prst="rect">
+            <a:avLst/>
+          </a:prstGeom>
+        </p:spPr>
+        <p:txBody>
+          <a:bodyPr vert="horz" lIns="91440" tIns="45720" rIns="91440" bIns="45720" rtlCol="0" anchor="b"/>
+          <a:lstStyle>
+            <a:lvl1pPr algn="r">
+              <a:defRPr sz="1200"/>
+            </a:lvl1pPr>
+          </a:lstStyle>
+          <a:p>
+            <a:fld id="{49C92D87-3411-4B6F-A0B9-C415849E2B85}" type="slidenum">
+              <a:rPr lang="de-DE" smtClean="0"/>
+              <a:t>‹#›</a:t>
+            </a:fld>
+            <a:endParaRPr lang="de-DE"/>
+          </a:p>
+        </p:txBody>
+      </p:sp>
+    </p:spTree>
+    <p:extLst>
+      <p:ext uri="{BB962C8B-B14F-4D97-AF65-F5344CB8AC3E}">
+        <p14:creationId xmlns:p14="http://schemas.microsoft.com/office/powerpoint/2010/main" val="1655568315"/>
+      </p:ext>
+    </p:extLst>
+  </p:cSld>
+  <p:clrMap bg1="lt1" tx1="dk1" bg2="lt2" tx2="dk2" accent1="accent1" accent2="accent2" accent3="accent3" accent4="accent4" accent5="accent5" accent6="accent6" hlink="hlink" folHlink="folHlink"/>
+  <p:notesStyle>
+    <a:lvl1pPr marL="0" algn="l" defTabSz="914400" rtl="0" eaLnBrk="1" latinLnBrk="0" hangingPunct="1">
+      <a:defRPr sz="1200" kern="1200">
+        <a:solidFill>
+          <a:schemeClr val="tx1"/>
+        </a:solidFill>
+        <a:latin typeface="+mn-lt"/>
+        <a:ea typeface="+mn-ea"/>
+        <a:cs typeface="+mn-cs"/>
+      </a:defRPr>
+    </a:lvl1pPr>
+    <a:lvl2pPr marL="457200" algn="l" defTabSz="914400" rtl="0" eaLnBrk="1" latinLnBrk="0" hangingPunct="1">
+      <a:defRPr sz="1200" kern="1200">
+        <a:solidFill>
+          <a:schemeClr val="tx1"/>
+        </a:solidFill>
+        <a:latin typeface="+mn-lt"/>
+        <a:ea typeface="+mn-ea"/>
+        <a:cs typeface="+mn-cs"/>
+      </a:defRPr>
+    </a:lvl2pPr>
+    <a:lvl3pPr marL="914400" algn="l" defTabSz="914400" rtl="0" eaLnBrk="1" latinLnBrk="0" hangingPunct="1">
+      <a:defRPr sz="1200" kern="1200">
+        <a:solidFill>
+          <a:schemeClr val="tx1"/>
+        </a:solidFill>
+        <a:latin typeface="+mn-lt"/>
+        <a:ea typeface="+mn-ea"/>
+        <a:cs typeface="+mn-cs"/>
+      </a:defRPr>
+    </a:lvl3pPr>
+    <a:lvl4pPr marL="1371600" algn="l" defTabSz="914400" rtl="0" eaLnBrk="1" latinLnBrk="0" hangingPunct="1">
+      <a:defRPr sz="1200" kern="1200">
+        <a:solidFill>
+          <a:schemeClr val="tx1"/>
+        </a:solidFill>
+        <a:latin typeface="+mn-lt"/>
+        <a:ea typeface="+mn-ea"/>
+        <a:cs typeface="+mn-cs"/>
+      </a:defRPr>
+    </a:lvl4pPr>
+    <a:lvl5pPr marL="1828800" algn="l" defTabSz="914400" rtl="0" eaLnBrk="1" latinLnBrk="0" hangingPunct="1">
+      <a:defRPr sz="1200" kern="1200">
+        <a:solidFill>
+          <a:schemeClr val="tx1"/>
+        </a:solidFill>
+        <a:latin typeface="+mn-lt"/>
+        <a:ea typeface="+mn-ea"/>
+        <a:cs typeface="+mn-cs"/>
+      </a:defRPr>
+    </a:lvl5pPr>
+    <a:lvl6pPr marL="2286000" algn="l" defTabSz="914400" rtl="0" eaLnBrk="1" latinLnBrk="0" hangingPunct="1">
+      <a:defRPr sz="1200" kern="1200">
+        <a:solidFill>
+          <a:schemeClr val="tx1"/>
+        </a:solidFill>
+        <a:latin typeface="+mn-lt"/>
+        <a:ea typeface="+mn-ea"/>
+        <a:cs typeface="+mn-cs"/>
+      </a:defRPr>
+    </a:lvl6pPr>
+    <a:lvl7pPr marL="2743200" algn="l" defTabSz="914400" rtl="0" eaLnBrk="1" latinLnBrk="0" hangingPunct="1">
+      <a:defRPr sz="1200" kern="1200">
+        <a:solidFill>
+          <a:schemeClr val="tx1"/>
+        </a:solidFill>
+        <a:latin typeface="+mn-lt"/>
+        <a:ea typeface="+mn-ea"/>
+        <a:cs typeface="+mn-cs"/>
+      </a:defRPr>
+    </a:lvl7pPr>
+    <a:lvl8pPr marL="3200400" algn="l" defTabSz="914400" rtl="0" eaLnBrk="1" latinLnBrk="0" hangingPunct="1">
+      <a:defRPr sz="1200" kern="1200">
+        <a:solidFill>
+          <a:schemeClr val="tx1"/>
+        </a:solidFill>
+        <a:latin typeface="+mn-lt"/>
+        <a:ea typeface="+mn-ea"/>
+        <a:cs typeface="+mn-cs"/>
+      </a:defRPr>
+    </a:lvl8pPr>
+    <a:lvl9pPr marL="3657600" algn="l" defTabSz="914400" rtl="0" eaLnBrk="1" latinLnBrk="0" hangingPunct="1">
+      <a:defRPr sz="1200" kern="1200">
+        <a:solidFill>
+          <a:schemeClr val="tx1"/>
+        </a:solidFill>
+        <a:latin typeface="+mn-lt"/>
+        <a:ea typeface="+mn-ea"/>
+        <a:cs typeface="+mn-cs"/>
+      </a:defRPr>
+    </a:lvl9pPr>
+  </p:notesStyle>
+</p:notesMaster>
+</file>
+
+<file path=ppt/notesSlides/notesSlide1.xml><?xml version="1.0" encoding="utf-8"?>
+<p:notes xmlns:a="http://schemas.openxmlformats.org/drawingml/2006/main" xmlns:r="http://schemas.openxmlformats.org/officeDocument/2006/relationships" xmlns:p="http://schemas.openxmlformats.org/presentationml/2006/main">
+  <p:cSld>
+    <p:spTree>
+      <p:nvGrpSpPr>
+        <p:cNvPr id="1" name=""/>
+        <p:cNvGrpSpPr/>
+        <p:nvPr/>
+      </p:nvGrpSpPr>
+      <p:grpSpPr>
+        <a:xfrm>
+          <a:off x="0" y="0"/>
+          <a:ext cx="0" cy="0"/>
+          <a:chOff x="0" y="0"/>
+          <a:chExt cx="0" cy="0"/>
+        </a:xfrm>
+      </p:grpSpPr>
+      <p:sp>
+        <p:nvSpPr>
+          <p:cNvPr id="2" name="Slide Image Placeholder 1"/>
+          <p:cNvSpPr>
+            <a:spLocks noGrp="1" noRot="1" noChangeAspect="1"/>
+          </p:cNvSpPr>
+          <p:nvPr>
+            <p:ph type="sldImg"/>
+          </p:nvPr>
+        </p:nvSpPr>
+        <p:spPr/>
+      </p:sp>
+      <p:sp>
+        <p:nvSpPr>
+          <p:cNvPr id="3" name="Notes Placeholder 2"/>
+          <p:cNvSpPr>
+            <a:spLocks noGrp="1"/>
+          </p:cNvSpPr>
+          <p:nvPr>
+            <p:ph type="body" idx="1"/>
+          </p:nvPr>
+        </p:nvSpPr>
+        <p:spPr/>
+        <p:txBody>
+          <a:bodyPr/>
+          <a:lstStyle/>
+          <a:p>
+            <a:endParaRPr lang="de-DE" dirty="0"/>
+          </a:p>
+        </p:txBody>
+      </p:sp>
+      <p:sp>
+        <p:nvSpPr>
+          <p:cNvPr id="4" name="Slide Number Placeholder 3"/>
+          <p:cNvSpPr>
+            <a:spLocks noGrp="1"/>
+          </p:cNvSpPr>
+          <p:nvPr>
+            <p:ph type="sldNum" sz="quarter" idx="10"/>
+          </p:nvPr>
+        </p:nvSpPr>
+        <p:spPr/>
+        <p:txBody>
+          <a:bodyPr/>
+          <a:lstStyle/>
+          <a:p>
+            <a:fld id="{49C92D87-3411-4B6F-A0B9-C415849E2B85}" type="slidenum">
+              <a:rPr lang="de-DE" smtClean="0"/>
+              <a:t>2</a:t>
+            </a:fld>
+            <a:endParaRPr lang="de-DE"/>
+          </a:p>
+        </p:txBody>
+      </p:sp>
+    </p:spTree>
+    <p:extLst>
+      <p:ext uri="{BB962C8B-B14F-4D97-AF65-F5344CB8AC3E}">
+        <p14:creationId xmlns:p14="http://schemas.microsoft.com/office/powerpoint/2010/main" val="1441346684"/>
+      </p:ext>
+    </p:extLst>
+  </p:cSld>
+  <p:clrMapOvr>
+    <a:masterClrMapping/>
+  </p:clrMapOvr>
+</p:notes>
 </file>
 
 <file path=ppt/slideLayouts/slideLayout1.xml><?xml version="1.0" encoding="utf-8"?>
@@ -335,7 +778,7 @@
           <a:p>
             <a:fld id="{CC555D53-45D0-4CF5-A018-A4852F53D1B1}" type="datetimeFigureOut">
               <a:rPr lang="de-DE" smtClean="0"/>
-              <a:t>27.02.2020</a:t>
+              <a:t>25.06.2020</a:t>
             </a:fld>
             <a:endParaRPr lang="de-DE"/>
           </a:p>
@@ -505,7 +948,7 @@
           <a:p>
             <a:fld id="{CC555D53-45D0-4CF5-A018-A4852F53D1B1}" type="datetimeFigureOut">
               <a:rPr lang="de-DE" smtClean="0"/>
-              <a:t>27.02.2020</a:t>
+              <a:t>25.06.2020</a:t>
             </a:fld>
             <a:endParaRPr lang="de-DE"/>
           </a:p>
@@ -685,7 +1128,7 @@
           <a:p>
             <a:fld id="{CC555D53-45D0-4CF5-A018-A4852F53D1B1}" type="datetimeFigureOut">
               <a:rPr lang="de-DE" smtClean="0"/>
-              <a:t>27.02.2020</a:t>
+              <a:t>25.06.2020</a:t>
             </a:fld>
             <a:endParaRPr lang="de-DE"/>
           </a:p>
@@ -855,7 +1298,7 @@
           <a:p>
             <a:fld id="{CC555D53-45D0-4CF5-A018-A4852F53D1B1}" type="datetimeFigureOut">
               <a:rPr lang="de-DE" smtClean="0"/>
-              <a:t>27.02.2020</a:t>
+              <a:t>25.06.2020</a:t>
             </a:fld>
             <a:endParaRPr lang="de-DE"/>
           </a:p>
@@ -1101,7 +1544,7 @@
           <a:p>
             <a:fld id="{CC555D53-45D0-4CF5-A018-A4852F53D1B1}" type="datetimeFigureOut">
               <a:rPr lang="de-DE" smtClean="0"/>
-              <a:t>27.02.2020</a:t>
+              <a:t>25.06.2020</a:t>
             </a:fld>
             <a:endParaRPr lang="de-DE"/>
           </a:p>
@@ -1389,7 +1832,7 @@
           <a:p>
             <a:fld id="{CC555D53-45D0-4CF5-A018-A4852F53D1B1}" type="datetimeFigureOut">
               <a:rPr lang="de-DE" smtClean="0"/>
-              <a:t>27.02.2020</a:t>
+              <a:t>25.06.2020</a:t>
             </a:fld>
             <a:endParaRPr lang="de-DE"/>
           </a:p>
@@ -1811,7 +2254,7 @@
           <a:p>
             <a:fld id="{CC555D53-45D0-4CF5-A018-A4852F53D1B1}" type="datetimeFigureOut">
               <a:rPr lang="de-DE" smtClean="0"/>
-              <a:t>27.02.2020</a:t>
+              <a:t>25.06.2020</a:t>
             </a:fld>
             <a:endParaRPr lang="de-DE"/>
           </a:p>
@@ -1929,7 +2372,7 @@
           <a:p>
             <a:fld id="{CC555D53-45D0-4CF5-A018-A4852F53D1B1}" type="datetimeFigureOut">
               <a:rPr lang="de-DE" smtClean="0"/>
-              <a:t>27.02.2020</a:t>
+              <a:t>25.06.2020</a:t>
             </a:fld>
             <a:endParaRPr lang="de-DE"/>
           </a:p>
@@ -2024,7 +2467,7 @@
           <a:p>
             <a:fld id="{CC555D53-45D0-4CF5-A018-A4852F53D1B1}" type="datetimeFigureOut">
               <a:rPr lang="de-DE" smtClean="0"/>
-              <a:t>27.02.2020</a:t>
+              <a:t>25.06.2020</a:t>
             </a:fld>
             <a:endParaRPr lang="de-DE"/>
           </a:p>
@@ -2301,7 +2744,7 @@
           <a:p>
             <a:fld id="{CC555D53-45D0-4CF5-A018-A4852F53D1B1}" type="datetimeFigureOut">
               <a:rPr lang="de-DE" smtClean="0"/>
-              <a:t>27.02.2020</a:t>
+              <a:t>25.06.2020</a:t>
             </a:fld>
             <a:endParaRPr lang="de-DE"/>
           </a:p>
@@ -2554,7 +2997,7 @@
           <a:p>
             <a:fld id="{CC555D53-45D0-4CF5-A018-A4852F53D1B1}" type="datetimeFigureOut">
               <a:rPr lang="de-DE" smtClean="0"/>
-              <a:t>27.02.2020</a:t>
+              <a:t>25.06.2020</a:t>
             </a:fld>
             <a:endParaRPr lang="de-DE"/>
           </a:p>
@@ -2767,7 +3210,7 @@
           <a:p>
             <a:fld id="{CC555D53-45D0-4CF5-A018-A4852F53D1B1}" type="datetimeFigureOut">
               <a:rPr lang="de-DE" smtClean="0"/>
-              <a:t>27.02.2020</a:t>
+              <a:t>25.06.2020</a:t>
             </a:fld>
             <a:endParaRPr lang="de-DE"/>
           </a:p>
@@ -3661,6 +4104,1234 @@
       </p:grpSpPr>
       <p:sp>
         <p:nvSpPr>
+          <p:cNvPr id="4" name="Title 3"/>
+          <p:cNvSpPr>
+            <a:spLocks noGrp="1"/>
+          </p:cNvSpPr>
+          <p:nvPr>
+            <p:ph type="ctrTitle"/>
+          </p:nvPr>
+        </p:nvSpPr>
+        <p:spPr/>
+        <p:txBody>
+          <a:bodyPr/>
+          <a:lstStyle/>
+          <a:p>
+            <a:r>
+              <a:rPr lang="de-DE" dirty="0" smtClean="0"/>
+              <a:t>first published version</a:t>
+            </a:r>
+            <a:endParaRPr lang="de-DE" dirty="0"/>
+          </a:p>
+        </p:txBody>
+      </p:sp>
+      <p:sp>
+        <p:nvSpPr>
+          <p:cNvPr id="5" name="Subtitle 4"/>
+          <p:cNvSpPr>
+            <a:spLocks noGrp="1"/>
+          </p:cNvSpPr>
+          <p:nvPr>
+            <p:ph type="subTitle" idx="1"/>
+          </p:nvPr>
+        </p:nvSpPr>
+        <p:spPr/>
+        <p:txBody>
+          <a:bodyPr/>
+          <a:lstStyle/>
+          <a:p>
+            <a:r>
+              <a:rPr lang="de-DE" dirty="0" smtClean="0"/>
+              <a:t>Chiarcos et al. 2020@GlobaLex</a:t>
+            </a:r>
+          </a:p>
+          <a:p>
+            <a:r>
+              <a:rPr lang="de-DE" dirty="0" smtClean="0"/>
+              <a:t>(embeddings, collocations and similarity omitted)</a:t>
+            </a:r>
+            <a:endParaRPr lang="de-DE" dirty="0"/>
+          </a:p>
+        </p:txBody>
+      </p:sp>
+    </p:spTree>
+    <p:extLst>
+      <p:ext uri="{BB962C8B-B14F-4D97-AF65-F5344CB8AC3E}">
+        <p14:creationId xmlns:p14="http://schemas.microsoft.com/office/powerpoint/2010/main" val="1891922336"/>
+      </p:ext>
+    </p:extLst>
+  </p:cSld>
+  <p:clrMapOvr>
+    <a:masterClrMapping/>
+  </p:clrMapOvr>
+</p:sld>
+</file>
+
+<file path=ppt/slides/slide11.xml><?xml version="1.0" encoding="utf-8"?>
+<p:sld xmlns:a="http://schemas.openxmlformats.org/drawingml/2006/main" xmlns:r="http://schemas.openxmlformats.org/officeDocument/2006/relationships" xmlns:p="http://schemas.openxmlformats.org/presentationml/2006/main">
+  <p:cSld>
+    <p:spTree>
+      <p:nvGrpSpPr>
+        <p:cNvPr id="1" name=""/>
+        <p:cNvGrpSpPr/>
+        <p:nvPr/>
+      </p:nvGrpSpPr>
+      <p:grpSpPr>
+        <a:xfrm>
+          <a:off x="0" y="0"/>
+          <a:ext cx="0" cy="0"/>
+          <a:chOff x="0" y="0"/>
+          <a:chExt cx="0" cy="0"/>
+        </a:xfrm>
+      </p:grpSpPr>
+      <p:sp>
+        <p:nvSpPr>
+          <p:cNvPr id="4" name="TextBox 3"/>
+          <p:cNvSpPr txBox="1"/>
+          <p:nvPr/>
+        </p:nvSpPr>
+        <p:spPr>
+          <a:xfrm>
+            <a:off x="376253" y="4005064"/>
+            <a:ext cx="1237198" cy="369332"/>
+          </a:xfrm>
+          <a:prstGeom prst="rect">
+            <a:avLst/>
+          </a:prstGeom>
+          <a:solidFill>
+            <a:schemeClr val="bg2"/>
+          </a:solidFill>
+          <a:ln>
+            <a:prstDash val="solid"/>
+          </a:ln>
+        </p:spPr>
+        <p:style>
+          <a:lnRef idx="2">
+            <a:schemeClr val="dk1"/>
+          </a:lnRef>
+          <a:fillRef idx="1">
+            <a:schemeClr val="lt1"/>
+          </a:fillRef>
+          <a:effectRef idx="0">
+            <a:schemeClr val="dk1"/>
+          </a:effectRef>
+          <a:fontRef idx="minor">
+            <a:schemeClr val="dk1"/>
+          </a:fontRef>
+        </p:style>
+        <p:txBody>
+          <a:bodyPr wrap="none" rtlCol="0">
+            <a:spAutoFit/>
+          </a:bodyPr>
+          <a:lstStyle/>
+          <a:p>
+            <a:pPr algn="ctr"/>
+            <a:r>
+              <a:rPr lang="de-DE" i="1" dirty="0" smtClean="0"/>
+              <a:t>Observable</a:t>
+            </a:r>
+            <a:endParaRPr lang="de-DE" i="1" dirty="0"/>
+          </a:p>
+        </p:txBody>
+      </p:sp>
+      <p:sp>
+        <p:nvSpPr>
+          <p:cNvPr id="5" name="TextBox 4"/>
+          <p:cNvSpPr txBox="1"/>
+          <p:nvPr/>
+        </p:nvSpPr>
+        <p:spPr>
+          <a:xfrm>
+            <a:off x="1368253" y="5507940"/>
+            <a:ext cx="1438471" cy="369332"/>
+          </a:xfrm>
+          <a:prstGeom prst="rect">
+            <a:avLst/>
+          </a:prstGeom>
+          <a:ln/>
+        </p:spPr>
+        <p:style>
+          <a:lnRef idx="2">
+            <a:schemeClr val="dk1"/>
+          </a:lnRef>
+          <a:fillRef idx="1">
+            <a:schemeClr val="lt1"/>
+          </a:fillRef>
+          <a:effectRef idx="0">
+            <a:schemeClr val="dk1"/>
+          </a:effectRef>
+          <a:fontRef idx="minor">
+            <a:schemeClr val="dk1"/>
+          </a:fontRef>
+        </p:style>
+        <p:txBody>
+          <a:bodyPr wrap="none" rtlCol="0">
+            <a:spAutoFit/>
+          </a:bodyPr>
+          <a:lstStyle/>
+          <a:p>
+            <a:r>
+              <a:rPr lang="de-DE" dirty="0" smtClean="0"/>
+              <a:t>ontolex:Form</a:t>
+            </a:r>
+            <a:endParaRPr lang="de-DE" dirty="0"/>
+          </a:p>
+        </p:txBody>
+      </p:sp>
+      <p:sp>
+        <p:nvSpPr>
+          <p:cNvPr id="6" name="TextBox 5"/>
+          <p:cNvSpPr txBox="1"/>
+          <p:nvPr/>
+        </p:nvSpPr>
+        <p:spPr>
+          <a:xfrm>
+            <a:off x="3923928" y="5210616"/>
+            <a:ext cx="2119106" cy="369332"/>
+          </a:xfrm>
+          <a:prstGeom prst="rect">
+            <a:avLst/>
+          </a:prstGeom>
+          <a:ln/>
+        </p:spPr>
+        <p:style>
+          <a:lnRef idx="2">
+            <a:schemeClr val="dk1"/>
+          </a:lnRef>
+          <a:fillRef idx="1">
+            <a:schemeClr val="lt1"/>
+          </a:fillRef>
+          <a:effectRef idx="0">
+            <a:schemeClr val="dk1"/>
+          </a:effectRef>
+          <a:fontRef idx="minor">
+            <a:schemeClr val="dk1"/>
+          </a:fontRef>
+        </p:style>
+        <p:txBody>
+          <a:bodyPr wrap="none" rtlCol="0">
+            <a:spAutoFit/>
+          </a:bodyPr>
+          <a:lstStyle/>
+          <a:p>
+            <a:r>
+              <a:rPr lang="de-DE" dirty="0" smtClean="0"/>
+              <a:t>ontolex:LexicalSense</a:t>
+            </a:r>
+            <a:endParaRPr lang="de-DE" dirty="0"/>
+          </a:p>
+        </p:txBody>
+      </p:sp>
+      <p:sp>
+        <p:nvSpPr>
+          <p:cNvPr id="7" name="TextBox 6"/>
+          <p:cNvSpPr txBox="1"/>
+          <p:nvPr/>
+        </p:nvSpPr>
+        <p:spPr>
+          <a:xfrm>
+            <a:off x="1331640" y="4898035"/>
+            <a:ext cx="2348913" cy="369332"/>
+          </a:xfrm>
+          <a:prstGeom prst="rect">
+            <a:avLst/>
+          </a:prstGeom>
+          <a:ln/>
+        </p:spPr>
+        <p:style>
+          <a:lnRef idx="2">
+            <a:schemeClr val="dk1"/>
+          </a:lnRef>
+          <a:fillRef idx="1">
+            <a:schemeClr val="lt1"/>
+          </a:fillRef>
+          <a:effectRef idx="0">
+            <a:schemeClr val="dk1"/>
+          </a:effectRef>
+          <a:fontRef idx="minor">
+            <a:schemeClr val="dk1"/>
+          </a:fontRef>
+        </p:style>
+        <p:txBody>
+          <a:bodyPr wrap="none" rtlCol="0">
+            <a:spAutoFit/>
+          </a:bodyPr>
+          <a:lstStyle/>
+          <a:p>
+            <a:r>
+              <a:rPr lang="de-DE" dirty="0" smtClean="0"/>
+              <a:t>ontolex:LexicalConcept</a:t>
+            </a:r>
+            <a:endParaRPr lang="de-DE" dirty="0"/>
+          </a:p>
+        </p:txBody>
+      </p:sp>
+      <p:sp>
+        <p:nvSpPr>
+          <p:cNvPr id="8" name="TextBox 7"/>
+          <p:cNvSpPr txBox="1"/>
+          <p:nvPr/>
+        </p:nvSpPr>
+        <p:spPr>
+          <a:xfrm>
+            <a:off x="3874907" y="4581128"/>
+            <a:ext cx="2065245" cy="369332"/>
+          </a:xfrm>
+          <a:prstGeom prst="rect">
+            <a:avLst/>
+          </a:prstGeom>
+          <a:ln/>
+        </p:spPr>
+        <p:style>
+          <a:lnRef idx="2">
+            <a:schemeClr val="dk1"/>
+          </a:lnRef>
+          <a:fillRef idx="1">
+            <a:schemeClr val="lt1"/>
+          </a:fillRef>
+          <a:effectRef idx="0">
+            <a:schemeClr val="dk1"/>
+          </a:effectRef>
+          <a:fontRef idx="minor">
+            <a:schemeClr val="dk1"/>
+          </a:fontRef>
+        </p:style>
+        <p:txBody>
+          <a:bodyPr wrap="none" rtlCol="0">
+            <a:spAutoFit/>
+          </a:bodyPr>
+          <a:lstStyle/>
+          <a:p>
+            <a:r>
+              <a:rPr lang="de-DE" dirty="0" smtClean="0"/>
+              <a:t>ontolex:LexicalEntry</a:t>
+            </a:r>
+            <a:endParaRPr lang="de-DE" dirty="0"/>
+          </a:p>
+        </p:txBody>
+      </p:sp>
+      <p:sp>
+        <p:nvSpPr>
+          <p:cNvPr id="9" name="Isosceles Triangle 8"/>
+          <p:cNvSpPr/>
+          <p:nvPr/>
+        </p:nvSpPr>
+        <p:spPr>
+          <a:xfrm>
+            <a:off x="899592" y="4398969"/>
+            <a:ext cx="216024" cy="216024"/>
+          </a:xfrm>
+          <a:prstGeom prst="triangle">
+            <a:avLst/>
+          </a:prstGeom>
+        </p:spPr>
+        <p:style>
+          <a:lnRef idx="2">
+            <a:schemeClr val="dk1"/>
+          </a:lnRef>
+          <a:fillRef idx="1">
+            <a:schemeClr val="lt1"/>
+          </a:fillRef>
+          <a:effectRef idx="0">
+            <a:schemeClr val="dk1"/>
+          </a:effectRef>
+          <a:fontRef idx="minor">
+            <a:schemeClr val="dk1"/>
+          </a:fontRef>
+        </p:style>
+        <p:txBody>
+          <a:bodyPr rtlCol="0" anchor="ctr"/>
+          <a:lstStyle/>
+          <a:p>
+            <a:pPr algn="ctr"/>
+            <a:endParaRPr lang="de-DE"/>
+          </a:p>
+        </p:txBody>
+      </p:sp>
+      <p:cxnSp>
+        <p:nvCxnSpPr>
+          <p:cNvPr id="10" name="Elbow Connector 9"/>
+          <p:cNvCxnSpPr>
+            <a:stCxn id="9" idx="3"/>
+            <a:endCxn id="5" idx="1"/>
+          </p:cNvCxnSpPr>
+          <p:nvPr/>
+        </p:nvCxnSpPr>
+        <p:spPr>
+          <a:xfrm rot="16200000" flipH="1">
+            <a:off x="649122" y="4973474"/>
+            <a:ext cx="1077613" cy="360649"/>
+          </a:xfrm>
+          <a:prstGeom prst="bentConnector2">
+            <a:avLst/>
+          </a:prstGeom>
+        </p:spPr>
+        <p:style>
+          <a:lnRef idx="2">
+            <a:schemeClr val="dk1"/>
+          </a:lnRef>
+          <a:fillRef idx="0">
+            <a:schemeClr val="dk1"/>
+          </a:fillRef>
+          <a:effectRef idx="1">
+            <a:schemeClr val="dk1"/>
+          </a:effectRef>
+          <a:fontRef idx="minor">
+            <a:schemeClr val="tx1"/>
+          </a:fontRef>
+        </p:style>
+      </p:cxnSp>
+      <p:cxnSp>
+        <p:nvCxnSpPr>
+          <p:cNvPr id="11" name="Elbow Connector 10"/>
+          <p:cNvCxnSpPr>
+            <a:stCxn id="9" idx="3"/>
+            <a:endCxn id="6" idx="1"/>
+          </p:cNvCxnSpPr>
+          <p:nvPr/>
+        </p:nvCxnSpPr>
+        <p:spPr>
+          <a:xfrm rot="16200000" flipH="1">
+            <a:off x="2075622" y="3546975"/>
+            <a:ext cx="780289" cy="2916324"/>
+          </a:xfrm>
+          <a:prstGeom prst="bentConnector2">
+            <a:avLst/>
+          </a:prstGeom>
+        </p:spPr>
+        <p:style>
+          <a:lnRef idx="2">
+            <a:schemeClr val="dk1"/>
+          </a:lnRef>
+          <a:fillRef idx="0">
+            <a:schemeClr val="dk1"/>
+          </a:fillRef>
+          <a:effectRef idx="1">
+            <a:schemeClr val="dk1"/>
+          </a:effectRef>
+          <a:fontRef idx="minor">
+            <a:schemeClr val="tx1"/>
+          </a:fontRef>
+        </p:style>
+      </p:cxnSp>
+      <p:cxnSp>
+        <p:nvCxnSpPr>
+          <p:cNvPr id="12" name="Elbow Connector 11"/>
+          <p:cNvCxnSpPr>
+            <a:stCxn id="9" idx="3"/>
+            <a:endCxn id="7" idx="1"/>
+          </p:cNvCxnSpPr>
+          <p:nvPr/>
+        </p:nvCxnSpPr>
+        <p:spPr>
+          <a:xfrm rot="16200000" flipH="1">
+            <a:off x="935768" y="4686829"/>
+            <a:ext cx="467708" cy="324036"/>
+          </a:xfrm>
+          <a:prstGeom prst="bentConnector2">
+            <a:avLst/>
+          </a:prstGeom>
+        </p:spPr>
+        <p:style>
+          <a:lnRef idx="2">
+            <a:schemeClr val="dk1"/>
+          </a:lnRef>
+          <a:fillRef idx="0">
+            <a:schemeClr val="dk1"/>
+          </a:fillRef>
+          <a:effectRef idx="1">
+            <a:schemeClr val="dk1"/>
+          </a:effectRef>
+          <a:fontRef idx="minor">
+            <a:schemeClr val="tx1"/>
+          </a:fontRef>
+        </p:style>
+      </p:cxnSp>
+      <p:cxnSp>
+        <p:nvCxnSpPr>
+          <p:cNvPr id="13" name="Elbow Connector 12"/>
+          <p:cNvCxnSpPr>
+            <a:stCxn id="9" idx="3"/>
+            <a:endCxn id="8" idx="1"/>
+          </p:cNvCxnSpPr>
+          <p:nvPr/>
+        </p:nvCxnSpPr>
+        <p:spPr>
+          <a:xfrm rot="16200000" flipH="1">
+            <a:off x="2365855" y="3256741"/>
+            <a:ext cx="150801" cy="2867303"/>
+          </a:xfrm>
+          <a:prstGeom prst="bentConnector2">
+            <a:avLst/>
+          </a:prstGeom>
+        </p:spPr>
+        <p:style>
+          <a:lnRef idx="2">
+            <a:schemeClr val="dk1"/>
+          </a:lnRef>
+          <a:fillRef idx="0">
+            <a:schemeClr val="dk1"/>
+          </a:fillRef>
+          <a:effectRef idx="1">
+            <a:schemeClr val="dk1"/>
+          </a:effectRef>
+          <a:fontRef idx="minor">
+            <a:schemeClr val="tx1"/>
+          </a:fontRef>
+        </p:style>
+      </p:cxnSp>
+      <p:sp>
+        <p:nvSpPr>
+          <p:cNvPr id="14" name="TextBox 13"/>
+          <p:cNvSpPr txBox="1"/>
+          <p:nvPr/>
+        </p:nvSpPr>
+        <p:spPr>
+          <a:xfrm>
+            <a:off x="4225902" y="2009165"/>
+            <a:ext cx="1786258" cy="646331"/>
+          </a:xfrm>
+          <a:prstGeom prst="rect">
+            <a:avLst/>
+          </a:prstGeom>
+          <a:solidFill>
+            <a:schemeClr val="bg2"/>
+          </a:solidFill>
+          <a:ln/>
+        </p:spPr>
+        <p:style>
+          <a:lnRef idx="2">
+            <a:schemeClr val="dk1"/>
+          </a:lnRef>
+          <a:fillRef idx="1">
+            <a:schemeClr val="lt1"/>
+          </a:fillRef>
+          <a:effectRef idx="0">
+            <a:schemeClr val="dk1"/>
+          </a:effectRef>
+          <a:fontRef idx="minor">
+            <a:schemeClr val="dk1"/>
+          </a:fontRef>
+        </p:style>
+        <p:txBody>
+          <a:bodyPr wrap="none" rtlCol="0">
+            <a:spAutoFit/>
+          </a:bodyPr>
+          <a:lstStyle/>
+          <a:p>
+            <a:r>
+              <a:rPr lang="de-DE" i="1" dirty="0" smtClean="0"/>
+              <a:t>CorpusFrequency</a:t>
+            </a:r>
+          </a:p>
+          <a:p>
+            <a:r>
+              <a:rPr lang="de-DE" dirty="0" smtClean="0"/>
+              <a:t>rdf:value: int</a:t>
+            </a:r>
+            <a:endParaRPr lang="de-DE" dirty="0"/>
+          </a:p>
+        </p:txBody>
+      </p:sp>
+      <p:sp>
+        <p:nvSpPr>
+          <p:cNvPr id="16" name="TextBox 15"/>
+          <p:cNvSpPr txBox="1"/>
+          <p:nvPr/>
+        </p:nvSpPr>
+        <p:spPr>
+          <a:xfrm>
+            <a:off x="2411760" y="2636912"/>
+            <a:ext cx="1130631" cy="369332"/>
+          </a:xfrm>
+          <a:prstGeom prst="rect">
+            <a:avLst/>
+          </a:prstGeom>
+          <a:noFill/>
+        </p:spPr>
+        <p:txBody>
+          <a:bodyPr wrap="none" rtlCol="0">
+            <a:spAutoFit/>
+          </a:bodyPr>
+          <a:lstStyle/>
+          <a:p>
+            <a:r>
+              <a:rPr lang="de-DE" i="1" dirty="0" smtClean="0"/>
+              <a:t>frequency</a:t>
+            </a:r>
+            <a:endParaRPr lang="de-DE" i="1" dirty="0"/>
+          </a:p>
+        </p:txBody>
+      </p:sp>
+      <p:cxnSp>
+        <p:nvCxnSpPr>
+          <p:cNvPr id="18" name="Straight Arrow Connector 17"/>
+          <p:cNvCxnSpPr>
+            <a:stCxn id="14" idx="3"/>
+            <a:endCxn id="74" idx="1"/>
+          </p:cNvCxnSpPr>
+          <p:nvPr/>
+        </p:nvCxnSpPr>
+        <p:spPr>
+          <a:xfrm flipV="1">
+            <a:off x="6012160" y="2332330"/>
+            <a:ext cx="1172534" cy="1"/>
+          </a:xfrm>
+          <a:prstGeom prst="straightConnector1">
+            <a:avLst/>
+          </a:prstGeom>
+          <a:ln>
+            <a:tailEnd type="arrow"/>
+          </a:ln>
+        </p:spPr>
+        <p:style>
+          <a:lnRef idx="2">
+            <a:schemeClr val="dk1"/>
+          </a:lnRef>
+          <a:fillRef idx="0">
+            <a:schemeClr val="dk1"/>
+          </a:fillRef>
+          <a:effectRef idx="1">
+            <a:schemeClr val="dk1"/>
+          </a:effectRef>
+          <a:fontRef idx="minor">
+            <a:schemeClr val="tx1"/>
+          </a:fontRef>
+        </p:style>
+      </p:cxnSp>
+      <p:sp>
+        <p:nvSpPr>
+          <p:cNvPr id="19" name="TextBox 18"/>
+          <p:cNvSpPr txBox="1"/>
+          <p:nvPr/>
+        </p:nvSpPr>
+        <p:spPr>
+          <a:xfrm>
+            <a:off x="6204343" y="1916832"/>
+            <a:ext cx="815929" cy="369332"/>
+          </a:xfrm>
+          <a:prstGeom prst="rect">
+            <a:avLst/>
+          </a:prstGeom>
+          <a:noFill/>
+        </p:spPr>
+        <p:txBody>
+          <a:bodyPr wrap="none" rtlCol="0">
+            <a:spAutoFit/>
+          </a:bodyPr>
+          <a:lstStyle/>
+          <a:p>
+            <a:r>
+              <a:rPr lang="de-DE" i="1" dirty="0" smtClean="0"/>
+              <a:t>corpus</a:t>
+            </a:r>
+            <a:endParaRPr lang="de-DE" i="1" dirty="0"/>
+          </a:p>
+        </p:txBody>
+      </p:sp>
+      <p:cxnSp>
+        <p:nvCxnSpPr>
+          <p:cNvPr id="20" name="Straight Connector 19"/>
+          <p:cNvCxnSpPr>
+            <a:stCxn id="14" idx="1"/>
+            <a:endCxn id="14" idx="3"/>
+          </p:cNvCxnSpPr>
+          <p:nvPr/>
+        </p:nvCxnSpPr>
+        <p:spPr>
+          <a:xfrm>
+            <a:off x="4225902" y="2332331"/>
+            <a:ext cx="1786258" cy="0"/>
+          </a:xfrm>
+          <a:prstGeom prst="line">
+            <a:avLst/>
+          </a:prstGeom>
+        </p:spPr>
+        <p:style>
+          <a:lnRef idx="1">
+            <a:schemeClr val="dk1"/>
+          </a:lnRef>
+          <a:fillRef idx="0">
+            <a:schemeClr val="dk1"/>
+          </a:fillRef>
+          <a:effectRef idx="0">
+            <a:schemeClr val="dk1"/>
+          </a:effectRef>
+          <a:fontRef idx="minor">
+            <a:schemeClr val="tx1"/>
+          </a:fontRef>
+        </p:style>
+      </p:cxnSp>
+      <p:sp>
+        <p:nvSpPr>
+          <p:cNvPr id="74" name="TextBox 73"/>
+          <p:cNvSpPr txBox="1"/>
+          <p:nvPr/>
+        </p:nvSpPr>
+        <p:spPr>
+          <a:xfrm>
+            <a:off x="7184694" y="2009164"/>
+            <a:ext cx="987706" cy="646331"/>
+          </a:xfrm>
+          <a:prstGeom prst="rect">
+            <a:avLst/>
+          </a:prstGeom>
+          <a:solidFill>
+            <a:schemeClr val="bg2"/>
+          </a:solidFill>
+          <a:ln/>
+        </p:spPr>
+        <p:style>
+          <a:lnRef idx="2">
+            <a:schemeClr val="dk1"/>
+          </a:lnRef>
+          <a:fillRef idx="1">
+            <a:schemeClr val="lt1"/>
+          </a:fillRef>
+          <a:effectRef idx="0">
+            <a:schemeClr val="dk1"/>
+          </a:effectRef>
+          <a:fontRef idx="minor">
+            <a:schemeClr val="dk1"/>
+          </a:fontRef>
+        </p:style>
+        <p:txBody>
+          <a:bodyPr wrap="none" rtlCol="0">
+            <a:spAutoFit/>
+          </a:bodyPr>
+          <a:lstStyle/>
+          <a:p>
+            <a:r>
+              <a:rPr lang="de-DE" i="1" dirty="0" smtClean="0"/>
+              <a:t>Corpus</a:t>
+            </a:r>
+          </a:p>
+          <a:p>
+            <a:r>
+              <a:rPr lang="de-DE" i="1" dirty="0" smtClean="0"/>
+              <a:t>total</a:t>
+            </a:r>
+            <a:r>
+              <a:rPr lang="de-DE" dirty="0" smtClean="0"/>
+              <a:t>: int</a:t>
+            </a:r>
+            <a:endParaRPr lang="de-DE" dirty="0"/>
+          </a:p>
+        </p:txBody>
+      </p:sp>
+      <p:cxnSp>
+        <p:nvCxnSpPr>
+          <p:cNvPr id="76" name="Straight Connector 75"/>
+          <p:cNvCxnSpPr>
+            <a:stCxn id="74" idx="3"/>
+            <a:endCxn id="74" idx="1"/>
+          </p:cNvCxnSpPr>
+          <p:nvPr/>
+        </p:nvCxnSpPr>
+        <p:spPr>
+          <a:xfrm flipH="1">
+            <a:off x="7184694" y="2332330"/>
+            <a:ext cx="987706" cy="0"/>
+          </a:xfrm>
+          <a:prstGeom prst="line">
+            <a:avLst/>
+          </a:prstGeom>
+        </p:spPr>
+        <p:style>
+          <a:lnRef idx="1">
+            <a:schemeClr val="dk1"/>
+          </a:lnRef>
+          <a:fillRef idx="0">
+            <a:schemeClr val="dk1"/>
+          </a:fillRef>
+          <a:effectRef idx="0">
+            <a:schemeClr val="dk1"/>
+          </a:effectRef>
+          <a:fontRef idx="minor">
+            <a:schemeClr val="tx1"/>
+          </a:fontRef>
+        </p:style>
+      </p:cxnSp>
+      <p:sp>
+        <p:nvSpPr>
+          <p:cNvPr id="2" name="Title 1"/>
+          <p:cNvSpPr>
+            <a:spLocks noGrp="1"/>
+          </p:cNvSpPr>
+          <p:nvPr>
+            <p:ph type="title"/>
+          </p:nvPr>
+        </p:nvSpPr>
+        <p:spPr/>
+        <p:txBody>
+          <a:bodyPr>
+            <a:normAutofit fontScale="90000"/>
+          </a:bodyPr>
+          <a:lstStyle/>
+          <a:p>
+            <a:r>
+              <a:rPr lang="de-DE" dirty="0" smtClean="0"/>
+              <a:t>Frequency and </a:t>
+            </a:r>
+            <a:r>
+              <a:rPr lang="de-DE" dirty="0" smtClean="0"/>
+              <a:t>Attestation (Chiarcos et al. 2020@GlobaLex)</a:t>
+            </a:r>
+            <a:endParaRPr lang="de-DE" dirty="0"/>
+          </a:p>
+        </p:txBody>
+      </p:sp>
+      <p:sp>
+        <p:nvSpPr>
+          <p:cNvPr id="90" name="TextBox 89"/>
+          <p:cNvSpPr txBox="1"/>
+          <p:nvPr/>
+        </p:nvSpPr>
+        <p:spPr>
+          <a:xfrm>
+            <a:off x="2339752" y="3717032"/>
+            <a:ext cx="2317814" cy="646331"/>
+          </a:xfrm>
+          <a:prstGeom prst="rect">
+            <a:avLst/>
+          </a:prstGeom>
+          <a:noFill/>
+        </p:spPr>
+        <p:txBody>
+          <a:bodyPr wrap="none" rtlCol="0">
+            <a:spAutoFit/>
+          </a:bodyPr>
+          <a:lstStyle/>
+          <a:p>
+            <a:r>
+              <a:rPr lang="de-DE" i="1" dirty="0" smtClean="0"/>
+              <a:t>attestation</a:t>
+            </a:r>
+          </a:p>
+          <a:p>
+            <a:r>
+              <a:rPr lang="de-DE" dirty="0" smtClean="0"/>
+              <a:t>subPropertyOf </a:t>
+            </a:r>
+            <a:r>
+              <a:rPr lang="de-DE" i="1" dirty="0" smtClean="0"/>
+              <a:t>citation</a:t>
+            </a:r>
+            <a:endParaRPr lang="de-DE" dirty="0"/>
+          </a:p>
+        </p:txBody>
+      </p:sp>
+      <p:cxnSp>
+        <p:nvCxnSpPr>
+          <p:cNvPr id="92" name="Elbow Connector 91"/>
+          <p:cNvCxnSpPr>
+            <a:stCxn id="97" idx="3"/>
+            <a:endCxn id="94" idx="1"/>
+          </p:cNvCxnSpPr>
+          <p:nvPr/>
+        </p:nvCxnSpPr>
+        <p:spPr>
+          <a:xfrm>
+            <a:off x="6352950" y="3543399"/>
+            <a:ext cx="881754" cy="2368"/>
+          </a:xfrm>
+          <a:prstGeom prst="bentConnector3">
+            <a:avLst>
+              <a:gd name="adj1" fmla="val 50000"/>
+            </a:avLst>
+          </a:prstGeom>
+          <a:ln>
+            <a:headEnd type="none" w="med" len="med"/>
+            <a:tailEnd type="arrow" w="med" len="med"/>
+          </a:ln>
+        </p:spPr>
+        <p:style>
+          <a:lnRef idx="2">
+            <a:schemeClr val="dk1"/>
+          </a:lnRef>
+          <a:fillRef idx="0">
+            <a:schemeClr val="dk1"/>
+          </a:fillRef>
+          <a:effectRef idx="1">
+            <a:schemeClr val="dk1"/>
+          </a:effectRef>
+          <a:fontRef idx="minor">
+            <a:schemeClr val="tx1"/>
+          </a:fontRef>
+        </p:style>
+      </p:cxnSp>
+      <p:sp>
+        <p:nvSpPr>
+          <p:cNvPr id="94" name="TextBox 93"/>
+          <p:cNvSpPr txBox="1"/>
+          <p:nvPr/>
+        </p:nvSpPr>
+        <p:spPr>
+          <a:xfrm>
+            <a:off x="7234704" y="3222601"/>
+            <a:ext cx="721672" cy="646331"/>
+          </a:xfrm>
+          <a:prstGeom prst="rect">
+            <a:avLst/>
+          </a:prstGeom>
+          <a:noFill/>
+          <a:ln>
+            <a:prstDash val="sysDot"/>
+          </a:ln>
+        </p:spPr>
+        <p:style>
+          <a:lnRef idx="2">
+            <a:schemeClr val="dk1"/>
+          </a:lnRef>
+          <a:fillRef idx="1">
+            <a:schemeClr val="lt1"/>
+          </a:fillRef>
+          <a:effectRef idx="0">
+            <a:schemeClr val="dk1"/>
+          </a:effectRef>
+          <a:fontRef idx="minor">
+            <a:schemeClr val="dk1"/>
+          </a:fontRef>
+        </p:style>
+        <p:txBody>
+          <a:bodyPr wrap="none" rtlCol="0">
+            <a:spAutoFit/>
+          </a:bodyPr>
+          <a:lstStyle/>
+          <a:p>
+            <a:pPr algn="ctr"/>
+            <a:r>
+              <a:rPr lang="de-DE" dirty="0" smtClean="0"/>
+              <a:t>locus </a:t>
+            </a:r>
+          </a:p>
+          <a:p>
+            <a:pPr algn="ctr"/>
+            <a:r>
+              <a:rPr lang="de-DE" dirty="0" smtClean="0"/>
+              <a:t>URI</a:t>
+            </a:r>
+            <a:endParaRPr lang="de-DE" dirty="0"/>
+          </a:p>
+        </p:txBody>
+      </p:sp>
+      <p:sp>
+        <p:nvSpPr>
+          <p:cNvPr id="95" name="TextBox 94"/>
+          <p:cNvSpPr txBox="1"/>
+          <p:nvPr/>
+        </p:nvSpPr>
+        <p:spPr>
+          <a:xfrm>
+            <a:off x="6423507" y="3140968"/>
+            <a:ext cx="668773" cy="369332"/>
+          </a:xfrm>
+          <a:prstGeom prst="rect">
+            <a:avLst/>
+          </a:prstGeom>
+          <a:noFill/>
+        </p:spPr>
+        <p:txBody>
+          <a:bodyPr wrap="none" rtlCol="0">
+            <a:spAutoFit/>
+          </a:bodyPr>
+          <a:lstStyle/>
+          <a:p>
+            <a:pPr algn="ctr"/>
+            <a:r>
+              <a:rPr lang="de-DE" i="1" dirty="0" smtClean="0"/>
+              <a:t>locus</a:t>
+            </a:r>
+            <a:endParaRPr lang="de-DE" i="1" dirty="0"/>
+          </a:p>
+        </p:txBody>
+      </p:sp>
+      <p:grpSp>
+        <p:nvGrpSpPr>
+          <p:cNvPr id="96" name="Group 95"/>
+          <p:cNvGrpSpPr/>
+          <p:nvPr/>
+        </p:nvGrpSpPr>
+        <p:grpSpPr>
+          <a:xfrm>
+            <a:off x="4009360" y="3081734"/>
+            <a:ext cx="2343590" cy="923330"/>
+            <a:chOff x="8176191" y="6000546"/>
+            <a:chExt cx="2343590" cy="923330"/>
+          </a:xfrm>
+        </p:grpSpPr>
+        <p:sp>
+          <p:nvSpPr>
+            <p:cNvPr id="97" name="TextBox 96"/>
+            <p:cNvSpPr txBox="1"/>
+            <p:nvPr/>
+          </p:nvSpPr>
+          <p:spPr>
+            <a:xfrm>
+              <a:off x="8176191" y="6000546"/>
+              <a:ext cx="2343590" cy="923330"/>
+            </a:xfrm>
+            <a:prstGeom prst="rect">
+              <a:avLst/>
+            </a:prstGeom>
+            <a:solidFill>
+              <a:schemeClr val="bg2"/>
+            </a:solidFill>
+            <a:ln/>
+          </p:spPr>
+          <p:style>
+            <a:lnRef idx="2">
+              <a:schemeClr val="dk1"/>
+            </a:lnRef>
+            <a:fillRef idx="1">
+              <a:schemeClr val="lt1"/>
+            </a:fillRef>
+            <a:effectRef idx="0">
+              <a:schemeClr val="dk1"/>
+            </a:effectRef>
+            <a:fontRef idx="minor">
+              <a:schemeClr val="dk1"/>
+            </a:fontRef>
+          </p:style>
+          <p:txBody>
+            <a:bodyPr wrap="none" rtlCol="0">
+              <a:spAutoFit/>
+            </a:bodyPr>
+            <a:lstStyle/>
+            <a:p>
+              <a:r>
+                <a:rPr lang="de-DE" i="1" dirty="0" smtClean="0"/>
+                <a:t>Attestation</a:t>
+              </a:r>
+            </a:p>
+            <a:p>
+              <a:r>
+                <a:rPr lang="de-DE" dirty="0" smtClean="0"/>
+                <a:t>quotation: string</a:t>
+              </a:r>
+            </a:p>
+            <a:p>
+              <a:r>
+                <a:rPr lang="de-DE" dirty="0" smtClean="0"/>
+                <a:t>attestationGloss: string</a:t>
+              </a:r>
+            </a:p>
+          </p:txBody>
+        </p:sp>
+        <p:cxnSp>
+          <p:nvCxnSpPr>
+            <p:cNvPr id="98" name="Straight Connector 97"/>
+            <p:cNvCxnSpPr/>
+            <p:nvPr/>
+          </p:nvCxnSpPr>
+          <p:spPr>
+            <a:xfrm>
+              <a:off x="8195441" y="6347812"/>
+              <a:ext cx="2290692" cy="0"/>
+            </a:xfrm>
+            <a:prstGeom prst="line">
+              <a:avLst/>
+            </a:prstGeom>
+          </p:spPr>
+          <p:style>
+            <a:lnRef idx="1">
+              <a:schemeClr val="dk1"/>
+            </a:lnRef>
+            <a:fillRef idx="0">
+              <a:schemeClr val="dk1"/>
+            </a:fillRef>
+            <a:effectRef idx="0">
+              <a:schemeClr val="dk1"/>
+            </a:effectRef>
+            <a:fontRef idx="minor">
+              <a:schemeClr val="tx1"/>
+            </a:fontRef>
+          </p:style>
+        </p:cxnSp>
+      </p:grpSp>
+      <p:cxnSp>
+        <p:nvCxnSpPr>
+          <p:cNvPr id="29" name="Curved Connector 28"/>
+          <p:cNvCxnSpPr>
+            <a:stCxn id="4" idx="0"/>
+            <a:endCxn id="14" idx="1"/>
+          </p:cNvCxnSpPr>
+          <p:nvPr/>
+        </p:nvCxnSpPr>
+        <p:spPr>
+          <a:xfrm rot="5400000" flipH="1" flipV="1">
+            <a:off x="1774011" y="1553173"/>
+            <a:ext cx="1672733" cy="3231050"/>
+          </a:xfrm>
+          <a:prstGeom prst="curvedConnector2">
+            <a:avLst/>
+          </a:prstGeom>
+          <a:ln>
+            <a:tailEnd type="arrow"/>
+          </a:ln>
+        </p:spPr>
+        <p:style>
+          <a:lnRef idx="2">
+            <a:schemeClr val="dk1"/>
+          </a:lnRef>
+          <a:fillRef idx="0">
+            <a:schemeClr val="dk1"/>
+          </a:fillRef>
+          <a:effectRef idx="1">
+            <a:schemeClr val="dk1"/>
+          </a:effectRef>
+          <a:fontRef idx="minor">
+            <a:schemeClr val="tx1"/>
+          </a:fontRef>
+        </p:style>
+      </p:cxnSp>
+      <p:cxnSp>
+        <p:nvCxnSpPr>
+          <p:cNvPr id="33" name="Curved Connector 32"/>
+          <p:cNvCxnSpPr>
+            <a:stCxn id="4" idx="0"/>
+            <a:endCxn id="97" idx="1"/>
+          </p:cNvCxnSpPr>
+          <p:nvPr/>
+        </p:nvCxnSpPr>
+        <p:spPr>
+          <a:xfrm rot="5400000" flipH="1" flipV="1">
+            <a:off x="2271274" y="2266978"/>
+            <a:ext cx="461665" cy="3014508"/>
+          </a:xfrm>
+          <a:prstGeom prst="curvedConnector2">
+            <a:avLst/>
+          </a:prstGeom>
+          <a:ln>
+            <a:tailEnd type="arrow"/>
+          </a:ln>
+        </p:spPr>
+        <p:style>
+          <a:lnRef idx="2">
+            <a:schemeClr val="dk1"/>
+          </a:lnRef>
+          <a:fillRef idx="0">
+            <a:schemeClr val="dk1"/>
+          </a:fillRef>
+          <a:effectRef idx="1">
+            <a:schemeClr val="dk1"/>
+          </a:effectRef>
+          <a:fontRef idx="minor">
+            <a:schemeClr val="tx1"/>
+          </a:fontRef>
+        </p:style>
+      </p:cxnSp>
+    </p:spTree>
+    <p:extLst>
+      <p:ext uri="{BB962C8B-B14F-4D97-AF65-F5344CB8AC3E}">
+        <p14:creationId xmlns:p14="http://schemas.microsoft.com/office/powerpoint/2010/main" val="672977862"/>
+      </p:ext>
+    </p:extLst>
+  </p:cSld>
+  <p:clrMapOvr>
+    <a:masterClrMapping/>
+  </p:clrMapOvr>
+  <p:timing>
+    <p:tnLst>
+      <p:par>
+        <p:cTn id="1" dur="indefinite" restart="never" nodeType="tmRoot"/>
+      </p:par>
+    </p:tnLst>
+  </p:timing>
+</p:sld>
+</file>
+
+<file path=ppt/slides/slide12.xml><?xml version="1.0" encoding="utf-8"?>
+<p:sld xmlns:a="http://schemas.openxmlformats.org/drawingml/2006/main" xmlns:r="http://schemas.openxmlformats.org/officeDocument/2006/relationships" xmlns:p="http://schemas.openxmlformats.org/presentationml/2006/main">
+  <p:cSld>
+    <p:spTree>
+      <p:nvGrpSpPr>
+        <p:cNvPr id="1" name=""/>
+        <p:cNvGrpSpPr/>
+        <p:nvPr/>
+      </p:nvGrpSpPr>
+      <p:grpSpPr>
+        <a:xfrm>
+          <a:off x="0" y="0"/>
+          <a:ext cx="0" cy="0"/>
+          <a:chOff x="0" y="0"/>
+          <a:chExt cx="0" cy="0"/>
+        </a:xfrm>
+      </p:grpSpPr>
+      <p:sp>
+        <p:nvSpPr>
+          <p:cNvPr id="2" name="Title 1"/>
+          <p:cNvSpPr>
+            <a:spLocks noGrp="1"/>
+          </p:cNvSpPr>
+          <p:nvPr>
+            <p:ph type="ctrTitle"/>
+          </p:nvPr>
+        </p:nvSpPr>
+        <p:spPr/>
+        <p:txBody>
+          <a:bodyPr/>
+          <a:lstStyle/>
+          <a:p>
+            <a:r>
+              <a:rPr lang="de-DE" dirty="0" smtClean="0"/>
+              <a:t>initial draft (Nov 2018)</a:t>
+            </a:r>
+            <a:endParaRPr lang="de-DE" dirty="0"/>
+          </a:p>
+        </p:txBody>
+      </p:sp>
+      <p:sp>
+        <p:nvSpPr>
+          <p:cNvPr id="4" name="Subtitle 3"/>
+          <p:cNvSpPr>
+            <a:spLocks noGrp="1"/>
+          </p:cNvSpPr>
+          <p:nvPr>
+            <p:ph type="subTitle" idx="1"/>
+          </p:nvPr>
+        </p:nvSpPr>
+        <p:spPr/>
+        <p:txBody>
+          <a:bodyPr/>
+          <a:lstStyle/>
+          <a:p>
+            <a:endParaRPr lang="de-DE"/>
+          </a:p>
+        </p:txBody>
+      </p:sp>
+    </p:spTree>
+    <p:extLst>
+      <p:ext uri="{BB962C8B-B14F-4D97-AF65-F5344CB8AC3E}">
+        <p14:creationId xmlns:p14="http://schemas.microsoft.com/office/powerpoint/2010/main" val="1535454"/>
+      </p:ext>
+    </p:extLst>
+  </p:cSld>
+  <p:clrMapOvr>
+    <a:masterClrMapping/>
+  </p:clrMapOvr>
+</p:sld>
+</file>
+
+<file path=ppt/slides/slide13.xml><?xml version="1.0" encoding="utf-8"?>
+<p:sld xmlns:a="http://schemas.openxmlformats.org/drawingml/2006/main" xmlns:r="http://schemas.openxmlformats.org/officeDocument/2006/relationships" xmlns:p="http://schemas.openxmlformats.org/presentationml/2006/main">
+  <p:cSld>
+    <p:spTree>
+      <p:nvGrpSpPr>
+        <p:cNvPr id="1" name=""/>
+        <p:cNvGrpSpPr/>
+        <p:nvPr/>
+      </p:nvGrpSpPr>
+      <p:grpSpPr>
+        <a:xfrm>
+          <a:off x="0" y="0"/>
+          <a:ext cx="0" cy="0"/>
+          <a:chOff x="0" y="0"/>
+          <a:chExt cx="0" cy="0"/>
+        </a:xfrm>
+      </p:grpSpPr>
+      <p:sp>
+        <p:nvSpPr>
           <p:cNvPr id="4" name="TextBox 3"/>
           <p:cNvSpPr txBox="1"/>
           <p:nvPr/>
@@ -5765,7 +7436,7 @@
 </p:sld>
 </file>
 
-<file path=ppt/slides/slide11.xml><?xml version="1.0" encoding="utf-8"?>
+<file path=ppt/slides/slide14.xml><?xml version="1.0" encoding="utf-8"?>
 <p:sld xmlns:a="http://schemas.openxmlformats.org/drawingml/2006/main" xmlns:r="http://schemas.openxmlformats.org/officeDocument/2006/relationships" xmlns:p="http://schemas.openxmlformats.org/presentationml/2006/main">
   <p:cSld>
     <p:spTree>
@@ -5837,7 +7508,7 @@
 </p:sld>
 </file>
 
-<file path=ppt/slides/slide12.xml><?xml version="1.0" encoding="utf-8"?>
+<file path=ppt/slides/slide15.xml><?xml version="1.0" encoding="utf-8"?>
 <p:sld xmlns:a="http://schemas.openxmlformats.org/drawingml/2006/main" xmlns:r="http://schemas.openxmlformats.org/officeDocument/2006/relationships" xmlns:p="http://schemas.openxmlformats.org/presentationml/2006/main">
   <p:cSld>
     <p:spTree>
@@ -6696,7 +8367,7 @@
 </p:sld>
 </file>
 
-<file path=ppt/slides/slide13.xml><?xml version="1.0" encoding="utf-8"?>
+<file path=ppt/slides/slide16.xml><?xml version="1.0" encoding="utf-8"?>
 <p:sld xmlns:a="http://schemas.openxmlformats.org/drawingml/2006/main" xmlns:r="http://schemas.openxmlformats.org/officeDocument/2006/relationships" xmlns:p="http://schemas.openxmlformats.org/presentationml/2006/main">
   <p:cSld>
     <p:spTree>
@@ -7439,7 +9110,7 @@
 </p:sld>
 </file>
 
-<file path=ppt/slides/slide14.xml><?xml version="1.0" encoding="utf-8"?>
+<file path=ppt/slides/slide17.xml><?xml version="1.0" encoding="utf-8"?>
 <p:sld xmlns:a="http://schemas.openxmlformats.org/drawingml/2006/main" xmlns:r="http://schemas.openxmlformats.org/officeDocument/2006/relationships" xmlns:p="http://schemas.openxmlformats.org/presentationml/2006/main">
   <p:cSld>
     <p:spTree>
@@ -8166,7 +9837,7 @@
 </p:sld>
 </file>
 
-<file path=ppt/slides/slide15.xml><?xml version="1.0" encoding="utf-8"?>
+<file path=ppt/slides/slide18.xml><?xml version="1.0" encoding="utf-8"?>
 <p:sld xmlns:a="http://schemas.openxmlformats.org/drawingml/2006/main" xmlns:r="http://schemas.openxmlformats.org/officeDocument/2006/relationships" xmlns:p="http://schemas.openxmlformats.org/presentationml/2006/main">
   <p:cSld>
     <p:spTree>
@@ -10003,7 +11674,11 @@
           <a:p>
             <a:r>
               <a:rPr lang="de-DE" dirty="0" smtClean="0"/>
-              <a:t>dc:description: String</a:t>
+              <a:t>dc:description: </a:t>
+            </a:r>
+            <a:r>
+              <a:rPr lang="de-DE" dirty="0" smtClean="0"/>
+              <a:t>String</a:t>
             </a:r>
           </a:p>
           <a:p>
@@ -10015,7 +11690,11 @@
           <a:p>
             <a:r>
               <a:rPr lang="de-DE" dirty="0" smtClean="0"/>
-              <a:t>rdf:value: Literal</a:t>
+              <a:t>rdf:value</a:t>
+            </a:r>
+            <a:r>
+              <a:rPr lang="de-DE" dirty="0" smtClean="0"/>
+              <a:t>: Literal</a:t>
             </a:r>
             <a:endParaRPr lang="de-DE" dirty="0"/>
           </a:p>
@@ -11009,11 +12688,7 @@
             <a:p>
               <a:r>
                 <a:rPr lang="de-DE" dirty="0" smtClean="0"/>
-                <a:t>quotation: </a:t>
-              </a:r>
-              <a:r>
-                <a:rPr lang="de-DE" dirty="0" smtClean="0"/>
-                <a:t>string</a:t>
+                <a:t>quotation: string</a:t>
               </a:r>
             </a:p>
             <a:p>
@@ -11021,7 +12696,6 @@
                 <a:rPr lang="de-DE" dirty="0" smtClean="0"/>
                 <a:t>attestationGloss:string</a:t>
               </a:r>
-              <a:endParaRPr lang="de-DE" dirty="0" smtClean="0"/>
             </a:p>
           </p:txBody>
         </p:sp>
@@ -11269,11 +12943,7 @@
             </a:r>
             <a:r>
               <a:rPr lang="de-DE" dirty="0" smtClean="0"/>
-              <a:t>: </a:t>
-            </a:r>
-            <a:r>
-              <a:rPr lang="de-DE" dirty="0" smtClean="0"/>
-              <a:t>int</a:t>
+              <a:t>: int</a:t>
             </a:r>
             <a:endParaRPr lang="de-DE" dirty="0"/>
           </a:p>
@@ -11803,11 +13473,7 @@
             </a:r>
             <a:r>
               <a:rPr lang="de-DE" dirty="0" smtClean="0"/>
-              <a:t>: </a:t>
-            </a:r>
-            <a:r>
-              <a:rPr lang="de-DE" dirty="0" smtClean="0"/>
-              <a:t>int</a:t>
+              <a:t>: int</a:t>
             </a:r>
             <a:endParaRPr lang="de-DE" dirty="0"/>
           </a:p>
@@ -12274,11 +13940,7 @@
             <a:p>
               <a:r>
                 <a:rPr lang="de-DE" dirty="0" smtClean="0"/>
-                <a:t>quotation: </a:t>
-              </a:r>
-              <a:r>
-                <a:rPr lang="de-DE" dirty="0" smtClean="0"/>
-                <a:t>string</a:t>
+                <a:t>quotation: string</a:t>
               </a:r>
             </a:p>
             <a:p>
@@ -12286,7 +13948,6 @@
                 <a:rPr lang="de-DE" dirty="0" smtClean="0"/>
                 <a:t>attestationGloss: string</a:t>
               </a:r>
-              <a:endParaRPr lang="de-DE" dirty="0" smtClean="0"/>
             </a:p>
           </p:txBody>
         </p:sp>
@@ -12701,11 +14362,7 @@
             </a:r>
             <a:r>
               <a:rPr lang="de-DE" dirty="0" smtClean="0"/>
-              <a:t>: </a:t>
-            </a:r>
-            <a:r>
-              <a:rPr lang="de-DE" dirty="0" smtClean="0"/>
-              <a:t>int</a:t>
+              <a:t>: int</a:t>
             </a:r>
             <a:endParaRPr lang="de-DE" dirty="0"/>
           </a:p>
@@ -13601,11 +15258,7 @@
             </a:r>
             <a:r>
               <a:rPr lang="de-DE" dirty="0" smtClean="0"/>
-              <a:t>: </a:t>
-            </a:r>
-            <a:r>
-              <a:rPr lang="de-DE" dirty="0" smtClean="0"/>
-              <a:t>int</a:t>
+              <a:t>: int</a:t>
             </a:r>
             <a:endParaRPr lang="de-DE" dirty="0"/>
           </a:p>
@@ -13644,6 +15297,49 @@
           </a:fontRef>
         </p:style>
       </p:cxnSp>
+      <p:sp>
+        <p:nvSpPr>
+          <p:cNvPr id="3" name="TextBox 2"/>
+          <p:cNvSpPr txBox="1"/>
+          <p:nvPr/>
+        </p:nvSpPr>
+        <p:spPr>
+          <a:xfrm>
+            <a:off x="1403648" y="5661248"/>
+            <a:ext cx="1804468" cy="369332"/>
+          </a:xfrm>
+          <a:prstGeom prst="rect">
+            <a:avLst/>
+          </a:prstGeom>
+        </p:spPr>
+        <p:style>
+          <a:lnRef idx="2">
+            <a:schemeClr val="accent2"/>
+          </a:lnRef>
+          <a:fillRef idx="1">
+            <a:schemeClr val="lt1"/>
+          </a:fillRef>
+          <a:effectRef idx="0">
+            <a:schemeClr val="accent2"/>
+          </a:effectRef>
+          <a:fontRef idx="minor">
+            <a:schemeClr val="dk1"/>
+          </a:fontRef>
+        </p:style>
+        <p:txBody>
+          <a:bodyPr wrap="none" rtlCol="0">
+            <a:spAutoFit/>
+          </a:bodyPr>
+          <a:lstStyle/>
+          <a:p>
+            <a:r>
+              <a:rPr lang="de-DE" dirty="0" smtClean="0"/>
+              <a:t>not discussed yet</a:t>
+            </a:r>
+            <a:endParaRPr lang="de-DE" dirty="0"/>
+          </a:p>
+        </p:txBody>
+      </p:sp>
     </p:spTree>
     <p:extLst>
       <p:ext uri="{BB962C8B-B14F-4D97-AF65-F5344CB8AC3E}">
@@ -13683,684 +15379,12 @@
       </p:grpSpPr>
       <p:sp>
         <p:nvSpPr>
-          <p:cNvPr id="4" name="TextBox 3"/>
-          <p:cNvSpPr txBox="1"/>
-          <p:nvPr/>
-        </p:nvSpPr>
-        <p:spPr>
-          <a:xfrm>
-            <a:off x="376253" y="4005064"/>
-            <a:ext cx="1237198" cy="369332"/>
-          </a:xfrm>
-          <a:prstGeom prst="rect">
-            <a:avLst/>
-          </a:prstGeom>
-          <a:solidFill>
-            <a:schemeClr val="bg2"/>
-          </a:solidFill>
-          <a:ln>
-            <a:prstDash val="solid"/>
-          </a:ln>
-        </p:spPr>
-        <p:style>
-          <a:lnRef idx="2">
-            <a:schemeClr val="dk1"/>
-          </a:lnRef>
-          <a:fillRef idx="1">
-            <a:schemeClr val="lt1"/>
-          </a:fillRef>
-          <a:effectRef idx="0">
-            <a:schemeClr val="dk1"/>
-          </a:effectRef>
-          <a:fontRef idx="minor">
-            <a:schemeClr val="dk1"/>
-          </a:fontRef>
-        </p:style>
-        <p:txBody>
-          <a:bodyPr wrap="none" rtlCol="0">
-            <a:spAutoFit/>
-          </a:bodyPr>
-          <a:lstStyle/>
-          <a:p>
-            <a:pPr algn="ctr"/>
-            <a:r>
-              <a:rPr lang="de-DE" i="1" dirty="0" smtClean="0"/>
-              <a:t>Observable</a:t>
-            </a:r>
-            <a:endParaRPr lang="de-DE" i="1" dirty="0"/>
-          </a:p>
-        </p:txBody>
-      </p:sp>
-      <p:sp>
-        <p:nvSpPr>
-          <p:cNvPr id="5" name="TextBox 4"/>
-          <p:cNvSpPr txBox="1"/>
-          <p:nvPr/>
-        </p:nvSpPr>
-        <p:spPr>
-          <a:xfrm>
-            <a:off x="1368253" y="5507940"/>
-            <a:ext cx="1438471" cy="369332"/>
-          </a:xfrm>
-          <a:prstGeom prst="rect">
-            <a:avLst/>
-          </a:prstGeom>
-          <a:ln/>
-        </p:spPr>
-        <p:style>
-          <a:lnRef idx="2">
-            <a:schemeClr val="dk1"/>
-          </a:lnRef>
-          <a:fillRef idx="1">
-            <a:schemeClr val="lt1"/>
-          </a:fillRef>
-          <a:effectRef idx="0">
-            <a:schemeClr val="dk1"/>
-          </a:effectRef>
-          <a:fontRef idx="minor">
-            <a:schemeClr val="dk1"/>
-          </a:fontRef>
-        </p:style>
-        <p:txBody>
-          <a:bodyPr wrap="none" rtlCol="0">
-            <a:spAutoFit/>
-          </a:bodyPr>
-          <a:lstStyle/>
-          <a:p>
-            <a:r>
-              <a:rPr lang="de-DE" dirty="0" smtClean="0"/>
-              <a:t>ontolex:Form</a:t>
-            </a:r>
-            <a:endParaRPr lang="de-DE" dirty="0"/>
-          </a:p>
-        </p:txBody>
-      </p:sp>
-      <p:sp>
-        <p:nvSpPr>
-          <p:cNvPr id="6" name="TextBox 5"/>
-          <p:cNvSpPr txBox="1"/>
-          <p:nvPr/>
-        </p:nvSpPr>
-        <p:spPr>
-          <a:xfrm>
-            <a:off x="3923928" y="5210616"/>
-            <a:ext cx="2119106" cy="369332"/>
-          </a:xfrm>
-          <a:prstGeom prst="rect">
-            <a:avLst/>
-          </a:prstGeom>
-          <a:ln/>
-        </p:spPr>
-        <p:style>
-          <a:lnRef idx="2">
-            <a:schemeClr val="dk1"/>
-          </a:lnRef>
-          <a:fillRef idx="1">
-            <a:schemeClr val="lt1"/>
-          </a:fillRef>
-          <a:effectRef idx="0">
-            <a:schemeClr val="dk1"/>
-          </a:effectRef>
-          <a:fontRef idx="minor">
-            <a:schemeClr val="dk1"/>
-          </a:fontRef>
-        </p:style>
-        <p:txBody>
-          <a:bodyPr wrap="none" rtlCol="0">
-            <a:spAutoFit/>
-          </a:bodyPr>
-          <a:lstStyle/>
-          <a:p>
-            <a:r>
-              <a:rPr lang="de-DE" dirty="0" smtClean="0"/>
-              <a:t>ontolex:LexicalSense</a:t>
-            </a:r>
-            <a:endParaRPr lang="de-DE" dirty="0"/>
-          </a:p>
-        </p:txBody>
-      </p:sp>
-      <p:sp>
-        <p:nvSpPr>
-          <p:cNvPr id="7" name="TextBox 6"/>
-          <p:cNvSpPr txBox="1"/>
-          <p:nvPr/>
-        </p:nvSpPr>
-        <p:spPr>
-          <a:xfrm>
-            <a:off x="1331640" y="4898035"/>
-            <a:ext cx="2348913" cy="369332"/>
-          </a:xfrm>
-          <a:prstGeom prst="rect">
-            <a:avLst/>
-          </a:prstGeom>
-          <a:ln/>
-        </p:spPr>
-        <p:style>
-          <a:lnRef idx="2">
-            <a:schemeClr val="dk1"/>
-          </a:lnRef>
-          <a:fillRef idx="1">
-            <a:schemeClr val="lt1"/>
-          </a:fillRef>
-          <a:effectRef idx="0">
-            <a:schemeClr val="dk1"/>
-          </a:effectRef>
-          <a:fontRef idx="minor">
-            <a:schemeClr val="dk1"/>
-          </a:fontRef>
-        </p:style>
-        <p:txBody>
-          <a:bodyPr wrap="none" rtlCol="0">
-            <a:spAutoFit/>
-          </a:bodyPr>
-          <a:lstStyle/>
-          <a:p>
-            <a:r>
-              <a:rPr lang="de-DE" dirty="0" smtClean="0"/>
-              <a:t>ontolex:LexicalConcept</a:t>
-            </a:r>
-            <a:endParaRPr lang="de-DE" dirty="0"/>
-          </a:p>
-        </p:txBody>
-      </p:sp>
-      <p:sp>
-        <p:nvSpPr>
-          <p:cNvPr id="8" name="TextBox 7"/>
-          <p:cNvSpPr txBox="1"/>
-          <p:nvPr/>
-        </p:nvSpPr>
-        <p:spPr>
-          <a:xfrm>
-            <a:off x="3874907" y="4581128"/>
-            <a:ext cx="2065245" cy="369332"/>
-          </a:xfrm>
-          <a:prstGeom prst="rect">
-            <a:avLst/>
-          </a:prstGeom>
-          <a:ln/>
-        </p:spPr>
-        <p:style>
-          <a:lnRef idx="2">
-            <a:schemeClr val="dk1"/>
-          </a:lnRef>
-          <a:fillRef idx="1">
-            <a:schemeClr val="lt1"/>
-          </a:fillRef>
-          <a:effectRef idx="0">
-            <a:schemeClr val="dk1"/>
-          </a:effectRef>
-          <a:fontRef idx="minor">
-            <a:schemeClr val="dk1"/>
-          </a:fontRef>
-        </p:style>
-        <p:txBody>
-          <a:bodyPr wrap="none" rtlCol="0">
-            <a:spAutoFit/>
-          </a:bodyPr>
-          <a:lstStyle/>
-          <a:p>
-            <a:r>
-              <a:rPr lang="de-DE" dirty="0" smtClean="0"/>
-              <a:t>ontolex:LexicalEntry</a:t>
-            </a:r>
-            <a:endParaRPr lang="de-DE" dirty="0"/>
-          </a:p>
-        </p:txBody>
-      </p:sp>
-      <p:sp>
-        <p:nvSpPr>
-          <p:cNvPr id="9" name="Isosceles Triangle 8"/>
-          <p:cNvSpPr/>
-          <p:nvPr/>
-        </p:nvSpPr>
-        <p:spPr>
-          <a:xfrm>
-            <a:off x="899592" y="4398969"/>
-            <a:ext cx="216024" cy="216024"/>
-          </a:xfrm>
-          <a:prstGeom prst="triangle">
-            <a:avLst/>
-          </a:prstGeom>
-        </p:spPr>
-        <p:style>
-          <a:lnRef idx="2">
-            <a:schemeClr val="dk1"/>
-          </a:lnRef>
-          <a:fillRef idx="1">
-            <a:schemeClr val="lt1"/>
-          </a:fillRef>
-          <a:effectRef idx="0">
-            <a:schemeClr val="dk1"/>
-          </a:effectRef>
-          <a:fontRef idx="minor">
-            <a:schemeClr val="dk1"/>
-          </a:fontRef>
-        </p:style>
-        <p:txBody>
-          <a:bodyPr rtlCol="0" anchor="ctr"/>
-          <a:lstStyle/>
-          <a:p>
-            <a:pPr algn="ctr"/>
-            <a:endParaRPr lang="de-DE"/>
-          </a:p>
-        </p:txBody>
-      </p:sp>
-      <p:cxnSp>
-        <p:nvCxnSpPr>
-          <p:cNvPr id="10" name="Elbow Connector 9"/>
-          <p:cNvCxnSpPr>
-            <a:stCxn id="9" idx="3"/>
-            <a:endCxn id="5" idx="1"/>
-          </p:cNvCxnSpPr>
-          <p:nvPr/>
-        </p:nvCxnSpPr>
-        <p:spPr>
-          <a:xfrm rot="16200000" flipH="1">
-            <a:off x="649122" y="4973474"/>
-            <a:ext cx="1077613" cy="360649"/>
-          </a:xfrm>
-          <a:prstGeom prst="bentConnector2">
-            <a:avLst/>
-          </a:prstGeom>
-        </p:spPr>
-        <p:style>
-          <a:lnRef idx="2">
-            <a:schemeClr val="dk1"/>
-          </a:lnRef>
-          <a:fillRef idx="0">
-            <a:schemeClr val="dk1"/>
-          </a:fillRef>
-          <a:effectRef idx="1">
-            <a:schemeClr val="dk1"/>
-          </a:effectRef>
-          <a:fontRef idx="minor">
-            <a:schemeClr val="tx1"/>
-          </a:fontRef>
-        </p:style>
-      </p:cxnSp>
-      <p:cxnSp>
-        <p:nvCxnSpPr>
-          <p:cNvPr id="11" name="Elbow Connector 10"/>
-          <p:cNvCxnSpPr>
-            <a:stCxn id="9" idx="3"/>
-            <a:endCxn id="6" idx="1"/>
-          </p:cNvCxnSpPr>
-          <p:nvPr/>
-        </p:nvCxnSpPr>
-        <p:spPr>
-          <a:xfrm rot="16200000" flipH="1">
-            <a:off x="2075622" y="3546975"/>
-            <a:ext cx="780289" cy="2916324"/>
-          </a:xfrm>
-          <a:prstGeom prst="bentConnector2">
-            <a:avLst/>
-          </a:prstGeom>
-        </p:spPr>
-        <p:style>
-          <a:lnRef idx="2">
-            <a:schemeClr val="dk1"/>
-          </a:lnRef>
-          <a:fillRef idx="0">
-            <a:schemeClr val="dk1"/>
-          </a:fillRef>
-          <a:effectRef idx="1">
-            <a:schemeClr val="dk1"/>
-          </a:effectRef>
-          <a:fontRef idx="minor">
-            <a:schemeClr val="tx1"/>
-          </a:fontRef>
-        </p:style>
-      </p:cxnSp>
-      <p:cxnSp>
-        <p:nvCxnSpPr>
-          <p:cNvPr id="12" name="Elbow Connector 11"/>
-          <p:cNvCxnSpPr>
-            <a:stCxn id="9" idx="3"/>
-            <a:endCxn id="7" idx="1"/>
-          </p:cNvCxnSpPr>
-          <p:nvPr/>
-        </p:nvCxnSpPr>
-        <p:spPr>
-          <a:xfrm rot="16200000" flipH="1">
-            <a:off x="935768" y="4686829"/>
-            <a:ext cx="467708" cy="324036"/>
-          </a:xfrm>
-          <a:prstGeom prst="bentConnector2">
-            <a:avLst/>
-          </a:prstGeom>
-        </p:spPr>
-        <p:style>
-          <a:lnRef idx="2">
-            <a:schemeClr val="dk1"/>
-          </a:lnRef>
-          <a:fillRef idx="0">
-            <a:schemeClr val="dk1"/>
-          </a:fillRef>
-          <a:effectRef idx="1">
-            <a:schemeClr val="dk1"/>
-          </a:effectRef>
-          <a:fontRef idx="minor">
-            <a:schemeClr val="tx1"/>
-          </a:fontRef>
-        </p:style>
-      </p:cxnSp>
-      <p:cxnSp>
-        <p:nvCxnSpPr>
-          <p:cNvPr id="13" name="Elbow Connector 12"/>
-          <p:cNvCxnSpPr>
-            <a:stCxn id="9" idx="3"/>
-            <a:endCxn id="8" idx="1"/>
-          </p:cNvCxnSpPr>
-          <p:nvPr/>
-        </p:nvCxnSpPr>
-        <p:spPr>
-          <a:xfrm rot="16200000" flipH="1">
-            <a:off x="2365855" y="3256741"/>
-            <a:ext cx="150801" cy="2867303"/>
-          </a:xfrm>
-          <a:prstGeom prst="bentConnector2">
-            <a:avLst/>
-          </a:prstGeom>
-        </p:spPr>
-        <p:style>
-          <a:lnRef idx="2">
-            <a:schemeClr val="dk1"/>
-          </a:lnRef>
-          <a:fillRef idx="0">
-            <a:schemeClr val="dk1"/>
-          </a:fillRef>
-          <a:effectRef idx="1">
-            <a:schemeClr val="dk1"/>
-          </a:effectRef>
-          <a:fontRef idx="minor">
-            <a:schemeClr val="tx1"/>
-          </a:fontRef>
-        </p:style>
-      </p:cxnSp>
-      <p:sp>
-        <p:nvSpPr>
-          <p:cNvPr id="14" name="TextBox 13"/>
-          <p:cNvSpPr txBox="1"/>
-          <p:nvPr/>
-        </p:nvSpPr>
-        <p:spPr>
-          <a:xfrm>
-            <a:off x="4225902" y="2009165"/>
-            <a:ext cx="1786258" cy="646331"/>
-          </a:xfrm>
-          <a:prstGeom prst="rect">
-            <a:avLst/>
-          </a:prstGeom>
-          <a:solidFill>
-            <a:schemeClr val="bg2"/>
-          </a:solidFill>
-          <a:ln/>
-        </p:spPr>
-        <p:style>
-          <a:lnRef idx="2">
-            <a:schemeClr val="dk1"/>
-          </a:lnRef>
-          <a:fillRef idx="1">
-            <a:schemeClr val="lt1"/>
-          </a:fillRef>
-          <a:effectRef idx="0">
-            <a:schemeClr val="dk1"/>
-          </a:effectRef>
-          <a:fontRef idx="minor">
-            <a:schemeClr val="dk1"/>
-          </a:fontRef>
-        </p:style>
-        <p:txBody>
-          <a:bodyPr wrap="none" rtlCol="0">
-            <a:spAutoFit/>
-          </a:bodyPr>
-          <a:lstStyle/>
-          <a:p>
-            <a:r>
-              <a:rPr lang="de-DE" i="1" dirty="0" smtClean="0"/>
-              <a:t>CorpusFrequency</a:t>
-            </a:r>
-          </a:p>
-          <a:p>
-            <a:r>
-              <a:rPr lang="de-DE" dirty="0" smtClean="0"/>
-              <a:t>rdf:value: int</a:t>
-            </a:r>
-            <a:endParaRPr lang="de-DE" dirty="0"/>
-          </a:p>
-        </p:txBody>
-      </p:sp>
-      <p:sp>
-        <p:nvSpPr>
-          <p:cNvPr id="16" name="TextBox 15"/>
-          <p:cNvSpPr txBox="1"/>
-          <p:nvPr/>
-        </p:nvSpPr>
-        <p:spPr>
-          <a:xfrm>
-            <a:off x="2411760" y="2636912"/>
-            <a:ext cx="1130631" cy="369332"/>
-          </a:xfrm>
-          <a:prstGeom prst="rect">
-            <a:avLst/>
-          </a:prstGeom>
-          <a:noFill/>
-        </p:spPr>
-        <p:txBody>
-          <a:bodyPr wrap="none" rtlCol="0">
-            <a:spAutoFit/>
-          </a:bodyPr>
-          <a:lstStyle/>
-          <a:p>
-            <a:r>
-              <a:rPr lang="de-DE" i="1" dirty="0" smtClean="0"/>
-              <a:t>frequency</a:t>
-            </a:r>
-            <a:endParaRPr lang="de-DE" i="1" dirty="0"/>
-          </a:p>
-        </p:txBody>
-      </p:sp>
-      <p:cxnSp>
-        <p:nvCxnSpPr>
-          <p:cNvPr id="18" name="Straight Arrow Connector 17"/>
-          <p:cNvCxnSpPr>
-            <a:stCxn id="14" idx="3"/>
-            <a:endCxn id="74" idx="1"/>
-          </p:cNvCxnSpPr>
-          <p:nvPr/>
-        </p:nvCxnSpPr>
-        <p:spPr>
-          <a:xfrm flipV="1">
-            <a:off x="6012160" y="2332330"/>
-            <a:ext cx="1172534" cy="1"/>
-          </a:xfrm>
-          <a:prstGeom prst="straightConnector1">
-            <a:avLst/>
-          </a:prstGeom>
-          <a:ln>
-            <a:tailEnd type="arrow"/>
-          </a:ln>
-        </p:spPr>
-        <p:style>
-          <a:lnRef idx="2">
-            <a:schemeClr val="dk1"/>
-          </a:lnRef>
-          <a:fillRef idx="0">
-            <a:schemeClr val="dk1"/>
-          </a:fillRef>
-          <a:effectRef idx="1">
-            <a:schemeClr val="dk1"/>
-          </a:effectRef>
-          <a:fontRef idx="minor">
-            <a:schemeClr val="tx1"/>
-          </a:fontRef>
-        </p:style>
-      </p:cxnSp>
-      <p:sp>
-        <p:nvSpPr>
-          <p:cNvPr id="19" name="TextBox 18"/>
-          <p:cNvSpPr txBox="1"/>
-          <p:nvPr/>
-        </p:nvSpPr>
-        <p:spPr>
-          <a:xfrm>
-            <a:off x="6204343" y="1916832"/>
-            <a:ext cx="815929" cy="369332"/>
-          </a:xfrm>
-          <a:prstGeom prst="rect">
-            <a:avLst/>
-          </a:prstGeom>
-          <a:noFill/>
-        </p:spPr>
-        <p:txBody>
-          <a:bodyPr wrap="none" rtlCol="0">
-            <a:spAutoFit/>
-          </a:bodyPr>
-          <a:lstStyle/>
-          <a:p>
-            <a:r>
-              <a:rPr lang="de-DE" i="1" dirty="0" smtClean="0"/>
-              <a:t>corpus</a:t>
-            </a:r>
-            <a:endParaRPr lang="de-DE" i="1" dirty="0"/>
-          </a:p>
-        </p:txBody>
-      </p:sp>
-      <p:cxnSp>
-        <p:nvCxnSpPr>
-          <p:cNvPr id="20" name="Straight Connector 19"/>
-          <p:cNvCxnSpPr>
-            <a:stCxn id="14" idx="1"/>
-            <a:endCxn id="14" idx="3"/>
-          </p:cNvCxnSpPr>
-          <p:nvPr/>
-        </p:nvCxnSpPr>
-        <p:spPr>
-          <a:xfrm>
-            <a:off x="4225902" y="2332331"/>
-            <a:ext cx="1786258" cy="0"/>
-          </a:xfrm>
-          <a:prstGeom prst="line">
-            <a:avLst/>
-          </a:prstGeom>
-        </p:spPr>
-        <p:style>
-          <a:lnRef idx="1">
-            <a:schemeClr val="dk1"/>
-          </a:lnRef>
-          <a:fillRef idx="0">
-            <a:schemeClr val="dk1"/>
-          </a:fillRef>
-          <a:effectRef idx="0">
-            <a:schemeClr val="dk1"/>
-          </a:effectRef>
-          <a:fontRef idx="minor">
-            <a:schemeClr val="tx1"/>
-          </a:fontRef>
-        </p:style>
-      </p:cxnSp>
-      <p:sp>
-        <p:nvSpPr>
-          <p:cNvPr id="74" name="TextBox 73"/>
-          <p:cNvSpPr txBox="1"/>
-          <p:nvPr/>
-        </p:nvSpPr>
-        <p:spPr>
-          <a:xfrm>
-            <a:off x="7184694" y="2009164"/>
-            <a:ext cx="987706" cy="646331"/>
-          </a:xfrm>
-          <a:prstGeom prst="rect">
-            <a:avLst/>
-          </a:prstGeom>
-          <a:solidFill>
-            <a:schemeClr val="bg2"/>
-          </a:solidFill>
-          <a:ln/>
-        </p:spPr>
-        <p:style>
-          <a:lnRef idx="2">
-            <a:schemeClr val="dk1"/>
-          </a:lnRef>
-          <a:fillRef idx="1">
-            <a:schemeClr val="lt1"/>
-          </a:fillRef>
-          <a:effectRef idx="0">
-            <a:schemeClr val="dk1"/>
-          </a:effectRef>
-          <a:fontRef idx="minor">
-            <a:schemeClr val="dk1"/>
-          </a:fontRef>
-        </p:style>
-        <p:txBody>
-          <a:bodyPr wrap="none" rtlCol="0">
-            <a:spAutoFit/>
-          </a:bodyPr>
-          <a:lstStyle/>
-          <a:p>
-            <a:r>
-              <a:rPr lang="de-DE" i="1" dirty="0" smtClean="0"/>
-              <a:t>Corpus</a:t>
-            </a:r>
-          </a:p>
-          <a:p>
-            <a:r>
-              <a:rPr lang="de-DE" i="1" dirty="0" smtClean="0"/>
-              <a:t>total</a:t>
-            </a:r>
-            <a:r>
-              <a:rPr lang="de-DE" dirty="0" smtClean="0"/>
-              <a:t>: </a:t>
-            </a:r>
-            <a:r>
-              <a:rPr lang="de-DE" dirty="0" smtClean="0"/>
-              <a:t>int</a:t>
-            </a:r>
-            <a:endParaRPr lang="de-DE" dirty="0"/>
-          </a:p>
-        </p:txBody>
-      </p:sp>
-      <p:cxnSp>
-        <p:nvCxnSpPr>
-          <p:cNvPr id="76" name="Straight Connector 75"/>
-          <p:cNvCxnSpPr>
-            <a:stCxn id="74" idx="3"/>
-            <a:endCxn id="74" idx="1"/>
-          </p:cNvCxnSpPr>
-          <p:nvPr/>
-        </p:nvCxnSpPr>
-        <p:spPr>
-          <a:xfrm flipH="1">
-            <a:off x="7184694" y="2332330"/>
-            <a:ext cx="987706" cy="0"/>
-          </a:xfrm>
-          <a:prstGeom prst="line">
-            <a:avLst/>
-          </a:prstGeom>
-        </p:spPr>
-        <p:style>
-          <a:lnRef idx="1">
-            <a:schemeClr val="dk1"/>
-          </a:lnRef>
-          <a:fillRef idx="0">
-            <a:schemeClr val="dk1"/>
-          </a:fillRef>
-          <a:effectRef idx="0">
-            <a:schemeClr val="dk1"/>
-          </a:effectRef>
-          <a:fontRef idx="minor">
-            <a:schemeClr val="tx1"/>
-          </a:fontRef>
-        </p:style>
-      </p:cxnSp>
-      <p:sp>
-        <p:nvSpPr>
-          <p:cNvPr id="2" name="Title 1"/>
+          <p:cNvPr id="4" name="Title 3"/>
           <p:cNvSpPr>
             <a:spLocks noGrp="1"/>
           </p:cNvSpPr>
           <p:nvPr>
-            <p:ph type="title"/>
+            <p:ph type="ctrTitle"/>
           </p:nvPr>
         </p:nvSpPr>
         <p:spPr/>
@@ -14370,7 +15394,7 @@
           <a:p>
             <a:r>
               <a:rPr lang="de-DE" dirty="0" smtClean="0"/>
-              <a:t>Frequency and Attestation</a:t>
+              <a:t>Sandbox</a:t>
             </a:r>
             <a:endParaRPr lang="de-DE" dirty="0"/>
           </a:p>
@@ -14378,366 +15402,37 @@
       </p:sp>
       <p:sp>
         <p:nvSpPr>
-          <p:cNvPr id="90" name="TextBox 89"/>
-          <p:cNvSpPr txBox="1"/>
-          <p:nvPr/>
-        </p:nvSpPr>
-        <p:spPr>
-          <a:xfrm>
-            <a:off x="2339752" y="3717032"/>
-            <a:ext cx="2317814" cy="646331"/>
-          </a:xfrm>
-          <a:prstGeom prst="rect">
-            <a:avLst/>
-          </a:prstGeom>
-          <a:noFill/>
-        </p:spPr>
-        <p:txBody>
-          <a:bodyPr wrap="none" rtlCol="0">
-            <a:spAutoFit/>
-          </a:bodyPr>
-          <a:lstStyle/>
-          <a:p>
-            <a:r>
-              <a:rPr lang="de-DE" i="1" dirty="0" smtClean="0"/>
-              <a:t>attestation</a:t>
-            </a:r>
-          </a:p>
+          <p:cNvPr id="5" name="Subtitle 4"/>
+          <p:cNvSpPr>
+            <a:spLocks noGrp="1"/>
+          </p:cNvSpPr>
+          <p:nvPr>
+            <p:ph type="subTitle" idx="1"/>
+          </p:nvPr>
+        </p:nvSpPr>
+        <p:spPr/>
+        <p:txBody>
+          <a:bodyPr/>
+          <a:lstStyle/>
           <a:p>
             <a:r>
               <a:rPr lang="de-DE" dirty="0" smtClean="0"/>
-              <a:t>subPropertyOf </a:t>
-            </a:r>
-            <a:r>
-              <a:rPr lang="de-DE" i="1" dirty="0" smtClean="0"/>
-              <a:t>citation</a:t>
+              <a:t>Area for drafting extensions</a:t>
             </a:r>
             <a:endParaRPr lang="de-DE" dirty="0"/>
           </a:p>
         </p:txBody>
       </p:sp>
-      <p:cxnSp>
-        <p:nvCxnSpPr>
-          <p:cNvPr id="92" name="Elbow Connector 91"/>
-          <p:cNvCxnSpPr>
-            <a:stCxn id="97" idx="3"/>
-            <a:endCxn id="94" idx="1"/>
-          </p:cNvCxnSpPr>
-          <p:nvPr/>
-        </p:nvCxnSpPr>
-        <p:spPr>
-          <a:xfrm>
-            <a:off x="6352950" y="3543399"/>
-            <a:ext cx="881754" cy="2368"/>
-          </a:xfrm>
-          <a:prstGeom prst="bentConnector3">
-            <a:avLst>
-              <a:gd name="adj1" fmla="val 50000"/>
-            </a:avLst>
-          </a:prstGeom>
-          <a:ln>
-            <a:headEnd type="none" w="med" len="med"/>
-            <a:tailEnd type="arrow" w="med" len="med"/>
-          </a:ln>
-        </p:spPr>
-        <p:style>
-          <a:lnRef idx="2">
-            <a:schemeClr val="dk1"/>
-          </a:lnRef>
-          <a:fillRef idx="0">
-            <a:schemeClr val="dk1"/>
-          </a:fillRef>
-          <a:effectRef idx="1">
-            <a:schemeClr val="dk1"/>
-          </a:effectRef>
-          <a:fontRef idx="minor">
-            <a:schemeClr val="tx1"/>
-          </a:fontRef>
-        </p:style>
-      </p:cxnSp>
-      <p:sp>
-        <p:nvSpPr>
-          <p:cNvPr id="94" name="TextBox 93"/>
-          <p:cNvSpPr txBox="1"/>
-          <p:nvPr/>
-        </p:nvSpPr>
-        <p:spPr>
-          <a:xfrm>
-            <a:off x="7234704" y="3222601"/>
-            <a:ext cx="721672" cy="646331"/>
-          </a:xfrm>
-          <a:prstGeom prst="rect">
-            <a:avLst/>
-          </a:prstGeom>
-          <a:noFill/>
-          <a:ln>
-            <a:prstDash val="sysDot"/>
-          </a:ln>
-        </p:spPr>
-        <p:style>
-          <a:lnRef idx="2">
-            <a:schemeClr val="dk1"/>
-          </a:lnRef>
-          <a:fillRef idx="1">
-            <a:schemeClr val="lt1"/>
-          </a:fillRef>
-          <a:effectRef idx="0">
-            <a:schemeClr val="dk1"/>
-          </a:effectRef>
-          <a:fontRef idx="minor">
-            <a:schemeClr val="dk1"/>
-          </a:fontRef>
-        </p:style>
-        <p:txBody>
-          <a:bodyPr wrap="none" rtlCol="0">
-            <a:spAutoFit/>
-          </a:bodyPr>
-          <a:lstStyle/>
-          <a:p>
-            <a:pPr algn="ctr"/>
-            <a:r>
-              <a:rPr lang="de-DE" dirty="0" smtClean="0"/>
-              <a:t>locus </a:t>
-            </a:r>
-          </a:p>
-          <a:p>
-            <a:pPr algn="ctr"/>
-            <a:r>
-              <a:rPr lang="de-DE" dirty="0" smtClean="0"/>
-              <a:t>URI</a:t>
-            </a:r>
-            <a:endParaRPr lang="de-DE" dirty="0"/>
-          </a:p>
-        </p:txBody>
-      </p:sp>
-      <p:sp>
-        <p:nvSpPr>
-          <p:cNvPr id="95" name="TextBox 94"/>
-          <p:cNvSpPr txBox="1"/>
-          <p:nvPr/>
-        </p:nvSpPr>
-        <p:spPr>
-          <a:xfrm>
-            <a:off x="6423507" y="3140968"/>
-            <a:ext cx="668773" cy="369332"/>
-          </a:xfrm>
-          <a:prstGeom prst="rect">
-            <a:avLst/>
-          </a:prstGeom>
-          <a:noFill/>
-        </p:spPr>
-        <p:txBody>
-          <a:bodyPr wrap="none" rtlCol="0">
-            <a:spAutoFit/>
-          </a:bodyPr>
-          <a:lstStyle/>
-          <a:p>
-            <a:pPr algn="ctr"/>
-            <a:r>
-              <a:rPr lang="de-DE" i="1" dirty="0" smtClean="0"/>
-              <a:t>locus</a:t>
-            </a:r>
-            <a:endParaRPr lang="de-DE" i="1" dirty="0"/>
-          </a:p>
-        </p:txBody>
-      </p:sp>
-      <p:grpSp>
-        <p:nvGrpSpPr>
-          <p:cNvPr id="96" name="Group 95"/>
-          <p:cNvGrpSpPr/>
-          <p:nvPr/>
-        </p:nvGrpSpPr>
-        <p:grpSpPr>
-          <a:xfrm>
-            <a:off x="4009360" y="3081734"/>
-            <a:ext cx="2343590" cy="923330"/>
-            <a:chOff x="8176191" y="6000546"/>
-            <a:chExt cx="2343590" cy="923330"/>
-          </a:xfrm>
-        </p:grpSpPr>
-        <p:sp>
-          <p:nvSpPr>
-            <p:cNvPr id="97" name="TextBox 96"/>
-            <p:cNvSpPr txBox="1"/>
-            <p:nvPr/>
-          </p:nvSpPr>
-          <p:spPr>
-            <a:xfrm>
-              <a:off x="8176191" y="6000546"/>
-              <a:ext cx="2343590" cy="923330"/>
-            </a:xfrm>
-            <a:prstGeom prst="rect">
-              <a:avLst/>
-            </a:prstGeom>
-            <a:solidFill>
-              <a:schemeClr val="bg2"/>
-            </a:solidFill>
-            <a:ln/>
-          </p:spPr>
-          <p:style>
-            <a:lnRef idx="2">
-              <a:schemeClr val="dk1"/>
-            </a:lnRef>
-            <a:fillRef idx="1">
-              <a:schemeClr val="lt1"/>
-            </a:fillRef>
-            <a:effectRef idx="0">
-              <a:schemeClr val="dk1"/>
-            </a:effectRef>
-            <a:fontRef idx="minor">
-              <a:schemeClr val="dk1"/>
-            </a:fontRef>
-          </p:style>
-          <p:txBody>
-            <a:bodyPr wrap="none" rtlCol="0">
-              <a:spAutoFit/>
-            </a:bodyPr>
-            <a:lstStyle/>
-            <a:p>
-              <a:r>
-                <a:rPr lang="de-DE" i="1" dirty="0" smtClean="0"/>
-                <a:t>Attestation</a:t>
-              </a:r>
-            </a:p>
-            <a:p>
-              <a:r>
-                <a:rPr lang="de-DE" dirty="0" smtClean="0"/>
-                <a:t>quotation: </a:t>
-              </a:r>
-              <a:r>
-                <a:rPr lang="de-DE" dirty="0" smtClean="0"/>
-                <a:t>string</a:t>
-              </a:r>
-            </a:p>
-            <a:p>
-              <a:r>
-                <a:rPr lang="de-DE" dirty="0" smtClean="0"/>
-                <a:t>attestationGloss: string</a:t>
-              </a:r>
-              <a:endParaRPr lang="de-DE" dirty="0" smtClean="0"/>
-            </a:p>
-          </p:txBody>
-        </p:sp>
-        <p:cxnSp>
-          <p:nvCxnSpPr>
-            <p:cNvPr id="98" name="Straight Connector 97"/>
-            <p:cNvCxnSpPr/>
-            <p:nvPr/>
-          </p:nvCxnSpPr>
-          <p:spPr>
-            <a:xfrm>
-              <a:off x="8195441" y="6347812"/>
-              <a:ext cx="2290692" cy="0"/>
-            </a:xfrm>
-            <a:prstGeom prst="line">
-              <a:avLst/>
-            </a:prstGeom>
-          </p:spPr>
-          <p:style>
-            <a:lnRef idx="1">
-              <a:schemeClr val="dk1"/>
-            </a:lnRef>
-            <a:fillRef idx="0">
-              <a:schemeClr val="dk1"/>
-            </a:fillRef>
-            <a:effectRef idx="0">
-              <a:schemeClr val="dk1"/>
-            </a:effectRef>
-            <a:fontRef idx="minor">
-              <a:schemeClr val="tx1"/>
-            </a:fontRef>
-          </p:style>
-        </p:cxnSp>
-      </p:grpSp>
-      <p:cxnSp>
-        <p:nvCxnSpPr>
-          <p:cNvPr id="29" name="Curved Connector 28"/>
-          <p:cNvCxnSpPr>
-            <a:stCxn id="4" idx="0"/>
-            <a:endCxn id="14" idx="1"/>
-          </p:cNvCxnSpPr>
-          <p:nvPr/>
-        </p:nvCxnSpPr>
-        <p:spPr>
-          <a:xfrm rot="5400000" flipH="1" flipV="1">
-            <a:off x="1774011" y="1553173"/>
-            <a:ext cx="1672733" cy="3231050"/>
-          </a:xfrm>
-          <a:prstGeom prst="curvedConnector2">
-            <a:avLst/>
-          </a:prstGeom>
-          <a:ln>
-            <a:tailEnd type="arrow"/>
-          </a:ln>
-        </p:spPr>
-        <p:style>
-          <a:lnRef idx="2">
-            <a:schemeClr val="dk1"/>
-          </a:lnRef>
-          <a:fillRef idx="0">
-            <a:schemeClr val="dk1"/>
-          </a:fillRef>
-          <a:effectRef idx="1">
-            <a:schemeClr val="dk1"/>
-          </a:effectRef>
-          <a:fontRef idx="minor">
-            <a:schemeClr val="tx1"/>
-          </a:fontRef>
-        </p:style>
-      </p:cxnSp>
-      <p:cxnSp>
-        <p:nvCxnSpPr>
-          <p:cNvPr id="33" name="Curved Connector 32"/>
-          <p:cNvCxnSpPr>
-            <a:stCxn id="4" idx="0"/>
-            <a:endCxn id="97" idx="1"/>
-          </p:cNvCxnSpPr>
-          <p:nvPr/>
-        </p:nvCxnSpPr>
-        <p:spPr>
-          <a:xfrm rot="5400000" flipH="1" flipV="1">
-            <a:off x="2271274" y="2266978"/>
-            <a:ext cx="461665" cy="3014508"/>
-          </a:xfrm>
-          <a:prstGeom prst="curvedConnector2">
-            <a:avLst/>
-          </a:prstGeom>
-          <a:ln>
-            <a:tailEnd type="arrow"/>
-          </a:ln>
-        </p:spPr>
-        <p:style>
-          <a:lnRef idx="2">
-            <a:schemeClr val="dk1"/>
-          </a:lnRef>
-          <a:fillRef idx="0">
-            <a:schemeClr val="dk1"/>
-          </a:fillRef>
-          <a:effectRef idx="1">
-            <a:schemeClr val="dk1"/>
-          </a:effectRef>
-          <a:fontRef idx="minor">
-            <a:schemeClr val="tx1"/>
-          </a:fontRef>
-        </p:style>
-      </p:cxnSp>
     </p:spTree>
     <p:extLst>
       <p:ext uri="{BB962C8B-B14F-4D97-AF65-F5344CB8AC3E}">
-        <p14:creationId xmlns:p14="http://schemas.microsoft.com/office/powerpoint/2010/main" val="672977862"/>
+        <p14:creationId xmlns:p14="http://schemas.microsoft.com/office/powerpoint/2010/main" val="1139256546"/>
       </p:ext>
     </p:extLst>
   </p:cSld>
   <p:clrMapOvr>
     <a:masterClrMapping/>
   </p:clrMapOvr>
-  <p:timing>
-    <p:tnLst>
-      <p:par>
-        <p:cTn id="1" dur="indefinite" restart="never" nodeType="tmRoot"/>
-      </p:par>
-    </p:tnLst>
-  </p:timing>
 </p:sld>
 </file>
 
@@ -14760,12 +15455,12 @@
       </p:grpSpPr>
       <p:sp>
         <p:nvSpPr>
-          <p:cNvPr id="4" name="Title 3"/>
+          <p:cNvPr id="2" name="Title 1"/>
           <p:cNvSpPr>
             <a:spLocks noGrp="1"/>
           </p:cNvSpPr>
           <p:nvPr>
-            <p:ph type="ctrTitle"/>
+            <p:ph type="title"/>
           </p:nvPr>
         </p:nvSpPr>
         <p:spPr/>
@@ -14775,7 +15470,7 @@
           <a:p>
             <a:r>
               <a:rPr lang="de-DE" dirty="0" smtClean="0"/>
-              <a:t>RELICS</a:t>
+              <a:t>embedding (CC, 2020-06-25)</a:t>
             </a:r>
             <a:endParaRPr lang="de-DE" dirty="0"/>
           </a:p>
@@ -14783,37 +15478,873 @@
       </p:sp>
       <p:sp>
         <p:nvSpPr>
-          <p:cNvPr id="5" name="Subtitle 4"/>
-          <p:cNvSpPr>
-            <a:spLocks noGrp="1"/>
-          </p:cNvSpPr>
-          <p:nvPr>
-            <p:ph type="subTitle" idx="1"/>
-          </p:nvPr>
-        </p:nvSpPr>
-        <p:spPr/>
-        <p:txBody>
-          <a:bodyPr/>
-          <a:lstStyle/>
+          <p:cNvPr id="4" name="TextBox 3"/>
+          <p:cNvSpPr txBox="1"/>
+          <p:nvPr/>
+        </p:nvSpPr>
+        <p:spPr>
+          <a:xfrm>
+            <a:off x="941306" y="2629403"/>
+            <a:ext cx="1237198" cy="369332"/>
+          </a:xfrm>
+          <a:prstGeom prst="rect">
+            <a:avLst/>
+          </a:prstGeom>
+          <a:solidFill>
+            <a:schemeClr val="bg2"/>
+          </a:solidFill>
+          <a:ln>
+            <a:prstDash val="solid"/>
+          </a:ln>
+        </p:spPr>
+        <p:style>
+          <a:lnRef idx="2">
+            <a:schemeClr val="dk1"/>
+          </a:lnRef>
+          <a:fillRef idx="1">
+            <a:schemeClr val="lt1"/>
+          </a:fillRef>
+          <a:effectRef idx="0">
+            <a:schemeClr val="dk1"/>
+          </a:effectRef>
+          <a:fontRef idx="minor">
+            <a:schemeClr val="dk1"/>
+          </a:fontRef>
+        </p:style>
+        <p:txBody>
+          <a:bodyPr wrap="none" rtlCol="0">
+            <a:spAutoFit/>
+          </a:bodyPr>
+          <a:lstStyle/>
+          <a:p>
+            <a:r>
+              <a:rPr lang="de-DE" i="1" dirty="0" smtClean="0"/>
+              <a:t>Observable</a:t>
+            </a:r>
+            <a:endParaRPr lang="de-DE" i="1" dirty="0"/>
+          </a:p>
+        </p:txBody>
+      </p:sp>
+      <p:sp>
+        <p:nvSpPr>
+          <p:cNvPr id="21" name="TextBox 20"/>
+          <p:cNvSpPr txBox="1"/>
+          <p:nvPr/>
+        </p:nvSpPr>
+        <p:spPr>
+          <a:xfrm>
+            <a:off x="3707904" y="2228671"/>
+            <a:ext cx="2180982" cy="1200329"/>
+          </a:xfrm>
+          <a:prstGeom prst="rect">
+            <a:avLst/>
+          </a:prstGeom>
+          <a:solidFill>
+            <a:schemeClr val="bg2"/>
+          </a:solidFill>
+          <a:ln/>
+        </p:spPr>
+        <p:style>
+          <a:lnRef idx="2">
+            <a:schemeClr val="dk1"/>
+          </a:lnRef>
+          <a:fillRef idx="1">
+            <a:schemeClr val="lt1"/>
+          </a:fillRef>
+          <a:effectRef idx="0">
+            <a:schemeClr val="dk1"/>
+          </a:effectRef>
+          <a:fontRef idx="minor">
+            <a:schemeClr val="dk1"/>
+          </a:fontRef>
+        </p:style>
+        <p:txBody>
+          <a:bodyPr wrap="none" rtlCol="0">
+            <a:spAutoFit/>
+          </a:bodyPr>
+          <a:lstStyle/>
+          <a:p>
+            <a:r>
+              <a:rPr lang="de-DE" i="1" dirty="0" smtClean="0"/>
+              <a:t>Embedding</a:t>
+            </a:r>
+            <a:endParaRPr lang="de-DE" dirty="0" smtClean="0"/>
+          </a:p>
           <a:p>
             <a:r>
               <a:rPr lang="de-DE" dirty="0" smtClean="0"/>
-              <a:t>older slides, may be important for understanding how the model evolved</a:t>
+              <a:t>dc:description: </a:t>
+            </a:r>
+            <a:r>
+              <a:rPr lang="de-DE" dirty="0" smtClean="0"/>
+              <a:t>String</a:t>
+            </a:r>
+            <a:endParaRPr lang="de-DE" dirty="0" smtClean="0"/>
+          </a:p>
+          <a:p>
+            <a:r>
+              <a:rPr lang="de-DE" dirty="0" smtClean="0"/>
+              <a:t>dc:extent</a:t>
+            </a:r>
+          </a:p>
+          <a:p>
+            <a:r>
+              <a:rPr lang="de-DE" dirty="0" smtClean="0"/>
+              <a:t>rdf:value</a:t>
+            </a:r>
+            <a:r>
+              <a:rPr lang="de-DE" dirty="0" smtClean="0"/>
+              <a:t>: Literal</a:t>
             </a:r>
             <a:endParaRPr lang="de-DE" dirty="0"/>
           </a:p>
         </p:txBody>
       </p:sp>
+      <p:cxnSp>
+        <p:nvCxnSpPr>
+          <p:cNvPr id="23" name="Straight Arrow Connector 22"/>
+          <p:cNvCxnSpPr>
+            <a:stCxn id="4" idx="3"/>
+            <a:endCxn id="21" idx="1"/>
+          </p:cNvCxnSpPr>
+          <p:nvPr/>
+        </p:nvCxnSpPr>
+        <p:spPr>
+          <a:xfrm>
+            <a:off x="2178504" y="2814069"/>
+            <a:ext cx="1529400" cy="14767"/>
+          </a:xfrm>
+          <a:prstGeom prst="straightConnector1">
+            <a:avLst/>
+          </a:prstGeom>
+          <a:ln>
+            <a:tailEnd type="arrow"/>
+          </a:ln>
+        </p:spPr>
+        <p:style>
+          <a:lnRef idx="2">
+            <a:schemeClr val="dk1"/>
+          </a:lnRef>
+          <a:fillRef idx="0">
+            <a:schemeClr val="dk1"/>
+          </a:fillRef>
+          <a:effectRef idx="1">
+            <a:schemeClr val="dk1"/>
+          </a:effectRef>
+          <a:fontRef idx="minor">
+            <a:schemeClr val="tx1"/>
+          </a:fontRef>
+        </p:style>
+      </p:cxnSp>
+      <p:sp>
+        <p:nvSpPr>
+          <p:cNvPr id="24" name="TextBox 23"/>
+          <p:cNvSpPr txBox="1"/>
+          <p:nvPr/>
+        </p:nvSpPr>
+        <p:spPr>
+          <a:xfrm>
+            <a:off x="2411760" y="2420888"/>
+            <a:ext cx="1234633" cy="369332"/>
+          </a:xfrm>
+          <a:prstGeom prst="rect">
+            <a:avLst/>
+          </a:prstGeom>
+          <a:noFill/>
+        </p:spPr>
+        <p:txBody>
+          <a:bodyPr wrap="none" rtlCol="0">
+            <a:spAutoFit/>
+          </a:bodyPr>
+          <a:lstStyle/>
+          <a:p>
+            <a:r>
+              <a:rPr lang="de-DE" i="1" dirty="0" smtClean="0"/>
+              <a:t>embedding</a:t>
+            </a:r>
+            <a:endParaRPr lang="de-DE" i="1" dirty="0"/>
+          </a:p>
+        </p:txBody>
+      </p:sp>
+      <p:cxnSp>
+        <p:nvCxnSpPr>
+          <p:cNvPr id="29" name="Straight Arrow Connector 28"/>
+          <p:cNvCxnSpPr>
+            <a:stCxn id="21" idx="3"/>
+            <a:endCxn id="12" idx="1"/>
+          </p:cNvCxnSpPr>
+          <p:nvPr/>
+        </p:nvCxnSpPr>
+        <p:spPr>
+          <a:xfrm>
+            <a:off x="5888886" y="2828836"/>
+            <a:ext cx="1050882" cy="12325"/>
+          </a:xfrm>
+          <a:prstGeom prst="straightConnector1">
+            <a:avLst/>
+          </a:prstGeom>
+          <a:ln>
+            <a:tailEnd type="arrow"/>
+          </a:ln>
+        </p:spPr>
+        <p:style>
+          <a:lnRef idx="2">
+            <a:schemeClr val="dk1"/>
+          </a:lnRef>
+          <a:fillRef idx="0">
+            <a:schemeClr val="dk1"/>
+          </a:fillRef>
+          <a:effectRef idx="1">
+            <a:schemeClr val="dk1"/>
+          </a:effectRef>
+          <a:fontRef idx="minor">
+            <a:schemeClr val="tx1"/>
+          </a:fontRef>
+        </p:style>
+      </p:cxnSp>
+      <p:sp>
+        <p:nvSpPr>
+          <p:cNvPr id="32" name="TextBox 31"/>
+          <p:cNvSpPr txBox="1"/>
+          <p:nvPr/>
+        </p:nvSpPr>
+        <p:spPr>
+          <a:xfrm>
+            <a:off x="6060327" y="2430180"/>
+            <a:ext cx="815929" cy="369332"/>
+          </a:xfrm>
+          <a:prstGeom prst="rect">
+            <a:avLst/>
+          </a:prstGeom>
+          <a:noFill/>
+        </p:spPr>
+        <p:txBody>
+          <a:bodyPr wrap="none" rtlCol="0">
+            <a:spAutoFit/>
+          </a:bodyPr>
+          <a:lstStyle/>
+          <a:p>
+            <a:r>
+              <a:rPr lang="de-DE" i="1" dirty="0" smtClean="0"/>
+              <a:t>corpus</a:t>
+            </a:r>
+            <a:endParaRPr lang="de-DE" i="1" dirty="0"/>
+          </a:p>
+        </p:txBody>
+      </p:sp>
+      <p:cxnSp>
+        <p:nvCxnSpPr>
+          <p:cNvPr id="37" name="Straight Connector 36"/>
+          <p:cNvCxnSpPr/>
+          <p:nvPr/>
+        </p:nvCxnSpPr>
+        <p:spPr>
+          <a:xfrm>
+            <a:off x="3707904" y="2532804"/>
+            <a:ext cx="2180982" cy="0"/>
+          </a:xfrm>
+          <a:prstGeom prst="line">
+            <a:avLst/>
+          </a:prstGeom>
+        </p:spPr>
+        <p:style>
+          <a:lnRef idx="1">
+            <a:schemeClr val="dk1"/>
+          </a:lnRef>
+          <a:fillRef idx="0">
+            <a:schemeClr val="dk1"/>
+          </a:fillRef>
+          <a:effectRef idx="0">
+            <a:schemeClr val="dk1"/>
+          </a:effectRef>
+          <a:fontRef idx="minor">
+            <a:schemeClr val="tx1"/>
+          </a:fontRef>
+        </p:style>
+      </p:cxnSp>
+      <p:sp>
+        <p:nvSpPr>
+          <p:cNvPr id="12" name="TextBox 11"/>
+          <p:cNvSpPr txBox="1"/>
+          <p:nvPr/>
+        </p:nvSpPr>
+        <p:spPr>
+          <a:xfrm>
+            <a:off x="6939768" y="2656495"/>
+            <a:ext cx="829073" cy="369332"/>
+          </a:xfrm>
+          <a:prstGeom prst="rect">
+            <a:avLst/>
+          </a:prstGeom>
+          <a:solidFill>
+            <a:schemeClr val="bg2"/>
+          </a:solidFill>
+          <a:ln/>
+        </p:spPr>
+        <p:style>
+          <a:lnRef idx="2">
+            <a:schemeClr val="dk1"/>
+          </a:lnRef>
+          <a:fillRef idx="1">
+            <a:schemeClr val="lt1"/>
+          </a:fillRef>
+          <a:effectRef idx="0">
+            <a:schemeClr val="dk1"/>
+          </a:effectRef>
+          <a:fontRef idx="minor">
+            <a:schemeClr val="dk1"/>
+          </a:fontRef>
+        </p:style>
+        <p:txBody>
+          <a:bodyPr wrap="none" rtlCol="0">
+            <a:spAutoFit/>
+          </a:bodyPr>
+          <a:lstStyle/>
+          <a:p>
+            <a:r>
+              <a:rPr lang="de-DE" i="1" dirty="0" smtClean="0"/>
+              <a:t>Corpus</a:t>
+            </a:r>
+            <a:endParaRPr lang="de-DE" i="1" dirty="0" smtClean="0"/>
+          </a:p>
+        </p:txBody>
+      </p:sp>
+      <p:sp>
+        <p:nvSpPr>
+          <p:cNvPr id="14" name="TextBox 13"/>
+          <p:cNvSpPr txBox="1"/>
+          <p:nvPr/>
+        </p:nvSpPr>
+        <p:spPr>
+          <a:xfrm>
+            <a:off x="1547664" y="4162762"/>
+            <a:ext cx="1959126" cy="923330"/>
+          </a:xfrm>
+          <a:prstGeom prst="rect">
+            <a:avLst/>
+          </a:prstGeom>
+          <a:solidFill>
+            <a:schemeClr val="bg2"/>
+          </a:solidFill>
+        </p:spPr>
+        <p:style>
+          <a:lnRef idx="2">
+            <a:schemeClr val="dk1"/>
+          </a:lnRef>
+          <a:fillRef idx="1">
+            <a:schemeClr val="lt1"/>
+          </a:fillRef>
+          <a:effectRef idx="0">
+            <a:schemeClr val="dk1"/>
+          </a:effectRef>
+          <a:fontRef idx="minor">
+            <a:schemeClr val="dk1"/>
+          </a:fontRef>
+        </p:style>
+        <p:txBody>
+          <a:bodyPr wrap="none" rtlCol="0">
+            <a:spAutoFit/>
+          </a:bodyPr>
+          <a:lstStyle/>
+          <a:p>
+            <a:r>
+              <a:rPr lang="de-DE" i="1" dirty="0" smtClean="0"/>
+              <a:t>TimeSeries</a:t>
+            </a:r>
+          </a:p>
+          <a:p>
+            <a:r>
+              <a:rPr lang="de-DE" dirty="0" smtClean="0"/>
+              <a:t>rdf:value !rdf:JSON</a:t>
+            </a:r>
+          </a:p>
+          <a:p>
+            <a:pPr algn="r"/>
+            <a:r>
+              <a:rPr lang="de-DE" dirty="0" smtClean="0"/>
+              <a:t>(JSON array)</a:t>
+            </a:r>
+            <a:endParaRPr lang="de-DE" dirty="0"/>
+          </a:p>
+        </p:txBody>
+      </p:sp>
+      <p:sp>
+        <p:nvSpPr>
+          <p:cNvPr id="15" name="TextBox 14"/>
+          <p:cNvSpPr txBox="1"/>
+          <p:nvPr/>
+        </p:nvSpPr>
+        <p:spPr>
+          <a:xfrm>
+            <a:off x="3668503" y="4172054"/>
+            <a:ext cx="2199641" cy="923330"/>
+          </a:xfrm>
+          <a:prstGeom prst="rect">
+            <a:avLst/>
+          </a:prstGeom>
+          <a:solidFill>
+            <a:schemeClr val="bg2"/>
+          </a:solidFill>
+        </p:spPr>
+        <p:style>
+          <a:lnRef idx="2">
+            <a:schemeClr val="dk1"/>
+          </a:lnRef>
+          <a:fillRef idx="1">
+            <a:schemeClr val="lt1"/>
+          </a:fillRef>
+          <a:effectRef idx="0">
+            <a:schemeClr val="dk1"/>
+          </a:effectRef>
+          <a:fontRef idx="minor">
+            <a:schemeClr val="dk1"/>
+          </a:fontRef>
+        </p:style>
+        <p:txBody>
+          <a:bodyPr wrap="none" rtlCol="0">
+            <a:spAutoFit/>
+          </a:bodyPr>
+          <a:lstStyle/>
+          <a:p>
+            <a:r>
+              <a:rPr lang="de-DE" i="1" dirty="0" smtClean="0"/>
+              <a:t>Bag (of words)</a:t>
+            </a:r>
+          </a:p>
+          <a:p>
+            <a:r>
+              <a:rPr lang="de-DE" dirty="0" smtClean="0"/>
+              <a:t>rdf:value rdf:JSON</a:t>
+            </a:r>
+          </a:p>
+          <a:p>
+            <a:r>
+              <a:rPr lang="de-DE" dirty="0" smtClean="0"/>
+              <a:t>	(JSON map)</a:t>
+            </a:r>
+            <a:endParaRPr lang="de-DE" dirty="0"/>
+          </a:p>
+        </p:txBody>
+      </p:sp>
+      <p:sp>
+        <p:nvSpPr>
+          <p:cNvPr id="16" name="TextBox 15"/>
+          <p:cNvSpPr txBox="1"/>
+          <p:nvPr/>
+        </p:nvSpPr>
+        <p:spPr>
+          <a:xfrm>
+            <a:off x="6040029" y="4172054"/>
+            <a:ext cx="2636427" cy="923330"/>
+          </a:xfrm>
+          <a:prstGeom prst="rect">
+            <a:avLst/>
+          </a:prstGeom>
+          <a:solidFill>
+            <a:schemeClr val="bg2"/>
+          </a:solidFill>
+        </p:spPr>
+        <p:style>
+          <a:lnRef idx="2">
+            <a:schemeClr val="dk1"/>
+          </a:lnRef>
+          <a:fillRef idx="1">
+            <a:schemeClr val="lt1"/>
+          </a:fillRef>
+          <a:effectRef idx="0">
+            <a:schemeClr val="dk1"/>
+          </a:effectRef>
+          <a:fontRef idx="minor">
+            <a:schemeClr val="dk1"/>
+          </a:fontRef>
+        </p:style>
+        <p:txBody>
+          <a:bodyPr wrap="none" rtlCol="0">
+            <a:spAutoFit/>
+          </a:bodyPr>
+          <a:lstStyle/>
+          <a:p>
+            <a:r>
+              <a:rPr lang="de-DE" i="1" dirty="0" smtClean="0"/>
+              <a:t>FixedSizeVector</a:t>
+            </a:r>
+          </a:p>
+          <a:p>
+            <a:r>
+              <a:rPr lang="de-DE" dirty="0" smtClean="0"/>
+              <a:t>rdf:value ?xsd:string (orig)</a:t>
+            </a:r>
+          </a:p>
+          <a:p>
+            <a:r>
+              <a:rPr lang="de-DE" dirty="0"/>
+              <a:t>	</a:t>
+            </a:r>
+            <a:r>
+              <a:rPr lang="de-DE" dirty="0" smtClean="0"/>
+              <a:t>(JSON array?)</a:t>
+            </a:r>
+          </a:p>
+        </p:txBody>
+      </p:sp>
+      <p:cxnSp>
+        <p:nvCxnSpPr>
+          <p:cNvPr id="17" name="Elbow Connector 16"/>
+          <p:cNvCxnSpPr>
+            <a:stCxn id="14" idx="0"/>
+            <a:endCxn id="20" idx="3"/>
+          </p:cNvCxnSpPr>
+          <p:nvPr/>
+        </p:nvCxnSpPr>
+        <p:spPr>
+          <a:xfrm rot="5400000" flipH="1" flipV="1">
+            <a:off x="3372778" y="2750439"/>
+            <a:ext cx="566772" cy="2257875"/>
+          </a:xfrm>
+          <a:prstGeom prst="bentConnector3">
+            <a:avLst/>
+          </a:prstGeom>
+        </p:spPr>
+        <p:style>
+          <a:lnRef idx="2">
+            <a:schemeClr val="dk1"/>
+          </a:lnRef>
+          <a:fillRef idx="1">
+            <a:schemeClr val="lt1"/>
+          </a:fillRef>
+          <a:effectRef idx="0">
+            <a:schemeClr val="dk1"/>
+          </a:effectRef>
+          <a:fontRef idx="minor">
+            <a:schemeClr val="dk1"/>
+          </a:fontRef>
+        </p:style>
+      </p:cxnSp>
+      <p:cxnSp>
+        <p:nvCxnSpPr>
+          <p:cNvPr id="18" name="Elbow Connector 17"/>
+          <p:cNvCxnSpPr>
+            <a:stCxn id="16" idx="0"/>
+            <a:endCxn id="20" idx="3"/>
+          </p:cNvCxnSpPr>
+          <p:nvPr/>
+        </p:nvCxnSpPr>
+        <p:spPr>
+          <a:xfrm rot="16200000" flipV="1">
+            <a:off x="5783641" y="2597451"/>
+            <a:ext cx="576064" cy="2573141"/>
+          </a:xfrm>
+          <a:prstGeom prst="bentConnector3">
+            <a:avLst/>
+          </a:prstGeom>
+        </p:spPr>
+        <p:style>
+          <a:lnRef idx="2">
+            <a:schemeClr val="dk1"/>
+          </a:lnRef>
+          <a:fillRef idx="1">
+            <a:schemeClr val="lt1"/>
+          </a:fillRef>
+          <a:effectRef idx="0">
+            <a:schemeClr val="dk1"/>
+          </a:effectRef>
+          <a:fontRef idx="minor">
+            <a:schemeClr val="dk1"/>
+          </a:fontRef>
+        </p:style>
+      </p:cxnSp>
+      <p:cxnSp>
+        <p:nvCxnSpPr>
+          <p:cNvPr id="19" name="Straight Connector 18"/>
+          <p:cNvCxnSpPr>
+            <a:stCxn id="15" idx="0"/>
+            <a:endCxn id="20" idx="0"/>
+          </p:cNvCxnSpPr>
+          <p:nvPr/>
+        </p:nvCxnSpPr>
+        <p:spPr>
+          <a:xfrm flipV="1">
+            <a:off x="4768324" y="3429000"/>
+            <a:ext cx="16778" cy="743054"/>
+          </a:xfrm>
+          <a:prstGeom prst="line">
+            <a:avLst/>
+          </a:prstGeom>
+        </p:spPr>
+        <p:style>
+          <a:lnRef idx="2">
+            <a:schemeClr val="dk1"/>
+          </a:lnRef>
+          <a:fillRef idx="1">
+            <a:schemeClr val="lt1"/>
+          </a:fillRef>
+          <a:effectRef idx="0">
+            <a:schemeClr val="dk1"/>
+          </a:effectRef>
+          <a:fontRef idx="minor">
+            <a:schemeClr val="dk1"/>
+          </a:fontRef>
+        </p:style>
+      </p:cxnSp>
+      <p:sp>
+        <p:nvSpPr>
+          <p:cNvPr id="20" name="Isosceles Triangle 19"/>
+          <p:cNvSpPr/>
+          <p:nvPr/>
+        </p:nvSpPr>
+        <p:spPr>
+          <a:xfrm>
+            <a:off x="4725666" y="3429000"/>
+            <a:ext cx="118871" cy="166990"/>
+          </a:xfrm>
+          <a:prstGeom prst="triangle">
+            <a:avLst/>
+          </a:prstGeom>
+          <a:solidFill>
+            <a:schemeClr val="bg1"/>
+          </a:solidFill>
+        </p:spPr>
+        <p:style>
+          <a:lnRef idx="2">
+            <a:schemeClr val="dk1"/>
+          </a:lnRef>
+          <a:fillRef idx="1">
+            <a:schemeClr val="lt1"/>
+          </a:fillRef>
+          <a:effectRef idx="0">
+            <a:schemeClr val="dk1"/>
+          </a:effectRef>
+          <a:fontRef idx="minor">
+            <a:schemeClr val="dk1"/>
+          </a:fontRef>
+        </p:style>
+        <p:txBody>
+          <a:bodyPr rtlCol="0" anchor="ctr"/>
+          <a:lstStyle/>
+          <a:p>
+            <a:pPr algn="ctr"/>
+            <a:endParaRPr lang="de-DE"/>
+          </a:p>
+        </p:txBody>
+      </p:sp>
+      <p:sp>
+        <p:nvSpPr>
+          <p:cNvPr id="22" name="TextBox 21"/>
+          <p:cNvSpPr txBox="1"/>
+          <p:nvPr/>
+        </p:nvSpPr>
+        <p:spPr>
+          <a:xfrm>
+            <a:off x="1572185" y="5540206"/>
+            <a:ext cx="1775679" cy="646331"/>
+          </a:xfrm>
+          <a:prstGeom prst="rect">
+            <a:avLst/>
+          </a:prstGeom>
+          <a:noFill/>
+        </p:spPr>
+        <p:txBody>
+          <a:bodyPr wrap="none" rtlCol="0">
+            <a:spAutoFit/>
+          </a:bodyPr>
+          <a:lstStyle/>
+          <a:p>
+            <a:r>
+              <a:rPr lang="de-DE" dirty="0" smtClean="0"/>
+              <a:t>e.g., recording of</a:t>
+            </a:r>
+          </a:p>
+          <a:p>
+            <a:r>
+              <a:rPr lang="de-DE" dirty="0" smtClean="0"/>
+              <a:t>movements</a:t>
+            </a:r>
+          </a:p>
+        </p:txBody>
+      </p:sp>
+      <p:sp>
+        <p:nvSpPr>
+          <p:cNvPr id="25" name="TextBox 24"/>
+          <p:cNvSpPr txBox="1"/>
+          <p:nvPr/>
+        </p:nvSpPr>
+        <p:spPr>
+          <a:xfrm>
+            <a:off x="3563888" y="5540206"/>
+            <a:ext cx="2343398" cy="923330"/>
+          </a:xfrm>
+          <a:prstGeom prst="rect">
+            <a:avLst/>
+          </a:prstGeom>
+          <a:noFill/>
+        </p:spPr>
+        <p:txBody>
+          <a:bodyPr wrap="none" rtlCol="0">
+            <a:spAutoFit/>
+          </a:bodyPr>
+          <a:lstStyle/>
+          <a:p>
+            <a:r>
+              <a:rPr lang="de-DE" dirty="0" smtClean="0"/>
+              <a:t>e.g., collocation vector,</a:t>
+            </a:r>
+          </a:p>
+          <a:p>
+            <a:r>
+              <a:rPr lang="de-DE" dirty="0" smtClean="0"/>
+              <a:t>weighted by frequency</a:t>
+            </a:r>
+          </a:p>
+          <a:p>
+            <a:r>
+              <a:rPr lang="de-DE" dirty="0" smtClean="0"/>
+              <a:t>or otherwise</a:t>
+            </a:r>
+          </a:p>
+        </p:txBody>
+      </p:sp>
+      <p:sp>
+        <p:nvSpPr>
+          <p:cNvPr id="26" name="TextBox 25"/>
+          <p:cNvSpPr txBox="1"/>
+          <p:nvPr/>
+        </p:nvSpPr>
+        <p:spPr>
+          <a:xfrm>
+            <a:off x="6205832" y="5540206"/>
+            <a:ext cx="2102307" cy="646331"/>
+          </a:xfrm>
+          <a:prstGeom prst="rect">
+            <a:avLst/>
+          </a:prstGeom>
+          <a:noFill/>
+        </p:spPr>
+        <p:txBody>
+          <a:bodyPr wrap="none" rtlCol="0">
+            <a:spAutoFit/>
+          </a:bodyPr>
+          <a:lstStyle/>
+          <a:p>
+            <a:r>
+              <a:rPr lang="de-DE" dirty="0" smtClean="0"/>
+              <a:t>e.g., word (or sense)</a:t>
+            </a:r>
+          </a:p>
+          <a:p>
+            <a:r>
+              <a:rPr lang="de-DE" dirty="0" smtClean="0"/>
+              <a:t>embeddings</a:t>
+            </a:r>
+          </a:p>
+        </p:txBody>
+      </p:sp>
+      <p:cxnSp>
+        <p:nvCxnSpPr>
+          <p:cNvPr id="27" name="Straight Connector 26"/>
+          <p:cNvCxnSpPr/>
+          <p:nvPr/>
+        </p:nvCxnSpPr>
+        <p:spPr>
+          <a:xfrm>
+            <a:off x="1547664" y="4509120"/>
+            <a:ext cx="1959126" cy="0"/>
+          </a:xfrm>
+          <a:prstGeom prst="line">
+            <a:avLst/>
+          </a:prstGeom>
+        </p:spPr>
+        <p:style>
+          <a:lnRef idx="1">
+            <a:schemeClr val="dk1"/>
+          </a:lnRef>
+          <a:fillRef idx="0">
+            <a:schemeClr val="dk1"/>
+          </a:fillRef>
+          <a:effectRef idx="0">
+            <a:schemeClr val="dk1"/>
+          </a:effectRef>
+          <a:fontRef idx="minor">
+            <a:schemeClr val="tx1"/>
+          </a:fontRef>
+        </p:style>
+      </p:cxnSp>
+      <p:cxnSp>
+        <p:nvCxnSpPr>
+          <p:cNvPr id="28" name="Straight Connector 27"/>
+          <p:cNvCxnSpPr/>
+          <p:nvPr/>
+        </p:nvCxnSpPr>
+        <p:spPr>
+          <a:xfrm>
+            <a:off x="3687162" y="4509120"/>
+            <a:ext cx="2180982" cy="0"/>
+          </a:xfrm>
+          <a:prstGeom prst="line">
+            <a:avLst/>
+          </a:prstGeom>
+        </p:spPr>
+        <p:style>
+          <a:lnRef idx="1">
+            <a:schemeClr val="dk1"/>
+          </a:lnRef>
+          <a:fillRef idx="0">
+            <a:schemeClr val="dk1"/>
+          </a:fillRef>
+          <a:effectRef idx="0">
+            <a:schemeClr val="dk1"/>
+          </a:effectRef>
+          <a:fontRef idx="minor">
+            <a:schemeClr val="tx1"/>
+          </a:fontRef>
+        </p:style>
+      </p:cxnSp>
+      <p:cxnSp>
+        <p:nvCxnSpPr>
+          <p:cNvPr id="30" name="Straight Connector 29"/>
+          <p:cNvCxnSpPr/>
+          <p:nvPr/>
+        </p:nvCxnSpPr>
+        <p:spPr>
+          <a:xfrm>
+            <a:off x="6084168" y="4509120"/>
+            <a:ext cx="2592288" cy="0"/>
+          </a:xfrm>
+          <a:prstGeom prst="line">
+            <a:avLst/>
+          </a:prstGeom>
+        </p:spPr>
+        <p:style>
+          <a:lnRef idx="1">
+            <a:schemeClr val="dk1"/>
+          </a:lnRef>
+          <a:fillRef idx="0">
+            <a:schemeClr val="dk1"/>
+          </a:fillRef>
+          <a:effectRef idx="0">
+            <a:schemeClr val="dk1"/>
+          </a:effectRef>
+          <a:fontRef idx="minor">
+            <a:schemeClr val="tx1"/>
+          </a:fontRef>
+        </p:style>
+      </p:cxnSp>
     </p:spTree>
     <p:extLst>
       <p:ext uri="{BB962C8B-B14F-4D97-AF65-F5344CB8AC3E}">
-        <p14:creationId xmlns:p14="http://schemas.microsoft.com/office/powerpoint/2010/main" val="2204541993"/>
+        <p14:creationId xmlns:p14="http://schemas.microsoft.com/office/powerpoint/2010/main" val="3952447650"/>
       </p:ext>
     </p:extLst>
   </p:cSld>
   <p:clrMapOvr>
     <a:masterClrMapping/>
   </p:clrMapOvr>
+  <p:timing>
+    <p:tnLst>
+      <p:par>
+        <p:cTn id="1" dur="indefinite" restart="never" nodeType="tmRoot"/>
+      </p:par>
+    </p:tnLst>
+  </p:timing>
 </p:sld>
 </file>
 
@@ -14836,7 +16367,7 @@
       </p:grpSpPr>
       <p:sp>
         <p:nvSpPr>
-          <p:cNvPr id="2" name="Title 1"/>
+          <p:cNvPr id="4" name="Title 3"/>
           <p:cNvSpPr>
             <a:spLocks noGrp="1"/>
           </p:cNvSpPr>
@@ -14851,7 +16382,7 @@
           <a:p>
             <a:r>
               <a:rPr lang="de-DE" dirty="0" smtClean="0"/>
-              <a:t>initial draft (Nov 2018)</a:t>
+              <a:t>RELICS</a:t>
             </a:r>
             <a:endParaRPr lang="de-DE" dirty="0"/>
           </a:p>
@@ -14859,7 +16390,7 @@
       </p:sp>
       <p:sp>
         <p:nvSpPr>
-          <p:cNvPr id="4" name="Subtitle 3"/>
+          <p:cNvPr id="5" name="Subtitle 4"/>
           <p:cNvSpPr>
             <a:spLocks noGrp="1"/>
           </p:cNvSpPr>
@@ -14872,14 +16403,18 @@
           <a:bodyPr/>
           <a:lstStyle/>
           <a:p>
-            <a:endParaRPr lang="de-DE"/>
+            <a:r>
+              <a:rPr lang="de-DE" dirty="0" smtClean="0"/>
+              <a:t>older slides, may be important for understanding how the model evolved</a:t>
+            </a:r>
+            <a:endParaRPr lang="de-DE" dirty="0"/>
           </a:p>
         </p:txBody>
       </p:sp>
     </p:spTree>
     <p:extLst>
       <p:ext uri="{BB962C8B-B14F-4D97-AF65-F5344CB8AC3E}">
-        <p14:creationId xmlns:p14="http://schemas.microsoft.com/office/powerpoint/2010/main" val="1535454"/>
+        <p14:creationId xmlns:p14="http://schemas.microsoft.com/office/powerpoint/2010/main" val="2204541993"/>
       </p:ext>
     </p:extLst>
   </p:cSld>
@@ -15172,4 +16707,289 @@
   <a:objectDefaults/>
   <a:extraClrSchemeLst/>
 </a:theme>
+</file>
+
+<file path=ppt/theme/theme2.xml><?xml version="1.0" encoding="utf-8"?>
+<a:theme xmlns:a="http://schemas.openxmlformats.org/drawingml/2006/main" name="Office Theme">
+  <a:themeElements>
+    <a:clrScheme name="Office">
+      <a:dk1>
+        <a:sysClr val="windowText" lastClr="000000"/>
+      </a:dk1>
+      <a:lt1>
+        <a:sysClr val="window" lastClr="FFFFFF"/>
+      </a:lt1>
+      <a:dk2>
+        <a:srgbClr val="1F497D"/>
+      </a:dk2>
+      <a:lt2>
+        <a:srgbClr val="EEECE1"/>
+      </a:lt2>
+      <a:accent1>
+        <a:srgbClr val="4F81BD"/>
+      </a:accent1>
+      <a:accent2>
+        <a:srgbClr val="C0504D"/>
+      </a:accent2>
+      <a:accent3>
+        <a:srgbClr val="9BBB59"/>
+      </a:accent3>
+      <a:accent4>
+        <a:srgbClr val="8064A2"/>
+      </a:accent4>
+      <a:accent5>
+        <a:srgbClr val="4BACC6"/>
+      </a:accent5>
+      <a:accent6>
+        <a:srgbClr val="F79646"/>
+      </a:accent6>
+      <a:hlink>
+        <a:srgbClr val="0000FF"/>
+      </a:hlink>
+      <a:folHlink>
+        <a:srgbClr val="800080"/>
+      </a:folHlink>
+    </a:clrScheme>
+    <a:fontScheme name="Office">
+      <a:majorFont>
+        <a:latin typeface="Calibri"/>
+        <a:ea typeface=""/>
+        <a:cs typeface=""/>
+        <a:font script="Jpan" typeface="ＭＳ Ｐゴシック"/>
+        <a:font script="Hang" typeface="맑은 고딕"/>
+        <a:font script="Hans" typeface="宋体"/>
+        <a:font script="Hant" typeface="新細明體"/>
+        <a:font script="Arab" typeface="Times New Roman"/>
+        <a:font script="Hebr" typeface="Times New Roman"/>
+        <a:font script="Thai" typeface="Angsana New"/>
+        <a:font script="Ethi" typeface="Nyala"/>
+        <a:font script="Beng" typeface="Vrinda"/>
+        <a:font script="Gujr" typeface="Shruti"/>
+        <a:font script="Khmr" typeface="MoolBoran"/>
+        <a:font script="Knda" typeface="Tunga"/>
+        <a:font script="Guru" typeface="Raavi"/>
+        <a:font script="Cans" typeface="Euphemia"/>
+        <a:font script="Cher" typeface="Plantagenet Cherokee"/>
+        <a:font script="Yiii" typeface="Microsoft Yi Baiti"/>
+        <a:font script="Tibt" typeface="Microsoft Himalaya"/>
+        <a:font script="Thaa" typeface="MV Boli"/>
+        <a:font script="Deva" typeface="Mangal"/>
+        <a:font script="Telu" typeface="Gautami"/>
+        <a:font script="Taml" typeface="Latha"/>
+        <a:font script="Syrc" typeface="Estrangelo Edessa"/>
+        <a:font script="Orya" typeface="Kalinga"/>
+        <a:font script="Mlym" typeface="Kartika"/>
+        <a:font script="Laoo" typeface="DokChampa"/>
+        <a:font script="Sinh" typeface="Iskoola Pota"/>
+        <a:font script="Mong" typeface="Mongolian Baiti"/>
+        <a:font script="Viet" typeface="Times New Roman"/>
+        <a:font script="Uigh" typeface="Microsoft Uighur"/>
+        <a:font script="Geor" typeface="Sylfaen"/>
+      </a:majorFont>
+      <a:minorFont>
+        <a:latin typeface="Calibri"/>
+        <a:ea typeface=""/>
+        <a:cs typeface=""/>
+        <a:font script="Jpan" typeface="ＭＳ Ｐゴシック"/>
+        <a:font script="Hang" typeface="맑은 고딕"/>
+        <a:font script="Hans" typeface="宋体"/>
+        <a:font script="Hant" typeface="新細明體"/>
+        <a:font script="Arab" typeface="Arial"/>
+        <a:font script="Hebr" typeface="Arial"/>
+        <a:font script="Thai" typeface="Cordia New"/>
+        <a:font script="Ethi" typeface="Nyala"/>
+        <a:font script="Beng" typeface="Vrinda"/>
+        <a:font script="Gujr" typeface="Shruti"/>
+        <a:font script="Khmr" typeface="DaunPenh"/>
+        <a:font script="Knda" typeface="Tunga"/>
+        <a:font script="Guru" typeface="Raavi"/>
+        <a:font script="Cans" typeface="Euphemia"/>
+        <a:font script="Cher" typeface="Plantagenet Cherokee"/>
+        <a:font script="Yiii" typeface="Microsoft Yi Baiti"/>
+        <a:font script="Tibt" typeface="Microsoft Himalaya"/>
+        <a:font script="Thaa" typeface="MV Boli"/>
+        <a:font script="Deva" typeface="Mangal"/>
+        <a:font script="Telu" typeface="Gautami"/>
+        <a:font script="Taml" typeface="Latha"/>
+        <a:font script="Syrc" typeface="Estrangelo Edessa"/>
+        <a:font script="Orya" typeface="Kalinga"/>
+        <a:font script="Mlym" typeface="Kartika"/>
+        <a:font script="Laoo" typeface="DokChampa"/>
+        <a:font script="Sinh" typeface="Iskoola Pota"/>
+        <a:font script="Mong" typeface="Mongolian Baiti"/>
+        <a:font script="Viet" typeface="Arial"/>
+        <a:font script="Uigh" typeface="Microsoft Uighur"/>
+        <a:font script="Geor" typeface="Sylfaen"/>
+      </a:minorFont>
+    </a:fontScheme>
+    <a:fmtScheme name="Office">
+      <a:fillStyleLst>
+        <a:solidFill>
+          <a:schemeClr val="phClr"/>
+        </a:solidFill>
+        <a:gradFill rotWithShape="1">
+          <a:gsLst>
+            <a:gs pos="0">
+              <a:schemeClr val="phClr">
+                <a:tint val="50000"/>
+                <a:satMod val="300000"/>
+              </a:schemeClr>
+            </a:gs>
+            <a:gs pos="35000">
+              <a:schemeClr val="phClr">
+                <a:tint val="37000"/>
+                <a:satMod val="300000"/>
+              </a:schemeClr>
+            </a:gs>
+            <a:gs pos="100000">
+              <a:schemeClr val="phClr">
+                <a:tint val="15000"/>
+                <a:satMod val="350000"/>
+              </a:schemeClr>
+            </a:gs>
+          </a:gsLst>
+          <a:lin ang="16200000" scaled="1"/>
+        </a:gradFill>
+        <a:gradFill rotWithShape="1">
+          <a:gsLst>
+            <a:gs pos="0">
+              <a:schemeClr val="phClr">
+                <a:shade val="51000"/>
+                <a:satMod val="130000"/>
+              </a:schemeClr>
+            </a:gs>
+            <a:gs pos="80000">
+              <a:schemeClr val="phClr">
+                <a:shade val="93000"/>
+                <a:satMod val="130000"/>
+              </a:schemeClr>
+            </a:gs>
+            <a:gs pos="100000">
+              <a:schemeClr val="phClr">
+                <a:shade val="94000"/>
+                <a:satMod val="135000"/>
+              </a:schemeClr>
+            </a:gs>
+          </a:gsLst>
+          <a:lin ang="16200000" scaled="0"/>
+        </a:gradFill>
+      </a:fillStyleLst>
+      <a:lnStyleLst>
+        <a:ln w="9525" cap="flat" cmpd="sng" algn="ctr">
+          <a:solidFill>
+            <a:schemeClr val="phClr">
+              <a:shade val="95000"/>
+              <a:satMod val="105000"/>
+            </a:schemeClr>
+          </a:solidFill>
+          <a:prstDash val="solid"/>
+        </a:ln>
+        <a:ln w="25400" cap="flat" cmpd="sng" algn="ctr">
+          <a:solidFill>
+            <a:schemeClr val="phClr"/>
+          </a:solidFill>
+          <a:prstDash val="solid"/>
+        </a:ln>
+        <a:ln w="38100" cap="flat" cmpd="sng" algn="ctr">
+          <a:solidFill>
+            <a:schemeClr val="phClr"/>
+          </a:solidFill>
+          <a:prstDash val="solid"/>
+        </a:ln>
+      </a:lnStyleLst>
+      <a:effectStyleLst>
+        <a:effectStyle>
+          <a:effectLst>
+            <a:outerShdw blurRad="40000" dist="20000" dir="5400000" rotWithShape="0">
+              <a:srgbClr val="000000">
+                <a:alpha val="38000"/>
+              </a:srgbClr>
+            </a:outerShdw>
+          </a:effectLst>
+        </a:effectStyle>
+        <a:effectStyle>
+          <a:effectLst>
+            <a:outerShdw blurRad="40000" dist="23000" dir="5400000" rotWithShape="0">
+              <a:srgbClr val="000000">
+                <a:alpha val="35000"/>
+              </a:srgbClr>
+            </a:outerShdw>
+          </a:effectLst>
+        </a:effectStyle>
+        <a:effectStyle>
+          <a:effectLst>
+            <a:outerShdw blurRad="40000" dist="23000" dir="5400000" rotWithShape="0">
+              <a:srgbClr val="000000">
+                <a:alpha val="35000"/>
+              </a:srgbClr>
+            </a:outerShdw>
+          </a:effectLst>
+          <a:scene3d>
+            <a:camera prst="orthographicFront">
+              <a:rot lat="0" lon="0" rev="0"/>
+            </a:camera>
+            <a:lightRig rig="threePt" dir="t">
+              <a:rot lat="0" lon="0" rev="1200000"/>
+            </a:lightRig>
+          </a:scene3d>
+          <a:sp3d>
+            <a:bevelT w="63500" h="25400"/>
+          </a:sp3d>
+        </a:effectStyle>
+      </a:effectStyleLst>
+      <a:bgFillStyleLst>
+        <a:solidFill>
+          <a:schemeClr val="phClr"/>
+        </a:solidFill>
+        <a:gradFill rotWithShape="1">
+          <a:gsLst>
+            <a:gs pos="0">
+              <a:schemeClr val="phClr">
+                <a:tint val="40000"/>
+                <a:satMod val="350000"/>
+              </a:schemeClr>
+            </a:gs>
+            <a:gs pos="40000">
+              <a:schemeClr val="phClr">
+                <a:tint val="45000"/>
+                <a:shade val="99000"/>
+                <a:satMod val="350000"/>
+              </a:schemeClr>
+            </a:gs>
+            <a:gs pos="100000">
+              <a:schemeClr val="phClr">
+                <a:shade val="20000"/>
+                <a:satMod val="255000"/>
+              </a:schemeClr>
+            </a:gs>
+          </a:gsLst>
+          <a:path path="circle">
+            <a:fillToRect l="50000" t="-80000" r="50000" b="180000"/>
+          </a:path>
+        </a:gradFill>
+        <a:gradFill rotWithShape="1">
+          <a:gsLst>
+            <a:gs pos="0">
+              <a:schemeClr val="phClr">
+                <a:tint val="80000"/>
+                <a:satMod val="300000"/>
+              </a:schemeClr>
+            </a:gs>
+            <a:gs pos="100000">
+              <a:schemeClr val="phClr">
+                <a:shade val="30000"/>
+                <a:satMod val="200000"/>
+              </a:schemeClr>
+            </a:gs>
+          </a:gsLst>
+          <a:path path="circle">
+            <a:fillToRect l="50000" t="50000" r="50000" b="50000"/>
+          </a:path>
+        </a:gradFill>
+      </a:bgFillStyleLst>
+    </a:fmtScheme>
+  </a:themeElements>
+  <a:objectDefaults/>
+  <a:extraClrSchemeLst/>
+</a:theme>
 </file>
</xml_diff>

<commit_message>
diagrams (pptx) updated according to GlobaLex 2020; todo: static images
</commit_message>
<xml_diff>
--- a/img/source.pptx
+++ b/img/source.pptx
@@ -245,7 +245,7 @@
           <a:p>
             <a:fld id="{5A09DDC8-5590-434B-9C56-6F0CAB9C410A}" type="datetimeFigureOut">
               <a:rPr lang="de-DE" smtClean="0"/>
-              <a:t>25.06.2020</a:t>
+              <a:t>20.09.2020</a:t>
             </a:fld>
             <a:endParaRPr lang="de-DE"/>
           </a:p>
@@ -557,6 +557,14 @@
           <a:bodyPr/>
           <a:lstStyle/>
           <a:p>
+            <a:r>
+              <a:rPr lang="de-DE" dirty="0" smtClean="0"/>
+              <a:t>updated according to Globalex-2020, Collocation, Similarity, and Contextual Relation have not been</a:t>
+            </a:r>
+            <a:r>
+              <a:rPr lang="de-DE" baseline="0" dirty="0" smtClean="0"/>
+              <a:t> discussed yet</a:t>
+            </a:r>
             <a:endParaRPr lang="de-DE" dirty="0"/>
           </a:p>
         </p:txBody>
@@ -778,7 +786,7 @@
           <a:p>
             <a:fld id="{CC555D53-45D0-4CF5-A018-A4852F53D1B1}" type="datetimeFigureOut">
               <a:rPr lang="de-DE" smtClean="0"/>
-              <a:t>25.06.2020</a:t>
+              <a:t>20.09.2020</a:t>
             </a:fld>
             <a:endParaRPr lang="de-DE"/>
           </a:p>
@@ -948,7 +956,7 @@
           <a:p>
             <a:fld id="{CC555D53-45D0-4CF5-A018-A4852F53D1B1}" type="datetimeFigureOut">
               <a:rPr lang="de-DE" smtClean="0"/>
-              <a:t>25.06.2020</a:t>
+              <a:t>20.09.2020</a:t>
             </a:fld>
             <a:endParaRPr lang="de-DE"/>
           </a:p>
@@ -1128,7 +1136,7 @@
           <a:p>
             <a:fld id="{CC555D53-45D0-4CF5-A018-A4852F53D1B1}" type="datetimeFigureOut">
               <a:rPr lang="de-DE" smtClean="0"/>
-              <a:t>25.06.2020</a:t>
+              <a:t>20.09.2020</a:t>
             </a:fld>
             <a:endParaRPr lang="de-DE"/>
           </a:p>
@@ -1298,7 +1306,7 @@
           <a:p>
             <a:fld id="{CC555D53-45D0-4CF5-A018-A4852F53D1B1}" type="datetimeFigureOut">
               <a:rPr lang="de-DE" smtClean="0"/>
-              <a:t>25.06.2020</a:t>
+              <a:t>20.09.2020</a:t>
             </a:fld>
             <a:endParaRPr lang="de-DE"/>
           </a:p>
@@ -1544,7 +1552,7 @@
           <a:p>
             <a:fld id="{CC555D53-45D0-4CF5-A018-A4852F53D1B1}" type="datetimeFigureOut">
               <a:rPr lang="de-DE" smtClean="0"/>
-              <a:t>25.06.2020</a:t>
+              <a:t>20.09.2020</a:t>
             </a:fld>
             <a:endParaRPr lang="de-DE"/>
           </a:p>
@@ -1832,7 +1840,7 @@
           <a:p>
             <a:fld id="{CC555D53-45D0-4CF5-A018-A4852F53D1B1}" type="datetimeFigureOut">
               <a:rPr lang="de-DE" smtClean="0"/>
-              <a:t>25.06.2020</a:t>
+              <a:t>20.09.2020</a:t>
             </a:fld>
             <a:endParaRPr lang="de-DE"/>
           </a:p>
@@ -2254,7 +2262,7 @@
           <a:p>
             <a:fld id="{CC555D53-45D0-4CF5-A018-A4852F53D1B1}" type="datetimeFigureOut">
               <a:rPr lang="de-DE" smtClean="0"/>
-              <a:t>25.06.2020</a:t>
+              <a:t>20.09.2020</a:t>
             </a:fld>
             <a:endParaRPr lang="de-DE"/>
           </a:p>
@@ -2372,7 +2380,7 @@
           <a:p>
             <a:fld id="{CC555D53-45D0-4CF5-A018-A4852F53D1B1}" type="datetimeFigureOut">
               <a:rPr lang="de-DE" smtClean="0"/>
-              <a:t>25.06.2020</a:t>
+              <a:t>20.09.2020</a:t>
             </a:fld>
             <a:endParaRPr lang="de-DE"/>
           </a:p>
@@ -2467,7 +2475,7 @@
           <a:p>
             <a:fld id="{CC555D53-45D0-4CF5-A018-A4852F53D1B1}" type="datetimeFigureOut">
               <a:rPr lang="de-DE" smtClean="0"/>
-              <a:t>25.06.2020</a:t>
+              <a:t>20.09.2020</a:t>
             </a:fld>
             <a:endParaRPr lang="de-DE"/>
           </a:p>
@@ -2744,7 +2752,7 @@
           <a:p>
             <a:fld id="{CC555D53-45D0-4CF5-A018-A4852F53D1B1}" type="datetimeFigureOut">
               <a:rPr lang="de-DE" smtClean="0"/>
-              <a:t>25.06.2020</a:t>
+              <a:t>20.09.2020</a:t>
             </a:fld>
             <a:endParaRPr lang="de-DE"/>
           </a:p>
@@ -2997,7 +3005,7 @@
           <a:p>
             <a:fld id="{CC555D53-45D0-4CF5-A018-A4852F53D1B1}" type="datetimeFigureOut">
               <a:rPr lang="de-DE" smtClean="0"/>
-              <a:t>25.06.2020</a:t>
+              <a:t>20.09.2020</a:t>
             </a:fld>
             <a:endParaRPr lang="de-DE"/>
           </a:p>
@@ -3210,7 +3218,7 @@
           <a:p>
             <a:fld id="{CC555D53-45D0-4CF5-A018-A4852F53D1B1}" type="datetimeFigureOut">
               <a:rPr lang="de-DE" smtClean="0"/>
-              <a:t>25.06.2020</a:t>
+              <a:t>20.09.2020</a:t>
             </a:fld>
             <a:endParaRPr lang="de-DE"/>
           </a:p>
@@ -4871,11 +4879,7 @@
           <a:p>
             <a:r>
               <a:rPr lang="de-DE" dirty="0" smtClean="0"/>
-              <a:t>Frequency and </a:t>
-            </a:r>
-            <a:r>
-              <a:rPr lang="de-DE" dirty="0" smtClean="0"/>
-              <a:t>Attestation (Chiarcos et al. 2020@GlobaLex)</a:t>
+              <a:t>Frequency and Attestation (Chiarcos et al. 2020@GlobaLex)</a:t>
             </a:r>
             <a:endParaRPr lang="de-DE" dirty="0"/>
           </a:p>
@@ -10987,7 +10991,7 @@
         </p:nvSpPr>
         <p:spPr>
           <a:xfrm>
-            <a:off x="376253" y="3983973"/>
+            <a:off x="376253" y="3850091"/>
             <a:ext cx="1237198" cy="369332"/>
           </a:xfrm>
           <a:prstGeom prst="rect">
@@ -11037,7 +11041,7 @@
         </p:nvSpPr>
         <p:spPr>
           <a:xfrm>
-            <a:off x="1368253" y="5559623"/>
+            <a:off x="1368253" y="5218243"/>
             <a:ext cx="1438471" cy="369332"/>
           </a:xfrm>
           <a:prstGeom prst="rect">
@@ -11081,7 +11085,7 @@
         </p:nvSpPr>
         <p:spPr>
           <a:xfrm>
-            <a:off x="3923928" y="5856947"/>
+            <a:off x="3923928" y="5515567"/>
             <a:ext cx="2119106" cy="369332"/>
           </a:xfrm>
           <a:prstGeom prst="rect">
@@ -11125,7 +11129,7 @@
         </p:nvSpPr>
         <p:spPr>
           <a:xfrm>
-            <a:off x="1331640" y="6154271"/>
+            <a:off x="1331640" y="5812891"/>
             <a:ext cx="2348913" cy="369332"/>
           </a:xfrm>
           <a:prstGeom prst="rect">
@@ -11169,8 +11173,8 @@
         </p:nvSpPr>
         <p:spPr>
           <a:xfrm>
-            <a:off x="3874907" y="6451595"/>
-            <a:ext cx="2065245" cy="369332"/>
+            <a:off x="3923929" y="6110215"/>
+            <a:ext cx="2119106" cy="369332"/>
           </a:xfrm>
           <a:prstGeom prst="rect">
             <a:avLst/>
@@ -11192,7 +11196,7 @@
           </a:fontRef>
         </p:style>
         <p:txBody>
-          <a:bodyPr wrap="none" rtlCol="0">
+          <a:bodyPr wrap="square" rtlCol="0">
             <a:spAutoFit/>
           </a:bodyPr>
           <a:lstStyle/>
@@ -11213,7 +11217,7 @@
         </p:nvSpPr>
         <p:spPr>
           <a:xfrm>
-            <a:off x="899592" y="4377878"/>
+            <a:off x="899592" y="4210131"/>
             <a:ext cx="216024" cy="216024"/>
           </a:xfrm>
           <a:prstGeom prst="triangle">
@@ -11254,8 +11258,8 @@
         </p:nvCxnSpPr>
         <p:spPr>
           <a:xfrm rot="16200000" flipH="1">
-            <a:off x="612735" y="4988770"/>
-            <a:ext cx="1150387" cy="360649"/>
+            <a:off x="699551" y="4734207"/>
+            <a:ext cx="976754" cy="360649"/>
           </a:xfrm>
           <a:prstGeom prst="bentConnector2">
             <a:avLst/>
@@ -11287,8 +11291,8 @@
         </p:nvCxnSpPr>
         <p:spPr>
           <a:xfrm rot="16200000" flipH="1">
-            <a:off x="1741911" y="3859595"/>
-            <a:ext cx="1447711" cy="2916324"/>
+            <a:off x="1828727" y="3605032"/>
+            <a:ext cx="1274078" cy="2916324"/>
           </a:xfrm>
           <a:prstGeom prst="bentConnector2">
             <a:avLst/>
@@ -11320,8 +11324,8 @@
         </p:nvCxnSpPr>
         <p:spPr>
           <a:xfrm rot="16200000" flipH="1">
-            <a:off x="297105" y="5304401"/>
-            <a:ext cx="1745035" cy="324036"/>
+            <a:off x="383921" y="5049838"/>
+            <a:ext cx="1571402" cy="324036"/>
           </a:xfrm>
           <a:prstGeom prst="bentConnector2">
             <a:avLst/>
@@ -11353,8 +11357,8 @@
         </p:nvCxnSpPr>
         <p:spPr>
           <a:xfrm rot="16200000" flipH="1">
-            <a:off x="1420076" y="4181429"/>
-            <a:ext cx="2042359" cy="2867303"/>
+            <a:off x="1531403" y="3902355"/>
+            <a:ext cx="1868726" cy="2916325"/>
           </a:xfrm>
           <a:prstGeom prst="bentConnector2">
             <a:avLst/>
@@ -11383,8 +11387,8 @@
         </p:nvSpPr>
         <p:spPr>
           <a:xfrm>
-            <a:off x="3995936" y="3646765"/>
-            <a:ext cx="1786258" cy="646331"/>
+            <a:off x="3995936" y="3707816"/>
+            <a:ext cx="2290692" cy="646331"/>
           </a:xfrm>
           <a:prstGeom prst="rect">
             <a:avLst/>
@@ -11409,7 +11413,7 @@
           </a:fontRef>
         </p:style>
         <p:txBody>
-          <a:bodyPr wrap="none" rtlCol="0">
+          <a:bodyPr wrap="square" rtlCol="0">
             <a:spAutoFit/>
           </a:bodyPr>
           <a:lstStyle/>
@@ -11436,7 +11440,7 @@
         </p:nvSpPr>
         <p:spPr>
           <a:xfrm>
-            <a:off x="2793297" y="3626440"/>
+            <a:off x="2793297" y="3687491"/>
             <a:ext cx="1130631" cy="369332"/>
           </a:xfrm>
           <a:prstGeom prst="rect">
@@ -11469,8 +11473,8 @@
         </p:nvCxnSpPr>
         <p:spPr>
           <a:xfrm flipV="1">
-            <a:off x="5782194" y="3969930"/>
-            <a:ext cx="1670126" cy="1"/>
+            <a:off x="6286628" y="4030981"/>
+            <a:ext cx="1165692" cy="1"/>
           </a:xfrm>
           <a:prstGeom prst="straightConnector1">
             <a:avLst/>
@@ -11502,7 +11506,7 @@
         </p:nvSpPr>
         <p:spPr>
           <a:xfrm>
-            <a:off x="6276351" y="3626440"/>
+            <a:off x="6492375" y="3687491"/>
             <a:ext cx="815929" cy="369332"/>
           </a:xfrm>
           <a:prstGeom prst="rect">
@@ -11535,8 +11539,8 @@
         </p:nvCxnSpPr>
         <p:spPr>
           <a:xfrm>
-            <a:off x="3995936" y="3969931"/>
-            <a:ext cx="1786258" cy="0"/>
+            <a:off x="3995936" y="4030982"/>
+            <a:ext cx="2290692" cy="0"/>
           </a:xfrm>
           <a:prstGeom prst="line">
             <a:avLst/>
@@ -11557,36 +11561,97 @@
           </a:fontRef>
         </p:style>
       </p:cxnSp>
-      <p:sp>
-        <p:nvSpPr>
-          <p:cNvPr id="25" name="TextBox 24"/>
-          <p:cNvSpPr txBox="1"/>
-          <p:nvPr/>
-        </p:nvSpPr>
-        <p:spPr>
-          <a:xfrm>
-            <a:off x="2785861" y="4281297"/>
-            <a:ext cx="1210075" cy="369332"/>
-          </a:xfrm>
-          <a:prstGeom prst="rect">
-            <a:avLst/>
-          </a:prstGeom>
-          <a:noFill/>
-        </p:spPr>
-        <p:txBody>
-          <a:bodyPr wrap="none" rtlCol="0">
-            <a:spAutoFit/>
-          </a:bodyPr>
-          <a:lstStyle/>
-          <a:p>
-            <a:r>
-              <a:rPr lang="de-DE" i="1" dirty="0" smtClean="0"/>
-              <a:t>attestation</a:t>
-            </a:r>
-            <a:endParaRPr lang="de-DE" i="1" dirty="0"/>
-          </a:p>
-        </p:txBody>
-      </p:sp>
+      <mc:AlternateContent xmlns:mc="http://schemas.openxmlformats.org/markup-compatibility/2006">
+        <mc:Choice xmlns:a14="http://schemas.microsoft.com/office/drawing/2010/main" Requires="a14">
+          <p:sp>
+            <p:nvSpPr>
+              <p:cNvPr id="25" name="TextBox 24"/>
+              <p:cNvSpPr txBox="1"/>
+              <p:nvPr/>
+            </p:nvSpPr>
+            <p:spPr>
+              <a:xfrm>
+                <a:off x="2771800" y="4571912"/>
+                <a:ext cx="1262974" cy="646331"/>
+              </a:xfrm>
+              <a:prstGeom prst="rect">
+                <a:avLst/>
+              </a:prstGeom>
+              <a:noFill/>
+            </p:spPr>
+            <p:txBody>
+              <a:bodyPr wrap="none" rtlCol="0">
+                <a:spAutoFit/>
+              </a:bodyPr>
+              <a:lstStyle/>
+              <a:p>
+                <a:r>
+                  <a:rPr lang="de-DE" i="1" dirty="0" smtClean="0"/>
+                  <a:t>attestation </a:t>
+                </a:r>
+                <a:endParaRPr lang="de-DE" b="0" i="1" dirty="0" smtClean="0">
+                  <a:latin typeface="Cambria Math"/>
+                </a:endParaRPr>
+              </a:p>
+              <a:p>
+                <a14:m>
+                  <m:oMath xmlns:m="http://schemas.openxmlformats.org/officeDocument/2006/math">
+                    <m:r>
+                      <a:rPr lang="de-DE" b="0" i="1" smtClean="0">
+                        <a:latin typeface="Cambria Math"/>
+                      </a:rPr>
+                      <m:t>⊑</m:t>
+                    </m:r>
+                  </m:oMath>
+                </a14:m>
+                <a:r>
+                  <a:rPr lang="de-DE" i="1" dirty="0" smtClean="0"/>
+                  <a:t> citation</a:t>
+                </a:r>
+                <a:endParaRPr lang="de-DE" i="1" dirty="0"/>
+              </a:p>
+            </p:txBody>
+          </p:sp>
+        </mc:Choice>
+        <mc:Fallback>
+          <p:sp>
+            <p:nvSpPr>
+              <p:cNvPr id="25" name="TextBox 24"/>
+              <p:cNvSpPr txBox="1">
+                <a:spLocks noRot="1" noChangeAspect="1" noMove="1" noResize="1" noEditPoints="1" noAdjustHandles="1" noChangeArrowheads="1" noChangeShapeType="1" noTextEdit="1"/>
+              </p:cNvSpPr>
+              <p:nvPr/>
+            </p:nvSpPr>
+            <p:spPr>
+              <a:xfrm>
+                <a:off x="2771800" y="4571912"/>
+                <a:ext cx="1262974" cy="646331"/>
+              </a:xfrm>
+              <a:prstGeom prst="rect">
+                <a:avLst/>
+              </a:prstGeom>
+              <a:blipFill rotWithShape="1">
+                <a:blip r:embed="rId3"/>
+                <a:stretch>
+                  <a:fillRect l="-4348" t="-4717" r="-2899" b="-14151"/>
+                </a:stretch>
+              </a:blipFill>
+            </p:spPr>
+            <p:txBody>
+              <a:bodyPr/>
+              <a:lstStyle/>
+              <a:p>
+                <a:r>
+                  <a:rPr lang="de-DE">
+                    <a:noFill/>
+                  </a:rPr>
+                  <a:t> </a:t>
+                </a:r>
+              </a:p>
+            </p:txBody>
+          </p:sp>
+        </mc:Fallback>
+      </mc:AlternateContent>
       <p:cxnSp>
         <p:nvCxnSpPr>
           <p:cNvPr id="27" name="Elbow Connector 26"/>
@@ -11598,12 +11663,12 @@
         </p:nvCxnSpPr>
         <p:spPr>
           <a:xfrm>
-            <a:off x="1613451" y="4168639"/>
-            <a:ext cx="3404161" cy="670904"/>
+            <a:off x="1613451" y="4034757"/>
+            <a:ext cx="2382485" cy="865837"/>
           </a:xfrm>
           <a:prstGeom prst="bentConnector3">
             <a:avLst>
-              <a:gd name="adj1" fmla="val 35014"/>
+              <a:gd name="adj1" fmla="val 50000"/>
             </a:avLst>
           </a:prstGeom>
           <a:ln>
@@ -11634,8 +11699,8 @@
         </p:nvSpPr>
         <p:spPr>
           <a:xfrm>
-            <a:off x="3995936" y="2359837"/>
-            <a:ext cx="2180982" cy="1200329"/>
+            <a:off x="3995935" y="2420888"/>
+            <a:ext cx="2280415" cy="1200329"/>
           </a:xfrm>
           <a:prstGeom prst="rect">
             <a:avLst/>
@@ -11660,7 +11725,7 @@
           </a:fontRef>
         </p:style>
         <p:txBody>
-          <a:bodyPr wrap="none" rtlCol="0">
+          <a:bodyPr wrap="square" rtlCol="0">
             <a:spAutoFit/>
           </a:bodyPr>
           <a:lstStyle/>
@@ -11674,11 +11739,7 @@
           <a:p>
             <a:r>
               <a:rPr lang="de-DE" dirty="0" smtClean="0"/>
-              <a:t>dc:description: </a:t>
-            </a:r>
-            <a:r>
-              <a:rPr lang="de-DE" dirty="0" smtClean="0"/>
-              <a:t>String</a:t>
+              <a:t>dc:description: String</a:t>
             </a:r>
           </a:p>
           <a:p>
@@ -11690,11 +11751,7 @@
           <a:p>
             <a:r>
               <a:rPr lang="de-DE" dirty="0" smtClean="0"/>
-              <a:t>rdf:value</a:t>
-            </a:r>
-            <a:r>
-              <a:rPr lang="de-DE" dirty="0" smtClean="0"/>
-              <a:t>: Literal</a:t>
+              <a:t>rdf:value: Literal</a:t>
             </a:r>
             <a:endParaRPr lang="de-DE" dirty="0"/>
           </a:p>
@@ -11708,7 +11765,7 @@
         </p:nvSpPr>
         <p:spPr>
           <a:xfrm>
-            <a:off x="2699792" y="2552054"/>
+            <a:off x="2699792" y="2613105"/>
             <a:ext cx="1234633" cy="369332"/>
           </a:xfrm>
           <a:prstGeom prst="rect">
@@ -11738,7 +11795,7 @@
         </p:nvCxnSpPr>
         <p:spPr>
           <a:xfrm>
-            <a:off x="3995936" y="2696070"/>
+            <a:off x="3995936" y="2757121"/>
             <a:ext cx="2180982" cy="0"/>
           </a:xfrm>
           <a:prstGeom prst="line">
@@ -11771,8 +11828,8 @@
         </p:nvCxnSpPr>
         <p:spPr>
           <a:xfrm>
-            <a:off x="7308304" y="4839543"/>
-            <a:ext cx="720080" cy="4109"/>
+            <a:off x="6286628" y="4900594"/>
+            <a:ext cx="1165692" cy="4109"/>
           </a:xfrm>
           <a:prstGeom prst="bentConnector3">
             <a:avLst>
@@ -11803,14 +11860,15 @@
         <p:nvCxnSpPr>
           <p:cNvPr id="42" name="Elbow Connector 41"/>
           <p:cNvCxnSpPr>
+            <a:stCxn id="4" idx="3"/>
             <a:endCxn id="32" idx="1"/>
           </p:cNvCxnSpPr>
           <p:nvPr/>
         </p:nvCxnSpPr>
         <p:spPr>
           <a:xfrm flipV="1">
-            <a:off x="1613451" y="2960002"/>
-            <a:ext cx="2382485" cy="1297412"/>
+            <a:off x="1613451" y="3021053"/>
+            <a:ext cx="2382484" cy="1013704"/>
           </a:xfrm>
           <a:prstGeom prst="bentConnector3">
             <a:avLst>
@@ -11841,14 +11899,15 @@
         <p:nvCxnSpPr>
           <p:cNvPr id="47" name="Elbow Connector 46"/>
           <p:cNvCxnSpPr>
+            <a:stCxn id="4" idx="3"/>
             <a:endCxn id="14" idx="1"/>
           </p:cNvCxnSpPr>
           <p:nvPr/>
         </p:nvCxnSpPr>
         <p:spPr>
           <a:xfrm flipV="1">
-            <a:off x="1613451" y="3969931"/>
-            <a:ext cx="2382485" cy="239358"/>
+            <a:off x="1613451" y="4030982"/>
+            <a:ext cx="2382485" cy="3775"/>
           </a:xfrm>
           <a:prstGeom prst="bentConnector3">
             <a:avLst/>
@@ -12010,13 +12069,14 @@
           <p:cNvPr id="58" name="Straight Arrow Connector 57"/>
           <p:cNvCxnSpPr>
             <a:stCxn id="64" idx="2"/>
+            <a:endCxn id="4" idx="0"/>
           </p:cNvCxnSpPr>
           <p:nvPr/>
         </p:nvCxnSpPr>
         <p:spPr>
           <a:xfrm flipH="1">
             <a:off x="994852" y="1983541"/>
-            <a:ext cx="14859" cy="2089207"/>
+            <a:ext cx="14859" cy="1866550"/>
           </a:xfrm>
           <a:prstGeom prst="straightConnector1">
             <a:avLst/>
@@ -12048,7 +12108,7 @@
         </p:nvSpPr>
         <p:spPr>
           <a:xfrm>
-            <a:off x="1319331" y="2049739"/>
+            <a:off x="1115616" y="2049739"/>
             <a:ext cx="1032719" cy="646331"/>
           </a:xfrm>
           <a:prstGeom prst="rect">
@@ -12309,7 +12369,7 @@
         </p:nvSpPr>
         <p:spPr>
           <a:xfrm>
-            <a:off x="4546600" y="1604917"/>
+            <a:off x="4611464" y="1604917"/>
             <a:ext cx="1059906" cy="369332"/>
           </a:xfrm>
           <a:prstGeom prst="rect">
@@ -12359,8 +12419,8 @@
         </p:nvCxnSpPr>
         <p:spPr>
           <a:xfrm rot="16200000" flipH="1">
-            <a:off x="4018832" y="547196"/>
-            <a:ext cx="206732" cy="1908709"/>
+            <a:off x="4051264" y="514764"/>
+            <a:ext cx="206732" cy="1973573"/>
           </a:xfrm>
           <a:prstGeom prst="bentConnector3">
             <a:avLst>
@@ -12393,9 +12453,9 @@
           <p:nvPr/>
         </p:nvCxnSpPr>
         <p:spPr>
-          <a:xfrm>
-            <a:off x="5076553" y="1974249"/>
-            <a:ext cx="9874" cy="385588"/>
+          <a:xfrm flipH="1">
+            <a:off x="5136143" y="1974249"/>
+            <a:ext cx="5274" cy="446639"/>
           </a:xfrm>
           <a:prstGeom prst="straightConnector1">
             <a:avLst/>
@@ -12427,7 +12487,7 @@
         </p:nvSpPr>
         <p:spPr>
           <a:xfrm>
-            <a:off x="5207768" y="1964957"/>
+            <a:off x="5207768" y="2051556"/>
             <a:ext cx="2460576" cy="369332"/>
           </a:xfrm>
           <a:prstGeom prst="rect">
@@ -12522,111 +12582,6 @@
           </a:p>
         </p:txBody>
       </p:sp>
-      <p:sp>
-        <p:nvSpPr>
-          <p:cNvPr id="71" name="TextBox 70"/>
-          <p:cNvSpPr txBox="1"/>
-          <p:nvPr/>
-        </p:nvSpPr>
-        <p:spPr>
-          <a:xfrm>
-            <a:off x="3995936" y="5291916"/>
-            <a:ext cx="917302" cy="369332"/>
-          </a:xfrm>
-          <a:prstGeom prst="rect">
-            <a:avLst/>
-          </a:prstGeom>
-          <a:solidFill>
-            <a:schemeClr val="bg2"/>
-          </a:solidFill>
-          <a:ln/>
-        </p:spPr>
-        <p:style>
-          <a:lnRef idx="2">
-            <a:schemeClr val="dk1"/>
-          </a:lnRef>
-          <a:fillRef idx="1">
-            <a:schemeClr val="lt1"/>
-          </a:fillRef>
-          <a:effectRef idx="0">
-            <a:schemeClr val="dk1"/>
-          </a:effectRef>
-          <a:fontRef idx="minor">
-            <a:schemeClr val="dk1"/>
-          </a:fontRef>
-        </p:style>
-        <p:txBody>
-          <a:bodyPr wrap="none" rtlCol="0">
-            <a:spAutoFit/>
-          </a:bodyPr>
-          <a:lstStyle/>
-          <a:p>
-            <a:r>
-              <a:rPr lang="de-DE" i="1" dirty="0" smtClean="0"/>
-              <a:t>Citation</a:t>
-            </a:r>
-          </a:p>
-        </p:txBody>
-      </p:sp>
-      <p:sp>
-        <p:nvSpPr>
-          <p:cNvPr id="73" name="TextBox 72"/>
-          <p:cNvSpPr txBox="1"/>
-          <p:nvPr/>
-        </p:nvSpPr>
-        <p:spPr>
-          <a:xfrm>
-            <a:off x="2843808" y="5075892"/>
-            <a:ext cx="891462" cy="369332"/>
-          </a:xfrm>
-          <a:prstGeom prst="rect">
-            <a:avLst/>
-          </a:prstGeom>
-          <a:noFill/>
-        </p:spPr>
-        <p:txBody>
-          <a:bodyPr wrap="none" rtlCol="0">
-            <a:spAutoFit/>
-          </a:bodyPr>
-          <a:lstStyle/>
-          <a:p>
-            <a:r>
-              <a:rPr lang="de-DE" i="1" dirty="0" smtClean="0"/>
-              <a:t>citation</a:t>
-            </a:r>
-            <a:endParaRPr lang="de-DE" i="1" dirty="0"/>
-          </a:p>
-        </p:txBody>
-      </p:sp>
-      <p:sp>
-        <p:nvSpPr>
-          <p:cNvPr id="75" name="TextBox 74"/>
-          <p:cNvSpPr txBox="1"/>
-          <p:nvPr/>
-        </p:nvSpPr>
-        <p:spPr>
-          <a:xfrm>
-            <a:off x="6284767" y="5445224"/>
-            <a:ext cx="1815625" cy="369332"/>
-          </a:xfrm>
-          <a:prstGeom prst="rect">
-            <a:avLst/>
-          </a:prstGeom>
-          <a:noFill/>
-        </p:spPr>
-        <p:txBody>
-          <a:bodyPr wrap="none" rtlCol="0">
-            <a:spAutoFit/>
-          </a:bodyPr>
-          <a:lstStyle/>
-          <a:p>
-            <a:r>
-              <a:rPr lang="de-DE" i="1" dirty="0" smtClean="0"/>
-              <a:t>makesAttestation</a:t>
-            </a:r>
-          </a:p>
-        </p:txBody>
-      </p:sp>
       <p:grpSp>
         <p:nvGrpSpPr>
           <p:cNvPr id="77" name="Group 76"/>
@@ -12635,7 +12590,7 @@
         </p:nvGrpSpPr>
         <p:grpSpPr>
           <a:xfrm>
-            <a:off x="5017612" y="4377878"/>
+            <a:off x="3995936" y="4438929"/>
             <a:ext cx="2290692" cy="923330"/>
             <a:chOff x="8176191" y="6138279"/>
             <a:chExt cx="2290692" cy="923330"/>
@@ -12730,82 +12685,6 @@
           </p:style>
         </p:cxnSp>
       </p:grpSp>
-      <p:cxnSp>
-        <p:nvCxnSpPr>
-          <p:cNvPr id="82" name="Elbow Connector 81"/>
-          <p:cNvCxnSpPr>
-            <a:stCxn id="4" idx="3"/>
-            <a:endCxn id="71" idx="1"/>
-          </p:cNvCxnSpPr>
-          <p:nvPr/>
-        </p:nvCxnSpPr>
-        <p:spPr>
-          <a:xfrm>
-            <a:off x="1613451" y="4168639"/>
-            <a:ext cx="2382485" cy="1307943"/>
-          </a:xfrm>
-          <a:prstGeom prst="bentConnector3">
-            <a:avLst>
-              <a:gd name="adj1" fmla="val 50000"/>
-            </a:avLst>
-          </a:prstGeom>
-          <a:ln>
-            <a:headEnd type="none" w="med" len="med"/>
-            <a:tailEnd type="arrow" w="med" len="med"/>
-          </a:ln>
-        </p:spPr>
-        <p:style>
-          <a:lnRef idx="2">
-            <a:schemeClr val="dk1"/>
-          </a:lnRef>
-          <a:fillRef idx="0">
-            <a:schemeClr val="dk1"/>
-          </a:fillRef>
-          <a:effectRef idx="1">
-            <a:schemeClr val="dk1"/>
-          </a:effectRef>
-          <a:fontRef idx="minor">
-            <a:schemeClr val="tx1"/>
-          </a:fontRef>
-        </p:style>
-      </p:cxnSp>
-      <p:cxnSp>
-        <p:nvCxnSpPr>
-          <p:cNvPr id="83" name="Elbow Connector 82"/>
-          <p:cNvCxnSpPr>
-            <a:stCxn id="71" idx="3"/>
-            <a:endCxn id="79" idx="2"/>
-          </p:cNvCxnSpPr>
-          <p:nvPr/>
-        </p:nvCxnSpPr>
-        <p:spPr>
-          <a:xfrm flipV="1">
-            <a:off x="4913238" y="5301208"/>
-            <a:ext cx="1249720" cy="175374"/>
-          </a:xfrm>
-          <a:prstGeom prst="bentConnector2">
-            <a:avLst/>
-          </a:prstGeom>
-          <a:ln>
-            <a:headEnd type="none" w="med" len="med"/>
-            <a:tailEnd type="arrow" w="med" len="med"/>
-          </a:ln>
-        </p:spPr>
-        <p:style>
-          <a:lnRef idx="2">
-            <a:schemeClr val="dk1"/>
-          </a:lnRef>
-          <a:fillRef idx="0">
-            <a:schemeClr val="dk1"/>
-          </a:fillRef>
-          <a:effectRef idx="1">
-            <a:schemeClr val="dk1"/>
-          </a:effectRef>
-          <a:fontRef idx="minor">
-            <a:schemeClr val="tx1"/>
-          </a:fontRef>
-        </p:style>
-      </p:cxnSp>
       <p:sp>
         <p:nvSpPr>
           <p:cNvPr id="68" name="TextBox 67"/>
@@ -12814,8 +12693,8 @@
         </p:nvSpPr>
         <p:spPr>
           <a:xfrm>
-            <a:off x="8028384" y="4520486"/>
-            <a:ext cx="721672" cy="646331"/>
+            <a:off x="7452320" y="4581537"/>
+            <a:ext cx="987706" cy="646331"/>
           </a:xfrm>
           <a:prstGeom prst="rect">
             <a:avLst/>
@@ -12840,6 +12719,44 @@
           </a:fontRef>
         </p:style>
         <p:txBody>
+          <a:bodyPr wrap="square" rtlCol="0">
+            <a:spAutoFit/>
+          </a:bodyPr>
+          <a:lstStyle/>
+          <a:p>
+            <a:pPr algn="ctr"/>
+            <a:r>
+              <a:rPr lang="de-DE" dirty="0" smtClean="0"/>
+              <a:t>locus </a:t>
+            </a:r>
+          </a:p>
+          <a:p>
+            <a:pPr algn="ctr"/>
+            <a:r>
+              <a:rPr lang="de-DE" dirty="0" smtClean="0"/>
+              <a:t>URI</a:t>
+            </a:r>
+            <a:endParaRPr lang="de-DE" dirty="0"/>
+          </a:p>
+        </p:txBody>
+      </p:sp>
+      <p:sp>
+        <p:nvSpPr>
+          <p:cNvPr id="72" name="TextBox 71"/>
+          <p:cNvSpPr txBox="1"/>
+          <p:nvPr/>
+        </p:nvSpPr>
+        <p:spPr>
+          <a:xfrm>
+            <a:off x="6567523" y="4560879"/>
+            <a:ext cx="668773" cy="369332"/>
+          </a:xfrm>
+          <a:prstGeom prst="rect">
+            <a:avLst/>
+          </a:prstGeom>
+          <a:noFill/>
+        </p:spPr>
+        <p:txBody>
           <a:bodyPr wrap="none" rtlCol="0">
             <a:spAutoFit/>
           </a:bodyPr>
@@ -12847,44 +12764,6 @@
           <a:p>
             <a:pPr algn="ctr"/>
             <a:r>
-              <a:rPr lang="de-DE" dirty="0" smtClean="0"/>
-              <a:t>locus </a:t>
-            </a:r>
-          </a:p>
-          <a:p>
-            <a:pPr algn="ctr"/>
-            <a:r>
-              <a:rPr lang="de-DE" dirty="0" smtClean="0"/>
-              <a:t>URI</a:t>
-            </a:r>
-            <a:endParaRPr lang="de-DE" dirty="0"/>
-          </a:p>
-        </p:txBody>
-      </p:sp>
-      <p:sp>
-        <p:nvSpPr>
-          <p:cNvPr id="72" name="TextBox 71"/>
-          <p:cNvSpPr txBox="1"/>
-          <p:nvPr/>
-        </p:nvSpPr>
-        <p:spPr>
-          <a:xfrm>
-            <a:off x="7308304" y="4365104"/>
-            <a:ext cx="668773" cy="369332"/>
-          </a:xfrm>
-          <a:prstGeom prst="rect">
-            <a:avLst/>
-          </a:prstGeom>
-          <a:noFill/>
-        </p:spPr>
-        <p:txBody>
-          <a:bodyPr wrap="none" rtlCol="0">
-            <a:spAutoFit/>
-          </a:bodyPr>
-          <a:lstStyle/>
-          <a:p>
-            <a:pPr algn="ctr"/>
-            <a:r>
               <a:rPr lang="de-DE" i="1" dirty="0" smtClean="0"/>
               <a:t>locus</a:t>
             </a:r>
@@ -12900,7 +12779,7 @@
         </p:nvSpPr>
         <p:spPr>
           <a:xfrm>
-            <a:off x="7452320" y="3646764"/>
+            <a:off x="7452320" y="3707815"/>
             <a:ext cx="987706" cy="646331"/>
           </a:xfrm>
           <a:prstGeom prst="rect">
@@ -12960,7 +12839,7 @@
         </p:nvCxnSpPr>
         <p:spPr>
           <a:xfrm flipH="1">
-            <a:off x="7452320" y="3969930"/>
+            <a:off x="7452320" y="4030981"/>
             <a:ext cx="987706" cy="0"/>
           </a:xfrm>
           <a:prstGeom prst="line">
@@ -12993,8 +12872,8 @@
         </p:nvCxnSpPr>
         <p:spPr>
           <a:xfrm>
-            <a:off x="6176918" y="2960002"/>
-            <a:ext cx="1769255" cy="686762"/>
+            <a:off x="6276350" y="3021053"/>
+            <a:ext cx="1669823" cy="686762"/>
           </a:xfrm>
           <a:prstGeom prst="bentConnector2">
             <a:avLst/>
@@ -13031,7 +12910,7 @@
         <p:spPr>
           <a:xfrm>
             <a:off x="4232702" y="707722"/>
-            <a:ext cx="3713471" cy="2939042"/>
+            <a:ext cx="3713471" cy="3000093"/>
           </a:xfrm>
           <a:prstGeom prst="bentConnector2">
             <a:avLst/>
@@ -13064,7 +12943,7 @@
         </p:nvSpPr>
         <p:spPr>
           <a:xfrm>
-            <a:off x="6636391" y="2614770"/>
+            <a:off x="6516216" y="2675821"/>
             <a:ext cx="815929" cy="369332"/>
           </a:xfrm>
           <a:prstGeom prst="rect">
@@ -13111,6 +12990,91 @@
             <a:r>
               <a:rPr lang="de-DE" i="1" dirty="0" smtClean="0"/>
               <a:t>corpus</a:t>
+            </a:r>
+            <a:endParaRPr lang="de-DE" i="1" dirty="0"/>
+          </a:p>
+        </p:txBody>
+      </p:sp>
+      <p:cxnSp>
+        <p:nvCxnSpPr>
+          <p:cNvPr id="78" name="Elbow Connector 77"/>
+          <p:cNvCxnSpPr>
+            <a:stCxn id="9" idx="3"/>
+            <a:endCxn id="90" idx="1"/>
+          </p:cNvCxnSpPr>
+          <p:nvPr/>
+        </p:nvCxnSpPr>
+        <p:spPr>
+          <a:xfrm rot="16200000" flipH="1">
+            <a:off x="90479" y="5343280"/>
+            <a:ext cx="2158286" cy="324036"/>
+          </a:xfrm>
+          <a:prstGeom prst="bentConnector2">
+            <a:avLst/>
+          </a:prstGeom>
+        </p:spPr>
+        <p:style>
+          <a:lnRef idx="2">
+            <a:schemeClr val="dk1"/>
+          </a:lnRef>
+          <a:fillRef idx="0">
+            <a:schemeClr val="dk1"/>
+          </a:fillRef>
+          <a:effectRef idx="1">
+            <a:schemeClr val="dk1"/>
+          </a:effectRef>
+          <a:fontRef idx="minor">
+            <a:schemeClr val="tx1"/>
+          </a:fontRef>
+        </p:style>
+      </p:cxnSp>
+      <p:sp>
+        <p:nvSpPr>
+          <p:cNvPr id="90" name="TextBox 89"/>
+          <p:cNvSpPr txBox="1"/>
+          <p:nvPr/>
+        </p:nvSpPr>
+        <p:spPr>
+          <a:xfrm>
+            <a:off x="1331640" y="6399775"/>
+            <a:ext cx="2348913" cy="369332"/>
+          </a:xfrm>
+          <a:prstGeom prst="rect">
+            <a:avLst/>
+          </a:prstGeom>
+          <a:noFill/>
+          <a:ln>
+            <a:prstDash val="sysDot"/>
+          </a:ln>
+        </p:spPr>
+        <p:style>
+          <a:lnRef idx="2">
+            <a:schemeClr val="dk1"/>
+          </a:lnRef>
+          <a:fillRef idx="1">
+            <a:schemeClr val="lt1"/>
+          </a:fillRef>
+          <a:effectRef idx="0">
+            <a:schemeClr val="dk1"/>
+          </a:effectRef>
+          <a:fontRef idx="minor">
+            <a:schemeClr val="dk1"/>
+          </a:fontRef>
+        </p:style>
+        <p:txBody>
+          <a:bodyPr wrap="square" rtlCol="0">
+            <a:spAutoFit/>
+          </a:bodyPr>
+          <a:lstStyle/>
+          <a:p>
+            <a:pPr algn="ctr"/>
+            <a:r>
+              <a:rPr lang="de-DE" dirty="0" smtClean="0"/>
+              <a:t>... </a:t>
+            </a:r>
+            <a:r>
+              <a:rPr lang="de-DE" i="1" dirty="0" smtClean="0"/>
+              <a:t>(user-defined)</a:t>
             </a:r>
             <a:endParaRPr lang="de-DE" i="1" dirty="0"/>
           </a:p>
@@ -13155,365 +13119,6 @@
       </p:grpSpPr>
       <p:sp>
         <p:nvSpPr>
-          <p:cNvPr id="4" name="TextBox 3"/>
-          <p:cNvSpPr txBox="1"/>
-          <p:nvPr/>
-        </p:nvSpPr>
-        <p:spPr>
-          <a:xfrm>
-            <a:off x="1318578" y="3913806"/>
-            <a:ext cx="1237198" cy="369332"/>
-          </a:xfrm>
-          <a:prstGeom prst="rect">
-            <a:avLst/>
-          </a:prstGeom>
-          <a:solidFill>
-            <a:schemeClr val="bg2"/>
-          </a:solidFill>
-          <a:ln>
-            <a:prstDash val="solid"/>
-          </a:ln>
-        </p:spPr>
-        <p:style>
-          <a:lnRef idx="2">
-            <a:schemeClr val="dk1"/>
-          </a:lnRef>
-          <a:fillRef idx="1">
-            <a:schemeClr val="lt1"/>
-          </a:fillRef>
-          <a:effectRef idx="0">
-            <a:schemeClr val="dk1"/>
-          </a:effectRef>
-          <a:fontRef idx="minor">
-            <a:schemeClr val="dk1"/>
-          </a:fontRef>
-        </p:style>
-        <p:txBody>
-          <a:bodyPr wrap="none" rtlCol="0">
-            <a:spAutoFit/>
-          </a:bodyPr>
-          <a:lstStyle/>
-          <a:p>
-            <a:pPr algn="ctr"/>
-            <a:r>
-              <a:rPr lang="de-DE" i="1" dirty="0" smtClean="0"/>
-              <a:t>Observable</a:t>
-            </a:r>
-            <a:endParaRPr lang="de-DE" i="1" dirty="0"/>
-          </a:p>
-        </p:txBody>
-      </p:sp>
-      <p:sp>
-        <p:nvSpPr>
-          <p:cNvPr id="14" name="TextBox 13"/>
-          <p:cNvSpPr txBox="1"/>
-          <p:nvPr/>
-        </p:nvSpPr>
-        <p:spPr>
-          <a:xfrm>
-            <a:off x="3995936" y="3779748"/>
-            <a:ext cx="1786258" cy="646331"/>
-          </a:xfrm>
-          <a:prstGeom prst="rect">
-            <a:avLst/>
-          </a:prstGeom>
-          <a:solidFill>
-            <a:schemeClr val="bg2"/>
-          </a:solidFill>
-          <a:ln/>
-        </p:spPr>
-        <p:style>
-          <a:lnRef idx="2">
-            <a:schemeClr val="dk1"/>
-          </a:lnRef>
-          <a:fillRef idx="1">
-            <a:schemeClr val="lt1"/>
-          </a:fillRef>
-          <a:effectRef idx="0">
-            <a:schemeClr val="dk1"/>
-          </a:effectRef>
-          <a:fontRef idx="minor">
-            <a:schemeClr val="dk1"/>
-          </a:fontRef>
-        </p:style>
-        <p:txBody>
-          <a:bodyPr wrap="none" rtlCol="0">
-            <a:spAutoFit/>
-          </a:bodyPr>
-          <a:lstStyle/>
-          <a:p>
-            <a:r>
-              <a:rPr lang="de-DE" i="1" dirty="0" smtClean="0"/>
-              <a:t>CorpusFrequency</a:t>
-            </a:r>
-          </a:p>
-          <a:p>
-            <a:r>
-              <a:rPr lang="de-DE" dirty="0" smtClean="0"/>
-              <a:t>rdf:value: int</a:t>
-            </a:r>
-            <a:endParaRPr lang="de-DE" dirty="0"/>
-          </a:p>
-        </p:txBody>
-      </p:sp>
-      <p:sp>
-        <p:nvSpPr>
-          <p:cNvPr id="16" name="TextBox 15"/>
-          <p:cNvSpPr txBox="1"/>
-          <p:nvPr/>
-        </p:nvSpPr>
-        <p:spPr>
-          <a:xfrm>
-            <a:off x="2793297" y="3759423"/>
-            <a:ext cx="1130631" cy="369332"/>
-          </a:xfrm>
-          <a:prstGeom prst="rect">
-            <a:avLst/>
-          </a:prstGeom>
-          <a:noFill/>
-        </p:spPr>
-        <p:txBody>
-          <a:bodyPr wrap="none" rtlCol="0">
-            <a:spAutoFit/>
-          </a:bodyPr>
-          <a:lstStyle/>
-          <a:p>
-            <a:r>
-              <a:rPr lang="de-DE" i="1" dirty="0" smtClean="0"/>
-              <a:t>frequency</a:t>
-            </a:r>
-            <a:endParaRPr lang="de-DE" i="1" dirty="0"/>
-          </a:p>
-        </p:txBody>
-      </p:sp>
-      <p:cxnSp>
-        <p:nvCxnSpPr>
-          <p:cNvPr id="18" name="Straight Arrow Connector 17"/>
-          <p:cNvCxnSpPr>
-            <a:stCxn id="14" idx="3"/>
-            <a:endCxn id="74" idx="1"/>
-          </p:cNvCxnSpPr>
-          <p:nvPr/>
-        </p:nvCxnSpPr>
-        <p:spPr>
-          <a:xfrm flipV="1">
-            <a:off x="5782194" y="4102913"/>
-            <a:ext cx="1670126" cy="1"/>
-          </a:xfrm>
-          <a:prstGeom prst="straightConnector1">
-            <a:avLst/>
-          </a:prstGeom>
-          <a:ln>
-            <a:tailEnd type="arrow"/>
-          </a:ln>
-        </p:spPr>
-        <p:style>
-          <a:lnRef idx="2">
-            <a:schemeClr val="dk1"/>
-          </a:lnRef>
-          <a:fillRef idx="0">
-            <a:schemeClr val="dk1"/>
-          </a:fillRef>
-          <a:effectRef idx="1">
-            <a:schemeClr val="dk1"/>
-          </a:effectRef>
-          <a:fontRef idx="minor">
-            <a:schemeClr val="tx1"/>
-          </a:fontRef>
-        </p:style>
-      </p:cxnSp>
-      <p:sp>
-        <p:nvSpPr>
-          <p:cNvPr id="19" name="TextBox 18"/>
-          <p:cNvSpPr txBox="1"/>
-          <p:nvPr/>
-        </p:nvSpPr>
-        <p:spPr>
-          <a:xfrm>
-            <a:off x="6276351" y="3759423"/>
-            <a:ext cx="815929" cy="369332"/>
-          </a:xfrm>
-          <a:prstGeom prst="rect">
-            <a:avLst/>
-          </a:prstGeom>
-          <a:noFill/>
-        </p:spPr>
-        <p:txBody>
-          <a:bodyPr wrap="none" rtlCol="0">
-            <a:spAutoFit/>
-          </a:bodyPr>
-          <a:lstStyle/>
-          <a:p>
-            <a:r>
-              <a:rPr lang="de-DE" i="1" dirty="0" smtClean="0"/>
-              <a:t>corpus</a:t>
-            </a:r>
-            <a:endParaRPr lang="de-DE" i="1" dirty="0"/>
-          </a:p>
-        </p:txBody>
-      </p:sp>
-      <p:cxnSp>
-        <p:nvCxnSpPr>
-          <p:cNvPr id="20" name="Straight Connector 19"/>
-          <p:cNvCxnSpPr>
-            <a:stCxn id="14" idx="1"/>
-            <a:endCxn id="14" idx="3"/>
-          </p:cNvCxnSpPr>
-          <p:nvPr/>
-        </p:nvCxnSpPr>
-        <p:spPr>
-          <a:xfrm>
-            <a:off x="3995936" y="4102914"/>
-            <a:ext cx="1786258" cy="0"/>
-          </a:xfrm>
-          <a:prstGeom prst="line">
-            <a:avLst/>
-          </a:prstGeom>
-        </p:spPr>
-        <p:style>
-          <a:lnRef idx="1">
-            <a:schemeClr val="dk1"/>
-          </a:lnRef>
-          <a:fillRef idx="0">
-            <a:schemeClr val="dk1"/>
-          </a:fillRef>
-          <a:effectRef idx="0">
-            <a:schemeClr val="dk1"/>
-          </a:effectRef>
-          <a:fontRef idx="minor">
-            <a:schemeClr val="tx1"/>
-          </a:fontRef>
-        </p:style>
-      </p:cxnSp>
-      <p:cxnSp>
-        <p:nvCxnSpPr>
-          <p:cNvPr id="47" name="Elbow Connector 46"/>
-          <p:cNvCxnSpPr>
-            <a:stCxn id="4" idx="3"/>
-            <a:endCxn id="14" idx="1"/>
-          </p:cNvCxnSpPr>
-          <p:nvPr/>
-        </p:nvCxnSpPr>
-        <p:spPr>
-          <a:xfrm>
-            <a:off x="2555776" y="4098472"/>
-            <a:ext cx="1440160" cy="4442"/>
-          </a:xfrm>
-          <a:prstGeom prst="bentConnector3">
-            <a:avLst/>
-          </a:prstGeom>
-          <a:ln>
-            <a:headEnd type="none" w="med" len="med"/>
-            <a:tailEnd type="arrow" w="med" len="med"/>
-          </a:ln>
-        </p:spPr>
-        <p:style>
-          <a:lnRef idx="2">
-            <a:schemeClr val="dk1"/>
-          </a:lnRef>
-          <a:fillRef idx="0">
-            <a:schemeClr val="dk1"/>
-          </a:fillRef>
-          <a:effectRef idx="1">
-            <a:schemeClr val="dk1"/>
-          </a:effectRef>
-          <a:fontRef idx="minor">
-            <a:schemeClr val="tx1"/>
-          </a:fontRef>
-        </p:style>
-      </p:cxnSp>
-      <p:sp>
-        <p:nvSpPr>
-          <p:cNvPr id="74" name="TextBox 73"/>
-          <p:cNvSpPr txBox="1"/>
-          <p:nvPr/>
-        </p:nvSpPr>
-        <p:spPr>
-          <a:xfrm>
-            <a:off x="7452320" y="3779747"/>
-            <a:ext cx="987706" cy="646331"/>
-          </a:xfrm>
-          <a:prstGeom prst="rect">
-            <a:avLst/>
-          </a:prstGeom>
-          <a:solidFill>
-            <a:schemeClr val="bg2"/>
-          </a:solidFill>
-          <a:ln/>
-        </p:spPr>
-        <p:style>
-          <a:lnRef idx="2">
-            <a:schemeClr val="dk1"/>
-          </a:lnRef>
-          <a:fillRef idx="1">
-            <a:schemeClr val="lt1"/>
-          </a:fillRef>
-          <a:effectRef idx="0">
-            <a:schemeClr val="dk1"/>
-          </a:effectRef>
-          <a:fontRef idx="minor">
-            <a:schemeClr val="dk1"/>
-          </a:fontRef>
-        </p:style>
-        <p:txBody>
-          <a:bodyPr wrap="none" rtlCol="0">
-            <a:spAutoFit/>
-          </a:bodyPr>
-          <a:lstStyle/>
-          <a:p>
-            <a:r>
-              <a:rPr lang="de-DE" i="1" dirty="0" smtClean="0"/>
-              <a:t>Corpus</a:t>
-            </a:r>
-          </a:p>
-          <a:p>
-            <a:r>
-              <a:rPr lang="de-DE" i="1" dirty="0" smtClean="0"/>
-              <a:t>total</a:t>
-            </a:r>
-            <a:r>
-              <a:rPr lang="de-DE" dirty="0" smtClean="0"/>
-              <a:t>: int</a:t>
-            </a:r>
-            <a:endParaRPr lang="de-DE" dirty="0"/>
-          </a:p>
-        </p:txBody>
-      </p:sp>
-      <p:cxnSp>
-        <p:nvCxnSpPr>
-          <p:cNvPr id="76" name="Straight Connector 75"/>
-          <p:cNvCxnSpPr>
-            <a:stCxn id="74" idx="3"/>
-            <a:endCxn id="74" idx="1"/>
-          </p:cNvCxnSpPr>
-          <p:nvPr/>
-        </p:nvCxnSpPr>
-        <p:spPr>
-          <a:xfrm flipH="1">
-            <a:off x="7452320" y="4102913"/>
-            <a:ext cx="987706" cy="0"/>
-          </a:xfrm>
-          <a:prstGeom prst="line">
-            <a:avLst/>
-          </a:prstGeom>
-        </p:spPr>
-        <p:style>
-          <a:lnRef idx="1">
-            <a:schemeClr val="dk1"/>
-          </a:lnRef>
-          <a:fillRef idx="0">
-            <a:schemeClr val="dk1"/>
-          </a:fillRef>
-          <a:effectRef idx="0">
-            <a:schemeClr val="dk1"/>
-          </a:effectRef>
-          <a:fontRef idx="minor">
-            <a:schemeClr val="tx1"/>
-          </a:fontRef>
-        </p:style>
-      </p:cxnSp>
-      <p:sp>
-        <p:nvSpPr>
           <p:cNvPr id="2" name="Title 1"/>
           <p:cNvSpPr>
             <a:spLocks noGrp="1"/>
@@ -13535,6 +13140,365 @@
           </a:p>
         </p:txBody>
       </p:sp>
+      <p:sp>
+        <p:nvSpPr>
+          <p:cNvPr id="12" name="TextBox 11"/>
+          <p:cNvSpPr txBox="1"/>
+          <p:nvPr/>
+        </p:nvSpPr>
+        <p:spPr>
+          <a:xfrm>
+            <a:off x="376253" y="3850091"/>
+            <a:ext cx="1237198" cy="369332"/>
+          </a:xfrm>
+          <a:prstGeom prst="rect">
+            <a:avLst/>
+          </a:prstGeom>
+          <a:solidFill>
+            <a:schemeClr val="bg2"/>
+          </a:solidFill>
+          <a:ln>
+            <a:prstDash val="solid"/>
+          </a:ln>
+        </p:spPr>
+        <p:style>
+          <a:lnRef idx="2">
+            <a:schemeClr val="dk1"/>
+          </a:lnRef>
+          <a:fillRef idx="1">
+            <a:schemeClr val="lt1"/>
+          </a:fillRef>
+          <a:effectRef idx="0">
+            <a:schemeClr val="dk1"/>
+          </a:effectRef>
+          <a:fontRef idx="minor">
+            <a:schemeClr val="dk1"/>
+          </a:fontRef>
+        </p:style>
+        <p:txBody>
+          <a:bodyPr wrap="none" rtlCol="0">
+            <a:spAutoFit/>
+          </a:bodyPr>
+          <a:lstStyle/>
+          <a:p>
+            <a:pPr algn="ctr"/>
+            <a:r>
+              <a:rPr lang="de-DE" i="1" dirty="0" smtClean="0"/>
+              <a:t>Observable</a:t>
+            </a:r>
+            <a:endParaRPr lang="de-DE" i="1" dirty="0"/>
+          </a:p>
+        </p:txBody>
+      </p:sp>
+      <p:sp>
+        <p:nvSpPr>
+          <p:cNvPr id="15" name="TextBox 14"/>
+          <p:cNvSpPr txBox="1"/>
+          <p:nvPr/>
+        </p:nvSpPr>
+        <p:spPr>
+          <a:xfrm>
+            <a:off x="3995936" y="3707816"/>
+            <a:ext cx="2290692" cy="646331"/>
+          </a:xfrm>
+          <a:prstGeom prst="rect">
+            <a:avLst/>
+          </a:prstGeom>
+          <a:solidFill>
+            <a:schemeClr val="bg2"/>
+          </a:solidFill>
+          <a:ln/>
+        </p:spPr>
+        <p:style>
+          <a:lnRef idx="2">
+            <a:schemeClr val="dk1"/>
+          </a:lnRef>
+          <a:fillRef idx="1">
+            <a:schemeClr val="lt1"/>
+          </a:fillRef>
+          <a:effectRef idx="0">
+            <a:schemeClr val="dk1"/>
+          </a:effectRef>
+          <a:fontRef idx="minor">
+            <a:schemeClr val="dk1"/>
+          </a:fontRef>
+        </p:style>
+        <p:txBody>
+          <a:bodyPr wrap="square" rtlCol="0">
+            <a:spAutoFit/>
+          </a:bodyPr>
+          <a:lstStyle/>
+          <a:p>
+            <a:r>
+              <a:rPr lang="de-DE" i="1" dirty="0" smtClean="0"/>
+              <a:t>CorpusFrequency</a:t>
+            </a:r>
+          </a:p>
+          <a:p>
+            <a:r>
+              <a:rPr lang="de-DE" dirty="0" smtClean="0"/>
+              <a:t>rdf:value: int</a:t>
+            </a:r>
+            <a:endParaRPr lang="de-DE" dirty="0"/>
+          </a:p>
+        </p:txBody>
+      </p:sp>
+      <p:sp>
+        <p:nvSpPr>
+          <p:cNvPr id="17" name="TextBox 16"/>
+          <p:cNvSpPr txBox="1"/>
+          <p:nvPr/>
+        </p:nvSpPr>
+        <p:spPr>
+          <a:xfrm>
+            <a:off x="2793297" y="3687491"/>
+            <a:ext cx="1130631" cy="369332"/>
+          </a:xfrm>
+          <a:prstGeom prst="rect">
+            <a:avLst/>
+          </a:prstGeom>
+          <a:noFill/>
+        </p:spPr>
+        <p:txBody>
+          <a:bodyPr wrap="none" rtlCol="0">
+            <a:spAutoFit/>
+          </a:bodyPr>
+          <a:lstStyle/>
+          <a:p>
+            <a:r>
+              <a:rPr lang="de-DE" i="1" dirty="0" smtClean="0"/>
+              <a:t>frequency</a:t>
+            </a:r>
+            <a:endParaRPr lang="de-DE" i="1" dirty="0"/>
+          </a:p>
+        </p:txBody>
+      </p:sp>
+      <p:cxnSp>
+        <p:nvCxnSpPr>
+          <p:cNvPr id="21" name="Straight Arrow Connector 20"/>
+          <p:cNvCxnSpPr>
+            <a:stCxn id="15" idx="3"/>
+            <a:endCxn id="25" idx="1"/>
+          </p:cNvCxnSpPr>
+          <p:nvPr/>
+        </p:nvCxnSpPr>
+        <p:spPr>
+          <a:xfrm flipV="1">
+            <a:off x="6286628" y="4030981"/>
+            <a:ext cx="1165692" cy="1"/>
+          </a:xfrm>
+          <a:prstGeom prst="straightConnector1">
+            <a:avLst/>
+          </a:prstGeom>
+          <a:ln>
+            <a:tailEnd type="arrow"/>
+          </a:ln>
+        </p:spPr>
+        <p:style>
+          <a:lnRef idx="2">
+            <a:schemeClr val="dk1"/>
+          </a:lnRef>
+          <a:fillRef idx="0">
+            <a:schemeClr val="dk1"/>
+          </a:fillRef>
+          <a:effectRef idx="1">
+            <a:schemeClr val="dk1"/>
+          </a:effectRef>
+          <a:fontRef idx="minor">
+            <a:schemeClr val="tx1"/>
+          </a:fontRef>
+        </p:style>
+      </p:cxnSp>
+      <p:sp>
+        <p:nvSpPr>
+          <p:cNvPr id="22" name="TextBox 21"/>
+          <p:cNvSpPr txBox="1"/>
+          <p:nvPr/>
+        </p:nvSpPr>
+        <p:spPr>
+          <a:xfrm>
+            <a:off x="6492375" y="3687491"/>
+            <a:ext cx="815929" cy="369332"/>
+          </a:xfrm>
+          <a:prstGeom prst="rect">
+            <a:avLst/>
+          </a:prstGeom>
+          <a:noFill/>
+        </p:spPr>
+        <p:txBody>
+          <a:bodyPr wrap="none" rtlCol="0">
+            <a:spAutoFit/>
+          </a:bodyPr>
+          <a:lstStyle/>
+          <a:p>
+            <a:r>
+              <a:rPr lang="de-DE" i="1" dirty="0" smtClean="0"/>
+              <a:t>corpus</a:t>
+            </a:r>
+            <a:endParaRPr lang="de-DE" i="1" dirty="0"/>
+          </a:p>
+        </p:txBody>
+      </p:sp>
+      <p:cxnSp>
+        <p:nvCxnSpPr>
+          <p:cNvPr id="23" name="Straight Connector 22"/>
+          <p:cNvCxnSpPr>
+            <a:stCxn id="15" idx="1"/>
+            <a:endCxn id="15" idx="3"/>
+          </p:cNvCxnSpPr>
+          <p:nvPr/>
+        </p:nvCxnSpPr>
+        <p:spPr>
+          <a:xfrm>
+            <a:off x="3995936" y="4030982"/>
+            <a:ext cx="2290692" cy="0"/>
+          </a:xfrm>
+          <a:prstGeom prst="line">
+            <a:avLst/>
+          </a:prstGeom>
+        </p:spPr>
+        <p:style>
+          <a:lnRef idx="1">
+            <a:schemeClr val="dk1"/>
+          </a:lnRef>
+          <a:fillRef idx="0">
+            <a:schemeClr val="dk1"/>
+          </a:fillRef>
+          <a:effectRef idx="0">
+            <a:schemeClr val="dk1"/>
+          </a:effectRef>
+          <a:fontRef idx="minor">
+            <a:schemeClr val="tx1"/>
+          </a:fontRef>
+        </p:style>
+      </p:cxnSp>
+      <p:cxnSp>
+        <p:nvCxnSpPr>
+          <p:cNvPr id="24" name="Elbow Connector 23"/>
+          <p:cNvCxnSpPr>
+            <a:stCxn id="12" idx="3"/>
+            <a:endCxn id="15" idx="1"/>
+          </p:cNvCxnSpPr>
+          <p:nvPr/>
+        </p:nvCxnSpPr>
+        <p:spPr>
+          <a:xfrm flipV="1">
+            <a:off x="1613451" y="4030982"/>
+            <a:ext cx="2382485" cy="3775"/>
+          </a:xfrm>
+          <a:prstGeom prst="bentConnector3">
+            <a:avLst/>
+          </a:prstGeom>
+          <a:ln>
+            <a:headEnd type="none" w="med" len="med"/>
+            <a:tailEnd type="arrow" w="med" len="med"/>
+          </a:ln>
+        </p:spPr>
+        <p:style>
+          <a:lnRef idx="2">
+            <a:schemeClr val="dk1"/>
+          </a:lnRef>
+          <a:fillRef idx="0">
+            <a:schemeClr val="dk1"/>
+          </a:fillRef>
+          <a:effectRef idx="1">
+            <a:schemeClr val="dk1"/>
+          </a:effectRef>
+          <a:fontRef idx="minor">
+            <a:schemeClr val="tx1"/>
+          </a:fontRef>
+        </p:style>
+      </p:cxnSp>
+      <p:sp>
+        <p:nvSpPr>
+          <p:cNvPr id="25" name="TextBox 24"/>
+          <p:cNvSpPr txBox="1"/>
+          <p:nvPr/>
+        </p:nvSpPr>
+        <p:spPr>
+          <a:xfrm>
+            <a:off x="7452320" y="3707815"/>
+            <a:ext cx="987706" cy="646331"/>
+          </a:xfrm>
+          <a:prstGeom prst="rect">
+            <a:avLst/>
+          </a:prstGeom>
+          <a:solidFill>
+            <a:schemeClr val="bg2"/>
+          </a:solidFill>
+          <a:ln/>
+        </p:spPr>
+        <p:style>
+          <a:lnRef idx="2">
+            <a:schemeClr val="dk1"/>
+          </a:lnRef>
+          <a:fillRef idx="1">
+            <a:schemeClr val="lt1"/>
+          </a:fillRef>
+          <a:effectRef idx="0">
+            <a:schemeClr val="dk1"/>
+          </a:effectRef>
+          <a:fontRef idx="minor">
+            <a:schemeClr val="dk1"/>
+          </a:fontRef>
+        </p:style>
+        <p:txBody>
+          <a:bodyPr wrap="none" rtlCol="0">
+            <a:spAutoFit/>
+          </a:bodyPr>
+          <a:lstStyle/>
+          <a:p>
+            <a:r>
+              <a:rPr lang="de-DE" i="1" dirty="0" smtClean="0"/>
+              <a:t>Corpus</a:t>
+            </a:r>
+          </a:p>
+          <a:p>
+            <a:r>
+              <a:rPr lang="de-DE" i="1" dirty="0" smtClean="0"/>
+              <a:t>total</a:t>
+            </a:r>
+            <a:r>
+              <a:rPr lang="de-DE" dirty="0" smtClean="0"/>
+              <a:t>: int</a:t>
+            </a:r>
+            <a:endParaRPr lang="de-DE" dirty="0"/>
+          </a:p>
+        </p:txBody>
+      </p:sp>
+      <p:cxnSp>
+        <p:nvCxnSpPr>
+          <p:cNvPr id="26" name="Straight Connector 25"/>
+          <p:cNvCxnSpPr>
+            <a:stCxn id="25" idx="3"/>
+            <a:endCxn id="25" idx="1"/>
+          </p:cNvCxnSpPr>
+          <p:nvPr/>
+        </p:nvCxnSpPr>
+        <p:spPr>
+          <a:xfrm flipH="1">
+            <a:off x="7452320" y="4030981"/>
+            <a:ext cx="987706" cy="0"/>
+          </a:xfrm>
+          <a:prstGeom prst="line">
+            <a:avLst/>
+          </a:prstGeom>
+        </p:spPr>
+        <p:style>
+          <a:lnRef idx="1">
+            <a:schemeClr val="dk1"/>
+          </a:lnRef>
+          <a:fillRef idx="0">
+            <a:schemeClr val="dk1"/>
+          </a:fillRef>
+          <a:effectRef idx="0">
+            <a:schemeClr val="dk1"/>
+          </a:effectRef>
+          <a:fontRef idx="minor">
+            <a:schemeClr val="tx1"/>
+          </a:fontRef>
+        </p:style>
+      </p:cxnSp>
     </p:spTree>
     <p:extLst>
       <p:ext uri="{BB962C8B-B14F-4D97-AF65-F5344CB8AC3E}">
@@ -13597,13 +13561,13 @@
       </p:sp>
       <p:sp>
         <p:nvSpPr>
-          <p:cNvPr id="23" name="TextBox 22"/>
+          <p:cNvPr id="39" name="TextBox 38"/>
           <p:cNvSpPr txBox="1"/>
           <p:nvPr/>
         </p:nvSpPr>
         <p:spPr>
           <a:xfrm>
-            <a:off x="376253" y="3356992"/>
+            <a:off x="971600" y="2924944"/>
             <a:ext cx="1237198" cy="369332"/>
           </a:xfrm>
           <a:prstGeom prst="rect">
@@ -13645,59 +13609,110 @@
           </a:p>
         </p:txBody>
       </p:sp>
-      <p:sp>
-        <p:nvSpPr>
-          <p:cNvPr id="31" name="TextBox 30"/>
-          <p:cNvSpPr txBox="1"/>
-          <p:nvPr/>
-        </p:nvSpPr>
-        <p:spPr>
-          <a:xfrm>
-            <a:off x="1691680" y="3718773"/>
-            <a:ext cx="2317814" cy="646331"/>
-          </a:xfrm>
-          <a:prstGeom prst="rect">
-            <a:avLst/>
-          </a:prstGeom>
-          <a:noFill/>
-        </p:spPr>
-        <p:txBody>
-          <a:bodyPr wrap="none" rtlCol="0">
-            <a:spAutoFit/>
-          </a:bodyPr>
-          <a:lstStyle/>
-          <a:p>
-            <a:r>
-              <a:rPr lang="de-DE" i="1" dirty="0" smtClean="0"/>
-              <a:t>attestation</a:t>
-            </a:r>
-          </a:p>
-          <a:p>
-            <a:r>
-              <a:rPr lang="de-DE" dirty="0" smtClean="0"/>
-              <a:t>subPropertyOf </a:t>
-            </a:r>
-            <a:r>
-              <a:rPr lang="de-DE" i="1" dirty="0" smtClean="0"/>
-              <a:t>citation</a:t>
-            </a:r>
-            <a:endParaRPr lang="de-DE" dirty="0"/>
-          </a:p>
-        </p:txBody>
-      </p:sp>
+      <mc:AlternateContent xmlns:mc="http://schemas.openxmlformats.org/markup-compatibility/2006">
+        <mc:Choice xmlns:a14="http://schemas.microsoft.com/office/drawing/2010/main" Requires="a14">
+          <p:sp>
+            <p:nvSpPr>
+              <p:cNvPr id="41" name="TextBox 40"/>
+              <p:cNvSpPr txBox="1"/>
+              <p:nvPr/>
+            </p:nvSpPr>
+            <p:spPr>
+              <a:xfrm>
+                <a:off x="2568838" y="2776012"/>
+                <a:ext cx="1262974" cy="646331"/>
+              </a:xfrm>
+              <a:prstGeom prst="rect">
+                <a:avLst/>
+              </a:prstGeom>
+              <a:noFill/>
+            </p:spPr>
+            <p:txBody>
+              <a:bodyPr wrap="none" rtlCol="0">
+                <a:spAutoFit/>
+              </a:bodyPr>
+              <a:lstStyle/>
+              <a:p>
+                <a:r>
+                  <a:rPr lang="de-DE" i="1" dirty="0" smtClean="0"/>
+                  <a:t>attestation </a:t>
+                </a:r>
+                <a:endParaRPr lang="de-DE" b="0" i="1" dirty="0" smtClean="0">
+                  <a:latin typeface="Cambria Math"/>
+                </a:endParaRPr>
+              </a:p>
+              <a:p>
+                <a14:m>
+                  <m:oMath xmlns:m="http://schemas.openxmlformats.org/officeDocument/2006/math">
+                    <m:r>
+                      <a:rPr lang="de-DE" b="0" i="1" smtClean="0">
+                        <a:latin typeface="Cambria Math"/>
+                      </a:rPr>
+                      <m:t>⊑</m:t>
+                    </m:r>
+                  </m:oMath>
+                </a14:m>
+                <a:r>
+                  <a:rPr lang="de-DE" i="1" dirty="0" smtClean="0"/>
+                  <a:t> citation</a:t>
+                </a:r>
+                <a:endParaRPr lang="de-DE" i="1" dirty="0"/>
+              </a:p>
+            </p:txBody>
+          </p:sp>
+        </mc:Choice>
+        <mc:Fallback>
+          <p:sp>
+            <p:nvSpPr>
+              <p:cNvPr id="41" name="TextBox 40"/>
+              <p:cNvSpPr txBox="1">
+                <a:spLocks noRot="1" noChangeAspect="1" noMove="1" noResize="1" noEditPoints="1" noAdjustHandles="1" noChangeArrowheads="1" noChangeShapeType="1" noTextEdit="1"/>
+              </p:cNvSpPr>
+              <p:nvPr/>
+            </p:nvSpPr>
+            <p:spPr>
+              <a:xfrm>
+                <a:off x="2568838" y="2776012"/>
+                <a:ext cx="1262974" cy="646331"/>
+              </a:xfrm>
+              <a:prstGeom prst="rect">
+                <a:avLst/>
+              </a:prstGeom>
+              <a:blipFill rotWithShape="1">
+                <a:blip r:embed="rId2"/>
+                <a:stretch>
+                  <a:fillRect l="-3846" t="-4717" r="-2885" b="-14151"/>
+                </a:stretch>
+              </a:blipFill>
+            </p:spPr>
+            <p:txBody>
+              <a:bodyPr/>
+              <a:lstStyle/>
+              <a:p>
+                <a:r>
+                  <a:rPr lang="de-DE">
+                    <a:noFill/>
+                  </a:rPr>
+                  <a:t> </a:t>
+                </a:r>
+              </a:p>
+            </p:txBody>
+          </p:sp>
+        </mc:Fallback>
+      </mc:AlternateContent>
       <p:cxnSp>
         <p:nvCxnSpPr>
-          <p:cNvPr id="32" name="Elbow Connector 31"/>
+          <p:cNvPr id="42" name="Elbow Connector 41"/>
           <p:cNvCxnSpPr>
-            <a:stCxn id="23" idx="3"/>
-            <a:endCxn id="18" idx="1"/>
+            <a:stCxn id="39" idx="3"/>
+            <a:endCxn id="47" idx="1"/>
           </p:cNvCxnSpPr>
           <p:nvPr/>
         </p:nvCxnSpPr>
         <p:spPr>
-          <a:xfrm>
-            <a:off x="1613451" y="3541658"/>
-            <a:ext cx="2094453" cy="1741"/>
+          <a:xfrm flipV="1">
+            <a:off x="2208798" y="3104694"/>
+            <a:ext cx="1584176" cy="4916"/>
           </a:xfrm>
           <a:prstGeom prst="bentConnector3">
             <a:avLst>
@@ -13726,17 +13741,17 @@
       </p:cxnSp>
       <p:cxnSp>
         <p:nvCxnSpPr>
-          <p:cNvPr id="33" name="Elbow Connector 32"/>
+          <p:cNvPr id="45" name="Elbow Connector 44"/>
           <p:cNvCxnSpPr>
-            <a:stCxn id="18" idx="3"/>
-            <a:endCxn id="43" idx="1"/>
+            <a:stCxn id="47" idx="3"/>
+            <a:endCxn id="49" idx="1"/>
           </p:cNvCxnSpPr>
           <p:nvPr/>
         </p:nvCxnSpPr>
         <p:spPr>
-          <a:xfrm flipV="1">
-            <a:off x="6051494" y="3536142"/>
-            <a:ext cx="1183210" cy="7257"/>
+          <a:xfrm>
+            <a:off x="6083666" y="3104694"/>
+            <a:ext cx="1165692" cy="4109"/>
           </a:xfrm>
           <a:prstGeom prst="bentConnector3">
             <a:avLst>
@@ -13763,146 +13778,30 @@
           </a:fontRef>
         </p:style>
       </p:cxnSp>
-      <p:cxnSp>
-        <p:nvCxnSpPr>
-          <p:cNvPr id="40" name="Straight Connector 39"/>
-          <p:cNvCxnSpPr/>
-          <p:nvPr/>
-        </p:nvCxnSpPr>
-        <p:spPr>
-          <a:xfrm>
-            <a:off x="3686386" y="3680158"/>
-            <a:ext cx="1749710" cy="0"/>
-          </a:xfrm>
-          <a:prstGeom prst="line">
-            <a:avLst/>
-          </a:prstGeom>
-        </p:spPr>
-        <p:style>
-          <a:lnRef idx="1">
-            <a:schemeClr val="dk1"/>
-          </a:lnRef>
-          <a:fillRef idx="0">
-            <a:schemeClr val="dk1"/>
-          </a:fillRef>
-          <a:effectRef idx="0">
-            <a:schemeClr val="dk1"/>
-          </a:effectRef>
-          <a:fontRef idx="minor">
-            <a:schemeClr val="tx1"/>
-          </a:fontRef>
-        </p:style>
-      </p:cxnSp>
-      <p:sp>
-        <p:nvSpPr>
-          <p:cNvPr id="43" name="TextBox 42"/>
-          <p:cNvSpPr txBox="1"/>
-          <p:nvPr/>
-        </p:nvSpPr>
-        <p:spPr>
-          <a:xfrm>
-            <a:off x="7234704" y="3212976"/>
-            <a:ext cx="721672" cy="646331"/>
-          </a:xfrm>
-          <a:prstGeom prst="rect">
-            <a:avLst/>
-          </a:prstGeom>
-          <a:noFill/>
-          <a:ln>
-            <a:prstDash val="sysDot"/>
-          </a:ln>
-        </p:spPr>
-        <p:style>
-          <a:lnRef idx="2">
-            <a:schemeClr val="dk1"/>
-          </a:lnRef>
-          <a:fillRef idx="1">
-            <a:schemeClr val="lt1"/>
-          </a:fillRef>
-          <a:effectRef idx="0">
-            <a:schemeClr val="dk1"/>
-          </a:effectRef>
-          <a:fontRef idx="minor">
-            <a:schemeClr val="dk1"/>
-          </a:fontRef>
-        </p:style>
-        <p:txBody>
-          <a:bodyPr wrap="none" rtlCol="0">
-            <a:spAutoFit/>
-          </a:bodyPr>
-          <a:lstStyle/>
-          <a:p>
-            <a:pPr algn="ctr"/>
-            <a:r>
-              <a:rPr lang="de-DE" dirty="0" smtClean="0"/>
-              <a:t>locus </a:t>
-            </a:r>
-          </a:p>
-          <a:p>
-            <a:pPr algn="ctr"/>
-            <a:r>
-              <a:rPr lang="de-DE" dirty="0" smtClean="0"/>
-              <a:t>URI</a:t>
-            </a:r>
-            <a:endParaRPr lang="de-DE" dirty="0"/>
-          </a:p>
-        </p:txBody>
-      </p:sp>
-      <p:sp>
-        <p:nvSpPr>
-          <p:cNvPr id="44" name="TextBox 43"/>
-          <p:cNvSpPr txBox="1"/>
-          <p:nvPr/>
-        </p:nvSpPr>
-        <p:spPr>
-          <a:xfrm>
-            <a:off x="6298600" y="3563724"/>
-            <a:ext cx="668773" cy="369332"/>
-          </a:xfrm>
-          <a:prstGeom prst="rect">
-            <a:avLst/>
-          </a:prstGeom>
-          <a:noFill/>
-        </p:spPr>
-        <p:txBody>
-          <a:bodyPr wrap="none" rtlCol="0">
-            <a:spAutoFit/>
-          </a:bodyPr>
-          <a:lstStyle/>
-          <a:p>
-            <a:pPr algn="ctr"/>
-            <a:r>
-              <a:rPr lang="de-DE" i="1" dirty="0" smtClean="0"/>
-              <a:t>locus</a:t>
-            </a:r>
-            <a:endParaRPr lang="de-DE" i="1" dirty="0"/>
-          </a:p>
-        </p:txBody>
-      </p:sp>
       <p:grpSp>
         <p:nvGrpSpPr>
-          <p:cNvPr id="17" name="Group 16"/>
+          <p:cNvPr id="46" name="Group 45"/>
           <p:cNvGrpSpPr/>
           <p:nvPr/>
         </p:nvGrpSpPr>
         <p:grpSpPr>
           <a:xfrm>
-            <a:off x="3707904" y="3081734"/>
-            <a:ext cx="2343590" cy="923330"/>
-            <a:chOff x="8176191" y="6000546"/>
-            <a:chExt cx="2343590" cy="923330"/>
+            <a:off x="3792974" y="2643029"/>
+            <a:ext cx="2290692" cy="923330"/>
+            <a:chOff x="8176191" y="6138279"/>
+            <a:chExt cx="2290692" cy="923330"/>
           </a:xfrm>
         </p:grpSpPr>
         <p:sp>
           <p:nvSpPr>
-            <p:cNvPr id="18" name="TextBox 17"/>
+            <p:cNvPr id="47" name="TextBox 46"/>
             <p:cNvSpPr txBox="1"/>
             <p:nvPr/>
           </p:nvSpPr>
           <p:spPr>
             <a:xfrm>
-              <a:off x="8176191" y="6000546"/>
-              <a:ext cx="2343590" cy="923330"/>
+              <a:off x="8176191" y="6138279"/>
+              <a:ext cx="2290692" cy="923330"/>
             </a:xfrm>
             <a:prstGeom prst="rect">
               <a:avLst/>
@@ -13946,20 +13845,20 @@
             <a:p>
               <a:r>
                 <a:rPr lang="de-DE" dirty="0" smtClean="0"/>
-                <a:t>attestationGloss: string</a:t>
+                <a:t>attestationGloss:string</a:t>
               </a:r>
             </a:p>
           </p:txBody>
         </p:sp>
         <p:cxnSp>
           <p:nvCxnSpPr>
-            <p:cNvPr id="19" name="Straight Connector 18"/>
+            <p:cNvPr id="48" name="Straight Connector 47"/>
             <p:cNvCxnSpPr/>
             <p:nvPr/>
           </p:nvCxnSpPr>
           <p:spPr>
             <a:xfrm>
-              <a:off x="8176191" y="6347812"/>
+              <a:off x="8176191" y="6477982"/>
               <a:ext cx="2290692" cy="0"/>
             </a:xfrm>
             <a:prstGeom prst="line">
@@ -13982,6 +13881,92 @@
           </p:style>
         </p:cxnSp>
       </p:grpSp>
+      <p:sp>
+        <p:nvSpPr>
+          <p:cNvPr id="49" name="TextBox 48"/>
+          <p:cNvSpPr txBox="1"/>
+          <p:nvPr/>
+        </p:nvSpPr>
+        <p:spPr>
+          <a:xfrm>
+            <a:off x="7249358" y="2785637"/>
+            <a:ext cx="987706" cy="646331"/>
+          </a:xfrm>
+          <a:prstGeom prst="rect">
+            <a:avLst/>
+          </a:prstGeom>
+          <a:noFill/>
+          <a:ln>
+            <a:prstDash val="sysDot"/>
+          </a:ln>
+        </p:spPr>
+        <p:style>
+          <a:lnRef idx="2">
+            <a:schemeClr val="dk1"/>
+          </a:lnRef>
+          <a:fillRef idx="1">
+            <a:schemeClr val="lt1"/>
+          </a:fillRef>
+          <a:effectRef idx="0">
+            <a:schemeClr val="dk1"/>
+          </a:effectRef>
+          <a:fontRef idx="minor">
+            <a:schemeClr val="dk1"/>
+          </a:fontRef>
+        </p:style>
+        <p:txBody>
+          <a:bodyPr wrap="square" rtlCol="0">
+            <a:spAutoFit/>
+          </a:bodyPr>
+          <a:lstStyle/>
+          <a:p>
+            <a:pPr algn="ctr"/>
+            <a:r>
+              <a:rPr lang="de-DE" dirty="0" smtClean="0"/>
+              <a:t>locus </a:t>
+            </a:r>
+          </a:p>
+          <a:p>
+            <a:pPr algn="ctr"/>
+            <a:r>
+              <a:rPr lang="de-DE" dirty="0" smtClean="0"/>
+              <a:t>URI</a:t>
+            </a:r>
+            <a:endParaRPr lang="de-DE" dirty="0"/>
+          </a:p>
+        </p:txBody>
+      </p:sp>
+      <p:sp>
+        <p:nvSpPr>
+          <p:cNvPr id="50" name="TextBox 49"/>
+          <p:cNvSpPr txBox="1"/>
+          <p:nvPr/>
+        </p:nvSpPr>
+        <p:spPr>
+          <a:xfrm>
+            <a:off x="6364561" y="2764979"/>
+            <a:ext cx="668773" cy="369332"/>
+          </a:xfrm>
+          <a:prstGeom prst="rect">
+            <a:avLst/>
+          </a:prstGeom>
+          <a:noFill/>
+        </p:spPr>
+        <p:txBody>
+          <a:bodyPr wrap="none" rtlCol="0">
+            <a:spAutoFit/>
+          </a:bodyPr>
+          <a:lstStyle/>
+          <a:p>
+            <a:pPr algn="ctr"/>
+            <a:r>
+              <a:rPr lang="de-DE" i="1" dirty="0" smtClean="0"/>
+              <a:t>locus</a:t>
+            </a:r>
+            <a:endParaRPr lang="de-DE" i="1" dirty="0"/>
+          </a:p>
+        </p:txBody>
+      </p:sp>
     </p:spTree>
     <p:extLst>
       <p:ext uri="{BB962C8B-B14F-4D97-AF65-F5344CB8AC3E}">
@@ -15573,13 +15558,8 @@
           <a:p>
             <a:r>
               <a:rPr lang="de-DE" dirty="0" smtClean="0"/>
-              <a:t>dc:description: </a:t>
-            </a:r>
-            <a:r>
-              <a:rPr lang="de-DE" dirty="0" smtClean="0"/>
-              <a:t>String</a:t>
-            </a:r>
-            <a:endParaRPr lang="de-DE" dirty="0" smtClean="0"/>
+              <a:t>dc:description: String</a:t>
+            </a:r>
           </a:p>
           <a:p>
             <a:r>
@@ -15590,11 +15570,7 @@
           <a:p>
             <a:r>
               <a:rPr lang="de-DE" dirty="0" smtClean="0"/>
-              <a:t>rdf:value</a:t>
-            </a:r>
-            <a:r>
-              <a:rPr lang="de-DE" dirty="0" smtClean="0"/>
-              <a:t>: Literal</a:t>
+              <a:t>rdf:value: Literal</a:t>
             </a:r>
             <a:endParaRPr lang="de-DE" dirty="0"/>
           </a:p>
@@ -15805,7 +15781,6 @@
               <a:rPr lang="de-DE" i="1" dirty="0" smtClean="0"/>
               <a:t>Corpus</a:t>
             </a:r>
-            <a:endParaRPr lang="de-DE" i="1" dirty="0" smtClean="0"/>
           </a:p>
         </p:txBody>
       </p:sp>

</xml_diff>